<commit_message>
Rewrite ch08, B-tree split/unsplit
</commit_message>
<xml_diff>
--- a/datastruct/tree/B-tree/img/btrees.pptx
+++ b/datastruct/tree/B-tree/img/btrees.pptx
@@ -6,6 +6,7 @@
   </p:sldMasterIdLst>
   <p:sldIdLst>
     <p:sldId id="256" r:id="rId2"/>
+    <p:sldId id="257" r:id="rId3"/>
   </p:sldIdLst>
   <p:sldSz cx="12192000" cy="6858000"/>
   <p:notesSz cx="6858000" cy="9144000"/>
@@ -104,6 +105,11 @@
       </a:defRPr>
     </a:lvl9pPr>
   </p:defaultTextStyle>
+  <p:extLst>
+    <p:ext uri="{EFAFB233-063F-42B5-8137-9DF3F51BA10A}">
+      <p15:sldGuideLst xmlns:p15="http://schemas.microsoft.com/office/powerpoint/2012/main"/>
+    </p:ext>
+  </p:extLst>
 </p:presentation>
 </file>
 
@@ -256,7 +262,7 @@
           <a:p>
             <a:fld id="{B6EEB924-5985-A949-B5CF-883A526C1012}" type="datetimeFigureOut">
               <a:rPr lang="en-CN" smtClean="0"/>
-              <a:t>2021/9/10</a:t>
+              <a:t>2021/9/12</a:t>
             </a:fld>
             <a:endParaRPr lang="en-CN"/>
           </a:p>
@@ -456,7 +462,7 @@
           <a:p>
             <a:fld id="{B6EEB924-5985-A949-B5CF-883A526C1012}" type="datetimeFigureOut">
               <a:rPr lang="en-CN" smtClean="0"/>
-              <a:t>2021/9/10</a:t>
+              <a:t>2021/9/12</a:t>
             </a:fld>
             <a:endParaRPr lang="en-CN"/>
           </a:p>
@@ -666,7 +672,7 @@
           <a:p>
             <a:fld id="{B6EEB924-5985-A949-B5CF-883A526C1012}" type="datetimeFigureOut">
               <a:rPr lang="en-CN" smtClean="0"/>
-              <a:t>2021/9/10</a:t>
+              <a:t>2021/9/12</a:t>
             </a:fld>
             <a:endParaRPr lang="en-CN"/>
           </a:p>
@@ -866,7 +872,7 @@
           <a:p>
             <a:fld id="{B6EEB924-5985-A949-B5CF-883A526C1012}" type="datetimeFigureOut">
               <a:rPr lang="en-CN" smtClean="0"/>
-              <a:t>2021/9/10</a:t>
+              <a:t>2021/9/12</a:t>
             </a:fld>
             <a:endParaRPr lang="en-CN"/>
           </a:p>
@@ -1142,7 +1148,7 @@
           <a:p>
             <a:fld id="{B6EEB924-5985-A949-B5CF-883A526C1012}" type="datetimeFigureOut">
               <a:rPr lang="en-CN" smtClean="0"/>
-              <a:t>2021/9/10</a:t>
+              <a:t>2021/9/12</a:t>
             </a:fld>
             <a:endParaRPr lang="en-CN"/>
           </a:p>
@@ -1410,7 +1416,7 @@
           <a:p>
             <a:fld id="{B6EEB924-5985-A949-B5CF-883A526C1012}" type="datetimeFigureOut">
               <a:rPr lang="en-CN" smtClean="0"/>
-              <a:t>2021/9/10</a:t>
+              <a:t>2021/9/12</a:t>
             </a:fld>
             <a:endParaRPr lang="en-CN"/>
           </a:p>
@@ -1825,7 +1831,7 @@
           <a:p>
             <a:fld id="{B6EEB924-5985-A949-B5CF-883A526C1012}" type="datetimeFigureOut">
               <a:rPr lang="en-CN" smtClean="0"/>
-              <a:t>2021/9/10</a:t>
+              <a:t>2021/9/12</a:t>
             </a:fld>
             <a:endParaRPr lang="en-CN"/>
           </a:p>
@@ -1967,7 +1973,7 @@
           <a:p>
             <a:fld id="{B6EEB924-5985-A949-B5CF-883A526C1012}" type="datetimeFigureOut">
               <a:rPr lang="en-CN" smtClean="0"/>
-              <a:t>2021/9/10</a:t>
+              <a:t>2021/9/12</a:t>
             </a:fld>
             <a:endParaRPr lang="en-CN"/>
           </a:p>
@@ -2080,7 +2086,7 @@
           <a:p>
             <a:fld id="{B6EEB924-5985-A949-B5CF-883A526C1012}" type="datetimeFigureOut">
               <a:rPr lang="en-CN" smtClean="0"/>
-              <a:t>2021/9/10</a:t>
+              <a:t>2021/9/12</a:t>
             </a:fld>
             <a:endParaRPr lang="en-CN"/>
           </a:p>
@@ -2393,7 +2399,7 @@
           <a:p>
             <a:fld id="{B6EEB924-5985-A949-B5CF-883A526C1012}" type="datetimeFigureOut">
               <a:rPr lang="en-CN" smtClean="0"/>
-              <a:t>2021/9/10</a:t>
+              <a:t>2021/9/12</a:t>
             </a:fld>
             <a:endParaRPr lang="en-CN"/>
           </a:p>
@@ -2682,7 +2688,7 @@
           <a:p>
             <a:fld id="{B6EEB924-5985-A949-B5CF-883A526C1012}" type="datetimeFigureOut">
               <a:rPr lang="en-CN" smtClean="0"/>
-              <a:t>2021/9/10</a:t>
+              <a:t>2021/9/12</a:t>
             </a:fld>
             <a:endParaRPr lang="en-CN"/>
           </a:p>
@@ -2925,7 +2931,7 @@
           <a:p>
             <a:fld id="{B6EEB924-5985-A949-B5CF-883A526C1012}" type="datetimeFigureOut">
               <a:rPr lang="en-CN" smtClean="0"/>
-              <a:t>2021/9/10</a:t>
+              <a:t>2021/9/12</a:t>
             </a:fld>
             <a:endParaRPr lang="en-CN"/>
           </a:p>
@@ -4162,6 +4168,1643 @@
 </p:sld>
 </file>
 
+<file path=ppt/slides/slide2.xml><?xml version="1.0" encoding="utf-8"?>
+<p:sld xmlns:a="http://schemas.openxmlformats.org/drawingml/2006/main" xmlns:r="http://schemas.openxmlformats.org/officeDocument/2006/relationships" xmlns:p="http://schemas.openxmlformats.org/presentationml/2006/main">
+  <p:cSld>
+    <p:spTree>
+      <p:nvGrpSpPr>
+        <p:cNvPr id="1" name=""/>
+        <p:cNvGrpSpPr/>
+        <p:nvPr/>
+      </p:nvGrpSpPr>
+      <p:grpSpPr>
+        <a:xfrm>
+          <a:off x="0" y="0"/>
+          <a:ext cx="0" cy="0"/>
+          <a:chOff x="0" y="0"/>
+          <a:chExt cx="0" cy="0"/>
+        </a:xfrm>
+      </p:grpSpPr>
+      <p:sp>
+        <p:nvSpPr>
+          <p:cNvPr id="3" name="Rectangle 2">
+            <a:extLst>
+              <a:ext uri="{FF2B5EF4-FFF2-40B4-BE49-F238E27FC236}">
+                <a16:creationId xmlns:a16="http://schemas.microsoft.com/office/drawing/2014/main" id="{B5459B50-ACE7-C344-AD18-962652055465}"/>
+              </a:ext>
+            </a:extLst>
+          </p:cNvPr>
+          <p:cNvSpPr/>
+          <p:nvPr/>
+        </p:nvSpPr>
+        <p:spPr>
+          <a:xfrm>
+            <a:off x="2406882" y="4348654"/>
+            <a:ext cx="609600" cy="567559"/>
+          </a:xfrm>
+          <a:prstGeom prst="rect">
+            <a:avLst/>
+          </a:prstGeom>
+        </p:spPr>
+        <p:style>
+          <a:lnRef idx="2">
+            <a:schemeClr val="dk1"/>
+          </a:lnRef>
+          <a:fillRef idx="1">
+            <a:schemeClr val="lt1"/>
+          </a:fillRef>
+          <a:effectRef idx="0">
+            <a:schemeClr val="dk1"/>
+          </a:effectRef>
+          <a:fontRef idx="minor">
+            <a:schemeClr val="dk1"/>
+          </a:fontRef>
+        </p:style>
+        <p:txBody>
+          <a:bodyPr rtlCol="0" anchor="ctr"/>
+          <a:lstStyle/>
+          <a:p>
+            <a:pPr algn="ctr"/>
+            <a:r>
+              <a:rPr lang="en-CN" i="1" dirty="0">
+                <a:latin typeface="Times New Roman" panose="02020603050405020304" pitchFamily="18" charset="0"/>
+                <a:cs typeface="Times New Roman" panose="02020603050405020304" pitchFamily="18" charset="0"/>
+              </a:rPr>
+              <a:t>k</a:t>
+            </a:r>
+            <a:r>
+              <a:rPr lang="en-CN" baseline="-25000" dirty="0"/>
+              <a:t>1</a:t>
+            </a:r>
+          </a:p>
+        </p:txBody>
+      </p:sp>
+      <p:sp>
+        <p:nvSpPr>
+          <p:cNvPr id="4" name="Rectangle 3">
+            <a:extLst>
+              <a:ext uri="{FF2B5EF4-FFF2-40B4-BE49-F238E27FC236}">
+                <a16:creationId xmlns:a16="http://schemas.microsoft.com/office/drawing/2014/main" id="{20826EA8-8C02-5F42-9159-14BB2DCA1ABC}"/>
+              </a:ext>
+            </a:extLst>
+          </p:cNvPr>
+          <p:cNvSpPr/>
+          <p:nvPr/>
+        </p:nvSpPr>
+        <p:spPr>
+          <a:xfrm>
+            <a:off x="3016482" y="4348654"/>
+            <a:ext cx="609600" cy="567559"/>
+          </a:xfrm>
+          <a:prstGeom prst="rect">
+            <a:avLst/>
+          </a:prstGeom>
+        </p:spPr>
+        <p:style>
+          <a:lnRef idx="2">
+            <a:schemeClr val="dk1"/>
+          </a:lnRef>
+          <a:fillRef idx="1">
+            <a:schemeClr val="lt1"/>
+          </a:fillRef>
+          <a:effectRef idx="0">
+            <a:schemeClr val="dk1"/>
+          </a:effectRef>
+          <a:fontRef idx="minor">
+            <a:schemeClr val="dk1"/>
+          </a:fontRef>
+        </p:style>
+        <p:txBody>
+          <a:bodyPr rtlCol="0" anchor="ctr"/>
+          <a:lstStyle/>
+          <a:p>
+            <a:pPr algn="ctr"/>
+            <a:r>
+              <a:rPr lang="en-CN" dirty="0">
+                <a:latin typeface="Times New Roman" panose="02020603050405020304" pitchFamily="18" charset="0"/>
+                <a:cs typeface="Times New Roman" panose="02020603050405020304" pitchFamily="18" charset="0"/>
+              </a:rPr>
+              <a:t>…</a:t>
+            </a:r>
+          </a:p>
+        </p:txBody>
+      </p:sp>
+      <p:sp>
+        <p:nvSpPr>
+          <p:cNvPr id="5" name="Rectangle 4">
+            <a:extLst>
+              <a:ext uri="{FF2B5EF4-FFF2-40B4-BE49-F238E27FC236}">
+                <a16:creationId xmlns:a16="http://schemas.microsoft.com/office/drawing/2014/main" id="{7A86A469-3E50-D349-BD13-3D7C56301A40}"/>
+              </a:ext>
+            </a:extLst>
+          </p:cNvPr>
+          <p:cNvSpPr/>
+          <p:nvPr/>
+        </p:nvSpPr>
+        <p:spPr>
+          <a:xfrm>
+            <a:off x="3626082" y="4348654"/>
+            <a:ext cx="609600" cy="567559"/>
+          </a:xfrm>
+          <a:prstGeom prst="rect">
+            <a:avLst/>
+          </a:prstGeom>
+        </p:spPr>
+        <p:style>
+          <a:lnRef idx="2">
+            <a:schemeClr val="dk1"/>
+          </a:lnRef>
+          <a:fillRef idx="1">
+            <a:schemeClr val="lt1"/>
+          </a:fillRef>
+          <a:effectRef idx="0">
+            <a:schemeClr val="dk1"/>
+          </a:effectRef>
+          <a:fontRef idx="minor">
+            <a:schemeClr val="dk1"/>
+          </a:fontRef>
+        </p:style>
+        <p:txBody>
+          <a:bodyPr rtlCol="0" anchor="ctr"/>
+          <a:lstStyle/>
+          <a:p>
+            <a:pPr algn="ctr"/>
+            <a:r>
+              <a:rPr lang="en-US" i="1" dirty="0">
+                <a:latin typeface="Times New Roman" panose="02020603050405020304" pitchFamily="18" charset="0"/>
+                <a:cs typeface="Times New Roman" panose="02020603050405020304" pitchFamily="18" charset="0"/>
+              </a:rPr>
+              <a:t>k</a:t>
+            </a:r>
+            <a:r>
+              <a:rPr lang="en-CN" i="1" baseline="-25000" dirty="0">
+                <a:latin typeface="Times New Roman" panose="02020603050405020304" pitchFamily="18" charset="0"/>
+                <a:cs typeface="Times New Roman" panose="02020603050405020304" pitchFamily="18" charset="0"/>
+              </a:rPr>
+              <a:t>m</a:t>
+            </a:r>
+            <a:r>
+              <a:rPr lang="en-CN" baseline="-25000" dirty="0"/>
+              <a:t>-1</a:t>
+            </a:r>
+          </a:p>
+        </p:txBody>
+      </p:sp>
+      <p:sp>
+        <p:nvSpPr>
+          <p:cNvPr id="6" name="Rectangle 5">
+            <a:extLst>
+              <a:ext uri="{FF2B5EF4-FFF2-40B4-BE49-F238E27FC236}">
+                <a16:creationId xmlns:a16="http://schemas.microsoft.com/office/drawing/2014/main" id="{B27DD51C-43F2-FC4A-B0DE-1799D03FE106}"/>
+              </a:ext>
+            </a:extLst>
+          </p:cNvPr>
+          <p:cNvSpPr/>
+          <p:nvPr/>
+        </p:nvSpPr>
+        <p:spPr>
+          <a:xfrm>
+            <a:off x="7157563" y="4348653"/>
+            <a:ext cx="609600" cy="567559"/>
+          </a:xfrm>
+          <a:prstGeom prst="rect">
+            <a:avLst/>
+          </a:prstGeom>
+        </p:spPr>
+        <p:style>
+          <a:lnRef idx="2">
+            <a:schemeClr val="dk1"/>
+          </a:lnRef>
+          <a:fillRef idx="1">
+            <a:schemeClr val="lt1"/>
+          </a:fillRef>
+          <a:effectRef idx="0">
+            <a:schemeClr val="dk1"/>
+          </a:effectRef>
+          <a:fontRef idx="minor">
+            <a:schemeClr val="dk1"/>
+          </a:fontRef>
+        </p:style>
+        <p:txBody>
+          <a:bodyPr rtlCol="0" anchor="ctr"/>
+          <a:lstStyle/>
+          <a:p>
+            <a:pPr algn="ctr"/>
+            <a:r>
+              <a:rPr lang="en-US" i="1" dirty="0">
+                <a:latin typeface="Times New Roman" panose="02020603050405020304" pitchFamily="18" charset="0"/>
+                <a:cs typeface="Times New Roman" panose="02020603050405020304" pitchFamily="18" charset="0"/>
+              </a:rPr>
+              <a:t>k</a:t>
+            </a:r>
+            <a:r>
+              <a:rPr lang="en-CN" i="1" baseline="-25000" dirty="0">
+                <a:latin typeface="Times New Roman" panose="02020603050405020304" pitchFamily="18" charset="0"/>
+                <a:cs typeface="Times New Roman" panose="02020603050405020304" pitchFamily="18" charset="0"/>
+              </a:rPr>
+              <a:t>m+</a:t>
+            </a:r>
+            <a:r>
+              <a:rPr lang="en-CN" baseline="-25000" dirty="0">
+                <a:latin typeface="Times New Roman" panose="02020603050405020304" pitchFamily="18" charset="0"/>
+                <a:cs typeface="Times New Roman" panose="02020603050405020304" pitchFamily="18" charset="0"/>
+              </a:rPr>
+              <a:t>1</a:t>
+            </a:r>
+          </a:p>
+        </p:txBody>
+      </p:sp>
+      <p:sp>
+        <p:nvSpPr>
+          <p:cNvPr id="7" name="Rectangle 6">
+            <a:extLst>
+              <a:ext uri="{FF2B5EF4-FFF2-40B4-BE49-F238E27FC236}">
+                <a16:creationId xmlns:a16="http://schemas.microsoft.com/office/drawing/2014/main" id="{B54C2FE3-F4F3-9049-87F8-0651FC9BAF4E}"/>
+              </a:ext>
+            </a:extLst>
+          </p:cNvPr>
+          <p:cNvSpPr/>
+          <p:nvPr/>
+        </p:nvSpPr>
+        <p:spPr>
+          <a:xfrm>
+            <a:off x="8376763" y="4348654"/>
+            <a:ext cx="609600" cy="567559"/>
+          </a:xfrm>
+          <a:prstGeom prst="rect">
+            <a:avLst/>
+          </a:prstGeom>
+        </p:spPr>
+        <p:style>
+          <a:lnRef idx="2">
+            <a:schemeClr val="dk1"/>
+          </a:lnRef>
+          <a:fillRef idx="1">
+            <a:schemeClr val="lt1"/>
+          </a:fillRef>
+          <a:effectRef idx="0">
+            <a:schemeClr val="dk1"/>
+          </a:effectRef>
+          <a:fontRef idx="minor">
+            <a:schemeClr val="dk1"/>
+          </a:fontRef>
+        </p:style>
+        <p:txBody>
+          <a:bodyPr rtlCol="0" anchor="ctr"/>
+          <a:lstStyle/>
+          <a:p>
+            <a:pPr algn="ctr"/>
+            <a:r>
+              <a:rPr lang="en-CN" i="1" dirty="0">
+                <a:latin typeface="Times New Roman" panose="02020603050405020304" pitchFamily="18" charset="0"/>
+                <a:cs typeface="Times New Roman" panose="02020603050405020304" pitchFamily="18" charset="0"/>
+              </a:rPr>
+              <a:t>k</a:t>
+            </a:r>
+            <a:r>
+              <a:rPr lang="en-CN" i="1" baseline="-25000" dirty="0">
+                <a:latin typeface="Times New Roman" panose="02020603050405020304" pitchFamily="18" charset="0"/>
+                <a:cs typeface="Times New Roman" panose="02020603050405020304" pitchFamily="18" charset="0"/>
+              </a:rPr>
+              <a:t>n</a:t>
+            </a:r>
+          </a:p>
+        </p:txBody>
+      </p:sp>
+      <p:sp>
+        <p:nvSpPr>
+          <p:cNvPr id="9" name="Rectangle 8">
+            <a:extLst>
+              <a:ext uri="{FF2B5EF4-FFF2-40B4-BE49-F238E27FC236}">
+                <a16:creationId xmlns:a16="http://schemas.microsoft.com/office/drawing/2014/main" id="{B209D1D0-EF62-9549-8B64-CC7DDFB763F1}"/>
+              </a:ext>
+            </a:extLst>
+          </p:cNvPr>
+          <p:cNvSpPr/>
+          <p:nvPr/>
+        </p:nvSpPr>
+        <p:spPr>
+          <a:xfrm>
+            <a:off x="7767163" y="4348653"/>
+            <a:ext cx="609600" cy="567559"/>
+          </a:xfrm>
+          <a:prstGeom prst="rect">
+            <a:avLst/>
+          </a:prstGeom>
+        </p:spPr>
+        <p:style>
+          <a:lnRef idx="2">
+            <a:schemeClr val="dk1"/>
+          </a:lnRef>
+          <a:fillRef idx="1">
+            <a:schemeClr val="lt1"/>
+          </a:fillRef>
+          <a:effectRef idx="0">
+            <a:schemeClr val="dk1"/>
+          </a:effectRef>
+          <a:fontRef idx="minor">
+            <a:schemeClr val="dk1"/>
+          </a:fontRef>
+        </p:style>
+        <p:txBody>
+          <a:bodyPr rtlCol="0" anchor="ctr"/>
+          <a:lstStyle/>
+          <a:p>
+            <a:pPr algn="ctr"/>
+            <a:r>
+              <a:rPr lang="en-CN" i="1" dirty="0">
+                <a:latin typeface="Times New Roman" panose="02020603050405020304" pitchFamily="18" charset="0"/>
+                <a:cs typeface="Times New Roman" panose="02020603050405020304" pitchFamily="18" charset="0"/>
+              </a:rPr>
+              <a:t>…</a:t>
+            </a:r>
+            <a:endParaRPr lang="en-CN" baseline="-25000" dirty="0"/>
+          </a:p>
+        </p:txBody>
+      </p:sp>
+      <p:sp>
+        <p:nvSpPr>
+          <p:cNvPr id="10" name="Rectangle 9">
+            <a:extLst>
+              <a:ext uri="{FF2B5EF4-FFF2-40B4-BE49-F238E27FC236}">
+                <a16:creationId xmlns:a16="http://schemas.microsoft.com/office/drawing/2014/main" id="{2D144554-AD2A-D848-B46D-9BE11503496B}"/>
+              </a:ext>
+            </a:extLst>
+          </p:cNvPr>
+          <p:cNvSpPr/>
+          <p:nvPr/>
+        </p:nvSpPr>
+        <p:spPr>
+          <a:xfrm>
+            <a:off x="1166661" y="5541578"/>
+            <a:ext cx="609600" cy="567559"/>
+          </a:xfrm>
+          <a:prstGeom prst="rect">
+            <a:avLst/>
+          </a:prstGeom>
+        </p:spPr>
+        <p:style>
+          <a:lnRef idx="2">
+            <a:schemeClr val="dk1"/>
+          </a:lnRef>
+          <a:fillRef idx="1">
+            <a:schemeClr val="lt1"/>
+          </a:fillRef>
+          <a:effectRef idx="0">
+            <a:schemeClr val="dk1"/>
+          </a:effectRef>
+          <a:fontRef idx="minor">
+            <a:schemeClr val="dk1"/>
+          </a:fontRef>
+        </p:style>
+        <p:txBody>
+          <a:bodyPr rtlCol="0" anchor="ctr"/>
+          <a:lstStyle/>
+          <a:p>
+            <a:pPr algn="ctr"/>
+            <a:r>
+              <a:rPr lang="en-CN" i="1" dirty="0">
+                <a:latin typeface="Times New Roman" panose="02020603050405020304" pitchFamily="18" charset="0"/>
+                <a:cs typeface="Times New Roman" panose="02020603050405020304" pitchFamily="18" charset="0"/>
+              </a:rPr>
+              <a:t>t</a:t>
+            </a:r>
+            <a:r>
+              <a:rPr lang="en-CN" baseline="-25000" dirty="0"/>
+              <a:t>1</a:t>
+            </a:r>
+          </a:p>
+        </p:txBody>
+      </p:sp>
+      <p:cxnSp>
+        <p:nvCxnSpPr>
+          <p:cNvPr id="11" name="Straight Arrow Connector 10">
+            <a:extLst>
+              <a:ext uri="{FF2B5EF4-FFF2-40B4-BE49-F238E27FC236}">
+                <a16:creationId xmlns:a16="http://schemas.microsoft.com/office/drawing/2014/main" id="{323BDD05-2C1F-4E4E-AB10-7CFDA2BE2938}"/>
+              </a:ext>
+            </a:extLst>
+          </p:cNvPr>
+          <p:cNvCxnSpPr>
+            <a:cxnSpLocks/>
+            <a:stCxn id="3" idx="1"/>
+            <a:endCxn id="10" idx="0"/>
+          </p:cNvCxnSpPr>
+          <p:nvPr/>
+        </p:nvCxnSpPr>
+        <p:spPr>
+          <a:xfrm flipH="1">
+            <a:off x="1471461" y="4632434"/>
+            <a:ext cx="935421" cy="909144"/>
+          </a:xfrm>
+          <a:prstGeom prst="straightConnector1">
+            <a:avLst/>
+          </a:prstGeom>
+          <a:ln>
+            <a:tailEnd type="triangle"/>
+          </a:ln>
+        </p:spPr>
+        <p:style>
+          <a:lnRef idx="2">
+            <a:schemeClr val="dk1"/>
+          </a:lnRef>
+          <a:fillRef idx="0">
+            <a:schemeClr val="dk1"/>
+          </a:fillRef>
+          <a:effectRef idx="1">
+            <a:schemeClr val="dk1"/>
+          </a:effectRef>
+          <a:fontRef idx="minor">
+            <a:schemeClr val="tx1"/>
+          </a:fontRef>
+        </p:style>
+      </p:cxnSp>
+      <p:sp>
+        <p:nvSpPr>
+          <p:cNvPr id="12" name="Rectangle 11">
+            <a:extLst>
+              <a:ext uri="{FF2B5EF4-FFF2-40B4-BE49-F238E27FC236}">
+                <a16:creationId xmlns:a16="http://schemas.microsoft.com/office/drawing/2014/main" id="{681CF5D7-E2CE-BD43-81B3-A42C773CB563}"/>
+              </a:ext>
+            </a:extLst>
+          </p:cNvPr>
+          <p:cNvSpPr/>
+          <p:nvPr/>
+        </p:nvSpPr>
+        <p:spPr>
+          <a:xfrm>
+            <a:off x="4771712" y="5541578"/>
+            <a:ext cx="609600" cy="567559"/>
+          </a:xfrm>
+          <a:prstGeom prst="rect">
+            <a:avLst/>
+          </a:prstGeom>
+        </p:spPr>
+        <p:style>
+          <a:lnRef idx="2">
+            <a:schemeClr val="dk1"/>
+          </a:lnRef>
+          <a:fillRef idx="1">
+            <a:schemeClr val="lt1"/>
+          </a:fillRef>
+          <a:effectRef idx="0">
+            <a:schemeClr val="dk1"/>
+          </a:effectRef>
+          <a:fontRef idx="minor">
+            <a:schemeClr val="dk1"/>
+          </a:fontRef>
+        </p:style>
+        <p:txBody>
+          <a:bodyPr rtlCol="0" anchor="ctr"/>
+          <a:lstStyle/>
+          <a:p>
+            <a:pPr algn="ctr"/>
+            <a:r>
+              <a:rPr lang="en-CN" i="1" dirty="0">
+                <a:latin typeface="Times New Roman" panose="02020603050405020304" pitchFamily="18" charset="0"/>
+                <a:cs typeface="Times New Roman" panose="02020603050405020304" pitchFamily="18" charset="0"/>
+              </a:rPr>
+              <a:t>t</a:t>
+            </a:r>
+            <a:r>
+              <a:rPr lang="en-CN" i="1" baseline="-25000" dirty="0">
+                <a:latin typeface="Times New Roman" panose="02020603050405020304" pitchFamily="18" charset="0"/>
+                <a:cs typeface="Times New Roman" panose="02020603050405020304" pitchFamily="18" charset="0"/>
+              </a:rPr>
+              <a:t>m</a:t>
+            </a:r>
+          </a:p>
+        </p:txBody>
+      </p:sp>
+      <p:cxnSp>
+        <p:nvCxnSpPr>
+          <p:cNvPr id="13" name="Straight Arrow Connector 12">
+            <a:extLst>
+              <a:ext uri="{FF2B5EF4-FFF2-40B4-BE49-F238E27FC236}">
+                <a16:creationId xmlns:a16="http://schemas.microsoft.com/office/drawing/2014/main" id="{1F982FF6-7C90-9345-8CBE-59EB4CCC39F2}"/>
+              </a:ext>
+            </a:extLst>
+          </p:cNvPr>
+          <p:cNvCxnSpPr>
+            <a:cxnSpLocks/>
+            <a:stCxn id="5" idx="3"/>
+            <a:endCxn id="12" idx="0"/>
+          </p:cNvCxnSpPr>
+          <p:nvPr/>
+        </p:nvCxnSpPr>
+        <p:spPr>
+          <a:xfrm>
+            <a:off x="4235682" y="4632434"/>
+            <a:ext cx="840830" cy="909144"/>
+          </a:xfrm>
+          <a:prstGeom prst="straightConnector1">
+            <a:avLst/>
+          </a:prstGeom>
+          <a:ln>
+            <a:tailEnd type="triangle"/>
+          </a:ln>
+        </p:spPr>
+        <p:style>
+          <a:lnRef idx="2">
+            <a:schemeClr val="dk1"/>
+          </a:lnRef>
+          <a:fillRef idx="0">
+            <a:schemeClr val="dk1"/>
+          </a:fillRef>
+          <a:effectRef idx="1">
+            <a:schemeClr val="dk1"/>
+          </a:effectRef>
+          <a:fontRef idx="minor">
+            <a:schemeClr val="tx1"/>
+          </a:fontRef>
+        </p:style>
+      </p:cxnSp>
+      <p:sp>
+        <p:nvSpPr>
+          <p:cNvPr id="14" name="Rectangle 13">
+            <a:extLst>
+              <a:ext uri="{FF2B5EF4-FFF2-40B4-BE49-F238E27FC236}">
+                <a16:creationId xmlns:a16="http://schemas.microsoft.com/office/drawing/2014/main" id="{DD59F287-BA48-3A42-B7E9-222A8472D4A1}"/>
+              </a:ext>
+            </a:extLst>
+          </p:cNvPr>
+          <p:cNvSpPr/>
+          <p:nvPr/>
+        </p:nvSpPr>
+        <p:spPr>
+          <a:xfrm>
+            <a:off x="6222134" y="5541576"/>
+            <a:ext cx="609600" cy="567559"/>
+          </a:xfrm>
+          <a:prstGeom prst="rect">
+            <a:avLst/>
+          </a:prstGeom>
+        </p:spPr>
+        <p:style>
+          <a:lnRef idx="2">
+            <a:schemeClr val="dk1"/>
+          </a:lnRef>
+          <a:fillRef idx="1">
+            <a:schemeClr val="lt1"/>
+          </a:fillRef>
+          <a:effectRef idx="0">
+            <a:schemeClr val="dk1"/>
+          </a:effectRef>
+          <a:fontRef idx="minor">
+            <a:schemeClr val="dk1"/>
+          </a:fontRef>
+        </p:style>
+        <p:txBody>
+          <a:bodyPr rtlCol="0" anchor="ctr"/>
+          <a:lstStyle/>
+          <a:p>
+            <a:pPr algn="ctr"/>
+            <a:r>
+              <a:rPr lang="en-CN" i="1" dirty="0">
+                <a:latin typeface="Times New Roman" panose="02020603050405020304" pitchFamily="18" charset="0"/>
+                <a:cs typeface="Times New Roman" panose="02020603050405020304" pitchFamily="18" charset="0"/>
+              </a:rPr>
+              <a:t>t</a:t>
+            </a:r>
+            <a:r>
+              <a:rPr lang="en-CN" i="1" baseline="-25000" dirty="0">
+                <a:latin typeface="Times New Roman" panose="02020603050405020304" pitchFamily="18" charset="0"/>
+                <a:cs typeface="Times New Roman" panose="02020603050405020304" pitchFamily="18" charset="0"/>
+              </a:rPr>
+              <a:t>m</a:t>
+            </a:r>
+            <a:endParaRPr lang="en-CN" baseline="-25000" dirty="0"/>
+          </a:p>
+        </p:txBody>
+      </p:sp>
+      <p:cxnSp>
+        <p:nvCxnSpPr>
+          <p:cNvPr id="15" name="Straight Arrow Connector 14">
+            <a:extLst>
+              <a:ext uri="{FF2B5EF4-FFF2-40B4-BE49-F238E27FC236}">
+                <a16:creationId xmlns:a16="http://schemas.microsoft.com/office/drawing/2014/main" id="{00DBA832-31F2-EB4B-874E-3FC706E07DCC}"/>
+              </a:ext>
+            </a:extLst>
+          </p:cNvPr>
+          <p:cNvCxnSpPr>
+            <a:cxnSpLocks/>
+            <a:stCxn id="6" idx="1"/>
+            <a:endCxn id="14" idx="0"/>
+          </p:cNvCxnSpPr>
+          <p:nvPr/>
+        </p:nvCxnSpPr>
+        <p:spPr>
+          <a:xfrm flipH="1">
+            <a:off x="6526934" y="4632433"/>
+            <a:ext cx="630629" cy="909143"/>
+          </a:xfrm>
+          <a:prstGeom prst="straightConnector1">
+            <a:avLst/>
+          </a:prstGeom>
+          <a:ln>
+            <a:tailEnd type="triangle"/>
+          </a:ln>
+        </p:spPr>
+        <p:style>
+          <a:lnRef idx="2">
+            <a:schemeClr val="dk1"/>
+          </a:lnRef>
+          <a:fillRef idx="0">
+            <a:schemeClr val="dk1"/>
+          </a:fillRef>
+          <a:effectRef idx="1">
+            <a:schemeClr val="dk1"/>
+          </a:effectRef>
+          <a:fontRef idx="minor">
+            <a:schemeClr val="tx1"/>
+          </a:fontRef>
+        </p:style>
+      </p:cxnSp>
+      <p:sp>
+        <p:nvSpPr>
+          <p:cNvPr id="16" name="Rectangle 15">
+            <a:extLst>
+              <a:ext uri="{FF2B5EF4-FFF2-40B4-BE49-F238E27FC236}">
+                <a16:creationId xmlns:a16="http://schemas.microsoft.com/office/drawing/2014/main" id="{9787CF20-C0B7-2C49-B2F3-58DA6B9DBBDC}"/>
+              </a:ext>
+            </a:extLst>
+          </p:cNvPr>
+          <p:cNvSpPr/>
+          <p:nvPr/>
+        </p:nvSpPr>
+        <p:spPr>
+          <a:xfrm>
+            <a:off x="9501364" y="5541577"/>
+            <a:ext cx="609600" cy="567559"/>
+          </a:xfrm>
+          <a:prstGeom prst="rect">
+            <a:avLst/>
+          </a:prstGeom>
+        </p:spPr>
+        <p:style>
+          <a:lnRef idx="2">
+            <a:schemeClr val="dk1"/>
+          </a:lnRef>
+          <a:fillRef idx="1">
+            <a:schemeClr val="lt1"/>
+          </a:fillRef>
+          <a:effectRef idx="0">
+            <a:schemeClr val="dk1"/>
+          </a:effectRef>
+          <a:fontRef idx="minor">
+            <a:schemeClr val="dk1"/>
+          </a:fontRef>
+        </p:style>
+        <p:txBody>
+          <a:bodyPr rtlCol="0" anchor="ctr"/>
+          <a:lstStyle/>
+          <a:p>
+            <a:pPr algn="ctr"/>
+            <a:r>
+              <a:rPr lang="en-US" i="1" dirty="0">
+                <a:latin typeface="Times New Roman" panose="02020603050405020304" pitchFamily="18" charset="0"/>
+                <a:cs typeface="Times New Roman" panose="02020603050405020304" pitchFamily="18" charset="0"/>
+              </a:rPr>
+              <a:t>t</a:t>
+            </a:r>
+            <a:r>
+              <a:rPr lang="en-CN" i="1" baseline="-25000" dirty="0">
+                <a:latin typeface="Times New Roman" panose="02020603050405020304" pitchFamily="18" charset="0"/>
+                <a:cs typeface="Times New Roman" panose="02020603050405020304" pitchFamily="18" charset="0"/>
+              </a:rPr>
+              <a:t>n</a:t>
+            </a:r>
+            <a:r>
+              <a:rPr lang="en-CN" baseline="-25000" dirty="0">
+                <a:latin typeface="Times New Roman" panose="02020603050405020304" pitchFamily="18" charset="0"/>
+                <a:cs typeface="Times New Roman" panose="02020603050405020304" pitchFamily="18" charset="0"/>
+              </a:rPr>
+              <a:t>+1</a:t>
+            </a:r>
+          </a:p>
+        </p:txBody>
+      </p:sp>
+      <p:cxnSp>
+        <p:nvCxnSpPr>
+          <p:cNvPr id="17" name="Straight Arrow Connector 16">
+            <a:extLst>
+              <a:ext uri="{FF2B5EF4-FFF2-40B4-BE49-F238E27FC236}">
+                <a16:creationId xmlns:a16="http://schemas.microsoft.com/office/drawing/2014/main" id="{424B4A48-FFCA-8640-8CDE-067743771014}"/>
+              </a:ext>
+            </a:extLst>
+          </p:cNvPr>
+          <p:cNvCxnSpPr>
+            <a:cxnSpLocks/>
+            <a:stCxn id="7" idx="3"/>
+            <a:endCxn id="16" idx="0"/>
+          </p:cNvCxnSpPr>
+          <p:nvPr/>
+        </p:nvCxnSpPr>
+        <p:spPr>
+          <a:xfrm>
+            <a:off x="8986363" y="4632434"/>
+            <a:ext cx="819801" cy="909143"/>
+          </a:xfrm>
+          <a:prstGeom prst="straightConnector1">
+            <a:avLst/>
+          </a:prstGeom>
+          <a:ln>
+            <a:tailEnd type="triangle"/>
+          </a:ln>
+        </p:spPr>
+        <p:style>
+          <a:lnRef idx="2">
+            <a:schemeClr val="dk1"/>
+          </a:lnRef>
+          <a:fillRef idx="0">
+            <a:schemeClr val="dk1"/>
+          </a:fillRef>
+          <a:effectRef idx="1">
+            <a:schemeClr val="dk1"/>
+          </a:effectRef>
+          <a:fontRef idx="minor">
+            <a:schemeClr val="tx1"/>
+          </a:fontRef>
+        </p:style>
+      </p:cxnSp>
+      <p:sp>
+        <p:nvSpPr>
+          <p:cNvPr id="28" name="Rectangle 27">
+            <a:extLst>
+              <a:ext uri="{FF2B5EF4-FFF2-40B4-BE49-F238E27FC236}">
+                <a16:creationId xmlns:a16="http://schemas.microsoft.com/office/drawing/2014/main" id="{A3954980-4EC6-EE43-9D68-BF9362CE2861}"/>
+              </a:ext>
+            </a:extLst>
+          </p:cNvPr>
+          <p:cNvSpPr/>
+          <p:nvPr/>
+        </p:nvSpPr>
+        <p:spPr>
+          <a:xfrm>
+            <a:off x="5444379" y="3614241"/>
+            <a:ext cx="609600" cy="567559"/>
+          </a:xfrm>
+          <a:prstGeom prst="rect">
+            <a:avLst/>
+          </a:prstGeom>
+        </p:spPr>
+        <p:style>
+          <a:lnRef idx="2">
+            <a:schemeClr val="dk1"/>
+          </a:lnRef>
+          <a:fillRef idx="1">
+            <a:schemeClr val="lt1"/>
+          </a:fillRef>
+          <a:effectRef idx="0">
+            <a:schemeClr val="dk1"/>
+          </a:effectRef>
+          <a:fontRef idx="minor">
+            <a:schemeClr val="dk1"/>
+          </a:fontRef>
+        </p:style>
+        <p:txBody>
+          <a:bodyPr rtlCol="0" anchor="ctr"/>
+          <a:lstStyle/>
+          <a:p>
+            <a:pPr algn="ctr"/>
+            <a:r>
+              <a:rPr lang="en-US" i="1" dirty="0">
+                <a:latin typeface="Times New Roman" panose="02020603050405020304" pitchFamily="18" charset="0"/>
+                <a:cs typeface="Times New Roman" panose="02020603050405020304" pitchFamily="18" charset="0"/>
+              </a:rPr>
+              <a:t>k</a:t>
+            </a:r>
+            <a:r>
+              <a:rPr lang="en-CN" i="1" baseline="-25000" dirty="0">
+                <a:latin typeface="Times New Roman" panose="02020603050405020304" pitchFamily="18" charset="0"/>
+                <a:cs typeface="Times New Roman" panose="02020603050405020304" pitchFamily="18" charset="0"/>
+              </a:rPr>
+              <a:t>m</a:t>
+            </a:r>
+            <a:endParaRPr lang="en-CN" baseline="-25000" dirty="0"/>
+          </a:p>
+        </p:txBody>
+      </p:sp>
+      <p:sp>
+        <p:nvSpPr>
+          <p:cNvPr id="29" name="Rectangle 28">
+            <a:extLst>
+              <a:ext uri="{FF2B5EF4-FFF2-40B4-BE49-F238E27FC236}">
+                <a16:creationId xmlns:a16="http://schemas.microsoft.com/office/drawing/2014/main" id="{79D9F5C7-1282-A143-ABC3-F3D729278AE1}"/>
+              </a:ext>
+            </a:extLst>
+          </p:cNvPr>
+          <p:cNvSpPr/>
+          <p:nvPr/>
+        </p:nvSpPr>
+        <p:spPr>
+          <a:xfrm>
+            <a:off x="3552512" y="519605"/>
+            <a:ext cx="609600" cy="567559"/>
+          </a:xfrm>
+          <a:prstGeom prst="rect">
+            <a:avLst/>
+          </a:prstGeom>
+        </p:spPr>
+        <p:style>
+          <a:lnRef idx="2">
+            <a:schemeClr val="dk1"/>
+          </a:lnRef>
+          <a:fillRef idx="1">
+            <a:schemeClr val="lt1"/>
+          </a:fillRef>
+          <a:effectRef idx="0">
+            <a:schemeClr val="dk1"/>
+          </a:effectRef>
+          <a:fontRef idx="minor">
+            <a:schemeClr val="dk1"/>
+          </a:fontRef>
+        </p:style>
+        <p:txBody>
+          <a:bodyPr rtlCol="0" anchor="ctr"/>
+          <a:lstStyle/>
+          <a:p>
+            <a:pPr algn="ctr"/>
+            <a:r>
+              <a:rPr lang="en-CN" i="1" dirty="0">
+                <a:latin typeface="Times New Roman" panose="02020603050405020304" pitchFamily="18" charset="0"/>
+                <a:cs typeface="Times New Roman" panose="02020603050405020304" pitchFamily="18" charset="0"/>
+              </a:rPr>
+              <a:t>k</a:t>
+            </a:r>
+            <a:r>
+              <a:rPr lang="en-CN" baseline="-25000" dirty="0"/>
+              <a:t>1</a:t>
+            </a:r>
+          </a:p>
+        </p:txBody>
+      </p:sp>
+      <p:sp>
+        <p:nvSpPr>
+          <p:cNvPr id="30" name="Rectangle 29">
+            <a:extLst>
+              <a:ext uri="{FF2B5EF4-FFF2-40B4-BE49-F238E27FC236}">
+                <a16:creationId xmlns:a16="http://schemas.microsoft.com/office/drawing/2014/main" id="{FB4EA036-F7C0-2147-AA12-149169562E89}"/>
+              </a:ext>
+            </a:extLst>
+          </p:cNvPr>
+          <p:cNvSpPr/>
+          <p:nvPr/>
+        </p:nvSpPr>
+        <p:spPr>
+          <a:xfrm>
+            <a:off x="4162112" y="519605"/>
+            <a:ext cx="609600" cy="567559"/>
+          </a:xfrm>
+          <a:prstGeom prst="rect">
+            <a:avLst/>
+          </a:prstGeom>
+        </p:spPr>
+        <p:style>
+          <a:lnRef idx="2">
+            <a:schemeClr val="dk1"/>
+          </a:lnRef>
+          <a:fillRef idx="1">
+            <a:schemeClr val="lt1"/>
+          </a:fillRef>
+          <a:effectRef idx="0">
+            <a:schemeClr val="dk1"/>
+          </a:effectRef>
+          <a:fontRef idx="minor">
+            <a:schemeClr val="dk1"/>
+          </a:fontRef>
+        </p:style>
+        <p:txBody>
+          <a:bodyPr rtlCol="0" anchor="ctr"/>
+          <a:lstStyle/>
+          <a:p>
+            <a:pPr algn="ctr"/>
+            <a:r>
+              <a:rPr lang="en-CN" dirty="0">
+                <a:latin typeface="Times New Roman" panose="02020603050405020304" pitchFamily="18" charset="0"/>
+                <a:cs typeface="Times New Roman" panose="02020603050405020304" pitchFamily="18" charset="0"/>
+              </a:rPr>
+              <a:t>…</a:t>
+            </a:r>
+          </a:p>
+        </p:txBody>
+      </p:sp>
+      <p:sp>
+        <p:nvSpPr>
+          <p:cNvPr id="31" name="Rectangle 30">
+            <a:extLst>
+              <a:ext uri="{FF2B5EF4-FFF2-40B4-BE49-F238E27FC236}">
+                <a16:creationId xmlns:a16="http://schemas.microsoft.com/office/drawing/2014/main" id="{1DBE2F67-38A2-8F43-8080-5B8567AAE2C6}"/>
+              </a:ext>
+            </a:extLst>
+          </p:cNvPr>
+          <p:cNvSpPr/>
+          <p:nvPr/>
+        </p:nvSpPr>
+        <p:spPr>
+          <a:xfrm>
+            <a:off x="4771712" y="519605"/>
+            <a:ext cx="609600" cy="567559"/>
+          </a:xfrm>
+          <a:prstGeom prst="rect">
+            <a:avLst/>
+          </a:prstGeom>
+        </p:spPr>
+        <p:style>
+          <a:lnRef idx="2">
+            <a:schemeClr val="dk1"/>
+          </a:lnRef>
+          <a:fillRef idx="1">
+            <a:schemeClr val="lt1"/>
+          </a:fillRef>
+          <a:effectRef idx="0">
+            <a:schemeClr val="dk1"/>
+          </a:effectRef>
+          <a:fontRef idx="minor">
+            <a:schemeClr val="dk1"/>
+          </a:fontRef>
+        </p:style>
+        <p:txBody>
+          <a:bodyPr rtlCol="0" anchor="ctr"/>
+          <a:lstStyle/>
+          <a:p>
+            <a:pPr algn="ctr"/>
+            <a:r>
+              <a:rPr lang="en-US" i="1" dirty="0">
+                <a:latin typeface="Times New Roman" panose="02020603050405020304" pitchFamily="18" charset="0"/>
+                <a:cs typeface="Times New Roman" panose="02020603050405020304" pitchFamily="18" charset="0"/>
+              </a:rPr>
+              <a:t>k</a:t>
+            </a:r>
+            <a:r>
+              <a:rPr lang="en-CN" i="1" baseline="-25000" dirty="0">
+                <a:latin typeface="Times New Roman" panose="02020603050405020304" pitchFamily="18" charset="0"/>
+                <a:cs typeface="Times New Roman" panose="02020603050405020304" pitchFamily="18" charset="0"/>
+              </a:rPr>
+              <a:t>m</a:t>
+            </a:r>
+            <a:r>
+              <a:rPr lang="en-CN" baseline="-25000" dirty="0"/>
+              <a:t>-1</a:t>
+            </a:r>
+          </a:p>
+        </p:txBody>
+      </p:sp>
+      <p:sp>
+        <p:nvSpPr>
+          <p:cNvPr id="32" name="Rectangle 31">
+            <a:extLst>
+              <a:ext uri="{FF2B5EF4-FFF2-40B4-BE49-F238E27FC236}">
+                <a16:creationId xmlns:a16="http://schemas.microsoft.com/office/drawing/2014/main" id="{E49F64DE-2B08-AF47-B531-60DD4331DA54}"/>
+              </a:ext>
+            </a:extLst>
+          </p:cNvPr>
+          <p:cNvSpPr/>
+          <p:nvPr/>
+        </p:nvSpPr>
+        <p:spPr>
+          <a:xfrm>
+            <a:off x="5990912" y="519604"/>
+            <a:ext cx="609600" cy="567559"/>
+          </a:xfrm>
+          <a:prstGeom prst="rect">
+            <a:avLst/>
+          </a:prstGeom>
+        </p:spPr>
+        <p:style>
+          <a:lnRef idx="2">
+            <a:schemeClr val="dk1"/>
+          </a:lnRef>
+          <a:fillRef idx="1">
+            <a:schemeClr val="lt1"/>
+          </a:fillRef>
+          <a:effectRef idx="0">
+            <a:schemeClr val="dk1"/>
+          </a:effectRef>
+          <a:fontRef idx="minor">
+            <a:schemeClr val="dk1"/>
+          </a:fontRef>
+        </p:style>
+        <p:txBody>
+          <a:bodyPr rtlCol="0" anchor="ctr"/>
+          <a:lstStyle/>
+          <a:p>
+            <a:pPr algn="ctr"/>
+            <a:r>
+              <a:rPr lang="en-US" i="1" dirty="0">
+                <a:latin typeface="Times New Roman" panose="02020603050405020304" pitchFamily="18" charset="0"/>
+                <a:cs typeface="Times New Roman" panose="02020603050405020304" pitchFamily="18" charset="0"/>
+              </a:rPr>
+              <a:t>k</a:t>
+            </a:r>
+            <a:r>
+              <a:rPr lang="en-CN" i="1" baseline="-25000" dirty="0">
+                <a:latin typeface="Times New Roman" panose="02020603050405020304" pitchFamily="18" charset="0"/>
+                <a:cs typeface="Times New Roman" panose="02020603050405020304" pitchFamily="18" charset="0"/>
+              </a:rPr>
+              <a:t>m+</a:t>
+            </a:r>
+            <a:r>
+              <a:rPr lang="en-CN" baseline="-25000" dirty="0">
+                <a:latin typeface="Times New Roman" panose="02020603050405020304" pitchFamily="18" charset="0"/>
+                <a:cs typeface="Times New Roman" panose="02020603050405020304" pitchFamily="18" charset="0"/>
+              </a:rPr>
+              <a:t>1</a:t>
+            </a:r>
+          </a:p>
+        </p:txBody>
+      </p:sp>
+      <p:sp>
+        <p:nvSpPr>
+          <p:cNvPr id="33" name="Rectangle 32">
+            <a:extLst>
+              <a:ext uri="{FF2B5EF4-FFF2-40B4-BE49-F238E27FC236}">
+                <a16:creationId xmlns:a16="http://schemas.microsoft.com/office/drawing/2014/main" id="{59761D16-473A-6A4C-B5B8-C850AEA19AB8}"/>
+              </a:ext>
+            </a:extLst>
+          </p:cNvPr>
+          <p:cNvSpPr/>
+          <p:nvPr/>
+        </p:nvSpPr>
+        <p:spPr>
+          <a:xfrm>
+            <a:off x="7210112" y="519605"/>
+            <a:ext cx="609600" cy="567559"/>
+          </a:xfrm>
+          <a:prstGeom prst="rect">
+            <a:avLst/>
+          </a:prstGeom>
+        </p:spPr>
+        <p:style>
+          <a:lnRef idx="2">
+            <a:schemeClr val="dk1"/>
+          </a:lnRef>
+          <a:fillRef idx="1">
+            <a:schemeClr val="lt1"/>
+          </a:fillRef>
+          <a:effectRef idx="0">
+            <a:schemeClr val="dk1"/>
+          </a:effectRef>
+          <a:fontRef idx="minor">
+            <a:schemeClr val="dk1"/>
+          </a:fontRef>
+        </p:style>
+        <p:txBody>
+          <a:bodyPr rtlCol="0" anchor="ctr"/>
+          <a:lstStyle/>
+          <a:p>
+            <a:pPr algn="ctr"/>
+            <a:r>
+              <a:rPr lang="en-CN" i="1" dirty="0">
+                <a:latin typeface="Times New Roman" panose="02020603050405020304" pitchFamily="18" charset="0"/>
+                <a:cs typeface="Times New Roman" panose="02020603050405020304" pitchFamily="18" charset="0"/>
+              </a:rPr>
+              <a:t>k</a:t>
+            </a:r>
+            <a:r>
+              <a:rPr lang="en-CN" i="1" baseline="-25000" dirty="0">
+                <a:latin typeface="Times New Roman" panose="02020603050405020304" pitchFamily="18" charset="0"/>
+                <a:cs typeface="Times New Roman" panose="02020603050405020304" pitchFamily="18" charset="0"/>
+              </a:rPr>
+              <a:t>n</a:t>
+            </a:r>
+          </a:p>
+        </p:txBody>
+      </p:sp>
+      <p:sp>
+        <p:nvSpPr>
+          <p:cNvPr id="34" name="Rectangle 33">
+            <a:extLst>
+              <a:ext uri="{FF2B5EF4-FFF2-40B4-BE49-F238E27FC236}">
+                <a16:creationId xmlns:a16="http://schemas.microsoft.com/office/drawing/2014/main" id="{82BF7BE7-FD25-9F4D-9504-0A50FDD2714A}"/>
+              </a:ext>
+            </a:extLst>
+          </p:cNvPr>
+          <p:cNvSpPr/>
+          <p:nvPr/>
+        </p:nvSpPr>
+        <p:spPr>
+          <a:xfrm>
+            <a:off x="6600512" y="519604"/>
+            <a:ext cx="609600" cy="567559"/>
+          </a:xfrm>
+          <a:prstGeom prst="rect">
+            <a:avLst/>
+          </a:prstGeom>
+        </p:spPr>
+        <p:style>
+          <a:lnRef idx="2">
+            <a:schemeClr val="dk1"/>
+          </a:lnRef>
+          <a:fillRef idx="1">
+            <a:schemeClr val="lt1"/>
+          </a:fillRef>
+          <a:effectRef idx="0">
+            <a:schemeClr val="dk1"/>
+          </a:effectRef>
+          <a:fontRef idx="minor">
+            <a:schemeClr val="dk1"/>
+          </a:fontRef>
+        </p:style>
+        <p:txBody>
+          <a:bodyPr rtlCol="0" anchor="ctr"/>
+          <a:lstStyle/>
+          <a:p>
+            <a:pPr algn="ctr"/>
+            <a:r>
+              <a:rPr lang="en-CN" i="1" dirty="0">
+                <a:latin typeface="Times New Roman" panose="02020603050405020304" pitchFamily="18" charset="0"/>
+                <a:cs typeface="Times New Roman" panose="02020603050405020304" pitchFamily="18" charset="0"/>
+              </a:rPr>
+              <a:t>…</a:t>
+            </a:r>
+            <a:endParaRPr lang="en-CN" baseline="-25000" dirty="0"/>
+          </a:p>
+        </p:txBody>
+      </p:sp>
+      <p:sp>
+        <p:nvSpPr>
+          <p:cNvPr id="35" name="Rectangle 34">
+            <a:extLst>
+              <a:ext uri="{FF2B5EF4-FFF2-40B4-BE49-F238E27FC236}">
+                <a16:creationId xmlns:a16="http://schemas.microsoft.com/office/drawing/2014/main" id="{5C09BD99-5E1E-0443-879E-46B4AFF62745}"/>
+              </a:ext>
+            </a:extLst>
+          </p:cNvPr>
+          <p:cNvSpPr/>
+          <p:nvPr/>
+        </p:nvSpPr>
+        <p:spPr>
+          <a:xfrm>
+            <a:off x="2312291" y="1712529"/>
+            <a:ext cx="609600" cy="567559"/>
+          </a:xfrm>
+          <a:prstGeom prst="rect">
+            <a:avLst/>
+          </a:prstGeom>
+        </p:spPr>
+        <p:style>
+          <a:lnRef idx="2">
+            <a:schemeClr val="dk1"/>
+          </a:lnRef>
+          <a:fillRef idx="1">
+            <a:schemeClr val="lt1"/>
+          </a:fillRef>
+          <a:effectRef idx="0">
+            <a:schemeClr val="dk1"/>
+          </a:effectRef>
+          <a:fontRef idx="minor">
+            <a:schemeClr val="dk1"/>
+          </a:fontRef>
+        </p:style>
+        <p:txBody>
+          <a:bodyPr rtlCol="0" anchor="ctr"/>
+          <a:lstStyle/>
+          <a:p>
+            <a:pPr algn="ctr"/>
+            <a:r>
+              <a:rPr lang="en-CN" i="1" dirty="0">
+                <a:latin typeface="Times New Roman" panose="02020603050405020304" pitchFamily="18" charset="0"/>
+                <a:cs typeface="Times New Roman" panose="02020603050405020304" pitchFamily="18" charset="0"/>
+              </a:rPr>
+              <a:t>t</a:t>
+            </a:r>
+            <a:r>
+              <a:rPr lang="en-CN" baseline="-25000" dirty="0"/>
+              <a:t>1</a:t>
+            </a:r>
+          </a:p>
+        </p:txBody>
+      </p:sp>
+      <p:cxnSp>
+        <p:nvCxnSpPr>
+          <p:cNvPr id="36" name="Straight Arrow Connector 35">
+            <a:extLst>
+              <a:ext uri="{FF2B5EF4-FFF2-40B4-BE49-F238E27FC236}">
+                <a16:creationId xmlns:a16="http://schemas.microsoft.com/office/drawing/2014/main" id="{DF6BF7D3-1247-F84D-973A-D01098C2C42D}"/>
+              </a:ext>
+            </a:extLst>
+          </p:cNvPr>
+          <p:cNvCxnSpPr>
+            <a:cxnSpLocks/>
+            <a:stCxn id="29" idx="1"/>
+            <a:endCxn id="35" idx="0"/>
+          </p:cNvCxnSpPr>
+          <p:nvPr/>
+        </p:nvCxnSpPr>
+        <p:spPr>
+          <a:xfrm flipH="1">
+            <a:off x="2617091" y="803385"/>
+            <a:ext cx="935421" cy="909144"/>
+          </a:xfrm>
+          <a:prstGeom prst="straightConnector1">
+            <a:avLst/>
+          </a:prstGeom>
+          <a:ln>
+            <a:tailEnd type="triangle"/>
+          </a:ln>
+        </p:spPr>
+        <p:style>
+          <a:lnRef idx="2">
+            <a:schemeClr val="dk1"/>
+          </a:lnRef>
+          <a:fillRef idx="0">
+            <a:schemeClr val="dk1"/>
+          </a:fillRef>
+          <a:effectRef idx="1">
+            <a:schemeClr val="dk1"/>
+          </a:effectRef>
+          <a:fontRef idx="minor">
+            <a:schemeClr val="tx1"/>
+          </a:fontRef>
+        </p:style>
+      </p:cxnSp>
+      <p:sp>
+        <p:nvSpPr>
+          <p:cNvPr id="37" name="Rectangle 36">
+            <a:extLst>
+              <a:ext uri="{FF2B5EF4-FFF2-40B4-BE49-F238E27FC236}">
+                <a16:creationId xmlns:a16="http://schemas.microsoft.com/office/drawing/2014/main" id="{F5E5B91A-8CC9-1041-9115-A9D609C6D330}"/>
+              </a:ext>
+            </a:extLst>
+          </p:cNvPr>
+          <p:cNvSpPr/>
+          <p:nvPr/>
+        </p:nvSpPr>
+        <p:spPr>
+          <a:xfrm>
+            <a:off x="4803261" y="1713841"/>
+            <a:ext cx="609600" cy="567559"/>
+          </a:xfrm>
+          <a:prstGeom prst="rect">
+            <a:avLst/>
+          </a:prstGeom>
+        </p:spPr>
+        <p:style>
+          <a:lnRef idx="2">
+            <a:schemeClr val="dk1"/>
+          </a:lnRef>
+          <a:fillRef idx="1">
+            <a:schemeClr val="lt1"/>
+          </a:fillRef>
+          <a:effectRef idx="0">
+            <a:schemeClr val="dk1"/>
+          </a:effectRef>
+          <a:fontRef idx="minor">
+            <a:schemeClr val="dk1"/>
+          </a:fontRef>
+        </p:style>
+        <p:txBody>
+          <a:bodyPr rtlCol="0" anchor="ctr"/>
+          <a:lstStyle/>
+          <a:p>
+            <a:pPr algn="ctr"/>
+            <a:r>
+              <a:rPr lang="en-CN" i="1" dirty="0">
+                <a:latin typeface="Times New Roman" panose="02020603050405020304" pitchFamily="18" charset="0"/>
+                <a:cs typeface="Times New Roman" panose="02020603050405020304" pitchFamily="18" charset="0"/>
+              </a:rPr>
+              <a:t>t</a:t>
+            </a:r>
+            <a:r>
+              <a:rPr lang="en-CN" i="1" baseline="-25000" dirty="0">
+                <a:latin typeface="Times New Roman" panose="02020603050405020304" pitchFamily="18" charset="0"/>
+                <a:cs typeface="Times New Roman" panose="02020603050405020304" pitchFamily="18" charset="0"/>
+              </a:rPr>
+              <a:t>m</a:t>
+            </a:r>
+          </a:p>
+        </p:txBody>
+      </p:sp>
+      <p:cxnSp>
+        <p:nvCxnSpPr>
+          <p:cNvPr id="38" name="Straight Arrow Connector 37">
+            <a:extLst>
+              <a:ext uri="{FF2B5EF4-FFF2-40B4-BE49-F238E27FC236}">
+                <a16:creationId xmlns:a16="http://schemas.microsoft.com/office/drawing/2014/main" id="{CDA90BA1-6B56-434E-BE99-1B42AABD65A8}"/>
+              </a:ext>
+            </a:extLst>
+          </p:cNvPr>
+          <p:cNvCxnSpPr>
+            <a:cxnSpLocks/>
+            <a:stCxn id="31" idx="3"/>
+            <a:endCxn id="37" idx="0"/>
+          </p:cNvCxnSpPr>
+          <p:nvPr/>
+        </p:nvCxnSpPr>
+        <p:spPr>
+          <a:xfrm flipH="1">
+            <a:off x="5108061" y="803385"/>
+            <a:ext cx="273251" cy="910456"/>
+          </a:xfrm>
+          <a:prstGeom prst="straightConnector1">
+            <a:avLst/>
+          </a:prstGeom>
+          <a:ln>
+            <a:tailEnd type="triangle"/>
+          </a:ln>
+        </p:spPr>
+        <p:style>
+          <a:lnRef idx="2">
+            <a:schemeClr val="dk1"/>
+          </a:lnRef>
+          <a:fillRef idx="0">
+            <a:schemeClr val="dk1"/>
+          </a:fillRef>
+          <a:effectRef idx="1">
+            <a:schemeClr val="dk1"/>
+          </a:effectRef>
+          <a:fontRef idx="minor">
+            <a:schemeClr val="tx1"/>
+          </a:fontRef>
+        </p:style>
+      </p:cxnSp>
+      <p:sp>
+        <p:nvSpPr>
+          <p:cNvPr id="39" name="Rectangle 38">
+            <a:extLst>
+              <a:ext uri="{FF2B5EF4-FFF2-40B4-BE49-F238E27FC236}">
+                <a16:creationId xmlns:a16="http://schemas.microsoft.com/office/drawing/2014/main" id="{4849DDBC-288D-FF45-BE1D-58EBE155877F}"/>
+              </a:ext>
+            </a:extLst>
+          </p:cNvPr>
+          <p:cNvSpPr/>
+          <p:nvPr/>
+        </p:nvSpPr>
+        <p:spPr>
+          <a:xfrm>
+            <a:off x="6053979" y="1712528"/>
+            <a:ext cx="609600" cy="567559"/>
+          </a:xfrm>
+          <a:prstGeom prst="rect">
+            <a:avLst/>
+          </a:prstGeom>
+        </p:spPr>
+        <p:style>
+          <a:lnRef idx="2">
+            <a:schemeClr val="dk1"/>
+          </a:lnRef>
+          <a:fillRef idx="1">
+            <a:schemeClr val="lt1"/>
+          </a:fillRef>
+          <a:effectRef idx="0">
+            <a:schemeClr val="dk1"/>
+          </a:effectRef>
+          <a:fontRef idx="minor">
+            <a:schemeClr val="dk1"/>
+          </a:fontRef>
+        </p:style>
+        <p:txBody>
+          <a:bodyPr rtlCol="0" anchor="ctr"/>
+          <a:lstStyle/>
+          <a:p>
+            <a:pPr algn="ctr"/>
+            <a:r>
+              <a:rPr lang="en-US" i="1" dirty="0">
+                <a:latin typeface="Times New Roman" panose="02020603050405020304" pitchFamily="18" charset="0"/>
+                <a:cs typeface="Times New Roman" panose="02020603050405020304" pitchFamily="18" charset="0"/>
+              </a:rPr>
+              <a:t>t</a:t>
+            </a:r>
+            <a:r>
+              <a:rPr lang="en-CN" i="1" baseline="-25000" dirty="0">
+                <a:latin typeface="Times New Roman" panose="02020603050405020304" pitchFamily="18" charset="0"/>
+                <a:cs typeface="Times New Roman" panose="02020603050405020304" pitchFamily="18" charset="0"/>
+              </a:rPr>
+              <a:t>m+</a:t>
+            </a:r>
+            <a:r>
+              <a:rPr lang="en-CN" baseline="-25000" dirty="0">
+                <a:latin typeface="Times New Roman" panose="02020603050405020304" pitchFamily="18" charset="0"/>
+                <a:cs typeface="Times New Roman" panose="02020603050405020304" pitchFamily="18" charset="0"/>
+              </a:rPr>
+              <a:t>1</a:t>
+            </a:r>
+            <a:endParaRPr lang="en-CN" baseline="-25000" dirty="0"/>
+          </a:p>
+        </p:txBody>
+      </p:sp>
+      <p:cxnSp>
+        <p:nvCxnSpPr>
+          <p:cNvPr id="40" name="Straight Arrow Connector 39">
+            <a:extLst>
+              <a:ext uri="{FF2B5EF4-FFF2-40B4-BE49-F238E27FC236}">
+                <a16:creationId xmlns:a16="http://schemas.microsoft.com/office/drawing/2014/main" id="{C8E79B1B-3704-7940-A37D-279D64CAC138}"/>
+              </a:ext>
+            </a:extLst>
+          </p:cNvPr>
+          <p:cNvCxnSpPr>
+            <a:cxnSpLocks/>
+            <a:stCxn id="32" idx="1"/>
+            <a:endCxn id="39" idx="0"/>
+          </p:cNvCxnSpPr>
+          <p:nvPr/>
+        </p:nvCxnSpPr>
+        <p:spPr>
+          <a:xfrm>
+            <a:off x="5990912" y="803384"/>
+            <a:ext cx="367867" cy="909144"/>
+          </a:xfrm>
+          <a:prstGeom prst="straightConnector1">
+            <a:avLst/>
+          </a:prstGeom>
+          <a:ln>
+            <a:tailEnd type="triangle"/>
+          </a:ln>
+        </p:spPr>
+        <p:style>
+          <a:lnRef idx="2">
+            <a:schemeClr val="dk1"/>
+          </a:lnRef>
+          <a:fillRef idx="0">
+            <a:schemeClr val="dk1"/>
+          </a:fillRef>
+          <a:effectRef idx="1">
+            <a:schemeClr val="dk1"/>
+          </a:effectRef>
+          <a:fontRef idx="minor">
+            <a:schemeClr val="tx1"/>
+          </a:fontRef>
+        </p:style>
+      </p:cxnSp>
+      <p:sp>
+        <p:nvSpPr>
+          <p:cNvPr id="41" name="Rectangle 40">
+            <a:extLst>
+              <a:ext uri="{FF2B5EF4-FFF2-40B4-BE49-F238E27FC236}">
+                <a16:creationId xmlns:a16="http://schemas.microsoft.com/office/drawing/2014/main" id="{EF4E5A77-E6D4-5543-B05D-A58B8440F8A4}"/>
+              </a:ext>
+            </a:extLst>
+          </p:cNvPr>
+          <p:cNvSpPr/>
+          <p:nvPr/>
+        </p:nvSpPr>
+        <p:spPr>
+          <a:xfrm>
+            <a:off x="8345237" y="1712528"/>
+            <a:ext cx="609600" cy="567559"/>
+          </a:xfrm>
+          <a:prstGeom prst="rect">
+            <a:avLst/>
+          </a:prstGeom>
+        </p:spPr>
+        <p:style>
+          <a:lnRef idx="2">
+            <a:schemeClr val="dk1"/>
+          </a:lnRef>
+          <a:fillRef idx="1">
+            <a:schemeClr val="lt1"/>
+          </a:fillRef>
+          <a:effectRef idx="0">
+            <a:schemeClr val="dk1"/>
+          </a:effectRef>
+          <a:fontRef idx="minor">
+            <a:schemeClr val="dk1"/>
+          </a:fontRef>
+        </p:style>
+        <p:txBody>
+          <a:bodyPr rtlCol="0" anchor="ctr"/>
+          <a:lstStyle/>
+          <a:p>
+            <a:pPr algn="ctr"/>
+            <a:r>
+              <a:rPr lang="en-US" i="1" dirty="0">
+                <a:latin typeface="Times New Roman" panose="02020603050405020304" pitchFamily="18" charset="0"/>
+                <a:cs typeface="Times New Roman" panose="02020603050405020304" pitchFamily="18" charset="0"/>
+              </a:rPr>
+              <a:t>t</a:t>
+            </a:r>
+            <a:r>
+              <a:rPr lang="en-CN" i="1" baseline="-25000" dirty="0">
+                <a:latin typeface="Times New Roman" panose="02020603050405020304" pitchFamily="18" charset="0"/>
+                <a:cs typeface="Times New Roman" panose="02020603050405020304" pitchFamily="18" charset="0"/>
+              </a:rPr>
+              <a:t>n</a:t>
+            </a:r>
+            <a:r>
+              <a:rPr lang="en-CN" baseline="-25000" dirty="0">
+                <a:latin typeface="Times New Roman" panose="02020603050405020304" pitchFamily="18" charset="0"/>
+                <a:cs typeface="Times New Roman" panose="02020603050405020304" pitchFamily="18" charset="0"/>
+              </a:rPr>
+              <a:t>+1</a:t>
+            </a:r>
+          </a:p>
+        </p:txBody>
+      </p:sp>
+      <p:cxnSp>
+        <p:nvCxnSpPr>
+          <p:cNvPr id="42" name="Straight Arrow Connector 41">
+            <a:extLst>
+              <a:ext uri="{FF2B5EF4-FFF2-40B4-BE49-F238E27FC236}">
+                <a16:creationId xmlns:a16="http://schemas.microsoft.com/office/drawing/2014/main" id="{B63E9CF5-7578-D849-AE0E-B3E580973D4A}"/>
+              </a:ext>
+            </a:extLst>
+          </p:cNvPr>
+          <p:cNvCxnSpPr>
+            <a:cxnSpLocks/>
+            <a:stCxn id="33" idx="3"/>
+            <a:endCxn id="41" idx="0"/>
+          </p:cNvCxnSpPr>
+          <p:nvPr/>
+        </p:nvCxnSpPr>
+        <p:spPr>
+          <a:xfrm>
+            <a:off x="7819712" y="803385"/>
+            <a:ext cx="830325" cy="909143"/>
+          </a:xfrm>
+          <a:prstGeom prst="straightConnector1">
+            <a:avLst/>
+          </a:prstGeom>
+          <a:ln>
+            <a:tailEnd type="triangle"/>
+          </a:ln>
+        </p:spPr>
+        <p:style>
+          <a:lnRef idx="2">
+            <a:schemeClr val="dk1"/>
+          </a:lnRef>
+          <a:fillRef idx="0">
+            <a:schemeClr val="dk1"/>
+          </a:fillRef>
+          <a:effectRef idx="1">
+            <a:schemeClr val="dk1"/>
+          </a:effectRef>
+          <a:fontRef idx="minor">
+            <a:schemeClr val="tx1"/>
+          </a:fontRef>
+        </p:style>
+      </p:cxnSp>
+      <p:sp>
+        <p:nvSpPr>
+          <p:cNvPr id="43" name="Rectangle 42">
+            <a:extLst>
+              <a:ext uri="{FF2B5EF4-FFF2-40B4-BE49-F238E27FC236}">
+                <a16:creationId xmlns:a16="http://schemas.microsoft.com/office/drawing/2014/main" id="{6826200B-2F79-EF45-A7D7-F69E3438B152}"/>
+              </a:ext>
+            </a:extLst>
+          </p:cNvPr>
+          <p:cNvSpPr/>
+          <p:nvPr/>
+        </p:nvSpPr>
+        <p:spPr>
+          <a:xfrm>
+            <a:off x="5381312" y="519604"/>
+            <a:ext cx="609600" cy="567559"/>
+          </a:xfrm>
+          <a:prstGeom prst="rect">
+            <a:avLst/>
+          </a:prstGeom>
+        </p:spPr>
+        <p:style>
+          <a:lnRef idx="2">
+            <a:schemeClr val="dk1"/>
+          </a:lnRef>
+          <a:fillRef idx="1">
+            <a:schemeClr val="lt1"/>
+          </a:fillRef>
+          <a:effectRef idx="0">
+            <a:schemeClr val="dk1"/>
+          </a:effectRef>
+          <a:fontRef idx="minor">
+            <a:schemeClr val="dk1"/>
+          </a:fontRef>
+        </p:style>
+        <p:txBody>
+          <a:bodyPr rtlCol="0" anchor="ctr"/>
+          <a:lstStyle/>
+          <a:p>
+            <a:pPr algn="ctr"/>
+            <a:r>
+              <a:rPr lang="en-US" i="1" dirty="0">
+                <a:latin typeface="Times New Roman" panose="02020603050405020304" pitchFamily="18" charset="0"/>
+                <a:cs typeface="Times New Roman" panose="02020603050405020304" pitchFamily="18" charset="0"/>
+              </a:rPr>
+              <a:t>k</a:t>
+            </a:r>
+            <a:r>
+              <a:rPr lang="en-CN" i="1" baseline="-25000" dirty="0">
+                <a:latin typeface="Times New Roman" panose="02020603050405020304" pitchFamily="18" charset="0"/>
+                <a:cs typeface="Times New Roman" panose="02020603050405020304" pitchFamily="18" charset="0"/>
+              </a:rPr>
+              <a:t>m</a:t>
+            </a:r>
+            <a:endParaRPr lang="en-CN" baseline="-25000" dirty="0"/>
+          </a:p>
+        </p:txBody>
+      </p:sp>
+    </p:spTree>
+    <p:extLst>
+      <p:ext uri="{BB962C8B-B14F-4D97-AF65-F5344CB8AC3E}">
+        <p14:creationId xmlns:p14="http://schemas.microsoft.com/office/powerpoint/2010/main" val="2447991342"/>
+      </p:ext>
+    </p:extLst>
+  </p:cSld>
+  <p:clrMapOvr>
+    <a:masterClrMapping/>
+  </p:clrMapOvr>
+</p:sld>
+</file>
+
 <file path=ppt/theme/theme1.xml><?xml version="1.0" encoding="utf-8"?>
 <a:theme xmlns:a="http://schemas.openxmlformats.org/drawingml/2006/main" name="Office Theme">
   <a:themeElements>

</xml_diff>

<commit_message>
Rewrite ch08 - update figure of partition
</commit_message>
<xml_diff>
--- a/datastruct/tree/B-tree/img/btrees.pptx
+++ b/datastruct/tree/B-tree/img/btrees.pptx
@@ -7,6 +7,7 @@
   <p:sldIdLst>
     <p:sldId id="256" r:id="rId2"/>
     <p:sldId id="257" r:id="rId3"/>
+    <p:sldId id="258" r:id="rId4"/>
   </p:sldIdLst>
   <p:sldSz cx="12192000" cy="6858000"/>
   <p:notesSz cx="6858000" cy="9144000"/>
@@ -5805,6 +5806,1954 @@
 </p:sld>
 </file>
 
+<file path=ppt/slides/slide3.xml><?xml version="1.0" encoding="utf-8"?>
+<p:sld xmlns:a="http://schemas.openxmlformats.org/drawingml/2006/main" xmlns:r="http://schemas.openxmlformats.org/officeDocument/2006/relationships" xmlns:p="http://schemas.openxmlformats.org/presentationml/2006/main">
+  <p:cSld>
+    <p:spTree>
+      <p:nvGrpSpPr>
+        <p:cNvPr id="1" name=""/>
+        <p:cNvGrpSpPr/>
+        <p:nvPr/>
+      </p:nvGrpSpPr>
+      <p:grpSpPr>
+        <a:xfrm>
+          <a:off x="0" y="0"/>
+          <a:ext cx="0" cy="0"/>
+          <a:chOff x="0" y="0"/>
+          <a:chExt cx="0" cy="0"/>
+        </a:xfrm>
+      </p:grpSpPr>
+      <p:sp>
+        <p:nvSpPr>
+          <p:cNvPr id="3" name="Rectangle 2">
+            <a:extLst>
+              <a:ext uri="{FF2B5EF4-FFF2-40B4-BE49-F238E27FC236}">
+                <a16:creationId xmlns:a16="http://schemas.microsoft.com/office/drawing/2014/main" id="{B5459B50-ACE7-C344-AD18-962652055465}"/>
+              </a:ext>
+            </a:extLst>
+          </p:cNvPr>
+          <p:cNvSpPr/>
+          <p:nvPr/>
+        </p:nvSpPr>
+        <p:spPr>
+          <a:xfrm>
+            <a:off x="2259737" y="3831019"/>
+            <a:ext cx="609600" cy="567559"/>
+          </a:xfrm>
+          <a:prstGeom prst="rect">
+            <a:avLst/>
+          </a:prstGeom>
+        </p:spPr>
+        <p:style>
+          <a:lnRef idx="2">
+            <a:schemeClr val="dk1"/>
+          </a:lnRef>
+          <a:fillRef idx="1">
+            <a:schemeClr val="lt1"/>
+          </a:fillRef>
+          <a:effectRef idx="0">
+            <a:schemeClr val="dk1"/>
+          </a:effectRef>
+          <a:fontRef idx="minor">
+            <a:schemeClr val="dk1"/>
+          </a:fontRef>
+        </p:style>
+        <p:txBody>
+          <a:bodyPr rtlCol="0" anchor="ctr"/>
+          <a:lstStyle/>
+          <a:p>
+            <a:pPr algn="ctr"/>
+            <a:r>
+              <a:rPr lang="en-CN" i="1" dirty="0">
+                <a:latin typeface="Times New Roman" panose="02020603050405020304" pitchFamily="18" charset="0"/>
+                <a:cs typeface="Times New Roman" panose="02020603050405020304" pitchFamily="18" charset="0"/>
+              </a:rPr>
+              <a:t>k</a:t>
+            </a:r>
+            <a:r>
+              <a:rPr lang="en-CN" baseline="-25000" dirty="0"/>
+              <a:t>1</a:t>
+            </a:r>
+          </a:p>
+        </p:txBody>
+      </p:sp>
+      <p:sp>
+        <p:nvSpPr>
+          <p:cNvPr id="4" name="Rectangle 3">
+            <a:extLst>
+              <a:ext uri="{FF2B5EF4-FFF2-40B4-BE49-F238E27FC236}">
+                <a16:creationId xmlns:a16="http://schemas.microsoft.com/office/drawing/2014/main" id="{20826EA8-8C02-5F42-9159-14BB2DCA1ABC}"/>
+              </a:ext>
+            </a:extLst>
+          </p:cNvPr>
+          <p:cNvSpPr/>
+          <p:nvPr/>
+        </p:nvSpPr>
+        <p:spPr>
+          <a:xfrm>
+            <a:off x="2869337" y="3831019"/>
+            <a:ext cx="609600" cy="567559"/>
+          </a:xfrm>
+          <a:prstGeom prst="rect">
+            <a:avLst/>
+          </a:prstGeom>
+        </p:spPr>
+        <p:style>
+          <a:lnRef idx="2">
+            <a:schemeClr val="dk1"/>
+          </a:lnRef>
+          <a:fillRef idx="1">
+            <a:schemeClr val="lt1"/>
+          </a:fillRef>
+          <a:effectRef idx="0">
+            <a:schemeClr val="dk1"/>
+          </a:effectRef>
+          <a:fontRef idx="minor">
+            <a:schemeClr val="dk1"/>
+          </a:fontRef>
+        </p:style>
+        <p:txBody>
+          <a:bodyPr rtlCol="0" anchor="ctr"/>
+          <a:lstStyle/>
+          <a:p>
+            <a:pPr algn="ctr"/>
+            <a:r>
+              <a:rPr lang="en-CN" dirty="0">
+                <a:latin typeface="Times New Roman" panose="02020603050405020304" pitchFamily="18" charset="0"/>
+                <a:cs typeface="Times New Roman" panose="02020603050405020304" pitchFamily="18" charset="0"/>
+              </a:rPr>
+              <a:t>…</a:t>
+            </a:r>
+          </a:p>
+        </p:txBody>
+      </p:sp>
+      <p:sp>
+        <p:nvSpPr>
+          <p:cNvPr id="5" name="Rectangle 4">
+            <a:extLst>
+              <a:ext uri="{FF2B5EF4-FFF2-40B4-BE49-F238E27FC236}">
+                <a16:creationId xmlns:a16="http://schemas.microsoft.com/office/drawing/2014/main" id="{7A86A469-3E50-D349-BD13-3D7C56301A40}"/>
+              </a:ext>
+            </a:extLst>
+          </p:cNvPr>
+          <p:cNvSpPr/>
+          <p:nvPr/>
+        </p:nvSpPr>
+        <p:spPr>
+          <a:xfrm>
+            <a:off x="3478937" y="3831019"/>
+            <a:ext cx="609600" cy="567559"/>
+          </a:xfrm>
+          <a:prstGeom prst="rect">
+            <a:avLst/>
+          </a:prstGeom>
+        </p:spPr>
+        <p:style>
+          <a:lnRef idx="2">
+            <a:schemeClr val="dk1"/>
+          </a:lnRef>
+          <a:fillRef idx="1">
+            <a:schemeClr val="lt1"/>
+          </a:fillRef>
+          <a:effectRef idx="0">
+            <a:schemeClr val="dk1"/>
+          </a:effectRef>
+          <a:fontRef idx="minor">
+            <a:schemeClr val="dk1"/>
+          </a:fontRef>
+        </p:style>
+        <p:txBody>
+          <a:bodyPr rtlCol="0" anchor="ctr"/>
+          <a:lstStyle/>
+          <a:p>
+            <a:pPr algn="ctr"/>
+            <a:r>
+              <a:rPr lang="en-US" i="1" dirty="0">
+                <a:latin typeface="Times New Roman" panose="02020603050405020304" pitchFamily="18" charset="0"/>
+                <a:cs typeface="Times New Roman" panose="02020603050405020304" pitchFamily="18" charset="0"/>
+              </a:rPr>
+              <a:t>k</a:t>
+            </a:r>
+            <a:r>
+              <a:rPr lang="en-CN" i="1" baseline="-25000" dirty="0">
+                <a:latin typeface="Times New Roman" panose="02020603050405020304" pitchFamily="18" charset="0"/>
+                <a:cs typeface="Times New Roman" panose="02020603050405020304" pitchFamily="18" charset="0"/>
+              </a:rPr>
+              <a:t>i</a:t>
+            </a:r>
+            <a:r>
+              <a:rPr lang="en-CN" baseline="-25000" dirty="0"/>
+              <a:t>-1</a:t>
+            </a:r>
+          </a:p>
+        </p:txBody>
+      </p:sp>
+      <p:sp>
+        <p:nvSpPr>
+          <p:cNvPr id="6" name="Rectangle 5">
+            <a:extLst>
+              <a:ext uri="{FF2B5EF4-FFF2-40B4-BE49-F238E27FC236}">
+                <a16:creationId xmlns:a16="http://schemas.microsoft.com/office/drawing/2014/main" id="{B27DD51C-43F2-FC4A-B0DE-1799D03FE106}"/>
+              </a:ext>
+            </a:extLst>
+          </p:cNvPr>
+          <p:cNvSpPr/>
+          <p:nvPr/>
+        </p:nvSpPr>
+        <p:spPr>
+          <a:xfrm>
+            <a:off x="7010418" y="3831018"/>
+            <a:ext cx="609600" cy="567559"/>
+          </a:xfrm>
+          <a:prstGeom prst="rect">
+            <a:avLst/>
+          </a:prstGeom>
+        </p:spPr>
+        <p:style>
+          <a:lnRef idx="2">
+            <a:schemeClr val="dk1"/>
+          </a:lnRef>
+          <a:fillRef idx="1">
+            <a:schemeClr val="lt1"/>
+          </a:fillRef>
+          <a:effectRef idx="0">
+            <a:schemeClr val="dk1"/>
+          </a:effectRef>
+          <a:fontRef idx="minor">
+            <a:schemeClr val="dk1"/>
+          </a:fontRef>
+        </p:style>
+        <p:txBody>
+          <a:bodyPr rtlCol="0" anchor="ctr"/>
+          <a:lstStyle/>
+          <a:p>
+            <a:pPr algn="ctr"/>
+            <a:r>
+              <a:rPr lang="en-US" i="1" dirty="0">
+                <a:latin typeface="Times New Roman" panose="02020603050405020304" pitchFamily="18" charset="0"/>
+                <a:cs typeface="Times New Roman" panose="02020603050405020304" pitchFamily="18" charset="0"/>
+              </a:rPr>
+              <a:t>k</a:t>
+            </a:r>
+            <a:r>
+              <a:rPr lang="en-CN" i="1" baseline="-25000" dirty="0">
+                <a:latin typeface="Times New Roman" panose="02020603050405020304" pitchFamily="18" charset="0"/>
+                <a:cs typeface="Times New Roman" panose="02020603050405020304" pitchFamily="18" charset="0"/>
+              </a:rPr>
+              <a:t>i+</a:t>
+            </a:r>
+            <a:r>
+              <a:rPr lang="en-CN" baseline="-25000" dirty="0">
+                <a:latin typeface="Times New Roman" panose="02020603050405020304" pitchFamily="18" charset="0"/>
+                <a:cs typeface="Times New Roman" panose="02020603050405020304" pitchFamily="18" charset="0"/>
+              </a:rPr>
+              <a:t>1</a:t>
+            </a:r>
+          </a:p>
+        </p:txBody>
+      </p:sp>
+      <p:sp>
+        <p:nvSpPr>
+          <p:cNvPr id="7" name="Rectangle 6">
+            <a:extLst>
+              <a:ext uri="{FF2B5EF4-FFF2-40B4-BE49-F238E27FC236}">
+                <a16:creationId xmlns:a16="http://schemas.microsoft.com/office/drawing/2014/main" id="{B54C2FE3-F4F3-9049-87F8-0651FC9BAF4E}"/>
+              </a:ext>
+            </a:extLst>
+          </p:cNvPr>
+          <p:cNvSpPr/>
+          <p:nvPr/>
+        </p:nvSpPr>
+        <p:spPr>
+          <a:xfrm>
+            <a:off x="8229618" y="3831019"/>
+            <a:ext cx="609600" cy="567559"/>
+          </a:xfrm>
+          <a:prstGeom prst="rect">
+            <a:avLst/>
+          </a:prstGeom>
+        </p:spPr>
+        <p:style>
+          <a:lnRef idx="2">
+            <a:schemeClr val="dk1"/>
+          </a:lnRef>
+          <a:fillRef idx="1">
+            <a:schemeClr val="lt1"/>
+          </a:fillRef>
+          <a:effectRef idx="0">
+            <a:schemeClr val="dk1"/>
+          </a:effectRef>
+          <a:fontRef idx="minor">
+            <a:schemeClr val="dk1"/>
+          </a:fontRef>
+        </p:style>
+        <p:txBody>
+          <a:bodyPr rtlCol="0" anchor="ctr"/>
+          <a:lstStyle/>
+          <a:p>
+            <a:pPr algn="ctr"/>
+            <a:r>
+              <a:rPr lang="en-CN" i="1" dirty="0">
+                <a:latin typeface="Times New Roman" panose="02020603050405020304" pitchFamily="18" charset="0"/>
+                <a:cs typeface="Times New Roman" panose="02020603050405020304" pitchFamily="18" charset="0"/>
+              </a:rPr>
+              <a:t>k</a:t>
+            </a:r>
+            <a:r>
+              <a:rPr lang="en-CN" i="1" baseline="-25000" dirty="0">
+                <a:latin typeface="Times New Roman" panose="02020603050405020304" pitchFamily="18" charset="0"/>
+                <a:cs typeface="Times New Roman" panose="02020603050405020304" pitchFamily="18" charset="0"/>
+              </a:rPr>
+              <a:t>n</a:t>
+            </a:r>
+          </a:p>
+        </p:txBody>
+      </p:sp>
+      <p:sp>
+        <p:nvSpPr>
+          <p:cNvPr id="9" name="Rectangle 8">
+            <a:extLst>
+              <a:ext uri="{FF2B5EF4-FFF2-40B4-BE49-F238E27FC236}">
+                <a16:creationId xmlns:a16="http://schemas.microsoft.com/office/drawing/2014/main" id="{B209D1D0-EF62-9549-8B64-CC7DDFB763F1}"/>
+              </a:ext>
+            </a:extLst>
+          </p:cNvPr>
+          <p:cNvSpPr/>
+          <p:nvPr/>
+        </p:nvSpPr>
+        <p:spPr>
+          <a:xfrm>
+            <a:off x="7620018" y="3831018"/>
+            <a:ext cx="609600" cy="567559"/>
+          </a:xfrm>
+          <a:prstGeom prst="rect">
+            <a:avLst/>
+          </a:prstGeom>
+        </p:spPr>
+        <p:style>
+          <a:lnRef idx="2">
+            <a:schemeClr val="dk1"/>
+          </a:lnRef>
+          <a:fillRef idx="1">
+            <a:schemeClr val="lt1"/>
+          </a:fillRef>
+          <a:effectRef idx="0">
+            <a:schemeClr val="dk1"/>
+          </a:effectRef>
+          <a:fontRef idx="minor">
+            <a:schemeClr val="dk1"/>
+          </a:fontRef>
+        </p:style>
+        <p:txBody>
+          <a:bodyPr rtlCol="0" anchor="ctr"/>
+          <a:lstStyle/>
+          <a:p>
+            <a:pPr algn="ctr"/>
+            <a:r>
+              <a:rPr lang="en-CN" i="1" dirty="0">
+                <a:latin typeface="Times New Roman" panose="02020603050405020304" pitchFamily="18" charset="0"/>
+                <a:cs typeface="Times New Roman" panose="02020603050405020304" pitchFamily="18" charset="0"/>
+              </a:rPr>
+              <a:t>…</a:t>
+            </a:r>
+            <a:endParaRPr lang="en-CN" baseline="-25000" dirty="0"/>
+          </a:p>
+        </p:txBody>
+      </p:sp>
+      <p:sp>
+        <p:nvSpPr>
+          <p:cNvPr id="10" name="Rectangle 9">
+            <a:extLst>
+              <a:ext uri="{FF2B5EF4-FFF2-40B4-BE49-F238E27FC236}">
+                <a16:creationId xmlns:a16="http://schemas.microsoft.com/office/drawing/2014/main" id="{2D144554-AD2A-D848-B46D-9BE11503496B}"/>
+              </a:ext>
+            </a:extLst>
+          </p:cNvPr>
+          <p:cNvSpPr/>
+          <p:nvPr/>
+        </p:nvSpPr>
+        <p:spPr>
+          <a:xfrm>
+            <a:off x="1019516" y="5023943"/>
+            <a:ext cx="609600" cy="567559"/>
+          </a:xfrm>
+          <a:prstGeom prst="rect">
+            <a:avLst/>
+          </a:prstGeom>
+        </p:spPr>
+        <p:style>
+          <a:lnRef idx="2">
+            <a:schemeClr val="dk1"/>
+          </a:lnRef>
+          <a:fillRef idx="1">
+            <a:schemeClr val="lt1"/>
+          </a:fillRef>
+          <a:effectRef idx="0">
+            <a:schemeClr val="dk1"/>
+          </a:effectRef>
+          <a:fontRef idx="minor">
+            <a:schemeClr val="dk1"/>
+          </a:fontRef>
+        </p:style>
+        <p:txBody>
+          <a:bodyPr rtlCol="0" anchor="ctr"/>
+          <a:lstStyle/>
+          <a:p>
+            <a:pPr algn="ctr"/>
+            <a:r>
+              <a:rPr lang="en-CN" i="1" dirty="0">
+                <a:latin typeface="Times New Roman" panose="02020603050405020304" pitchFamily="18" charset="0"/>
+                <a:cs typeface="Times New Roman" panose="02020603050405020304" pitchFamily="18" charset="0"/>
+              </a:rPr>
+              <a:t>t</a:t>
+            </a:r>
+            <a:r>
+              <a:rPr lang="en-CN" baseline="-25000" dirty="0"/>
+              <a:t>1</a:t>
+            </a:r>
+          </a:p>
+        </p:txBody>
+      </p:sp>
+      <p:cxnSp>
+        <p:nvCxnSpPr>
+          <p:cNvPr id="11" name="Straight Arrow Connector 10">
+            <a:extLst>
+              <a:ext uri="{FF2B5EF4-FFF2-40B4-BE49-F238E27FC236}">
+                <a16:creationId xmlns:a16="http://schemas.microsoft.com/office/drawing/2014/main" id="{323BDD05-2C1F-4E4E-AB10-7CFDA2BE2938}"/>
+              </a:ext>
+            </a:extLst>
+          </p:cNvPr>
+          <p:cNvCxnSpPr>
+            <a:cxnSpLocks/>
+            <a:stCxn id="3" idx="1"/>
+            <a:endCxn id="10" idx="0"/>
+          </p:cNvCxnSpPr>
+          <p:nvPr/>
+        </p:nvCxnSpPr>
+        <p:spPr>
+          <a:xfrm flipH="1">
+            <a:off x="1324316" y="4114799"/>
+            <a:ext cx="935421" cy="909144"/>
+          </a:xfrm>
+          <a:prstGeom prst="straightConnector1">
+            <a:avLst/>
+          </a:prstGeom>
+          <a:ln>
+            <a:tailEnd type="triangle"/>
+          </a:ln>
+        </p:spPr>
+        <p:style>
+          <a:lnRef idx="2">
+            <a:schemeClr val="dk1"/>
+          </a:lnRef>
+          <a:fillRef idx="0">
+            <a:schemeClr val="dk1"/>
+          </a:fillRef>
+          <a:effectRef idx="1">
+            <a:schemeClr val="dk1"/>
+          </a:effectRef>
+          <a:fontRef idx="minor">
+            <a:schemeClr val="tx1"/>
+          </a:fontRef>
+        </p:style>
+      </p:cxnSp>
+      <p:sp>
+        <p:nvSpPr>
+          <p:cNvPr id="12" name="Rectangle 11">
+            <a:extLst>
+              <a:ext uri="{FF2B5EF4-FFF2-40B4-BE49-F238E27FC236}">
+                <a16:creationId xmlns:a16="http://schemas.microsoft.com/office/drawing/2014/main" id="{681CF5D7-E2CE-BD43-81B3-A42C773CB563}"/>
+              </a:ext>
+            </a:extLst>
+          </p:cNvPr>
+          <p:cNvSpPr/>
+          <p:nvPr/>
+        </p:nvSpPr>
+        <p:spPr>
+          <a:xfrm>
+            <a:off x="2753726" y="5023943"/>
+            <a:ext cx="609600" cy="567559"/>
+          </a:xfrm>
+          <a:prstGeom prst="rect">
+            <a:avLst/>
+          </a:prstGeom>
+        </p:spPr>
+        <p:style>
+          <a:lnRef idx="2">
+            <a:schemeClr val="dk1"/>
+          </a:lnRef>
+          <a:fillRef idx="1">
+            <a:schemeClr val="lt1"/>
+          </a:fillRef>
+          <a:effectRef idx="0">
+            <a:schemeClr val="dk1"/>
+          </a:effectRef>
+          <a:fontRef idx="minor">
+            <a:schemeClr val="dk1"/>
+          </a:fontRef>
+        </p:style>
+        <p:txBody>
+          <a:bodyPr rtlCol="0" anchor="ctr"/>
+          <a:lstStyle/>
+          <a:p>
+            <a:pPr algn="ctr"/>
+            <a:r>
+              <a:rPr lang="en-US" i="1" dirty="0">
+                <a:latin typeface="Times New Roman" panose="02020603050405020304" pitchFamily="18" charset="0"/>
+                <a:cs typeface="Times New Roman" panose="02020603050405020304" pitchFamily="18" charset="0"/>
+              </a:rPr>
+              <a:t>t</a:t>
+            </a:r>
+            <a:r>
+              <a:rPr lang="en-CN" i="1" baseline="-25000" dirty="0">
+                <a:latin typeface="Times New Roman" panose="02020603050405020304" pitchFamily="18" charset="0"/>
+                <a:cs typeface="Times New Roman" panose="02020603050405020304" pitchFamily="18" charset="0"/>
+              </a:rPr>
+              <a:t>i</a:t>
+            </a:r>
+            <a:r>
+              <a:rPr lang="en-CN" baseline="-25000" dirty="0">
+                <a:latin typeface="Times New Roman" panose="02020603050405020304" pitchFamily="18" charset="0"/>
+                <a:cs typeface="Times New Roman" panose="02020603050405020304" pitchFamily="18" charset="0"/>
+              </a:rPr>
+              <a:t>-1</a:t>
+            </a:r>
+          </a:p>
+        </p:txBody>
+      </p:sp>
+      <p:cxnSp>
+        <p:nvCxnSpPr>
+          <p:cNvPr id="13" name="Straight Arrow Connector 12">
+            <a:extLst>
+              <a:ext uri="{FF2B5EF4-FFF2-40B4-BE49-F238E27FC236}">
+                <a16:creationId xmlns:a16="http://schemas.microsoft.com/office/drawing/2014/main" id="{1F982FF6-7C90-9345-8CBE-59EB4CCC39F2}"/>
+              </a:ext>
+            </a:extLst>
+          </p:cNvPr>
+          <p:cNvCxnSpPr>
+            <a:cxnSpLocks/>
+            <a:stCxn id="5" idx="1"/>
+            <a:endCxn id="12" idx="0"/>
+          </p:cNvCxnSpPr>
+          <p:nvPr/>
+        </p:nvCxnSpPr>
+        <p:spPr>
+          <a:xfrm flipH="1">
+            <a:off x="3058526" y="4114799"/>
+            <a:ext cx="420411" cy="909144"/>
+          </a:xfrm>
+          <a:prstGeom prst="straightConnector1">
+            <a:avLst/>
+          </a:prstGeom>
+          <a:ln>
+            <a:tailEnd type="triangle"/>
+          </a:ln>
+        </p:spPr>
+        <p:style>
+          <a:lnRef idx="2">
+            <a:schemeClr val="dk1"/>
+          </a:lnRef>
+          <a:fillRef idx="0">
+            <a:schemeClr val="dk1"/>
+          </a:fillRef>
+          <a:effectRef idx="1">
+            <a:schemeClr val="dk1"/>
+          </a:effectRef>
+          <a:fontRef idx="minor">
+            <a:schemeClr val="tx1"/>
+          </a:fontRef>
+        </p:style>
+      </p:cxnSp>
+      <p:sp>
+        <p:nvSpPr>
+          <p:cNvPr id="14" name="Rectangle 13">
+            <a:extLst>
+              <a:ext uri="{FF2B5EF4-FFF2-40B4-BE49-F238E27FC236}">
+                <a16:creationId xmlns:a16="http://schemas.microsoft.com/office/drawing/2014/main" id="{DD59F287-BA48-3A42-B7E9-222A8472D4A1}"/>
+              </a:ext>
+            </a:extLst>
+          </p:cNvPr>
+          <p:cNvSpPr/>
+          <p:nvPr/>
+        </p:nvSpPr>
+        <p:spPr>
+          <a:xfrm>
+            <a:off x="7567499" y="5023941"/>
+            <a:ext cx="609600" cy="567559"/>
+          </a:xfrm>
+          <a:prstGeom prst="rect">
+            <a:avLst/>
+          </a:prstGeom>
+        </p:spPr>
+        <p:style>
+          <a:lnRef idx="2">
+            <a:schemeClr val="dk1"/>
+          </a:lnRef>
+          <a:fillRef idx="1">
+            <a:schemeClr val="lt1"/>
+          </a:fillRef>
+          <a:effectRef idx="0">
+            <a:schemeClr val="dk1"/>
+          </a:effectRef>
+          <a:fontRef idx="minor">
+            <a:schemeClr val="dk1"/>
+          </a:fontRef>
+        </p:style>
+        <p:txBody>
+          <a:bodyPr rtlCol="0" anchor="ctr"/>
+          <a:lstStyle/>
+          <a:p>
+            <a:pPr algn="ctr"/>
+            <a:r>
+              <a:rPr lang="en-US" i="1" dirty="0">
+                <a:latin typeface="Times New Roman" panose="02020603050405020304" pitchFamily="18" charset="0"/>
+                <a:cs typeface="Times New Roman" panose="02020603050405020304" pitchFamily="18" charset="0"/>
+              </a:rPr>
+              <a:t>t</a:t>
+            </a:r>
+            <a:r>
+              <a:rPr lang="en-CN" i="1" baseline="-25000" dirty="0">
+                <a:latin typeface="Times New Roman" panose="02020603050405020304" pitchFamily="18" charset="0"/>
+                <a:cs typeface="Times New Roman" panose="02020603050405020304" pitchFamily="18" charset="0"/>
+              </a:rPr>
+              <a:t>i</a:t>
+            </a:r>
+            <a:r>
+              <a:rPr lang="en-CN" baseline="-25000" dirty="0">
+                <a:latin typeface="Times New Roman" panose="02020603050405020304" pitchFamily="18" charset="0"/>
+                <a:cs typeface="Times New Roman" panose="02020603050405020304" pitchFamily="18" charset="0"/>
+              </a:rPr>
+              <a:t>+1</a:t>
+            </a:r>
+            <a:endParaRPr lang="en-CN" baseline="-25000" dirty="0"/>
+          </a:p>
+        </p:txBody>
+      </p:sp>
+      <p:cxnSp>
+        <p:nvCxnSpPr>
+          <p:cNvPr id="15" name="Straight Arrow Connector 14">
+            <a:extLst>
+              <a:ext uri="{FF2B5EF4-FFF2-40B4-BE49-F238E27FC236}">
+                <a16:creationId xmlns:a16="http://schemas.microsoft.com/office/drawing/2014/main" id="{00DBA832-31F2-EB4B-874E-3FC706E07DCC}"/>
+              </a:ext>
+            </a:extLst>
+          </p:cNvPr>
+          <p:cNvCxnSpPr>
+            <a:cxnSpLocks/>
+            <a:stCxn id="6" idx="3"/>
+            <a:endCxn id="14" idx="0"/>
+          </p:cNvCxnSpPr>
+          <p:nvPr/>
+        </p:nvCxnSpPr>
+        <p:spPr>
+          <a:xfrm>
+            <a:off x="7620018" y="4114798"/>
+            <a:ext cx="252281" cy="909143"/>
+          </a:xfrm>
+          <a:prstGeom prst="straightConnector1">
+            <a:avLst/>
+          </a:prstGeom>
+          <a:ln>
+            <a:tailEnd type="triangle"/>
+          </a:ln>
+        </p:spPr>
+        <p:style>
+          <a:lnRef idx="2">
+            <a:schemeClr val="dk1"/>
+          </a:lnRef>
+          <a:fillRef idx="0">
+            <a:schemeClr val="dk1"/>
+          </a:fillRef>
+          <a:effectRef idx="1">
+            <a:schemeClr val="dk1"/>
+          </a:effectRef>
+          <a:fontRef idx="minor">
+            <a:schemeClr val="tx1"/>
+          </a:fontRef>
+        </p:style>
+      </p:cxnSp>
+      <p:sp>
+        <p:nvSpPr>
+          <p:cNvPr id="16" name="Rectangle 15">
+            <a:extLst>
+              <a:ext uri="{FF2B5EF4-FFF2-40B4-BE49-F238E27FC236}">
+                <a16:creationId xmlns:a16="http://schemas.microsoft.com/office/drawing/2014/main" id="{9787CF20-C0B7-2C49-B2F3-58DA6B9DBBDC}"/>
+              </a:ext>
+            </a:extLst>
+          </p:cNvPr>
+          <p:cNvSpPr/>
+          <p:nvPr/>
+        </p:nvSpPr>
+        <p:spPr>
+          <a:xfrm>
+            <a:off x="9354219" y="5023942"/>
+            <a:ext cx="609600" cy="567559"/>
+          </a:xfrm>
+          <a:prstGeom prst="rect">
+            <a:avLst/>
+          </a:prstGeom>
+        </p:spPr>
+        <p:style>
+          <a:lnRef idx="2">
+            <a:schemeClr val="dk1"/>
+          </a:lnRef>
+          <a:fillRef idx="1">
+            <a:schemeClr val="lt1"/>
+          </a:fillRef>
+          <a:effectRef idx="0">
+            <a:schemeClr val="dk1"/>
+          </a:effectRef>
+          <a:fontRef idx="minor">
+            <a:schemeClr val="dk1"/>
+          </a:fontRef>
+        </p:style>
+        <p:txBody>
+          <a:bodyPr rtlCol="0" anchor="ctr"/>
+          <a:lstStyle/>
+          <a:p>
+            <a:pPr algn="ctr"/>
+            <a:r>
+              <a:rPr lang="en-US" i="1" dirty="0">
+                <a:latin typeface="Times New Roman" panose="02020603050405020304" pitchFamily="18" charset="0"/>
+                <a:cs typeface="Times New Roman" panose="02020603050405020304" pitchFamily="18" charset="0"/>
+              </a:rPr>
+              <a:t>t</a:t>
+            </a:r>
+            <a:r>
+              <a:rPr lang="en-CN" i="1" baseline="-25000" dirty="0">
+                <a:latin typeface="Times New Roman" panose="02020603050405020304" pitchFamily="18" charset="0"/>
+                <a:cs typeface="Times New Roman" panose="02020603050405020304" pitchFamily="18" charset="0"/>
+              </a:rPr>
+              <a:t>n</a:t>
+            </a:r>
+            <a:r>
+              <a:rPr lang="en-CN" baseline="-25000" dirty="0">
+                <a:latin typeface="Times New Roman" panose="02020603050405020304" pitchFamily="18" charset="0"/>
+                <a:cs typeface="Times New Roman" panose="02020603050405020304" pitchFamily="18" charset="0"/>
+              </a:rPr>
+              <a:t>+1</a:t>
+            </a:r>
+          </a:p>
+        </p:txBody>
+      </p:sp>
+      <p:cxnSp>
+        <p:nvCxnSpPr>
+          <p:cNvPr id="17" name="Straight Arrow Connector 16">
+            <a:extLst>
+              <a:ext uri="{FF2B5EF4-FFF2-40B4-BE49-F238E27FC236}">
+                <a16:creationId xmlns:a16="http://schemas.microsoft.com/office/drawing/2014/main" id="{424B4A48-FFCA-8640-8CDE-067743771014}"/>
+              </a:ext>
+            </a:extLst>
+          </p:cNvPr>
+          <p:cNvCxnSpPr>
+            <a:cxnSpLocks/>
+            <a:stCxn id="7" idx="3"/>
+            <a:endCxn id="16" idx="0"/>
+          </p:cNvCxnSpPr>
+          <p:nvPr/>
+        </p:nvCxnSpPr>
+        <p:spPr>
+          <a:xfrm>
+            <a:off x="8839218" y="4114799"/>
+            <a:ext cx="819801" cy="909143"/>
+          </a:xfrm>
+          <a:prstGeom prst="straightConnector1">
+            <a:avLst/>
+          </a:prstGeom>
+          <a:ln>
+            <a:tailEnd type="triangle"/>
+          </a:ln>
+        </p:spPr>
+        <p:style>
+          <a:lnRef idx="2">
+            <a:schemeClr val="dk1"/>
+          </a:lnRef>
+          <a:fillRef idx="0">
+            <a:schemeClr val="dk1"/>
+          </a:fillRef>
+          <a:effectRef idx="1">
+            <a:schemeClr val="dk1"/>
+          </a:effectRef>
+          <a:fontRef idx="minor">
+            <a:schemeClr val="tx1"/>
+          </a:fontRef>
+        </p:style>
+      </p:cxnSp>
+      <p:sp>
+        <p:nvSpPr>
+          <p:cNvPr id="28" name="Rectangle 27">
+            <a:extLst>
+              <a:ext uri="{FF2B5EF4-FFF2-40B4-BE49-F238E27FC236}">
+                <a16:creationId xmlns:a16="http://schemas.microsoft.com/office/drawing/2014/main" id="{A3954980-4EC6-EE43-9D68-BF9362CE2861}"/>
+              </a:ext>
+            </a:extLst>
+          </p:cNvPr>
+          <p:cNvSpPr/>
+          <p:nvPr/>
+        </p:nvSpPr>
+        <p:spPr>
+          <a:xfrm>
+            <a:off x="5202657" y="5023940"/>
+            <a:ext cx="609600" cy="567559"/>
+          </a:xfrm>
+          <a:prstGeom prst="rect">
+            <a:avLst/>
+          </a:prstGeom>
+        </p:spPr>
+        <p:style>
+          <a:lnRef idx="2">
+            <a:schemeClr val="dk1"/>
+          </a:lnRef>
+          <a:fillRef idx="1">
+            <a:schemeClr val="lt1"/>
+          </a:fillRef>
+          <a:effectRef idx="0">
+            <a:schemeClr val="dk1"/>
+          </a:effectRef>
+          <a:fontRef idx="minor">
+            <a:schemeClr val="dk1"/>
+          </a:fontRef>
+        </p:style>
+        <p:txBody>
+          <a:bodyPr rtlCol="0" anchor="ctr"/>
+          <a:lstStyle/>
+          <a:p>
+            <a:pPr algn="ctr"/>
+            <a:r>
+              <a:rPr lang="en-US" i="1" dirty="0">
+                <a:latin typeface="Times New Roman" panose="02020603050405020304" pitchFamily="18" charset="0"/>
+                <a:cs typeface="Times New Roman" panose="02020603050405020304" pitchFamily="18" charset="0"/>
+              </a:rPr>
+              <a:t>t</a:t>
+            </a:r>
+            <a:r>
+              <a:rPr lang="en-CN" i="1" baseline="-25000" dirty="0">
+                <a:latin typeface="Times New Roman" panose="02020603050405020304" pitchFamily="18" charset="0"/>
+                <a:cs typeface="Times New Roman" panose="02020603050405020304" pitchFamily="18" charset="0"/>
+              </a:rPr>
+              <a:t>i</a:t>
+            </a:r>
+            <a:endParaRPr lang="en-CN" baseline="-25000" dirty="0"/>
+          </a:p>
+        </p:txBody>
+      </p:sp>
+      <p:sp>
+        <p:nvSpPr>
+          <p:cNvPr id="29" name="Rectangle 28">
+            <a:extLst>
+              <a:ext uri="{FF2B5EF4-FFF2-40B4-BE49-F238E27FC236}">
+                <a16:creationId xmlns:a16="http://schemas.microsoft.com/office/drawing/2014/main" id="{79D9F5C7-1282-A143-ABC3-F3D729278AE1}"/>
+              </a:ext>
+            </a:extLst>
+          </p:cNvPr>
+          <p:cNvSpPr/>
+          <p:nvPr/>
+        </p:nvSpPr>
+        <p:spPr>
+          <a:xfrm>
+            <a:off x="3499963" y="1316423"/>
+            <a:ext cx="609600" cy="567559"/>
+          </a:xfrm>
+          <a:prstGeom prst="rect">
+            <a:avLst/>
+          </a:prstGeom>
+        </p:spPr>
+        <p:style>
+          <a:lnRef idx="2">
+            <a:schemeClr val="dk1"/>
+          </a:lnRef>
+          <a:fillRef idx="1">
+            <a:schemeClr val="lt1"/>
+          </a:fillRef>
+          <a:effectRef idx="0">
+            <a:schemeClr val="dk1"/>
+          </a:effectRef>
+          <a:fontRef idx="minor">
+            <a:schemeClr val="dk1"/>
+          </a:fontRef>
+        </p:style>
+        <p:txBody>
+          <a:bodyPr rtlCol="0" anchor="ctr"/>
+          <a:lstStyle/>
+          <a:p>
+            <a:pPr algn="ctr"/>
+            <a:r>
+              <a:rPr lang="en-CN" i="1" dirty="0">
+                <a:latin typeface="Times New Roman" panose="02020603050405020304" pitchFamily="18" charset="0"/>
+                <a:cs typeface="Times New Roman" panose="02020603050405020304" pitchFamily="18" charset="0"/>
+              </a:rPr>
+              <a:t>k</a:t>
+            </a:r>
+            <a:r>
+              <a:rPr lang="en-CN" baseline="-25000" dirty="0"/>
+              <a:t>1</a:t>
+            </a:r>
+          </a:p>
+        </p:txBody>
+      </p:sp>
+      <p:sp>
+        <p:nvSpPr>
+          <p:cNvPr id="30" name="Rectangle 29">
+            <a:extLst>
+              <a:ext uri="{FF2B5EF4-FFF2-40B4-BE49-F238E27FC236}">
+                <a16:creationId xmlns:a16="http://schemas.microsoft.com/office/drawing/2014/main" id="{FB4EA036-F7C0-2147-AA12-149169562E89}"/>
+              </a:ext>
+            </a:extLst>
+          </p:cNvPr>
+          <p:cNvSpPr/>
+          <p:nvPr/>
+        </p:nvSpPr>
+        <p:spPr>
+          <a:xfrm>
+            <a:off x="4109563" y="1316423"/>
+            <a:ext cx="609600" cy="567559"/>
+          </a:xfrm>
+          <a:prstGeom prst="rect">
+            <a:avLst/>
+          </a:prstGeom>
+        </p:spPr>
+        <p:style>
+          <a:lnRef idx="2">
+            <a:schemeClr val="dk1"/>
+          </a:lnRef>
+          <a:fillRef idx="1">
+            <a:schemeClr val="lt1"/>
+          </a:fillRef>
+          <a:effectRef idx="0">
+            <a:schemeClr val="dk1"/>
+          </a:effectRef>
+          <a:fontRef idx="minor">
+            <a:schemeClr val="dk1"/>
+          </a:fontRef>
+        </p:style>
+        <p:txBody>
+          <a:bodyPr rtlCol="0" anchor="ctr"/>
+          <a:lstStyle/>
+          <a:p>
+            <a:pPr algn="ctr"/>
+            <a:r>
+              <a:rPr lang="en-CN" dirty="0">
+                <a:latin typeface="Times New Roman" panose="02020603050405020304" pitchFamily="18" charset="0"/>
+                <a:cs typeface="Times New Roman" panose="02020603050405020304" pitchFamily="18" charset="0"/>
+              </a:rPr>
+              <a:t>…</a:t>
+            </a:r>
+          </a:p>
+        </p:txBody>
+      </p:sp>
+      <p:sp>
+        <p:nvSpPr>
+          <p:cNvPr id="31" name="Rectangle 30">
+            <a:extLst>
+              <a:ext uri="{FF2B5EF4-FFF2-40B4-BE49-F238E27FC236}">
+                <a16:creationId xmlns:a16="http://schemas.microsoft.com/office/drawing/2014/main" id="{1DBE2F67-38A2-8F43-8080-5B8567AAE2C6}"/>
+              </a:ext>
+            </a:extLst>
+          </p:cNvPr>
+          <p:cNvSpPr/>
+          <p:nvPr/>
+        </p:nvSpPr>
+        <p:spPr>
+          <a:xfrm>
+            <a:off x="4719163" y="1316423"/>
+            <a:ext cx="609600" cy="567559"/>
+          </a:xfrm>
+          <a:prstGeom prst="rect">
+            <a:avLst/>
+          </a:prstGeom>
+        </p:spPr>
+        <p:style>
+          <a:lnRef idx="2">
+            <a:schemeClr val="dk1"/>
+          </a:lnRef>
+          <a:fillRef idx="1">
+            <a:schemeClr val="lt1"/>
+          </a:fillRef>
+          <a:effectRef idx="0">
+            <a:schemeClr val="dk1"/>
+          </a:effectRef>
+          <a:fontRef idx="minor">
+            <a:schemeClr val="dk1"/>
+          </a:fontRef>
+        </p:style>
+        <p:txBody>
+          <a:bodyPr rtlCol="0" anchor="ctr"/>
+          <a:lstStyle/>
+          <a:p>
+            <a:pPr algn="ctr"/>
+            <a:r>
+              <a:rPr lang="en-US" i="1" dirty="0">
+                <a:latin typeface="Times New Roman" panose="02020603050405020304" pitchFamily="18" charset="0"/>
+                <a:cs typeface="Times New Roman" panose="02020603050405020304" pitchFamily="18" charset="0"/>
+              </a:rPr>
+              <a:t>k</a:t>
+            </a:r>
+            <a:r>
+              <a:rPr lang="en-CN" i="1" baseline="-25000" dirty="0">
+                <a:latin typeface="Times New Roman" panose="02020603050405020304" pitchFamily="18" charset="0"/>
+                <a:cs typeface="Times New Roman" panose="02020603050405020304" pitchFamily="18" charset="0"/>
+              </a:rPr>
+              <a:t>i</a:t>
+            </a:r>
+            <a:r>
+              <a:rPr lang="en-CN" baseline="-25000" dirty="0"/>
+              <a:t>-1</a:t>
+            </a:r>
+          </a:p>
+        </p:txBody>
+      </p:sp>
+      <p:sp>
+        <p:nvSpPr>
+          <p:cNvPr id="33" name="Rectangle 32">
+            <a:extLst>
+              <a:ext uri="{FF2B5EF4-FFF2-40B4-BE49-F238E27FC236}">
+                <a16:creationId xmlns:a16="http://schemas.microsoft.com/office/drawing/2014/main" id="{59761D16-473A-6A4C-B5B8-C850AEA19AB8}"/>
+              </a:ext>
+            </a:extLst>
+          </p:cNvPr>
+          <p:cNvSpPr/>
+          <p:nvPr/>
+        </p:nvSpPr>
+        <p:spPr>
+          <a:xfrm>
+            <a:off x="6558488" y="1316423"/>
+            <a:ext cx="609600" cy="567559"/>
+          </a:xfrm>
+          <a:prstGeom prst="rect">
+            <a:avLst/>
+          </a:prstGeom>
+        </p:spPr>
+        <p:style>
+          <a:lnRef idx="2">
+            <a:schemeClr val="dk1"/>
+          </a:lnRef>
+          <a:fillRef idx="1">
+            <a:schemeClr val="lt1"/>
+          </a:fillRef>
+          <a:effectRef idx="0">
+            <a:schemeClr val="dk1"/>
+          </a:effectRef>
+          <a:fontRef idx="minor">
+            <a:schemeClr val="dk1"/>
+          </a:fontRef>
+        </p:style>
+        <p:txBody>
+          <a:bodyPr rtlCol="0" anchor="ctr"/>
+          <a:lstStyle/>
+          <a:p>
+            <a:pPr algn="ctr"/>
+            <a:r>
+              <a:rPr lang="en-CN" i="1" dirty="0">
+                <a:latin typeface="Times New Roman" panose="02020603050405020304" pitchFamily="18" charset="0"/>
+                <a:cs typeface="Times New Roman" panose="02020603050405020304" pitchFamily="18" charset="0"/>
+              </a:rPr>
+              <a:t>k</a:t>
+            </a:r>
+            <a:r>
+              <a:rPr lang="en-CN" i="1" baseline="-25000" dirty="0">
+                <a:latin typeface="Times New Roman" panose="02020603050405020304" pitchFamily="18" charset="0"/>
+                <a:cs typeface="Times New Roman" panose="02020603050405020304" pitchFamily="18" charset="0"/>
+              </a:rPr>
+              <a:t>n</a:t>
+            </a:r>
+          </a:p>
+        </p:txBody>
+      </p:sp>
+      <p:sp>
+        <p:nvSpPr>
+          <p:cNvPr id="34" name="Rectangle 33">
+            <a:extLst>
+              <a:ext uri="{FF2B5EF4-FFF2-40B4-BE49-F238E27FC236}">
+                <a16:creationId xmlns:a16="http://schemas.microsoft.com/office/drawing/2014/main" id="{82BF7BE7-FD25-9F4D-9504-0A50FDD2714A}"/>
+              </a:ext>
+            </a:extLst>
+          </p:cNvPr>
+          <p:cNvSpPr/>
+          <p:nvPr/>
+        </p:nvSpPr>
+        <p:spPr>
+          <a:xfrm>
+            <a:off x="5948888" y="1316422"/>
+            <a:ext cx="609600" cy="567559"/>
+          </a:xfrm>
+          <a:prstGeom prst="rect">
+            <a:avLst/>
+          </a:prstGeom>
+        </p:spPr>
+        <p:style>
+          <a:lnRef idx="2">
+            <a:schemeClr val="dk1"/>
+          </a:lnRef>
+          <a:fillRef idx="1">
+            <a:schemeClr val="lt1"/>
+          </a:fillRef>
+          <a:effectRef idx="0">
+            <a:schemeClr val="dk1"/>
+          </a:effectRef>
+          <a:fontRef idx="minor">
+            <a:schemeClr val="dk1"/>
+          </a:fontRef>
+        </p:style>
+        <p:txBody>
+          <a:bodyPr rtlCol="0" anchor="ctr"/>
+          <a:lstStyle/>
+          <a:p>
+            <a:pPr algn="ctr"/>
+            <a:r>
+              <a:rPr lang="en-CN" i="1" dirty="0">
+                <a:latin typeface="Times New Roman" panose="02020603050405020304" pitchFamily="18" charset="0"/>
+                <a:cs typeface="Times New Roman" panose="02020603050405020304" pitchFamily="18" charset="0"/>
+              </a:rPr>
+              <a:t>…</a:t>
+            </a:r>
+            <a:endParaRPr lang="en-CN" baseline="-25000" dirty="0"/>
+          </a:p>
+        </p:txBody>
+      </p:sp>
+      <p:sp>
+        <p:nvSpPr>
+          <p:cNvPr id="35" name="Rectangle 34">
+            <a:extLst>
+              <a:ext uri="{FF2B5EF4-FFF2-40B4-BE49-F238E27FC236}">
+                <a16:creationId xmlns:a16="http://schemas.microsoft.com/office/drawing/2014/main" id="{5C09BD99-5E1E-0443-879E-46B4AFF62745}"/>
+              </a:ext>
+            </a:extLst>
+          </p:cNvPr>
+          <p:cNvSpPr/>
+          <p:nvPr/>
+        </p:nvSpPr>
+        <p:spPr>
+          <a:xfrm>
+            <a:off x="2259742" y="2509347"/>
+            <a:ext cx="609600" cy="567559"/>
+          </a:xfrm>
+          <a:prstGeom prst="rect">
+            <a:avLst/>
+          </a:prstGeom>
+        </p:spPr>
+        <p:style>
+          <a:lnRef idx="2">
+            <a:schemeClr val="dk1"/>
+          </a:lnRef>
+          <a:fillRef idx="1">
+            <a:schemeClr val="lt1"/>
+          </a:fillRef>
+          <a:effectRef idx="0">
+            <a:schemeClr val="dk1"/>
+          </a:effectRef>
+          <a:fontRef idx="minor">
+            <a:schemeClr val="dk1"/>
+          </a:fontRef>
+        </p:style>
+        <p:txBody>
+          <a:bodyPr rtlCol="0" anchor="ctr"/>
+          <a:lstStyle/>
+          <a:p>
+            <a:pPr algn="ctr"/>
+            <a:r>
+              <a:rPr lang="en-CN" i="1" dirty="0">
+                <a:latin typeface="Times New Roman" panose="02020603050405020304" pitchFamily="18" charset="0"/>
+                <a:cs typeface="Times New Roman" panose="02020603050405020304" pitchFamily="18" charset="0"/>
+              </a:rPr>
+              <a:t>t</a:t>
+            </a:r>
+            <a:r>
+              <a:rPr lang="en-CN" baseline="-25000" dirty="0"/>
+              <a:t>1</a:t>
+            </a:r>
+          </a:p>
+        </p:txBody>
+      </p:sp>
+      <p:cxnSp>
+        <p:nvCxnSpPr>
+          <p:cNvPr id="36" name="Straight Arrow Connector 35">
+            <a:extLst>
+              <a:ext uri="{FF2B5EF4-FFF2-40B4-BE49-F238E27FC236}">
+                <a16:creationId xmlns:a16="http://schemas.microsoft.com/office/drawing/2014/main" id="{DF6BF7D3-1247-F84D-973A-D01098C2C42D}"/>
+              </a:ext>
+            </a:extLst>
+          </p:cNvPr>
+          <p:cNvCxnSpPr>
+            <a:cxnSpLocks/>
+            <a:stCxn id="29" idx="1"/>
+            <a:endCxn id="35" idx="0"/>
+          </p:cNvCxnSpPr>
+          <p:nvPr/>
+        </p:nvCxnSpPr>
+        <p:spPr>
+          <a:xfrm flipH="1">
+            <a:off x="2564542" y="1600203"/>
+            <a:ext cx="935421" cy="909144"/>
+          </a:xfrm>
+          <a:prstGeom prst="straightConnector1">
+            <a:avLst/>
+          </a:prstGeom>
+          <a:ln>
+            <a:tailEnd type="triangle"/>
+          </a:ln>
+        </p:spPr>
+        <p:style>
+          <a:lnRef idx="2">
+            <a:schemeClr val="dk1"/>
+          </a:lnRef>
+          <a:fillRef idx="0">
+            <a:schemeClr val="dk1"/>
+          </a:fillRef>
+          <a:effectRef idx="1">
+            <a:schemeClr val="dk1"/>
+          </a:effectRef>
+          <a:fontRef idx="minor">
+            <a:schemeClr val="tx1"/>
+          </a:fontRef>
+        </p:style>
+      </p:cxnSp>
+      <p:sp>
+        <p:nvSpPr>
+          <p:cNvPr id="37" name="Rectangle 36">
+            <a:extLst>
+              <a:ext uri="{FF2B5EF4-FFF2-40B4-BE49-F238E27FC236}">
+                <a16:creationId xmlns:a16="http://schemas.microsoft.com/office/drawing/2014/main" id="{F5E5B91A-8CC9-1041-9115-A9D609C6D330}"/>
+              </a:ext>
+            </a:extLst>
+          </p:cNvPr>
+          <p:cNvSpPr/>
+          <p:nvPr/>
+        </p:nvSpPr>
+        <p:spPr>
+          <a:xfrm>
+            <a:off x="5276215" y="2509346"/>
+            <a:ext cx="609600" cy="567559"/>
+          </a:xfrm>
+          <a:prstGeom prst="rect">
+            <a:avLst/>
+          </a:prstGeom>
+        </p:spPr>
+        <p:style>
+          <a:lnRef idx="2">
+            <a:schemeClr val="dk1"/>
+          </a:lnRef>
+          <a:fillRef idx="1">
+            <a:schemeClr val="lt1"/>
+          </a:fillRef>
+          <a:effectRef idx="0">
+            <a:schemeClr val="dk1"/>
+          </a:effectRef>
+          <a:fontRef idx="minor">
+            <a:schemeClr val="dk1"/>
+          </a:fontRef>
+        </p:style>
+        <p:txBody>
+          <a:bodyPr rtlCol="0" anchor="ctr"/>
+          <a:lstStyle/>
+          <a:p>
+            <a:pPr algn="ctr"/>
+            <a:r>
+              <a:rPr lang="en-CN" i="1" dirty="0">
+                <a:latin typeface="Times New Roman" panose="02020603050405020304" pitchFamily="18" charset="0"/>
+                <a:cs typeface="Times New Roman" panose="02020603050405020304" pitchFamily="18" charset="0"/>
+              </a:rPr>
+              <a:t>t</a:t>
+            </a:r>
+            <a:r>
+              <a:rPr lang="en-CN" i="1" baseline="-25000" dirty="0">
+                <a:latin typeface="Times New Roman" panose="02020603050405020304" pitchFamily="18" charset="0"/>
+                <a:cs typeface="Times New Roman" panose="02020603050405020304" pitchFamily="18" charset="0"/>
+              </a:rPr>
+              <a:t>i</a:t>
+            </a:r>
+          </a:p>
+        </p:txBody>
+      </p:sp>
+      <p:sp>
+        <p:nvSpPr>
+          <p:cNvPr id="41" name="Rectangle 40">
+            <a:extLst>
+              <a:ext uri="{FF2B5EF4-FFF2-40B4-BE49-F238E27FC236}">
+                <a16:creationId xmlns:a16="http://schemas.microsoft.com/office/drawing/2014/main" id="{EF4E5A77-E6D4-5543-B05D-A58B8440F8A4}"/>
+              </a:ext>
+            </a:extLst>
+          </p:cNvPr>
+          <p:cNvSpPr/>
+          <p:nvPr/>
+        </p:nvSpPr>
+        <p:spPr>
+          <a:xfrm>
+            <a:off x="7693613" y="2509346"/>
+            <a:ext cx="609600" cy="567559"/>
+          </a:xfrm>
+          <a:prstGeom prst="rect">
+            <a:avLst/>
+          </a:prstGeom>
+        </p:spPr>
+        <p:style>
+          <a:lnRef idx="2">
+            <a:schemeClr val="dk1"/>
+          </a:lnRef>
+          <a:fillRef idx="1">
+            <a:schemeClr val="lt1"/>
+          </a:fillRef>
+          <a:effectRef idx="0">
+            <a:schemeClr val="dk1"/>
+          </a:effectRef>
+          <a:fontRef idx="minor">
+            <a:schemeClr val="dk1"/>
+          </a:fontRef>
+        </p:style>
+        <p:txBody>
+          <a:bodyPr rtlCol="0" anchor="ctr"/>
+          <a:lstStyle/>
+          <a:p>
+            <a:pPr algn="ctr"/>
+            <a:r>
+              <a:rPr lang="en-US" i="1" dirty="0">
+                <a:latin typeface="Times New Roman" panose="02020603050405020304" pitchFamily="18" charset="0"/>
+                <a:cs typeface="Times New Roman" panose="02020603050405020304" pitchFamily="18" charset="0"/>
+              </a:rPr>
+              <a:t>t</a:t>
+            </a:r>
+            <a:r>
+              <a:rPr lang="en-CN" i="1" baseline="-25000" dirty="0">
+                <a:latin typeface="Times New Roman" panose="02020603050405020304" pitchFamily="18" charset="0"/>
+                <a:cs typeface="Times New Roman" panose="02020603050405020304" pitchFamily="18" charset="0"/>
+              </a:rPr>
+              <a:t>n</a:t>
+            </a:r>
+            <a:r>
+              <a:rPr lang="en-CN" baseline="-25000" dirty="0">
+                <a:latin typeface="Times New Roman" panose="02020603050405020304" pitchFamily="18" charset="0"/>
+                <a:cs typeface="Times New Roman" panose="02020603050405020304" pitchFamily="18" charset="0"/>
+              </a:rPr>
+              <a:t>+1</a:t>
+            </a:r>
+          </a:p>
+        </p:txBody>
+      </p:sp>
+      <p:cxnSp>
+        <p:nvCxnSpPr>
+          <p:cNvPr id="42" name="Straight Arrow Connector 41">
+            <a:extLst>
+              <a:ext uri="{FF2B5EF4-FFF2-40B4-BE49-F238E27FC236}">
+                <a16:creationId xmlns:a16="http://schemas.microsoft.com/office/drawing/2014/main" id="{B63E9CF5-7578-D849-AE0E-B3E580973D4A}"/>
+              </a:ext>
+            </a:extLst>
+          </p:cNvPr>
+          <p:cNvCxnSpPr>
+            <a:cxnSpLocks/>
+            <a:stCxn id="33" idx="3"/>
+            <a:endCxn id="41" idx="0"/>
+          </p:cNvCxnSpPr>
+          <p:nvPr/>
+        </p:nvCxnSpPr>
+        <p:spPr>
+          <a:xfrm>
+            <a:off x="7168088" y="1600203"/>
+            <a:ext cx="830325" cy="909143"/>
+          </a:xfrm>
+          <a:prstGeom prst="straightConnector1">
+            <a:avLst/>
+          </a:prstGeom>
+          <a:ln>
+            <a:tailEnd type="triangle"/>
+          </a:ln>
+        </p:spPr>
+        <p:style>
+          <a:lnRef idx="2">
+            <a:schemeClr val="dk1"/>
+          </a:lnRef>
+          <a:fillRef idx="0">
+            <a:schemeClr val="dk1"/>
+          </a:fillRef>
+          <a:effectRef idx="1">
+            <a:schemeClr val="dk1"/>
+          </a:effectRef>
+          <a:fontRef idx="minor">
+            <a:schemeClr val="tx1"/>
+          </a:fontRef>
+        </p:style>
+      </p:cxnSp>
+      <p:sp>
+        <p:nvSpPr>
+          <p:cNvPr id="43" name="Rectangle 42">
+            <a:extLst>
+              <a:ext uri="{FF2B5EF4-FFF2-40B4-BE49-F238E27FC236}">
+                <a16:creationId xmlns:a16="http://schemas.microsoft.com/office/drawing/2014/main" id="{6826200B-2F79-EF45-A7D7-F69E3438B152}"/>
+              </a:ext>
+            </a:extLst>
+          </p:cNvPr>
+          <p:cNvSpPr/>
+          <p:nvPr/>
+        </p:nvSpPr>
+        <p:spPr>
+          <a:xfrm>
+            <a:off x="5328763" y="1316422"/>
+            <a:ext cx="609600" cy="567559"/>
+          </a:xfrm>
+          <a:prstGeom prst="rect">
+            <a:avLst/>
+          </a:prstGeom>
+        </p:spPr>
+        <p:style>
+          <a:lnRef idx="2">
+            <a:schemeClr val="dk1"/>
+          </a:lnRef>
+          <a:fillRef idx="1">
+            <a:schemeClr val="lt1"/>
+          </a:fillRef>
+          <a:effectRef idx="0">
+            <a:schemeClr val="dk1"/>
+          </a:effectRef>
+          <a:fontRef idx="minor">
+            <a:schemeClr val="dk1"/>
+          </a:fontRef>
+        </p:style>
+        <p:txBody>
+          <a:bodyPr rtlCol="0" anchor="ctr"/>
+          <a:lstStyle/>
+          <a:p>
+            <a:pPr algn="ctr"/>
+            <a:r>
+              <a:rPr lang="en-US" i="1" dirty="0">
+                <a:latin typeface="Times New Roman" panose="02020603050405020304" pitchFamily="18" charset="0"/>
+                <a:cs typeface="Times New Roman" panose="02020603050405020304" pitchFamily="18" charset="0"/>
+              </a:rPr>
+              <a:t>k</a:t>
+            </a:r>
+            <a:r>
+              <a:rPr lang="en-CN" i="1" baseline="-25000" dirty="0">
+                <a:latin typeface="Times New Roman" panose="02020603050405020304" pitchFamily="18" charset="0"/>
+                <a:cs typeface="Times New Roman" panose="02020603050405020304" pitchFamily="18" charset="0"/>
+              </a:rPr>
+              <a:t>i</a:t>
+            </a:r>
+            <a:endParaRPr lang="en-CN" baseline="-25000" dirty="0"/>
+          </a:p>
+        </p:txBody>
+      </p:sp>
+      <p:cxnSp>
+        <p:nvCxnSpPr>
+          <p:cNvPr id="38" name="Straight Arrow Connector 37">
+            <a:extLst>
+              <a:ext uri="{FF2B5EF4-FFF2-40B4-BE49-F238E27FC236}">
+                <a16:creationId xmlns:a16="http://schemas.microsoft.com/office/drawing/2014/main" id="{CDA90BA1-6B56-434E-BE99-1B42AABD65A8}"/>
+              </a:ext>
+            </a:extLst>
+          </p:cNvPr>
+          <p:cNvCxnSpPr>
+            <a:cxnSpLocks/>
+            <a:stCxn id="31" idx="3"/>
+            <a:endCxn id="37" idx="0"/>
+          </p:cNvCxnSpPr>
+          <p:nvPr/>
+        </p:nvCxnSpPr>
+        <p:spPr>
+          <a:xfrm>
+            <a:off x="5328763" y="1600203"/>
+            <a:ext cx="252252" cy="909143"/>
+          </a:xfrm>
+          <a:prstGeom prst="straightConnector1">
+            <a:avLst/>
+          </a:prstGeom>
+          <a:ln>
+            <a:tailEnd type="triangle"/>
+          </a:ln>
+        </p:spPr>
+        <p:style>
+          <a:lnRef idx="2">
+            <a:schemeClr val="dk1"/>
+          </a:lnRef>
+          <a:fillRef idx="0">
+            <a:schemeClr val="dk1"/>
+          </a:fillRef>
+          <a:effectRef idx="1">
+            <a:schemeClr val="dk1"/>
+          </a:effectRef>
+          <a:fontRef idx="minor">
+            <a:schemeClr val="tx1"/>
+          </a:fontRef>
+        </p:style>
+      </p:cxnSp>
+      <p:sp>
+        <p:nvSpPr>
+          <p:cNvPr id="8" name="TextBox 7">
+            <a:extLst>
+              <a:ext uri="{FF2B5EF4-FFF2-40B4-BE49-F238E27FC236}">
+                <a16:creationId xmlns:a16="http://schemas.microsoft.com/office/drawing/2014/main" id="{628A2781-36B0-3F47-ABDC-3E84009691DC}"/>
+              </a:ext>
+            </a:extLst>
+          </p:cNvPr>
+          <p:cNvSpPr txBox="1"/>
+          <p:nvPr/>
+        </p:nvSpPr>
+        <p:spPr>
+          <a:xfrm>
+            <a:off x="4759835" y="429961"/>
+            <a:ext cx="1178528" cy="369332"/>
+          </a:xfrm>
+          <a:prstGeom prst="rect">
+            <a:avLst/>
+          </a:prstGeom>
+          <a:noFill/>
+        </p:spPr>
+        <p:txBody>
+          <a:bodyPr wrap="none" rtlCol="0">
+            <a:spAutoFit/>
+          </a:bodyPr>
+          <a:lstStyle/>
+          <a:p>
+            <a:r>
+              <a:rPr lang="en-US" i="1" dirty="0">
+                <a:latin typeface="Times New Roman" panose="02020603050405020304" pitchFamily="18" charset="0"/>
+                <a:cs typeface="Times New Roman" panose="02020603050405020304" pitchFamily="18" charset="0"/>
+              </a:rPr>
+              <a:t>k</a:t>
+            </a:r>
+            <a:r>
+              <a:rPr lang="en-CN" i="1" baseline="-25000" dirty="0">
+                <a:latin typeface="Times New Roman" panose="02020603050405020304" pitchFamily="18" charset="0"/>
+                <a:cs typeface="Times New Roman" panose="02020603050405020304" pitchFamily="18" charset="0"/>
+              </a:rPr>
+              <a:t>i-</a:t>
+            </a:r>
+            <a:r>
+              <a:rPr lang="en-CN" baseline="-25000" dirty="0">
+                <a:latin typeface="Times New Roman" panose="02020603050405020304" pitchFamily="18" charset="0"/>
+                <a:cs typeface="Times New Roman" panose="02020603050405020304" pitchFamily="18" charset="0"/>
+              </a:rPr>
+              <a:t>1</a:t>
+            </a:r>
+            <a:r>
+              <a:rPr lang="en-CN" i="1" baseline="-25000" dirty="0">
+                <a:latin typeface="Times New Roman" panose="02020603050405020304" pitchFamily="18" charset="0"/>
+                <a:cs typeface="Times New Roman" panose="02020603050405020304" pitchFamily="18" charset="0"/>
+              </a:rPr>
+              <a:t> </a:t>
+            </a:r>
+            <a:r>
+              <a:rPr lang="en-CN" dirty="0">
+                <a:latin typeface="Times New Roman" panose="02020603050405020304" pitchFamily="18" charset="0"/>
+                <a:cs typeface="Times New Roman" panose="02020603050405020304" pitchFamily="18" charset="0"/>
+              </a:rPr>
+              <a:t>&lt; </a:t>
+            </a:r>
+            <a:r>
+              <a:rPr lang="en-CN" i="1" dirty="0">
+                <a:latin typeface="Times New Roman" panose="02020603050405020304" pitchFamily="18" charset="0"/>
+                <a:cs typeface="Times New Roman" panose="02020603050405020304" pitchFamily="18" charset="0"/>
+              </a:rPr>
+              <a:t>x </a:t>
+            </a:r>
+            <a:r>
+              <a:rPr lang="en-CN" dirty="0">
+                <a:latin typeface="Times New Roman" panose="02020603050405020304" pitchFamily="18" charset="0"/>
+                <a:cs typeface="Times New Roman" panose="02020603050405020304" pitchFamily="18" charset="0"/>
+              </a:rPr>
+              <a:t>&lt; </a:t>
+            </a:r>
+            <a:r>
+              <a:rPr lang="en-CN" i="1" dirty="0">
+                <a:latin typeface="Times New Roman" panose="02020603050405020304" pitchFamily="18" charset="0"/>
+                <a:cs typeface="Times New Roman" panose="02020603050405020304" pitchFamily="18" charset="0"/>
+              </a:rPr>
+              <a:t>k</a:t>
+            </a:r>
+            <a:r>
+              <a:rPr lang="en-CN" i="1" baseline="-25000" dirty="0">
+                <a:latin typeface="Times New Roman" panose="02020603050405020304" pitchFamily="18" charset="0"/>
+                <a:cs typeface="Times New Roman" panose="02020603050405020304" pitchFamily="18" charset="0"/>
+              </a:rPr>
+              <a:t>i</a:t>
+            </a:r>
+          </a:p>
+        </p:txBody>
+      </p:sp>
+      <p:cxnSp>
+        <p:nvCxnSpPr>
+          <p:cNvPr id="44" name="Straight Arrow Connector 43">
+            <a:extLst>
+              <a:ext uri="{FF2B5EF4-FFF2-40B4-BE49-F238E27FC236}">
+                <a16:creationId xmlns:a16="http://schemas.microsoft.com/office/drawing/2014/main" id="{3A10C8E1-3383-2E4B-B693-6095BAA39DD8}"/>
+              </a:ext>
+            </a:extLst>
+          </p:cNvPr>
+          <p:cNvCxnSpPr>
+            <a:cxnSpLocks/>
+            <a:stCxn id="8" idx="2"/>
+          </p:cNvCxnSpPr>
+          <p:nvPr/>
+        </p:nvCxnSpPr>
+        <p:spPr>
+          <a:xfrm flipH="1">
+            <a:off x="5328763" y="799293"/>
+            <a:ext cx="20336" cy="510159"/>
+          </a:xfrm>
+          <a:prstGeom prst="straightConnector1">
+            <a:avLst/>
+          </a:prstGeom>
+          <a:ln>
+            <a:tailEnd type="triangle"/>
+          </a:ln>
+        </p:spPr>
+        <p:style>
+          <a:lnRef idx="2">
+            <a:schemeClr val="dk1"/>
+          </a:lnRef>
+          <a:fillRef idx="0">
+            <a:schemeClr val="dk1"/>
+          </a:fillRef>
+          <a:effectRef idx="1">
+            <a:schemeClr val="dk1"/>
+          </a:effectRef>
+          <a:fontRef idx="minor">
+            <a:schemeClr val="tx1"/>
+          </a:fontRef>
+        </p:style>
+      </p:cxnSp>
+      <p:sp>
+        <p:nvSpPr>
+          <p:cNvPr id="24" name="TextBox 23">
+            <a:extLst>
+              <a:ext uri="{FF2B5EF4-FFF2-40B4-BE49-F238E27FC236}">
+                <a16:creationId xmlns:a16="http://schemas.microsoft.com/office/drawing/2014/main" id="{E8FC8C4E-E4BD-0C4F-B3BF-E6F3B0C76439}"/>
+              </a:ext>
+            </a:extLst>
+          </p:cNvPr>
+          <p:cNvSpPr txBox="1"/>
+          <p:nvPr/>
+        </p:nvSpPr>
+        <p:spPr>
+          <a:xfrm>
+            <a:off x="5405888" y="863088"/>
+            <a:ext cx="721672" cy="369332"/>
+          </a:xfrm>
+          <a:prstGeom prst="rect">
+            <a:avLst/>
+          </a:prstGeom>
+          <a:noFill/>
+        </p:spPr>
+        <p:txBody>
+          <a:bodyPr wrap="none" rtlCol="0">
+            <a:spAutoFit/>
+          </a:bodyPr>
+          <a:lstStyle/>
+          <a:p>
+            <a:r>
+              <a:rPr lang="en-CN" dirty="0"/>
+              <a:t>insert</a:t>
+            </a:r>
+          </a:p>
+        </p:txBody>
+      </p:sp>
+      <p:sp>
+        <p:nvSpPr>
+          <p:cNvPr id="46" name="TextBox 45">
+            <a:extLst>
+              <a:ext uri="{FF2B5EF4-FFF2-40B4-BE49-F238E27FC236}">
+                <a16:creationId xmlns:a16="http://schemas.microsoft.com/office/drawing/2014/main" id="{D81856EC-DA7C-194D-9C00-BF02C505BE32}"/>
+              </a:ext>
+            </a:extLst>
+          </p:cNvPr>
+          <p:cNvSpPr txBox="1"/>
+          <p:nvPr/>
+        </p:nvSpPr>
+        <p:spPr>
+          <a:xfrm>
+            <a:off x="4904858" y="4114798"/>
+            <a:ext cx="1178528" cy="369332"/>
+          </a:xfrm>
+          <a:prstGeom prst="rect">
+            <a:avLst/>
+          </a:prstGeom>
+          <a:noFill/>
+        </p:spPr>
+        <p:txBody>
+          <a:bodyPr wrap="none" rtlCol="0">
+            <a:spAutoFit/>
+          </a:bodyPr>
+          <a:lstStyle/>
+          <a:p>
+            <a:r>
+              <a:rPr lang="en-US" i="1" dirty="0">
+                <a:latin typeface="Times New Roman" panose="02020603050405020304" pitchFamily="18" charset="0"/>
+                <a:cs typeface="Times New Roman" panose="02020603050405020304" pitchFamily="18" charset="0"/>
+              </a:rPr>
+              <a:t>k</a:t>
+            </a:r>
+            <a:r>
+              <a:rPr lang="en-CN" i="1" baseline="-25000" dirty="0">
+                <a:latin typeface="Times New Roman" panose="02020603050405020304" pitchFamily="18" charset="0"/>
+                <a:cs typeface="Times New Roman" panose="02020603050405020304" pitchFamily="18" charset="0"/>
+              </a:rPr>
+              <a:t>i-</a:t>
+            </a:r>
+            <a:r>
+              <a:rPr lang="en-CN" baseline="-25000" dirty="0">
+                <a:latin typeface="Times New Roman" panose="02020603050405020304" pitchFamily="18" charset="0"/>
+                <a:cs typeface="Times New Roman" panose="02020603050405020304" pitchFamily="18" charset="0"/>
+              </a:rPr>
+              <a:t>1</a:t>
+            </a:r>
+            <a:r>
+              <a:rPr lang="en-CN" i="1" baseline="-25000" dirty="0">
+                <a:latin typeface="Times New Roman" panose="02020603050405020304" pitchFamily="18" charset="0"/>
+                <a:cs typeface="Times New Roman" panose="02020603050405020304" pitchFamily="18" charset="0"/>
+              </a:rPr>
+              <a:t> </a:t>
+            </a:r>
+            <a:r>
+              <a:rPr lang="en-CN" dirty="0">
+                <a:latin typeface="Times New Roman" panose="02020603050405020304" pitchFamily="18" charset="0"/>
+                <a:cs typeface="Times New Roman" panose="02020603050405020304" pitchFamily="18" charset="0"/>
+              </a:rPr>
+              <a:t>&lt; </a:t>
+            </a:r>
+            <a:r>
+              <a:rPr lang="en-CN" i="1" dirty="0">
+                <a:latin typeface="Times New Roman" panose="02020603050405020304" pitchFamily="18" charset="0"/>
+                <a:cs typeface="Times New Roman" panose="02020603050405020304" pitchFamily="18" charset="0"/>
+              </a:rPr>
+              <a:t>x </a:t>
+            </a:r>
+            <a:r>
+              <a:rPr lang="en-CN" dirty="0">
+                <a:latin typeface="Times New Roman" panose="02020603050405020304" pitchFamily="18" charset="0"/>
+                <a:cs typeface="Times New Roman" panose="02020603050405020304" pitchFamily="18" charset="0"/>
+              </a:rPr>
+              <a:t>&lt; </a:t>
+            </a:r>
+            <a:r>
+              <a:rPr lang="en-CN" i="1" dirty="0">
+                <a:latin typeface="Times New Roman" panose="02020603050405020304" pitchFamily="18" charset="0"/>
+                <a:cs typeface="Times New Roman" panose="02020603050405020304" pitchFamily="18" charset="0"/>
+              </a:rPr>
+              <a:t>k</a:t>
+            </a:r>
+            <a:r>
+              <a:rPr lang="en-CN" i="1" baseline="-25000" dirty="0">
+                <a:latin typeface="Times New Roman" panose="02020603050405020304" pitchFamily="18" charset="0"/>
+                <a:cs typeface="Times New Roman" panose="02020603050405020304" pitchFamily="18" charset="0"/>
+              </a:rPr>
+              <a:t>i</a:t>
+            </a:r>
+          </a:p>
+        </p:txBody>
+      </p:sp>
+      <p:cxnSp>
+        <p:nvCxnSpPr>
+          <p:cNvPr id="47" name="Straight Arrow Connector 46">
+            <a:extLst>
+              <a:ext uri="{FF2B5EF4-FFF2-40B4-BE49-F238E27FC236}">
+                <a16:creationId xmlns:a16="http://schemas.microsoft.com/office/drawing/2014/main" id="{DB2CC1EF-CA8B-DD49-879E-3FF2FB032648}"/>
+              </a:ext>
+            </a:extLst>
+          </p:cNvPr>
+          <p:cNvCxnSpPr>
+            <a:cxnSpLocks/>
+            <a:stCxn id="46" idx="2"/>
+            <a:endCxn id="28" idx="0"/>
+          </p:cNvCxnSpPr>
+          <p:nvPr/>
+        </p:nvCxnSpPr>
+        <p:spPr>
+          <a:xfrm>
+            <a:off x="5494122" y="4484130"/>
+            <a:ext cx="13335" cy="539810"/>
+          </a:xfrm>
+          <a:prstGeom prst="straightConnector1">
+            <a:avLst/>
+          </a:prstGeom>
+          <a:ln>
+            <a:tailEnd type="triangle"/>
+          </a:ln>
+        </p:spPr>
+        <p:style>
+          <a:lnRef idx="2">
+            <a:schemeClr val="dk1"/>
+          </a:lnRef>
+          <a:fillRef idx="0">
+            <a:schemeClr val="dk1"/>
+          </a:fillRef>
+          <a:effectRef idx="1">
+            <a:schemeClr val="dk1"/>
+          </a:effectRef>
+          <a:fontRef idx="minor">
+            <a:schemeClr val="tx1"/>
+          </a:fontRef>
+        </p:style>
+      </p:cxnSp>
+      <p:sp>
+        <p:nvSpPr>
+          <p:cNvPr id="48" name="TextBox 47">
+            <a:extLst>
+              <a:ext uri="{FF2B5EF4-FFF2-40B4-BE49-F238E27FC236}">
+                <a16:creationId xmlns:a16="http://schemas.microsoft.com/office/drawing/2014/main" id="{472CECB9-83BF-314F-8D99-E367BDE392EC}"/>
+              </a:ext>
+            </a:extLst>
+          </p:cNvPr>
+          <p:cNvSpPr txBox="1"/>
+          <p:nvPr/>
+        </p:nvSpPr>
+        <p:spPr>
+          <a:xfrm>
+            <a:off x="5550911" y="4547925"/>
+            <a:ext cx="721672" cy="369332"/>
+          </a:xfrm>
+          <a:prstGeom prst="rect">
+            <a:avLst/>
+          </a:prstGeom>
+          <a:noFill/>
+        </p:spPr>
+        <p:txBody>
+          <a:bodyPr wrap="none" rtlCol="0">
+            <a:spAutoFit/>
+          </a:bodyPr>
+          <a:lstStyle/>
+          <a:p>
+            <a:r>
+              <a:rPr lang="en-CN" dirty="0"/>
+              <a:t>insert</a:t>
+            </a:r>
+          </a:p>
+        </p:txBody>
+      </p:sp>
+      <p:sp>
+        <p:nvSpPr>
+          <p:cNvPr id="56" name="TextBox 55">
+            <a:extLst>
+              <a:ext uri="{FF2B5EF4-FFF2-40B4-BE49-F238E27FC236}">
+                <a16:creationId xmlns:a16="http://schemas.microsoft.com/office/drawing/2014/main" id="{3B4C5473-DCBB-3A4F-A100-A83DEC49486E}"/>
+              </a:ext>
+            </a:extLst>
+          </p:cNvPr>
+          <p:cNvSpPr txBox="1"/>
+          <p:nvPr/>
+        </p:nvSpPr>
+        <p:spPr>
+          <a:xfrm>
+            <a:off x="2925351" y="5847535"/>
+            <a:ext cx="248786" cy="369332"/>
+          </a:xfrm>
+          <a:prstGeom prst="rect">
+            <a:avLst/>
+          </a:prstGeom>
+          <a:noFill/>
+        </p:spPr>
+        <p:txBody>
+          <a:bodyPr wrap="none" rtlCol="0">
+            <a:spAutoFit/>
+          </a:bodyPr>
+          <a:lstStyle/>
+          <a:p>
+            <a:r>
+              <a:rPr lang="en-US" i="1" dirty="0">
+                <a:latin typeface="Times New Roman" panose="02020603050405020304" pitchFamily="18" charset="0"/>
+                <a:cs typeface="Times New Roman" panose="02020603050405020304" pitchFamily="18" charset="0"/>
+              </a:rPr>
+              <a:t>l</a:t>
+            </a:r>
+            <a:endParaRPr lang="en-CN" i="1" baseline="-25000" dirty="0">
+              <a:latin typeface="Times New Roman" panose="02020603050405020304" pitchFamily="18" charset="0"/>
+              <a:cs typeface="Times New Roman" panose="02020603050405020304" pitchFamily="18" charset="0"/>
+            </a:endParaRPr>
+          </a:p>
+        </p:txBody>
+      </p:sp>
+      <p:sp>
+        <p:nvSpPr>
+          <p:cNvPr id="57" name="TextBox 56">
+            <a:extLst>
+              <a:ext uri="{FF2B5EF4-FFF2-40B4-BE49-F238E27FC236}">
+                <a16:creationId xmlns:a16="http://schemas.microsoft.com/office/drawing/2014/main" id="{DA6E2504-DEA4-3541-ABFB-075FF0C45DCB}"/>
+              </a:ext>
+            </a:extLst>
+          </p:cNvPr>
+          <p:cNvSpPr txBox="1"/>
+          <p:nvPr/>
+        </p:nvSpPr>
+        <p:spPr>
+          <a:xfrm>
+            <a:off x="5359623" y="5810246"/>
+            <a:ext cx="325730" cy="369332"/>
+          </a:xfrm>
+          <a:prstGeom prst="rect">
+            <a:avLst/>
+          </a:prstGeom>
+          <a:noFill/>
+        </p:spPr>
+        <p:txBody>
+          <a:bodyPr wrap="none" rtlCol="0">
+            <a:spAutoFit/>
+          </a:bodyPr>
+          <a:lstStyle/>
+          <a:p>
+            <a:r>
+              <a:rPr lang="en-US" i="1" dirty="0">
+                <a:latin typeface="Times New Roman" panose="02020603050405020304" pitchFamily="18" charset="0"/>
+                <a:cs typeface="Times New Roman" panose="02020603050405020304" pitchFamily="18" charset="0"/>
+              </a:rPr>
+              <a:t>t’</a:t>
+            </a:r>
+            <a:endParaRPr lang="en-CN" i="1" baseline="-25000" dirty="0">
+              <a:latin typeface="Times New Roman" panose="02020603050405020304" pitchFamily="18" charset="0"/>
+              <a:cs typeface="Times New Roman" panose="02020603050405020304" pitchFamily="18" charset="0"/>
+            </a:endParaRPr>
+          </a:p>
+        </p:txBody>
+      </p:sp>
+      <p:sp>
+        <p:nvSpPr>
+          <p:cNvPr id="58" name="TextBox 57">
+            <a:extLst>
+              <a:ext uri="{FF2B5EF4-FFF2-40B4-BE49-F238E27FC236}">
+                <a16:creationId xmlns:a16="http://schemas.microsoft.com/office/drawing/2014/main" id="{F0C7143F-328E-CC4C-A9C3-2FA9734797F0}"/>
+              </a:ext>
+            </a:extLst>
+          </p:cNvPr>
+          <p:cNvSpPr txBox="1"/>
+          <p:nvPr/>
+        </p:nvSpPr>
+        <p:spPr>
+          <a:xfrm>
+            <a:off x="7924859" y="5847535"/>
+            <a:ext cx="274434" cy="369332"/>
+          </a:xfrm>
+          <a:prstGeom prst="rect">
+            <a:avLst/>
+          </a:prstGeom>
+          <a:noFill/>
+        </p:spPr>
+        <p:txBody>
+          <a:bodyPr wrap="none" rtlCol="0">
+            <a:spAutoFit/>
+          </a:bodyPr>
+          <a:lstStyle/>
+          <a:p>
+            <a:r>
+              <a:rPr lang="en-US" i="1" dirty="0">
+                <a:latin typeface="Times New Roman" panose="02020603050405020304" pitchFamily="18" charset="0"/>
+                <a:cs typeface="Times New Roman" panose="02020603050405020304" pitchFamily="18" charset="0"/>
+              </a:rPr>
+              <a:t>r</a:t>
+            </a:r>
+            <a:endParaRPr lang="en-CN" i="1" baseline="-25000" dirty="0">
+              <a:latin typeface="Times New Roman" panose="02020603050405020304" pitchFamily="18" charset="0"/>
+              <a:cs typeface="Times New Roman" panose="02020603050405020304" pitchFamily="18" charset="0"/>
+            </a:endParaRPr>
+          </a:p>
+        </p:txBody>
+      </p:sp>
+    </p:spTree>
+    <p:extLst>
+      <p:ext uri="{BB962C8B-B14F-4D97-AF65-F5344CB8AC3E}">
+        <p14:creationId xmlns:p14="http://schemas.microsoft.com/office/powerpoint/2010/main" val="3534260948"/>
+      </p:ext>
+    </p:extLst>
+  </p:cSld>
+  <p:clrMapOvr>
+    <a:masterClrMapping/>
+  </p:clrMapOvr>
+</p:sld>
+</file>
+
 <file path=ppt/theme/theme1.xml><?xml version="1.0" encoding="utf-8"?>
 <a:theme xmlns:a="http://schemas.openxmlformats.org/drawingml/2006/main" name="Office Theme">
   <a:themeElements>

</xml_diff>

<commit_message>
Update the B-tree insert example figure
</commit_message>
<xml_diff>
--- a/datastruct/tree/B-tree/img/btrees.pptx
+++ b/datastruct/tree/B-tree/img/btrees.pptx
@@ -4,10 +4,14 @@
   <p:sldMasterIdLst>
     <p:sldMasterId id="2147483648" r:id="rId1"/>
   </p:sldMasterIdLst>
+  <p:notesMasterIdLst>
+    <p:notesMasterId r:id="rId6"/>
+  </p:notesMasterIdLst>
   <p:sldIdLst>
     <p:sldId id="256" r:id="rId2"/>
     <p:sldId id="257" r:id="rId3"/>
     <p:sldId id="258" r:id="rId4"/>
+    <p:sldId id="259" r:id="rId5"/>
   </p:sldIdLst>
   <p:sldSz cx="12192000" cy="6858000"/>
   <p:notesSz cx="6858000" cy="9144000"/>
@@ -114,6 +118,735 @@
 </p:presentation>
 </file>
 
+<file path=ppt/notesMasters/notesMaster1.xml><?xml version="1.0" encoding="utf-8"?>
+<p:notesMaster xmlns:a="http://schemas.openxmlformats.org/drawingml/2006/main" xmlns:r="http://schemas.openxmlformats.org/officeDocument/2006/relationships" xmlns:p="http://schemas.openxmlformats.org/presentationml/2006/main">
+  <p:cSld>
+    <p:bg>
+      <p:bgRef idx="1001">
+        <a:schemeClr val="bg1"/>
+      </p:bgRef>
+    </p:bg>
+    <p:spTree>
+      <p:nvGrpSpPr>
+        <p:cNvPr id="1" name=""/>
+        <p:cNvGrpSpPr/>
+        <p:nvPr/>
+      </p:nvGrpSpPr>
+      <p:grpSpPr>
+        <a:xfrm>
+          <a:off x="0" y="0"/>
+          <a:ext cx="0" cy="0"/>
+          <a:chOff x="0" y="0"/>
+          <a:chExt cx="0" cy="0"/>
+        </a:xfrm>
+      </p:grpSpPr>
+      <p:sp>
+        <p:nvSpPr>
+          <p:cNvPr id="2" name="Header Placeholder 1"/>
+          <p:cNvSpPr>
+            <a:spLocks noGrp="1"/>
+          </p:cNvSpPr>
+          <p:nvPr>
+            <p:ph type="hdr" sz="quarter"/>
+          </p:nvPr>
+        </p:nvSpPr>
+        <p:spPr>
+          <a:xfrm>
+            <a:off x="0" y="0"/>
+            <a:ext cx="2971800" cy="458788"/>
+          </a:xfrm>
+          <a:prstGeom prst="rect">
+            <a:avLst/>
+          </a:prstGeom>
+        </p:spPr>
+        <p:txBody>
+          <a:bodyPr vert="horz" lIns="91440" tIns="45720" rIns="91440" bIns="45720" rtlCol="0"/>
+          <a:lstStyle>
+            <a:lvl1pPr algn="l">
+              <a:defRPr sz="1200"/>
+            </a:lvl1pPr>
+          </a:lstStyle>
+          <a:p>
+            <a:endParaRPr lang="en-CN"/>
+          </a:p>
+        </p:txBody>
+      </p:sp>
+      <p:sp>
+        <p:nvSpPr>
+          <p:cNvPr id="3" name="Date Placeholder 2"/>
+          <p:cNvSpPr>
+            <a:spLocks noGrp="1"/>
+          </p:cNvSpPr>
+          <p:nvPr>
+            <p:ph type="dt" idx="1"/>
+          </p:nvPr>
+        </p:nvSpPr>
+        <p:spPr>
+          <a:xfrm>
+            <a:off x="3884613" y="0"/>
+            <a:ext cx="2971800" cy="458788"/>
+          </a:xfrm>
+          <a:prstGeom prst="rect">
+            <a:avLst/>
+          </a:prstGeom>
+        </p:spPr>
+        <p:txBody>
+          <a:bodyPr vert="horz" lIns="91440" tIns="45720" rIns="91440" bIns="45720" rtlCol="0"/>
+          <a:lstStyle>
+            <a:lvl1pPr algn="r">
+              <a:defRPr sz="1200"/>
+            </a:lvl1pPr>
+          </a:lstStyle>
+          <a:p>
+            <a:fld id="{22594BF6-097C-9847-BA6A-E18D0743F6CE}" type="datetimeFigureOut">
+              <a:rPr lang="en-CN" smtClean="0"/>
+              <a:t>2021/9/25</a:t>
+            </a:fld>
+            <a:endParaRPr lang="en-CN"/>
+          </a:p>
+        </p:txBody>
+      </p:sp>
+      <p:sp>
+        <p:nvSpPr>
+          <p:cNvPr id="4" name="Slide Image Placeholder 3"/>
+          <p:cNvSpPr>
+            <a:spLocks noGrp="1" noRot="1" noChangeAspect="1"/>
+          </p:cNvSpPr>
+          <p:nvPr>
+            <p:ph type="sldImg" idx="2"/>
+          </p:nvPr>
+        </p:nvSpPr>
+        <p:spPr>
+          <a:xfrm>
+            <a:off x="685800" y="1143000"/>
+            <a:ext cx="5486400" cy="3086100"/>
+          </a:xfrm>
+          <a:prstGeom prst="rect">
+            <a:avLst/>
+          </a:prstGeom>
+          <a:noFill/>
+          <a:ln w="12700">
+            <a:solidFill>
+              <a:prstClr val="black"/>
+            </a:solidFill>
+          </a:ln>
+        </p:spPr>
+        <p:txBody>
+          <a:bodyPr vert="horz" lIns="91440" tIns="45720" rIns="91440" bIns="45720" rtlCol="0" anchor="ctr"/>
+          <a:lstStyle/>
+          <a:p>
+            <a:endParaRPr lang="en-CN"/>
+          </a:p>
+        </p:txBody>
+      </p:sp>
+      <p:sp>
+        <p:nvSpPr>
+          <p:cNvPr id="5" name="Notes Placeholder 4"/>
+          <p:cNvSpPr>
+            <a:spLocks noGrp="1"/>
+          </p:cNvSpPr>
+          <p:nvPr>
+            <p:ph type="body" sz="quarter" idx="3"/>
+          </p:nvPr>
+        </p:nvSpPr>
+        <p:spPr>
+          <a:xfrm>
+            <a:off x="685800" y="4400550"/>
+            <a:ext cx="5486400" cy="3600450"/>
+          </a:xfrm>
+          <a:prstGeom prst="rect">
+            <a:avLst/>
+          </a:prstGeom>
+        </p:spPr>
+        <p:txBody>
+          <a:bodyPr vert="horz" lIns="91440" tIns="45720" rIns="91440" bIns="45720" rtlCol="0"/>
+          <a:lstStyle/>
+          <a:p>
+            <a:pPr lvl="0"/>
+            <a:r>
+              <a:rPr lang="en-US"/>
+              <a:t>Click to edit Master text styles</a:t>
+            </a:r>
+          </a:p>
+          <a:p>
+            <a:pPr lvl="1"/>
+            <a:r>
+              <a:rPr lang="en-US"/>
+              <a:t>Second level</a:t>
+            </a:r>
+          </a:p>
+          <a:p>
+            <a:pPr lvl="2"/>
+            <a:r>
+              <a:rPr lang="en-US"/>
+              <a:t>Third level</a:t>
+            </a:r>
+          </a:p>
+          <a:p>
+            <a:pPr lvl="3"/>
+            <a:r>
+              <a:rPr lang="en-US"/>
+              <a:t>Fourth level</a:t>
+            </a:r>
+          </a:p>
+          <a:p>
+            <a:pPr lvl="4"/>
+            <a:r>
+              <a:rPr lang="en-US"/>
+              <a:t>Fifth level</a:t>
+            </a:r>
+            <a:endParaRPr lang="en-CN"/>
+          </a:p>
+        </p:txBody>
+      </p:sp>
+      <p:sp>
+        <p:nvSpPr>
+          <p:cNvPr id="6" name="Footer Placeholder 5"/>
+          <p:cNvSpPr>
+            <a:spLocks noGrp="1"/>
+          </p:cNvSpPr>
+          <p:nvPr>
+            <p:ph type="ftr" sz="quarter" idx="4"/>
+          </p:nvPr>
+        </p:nvSpPr>
+        <p:spPr>
+          <a:xfrm>
+            <a:off x="0" y="8685213"/>
+            <a:ext cx="2971800" cy="458787"/>
+          </a:xfrm>
+          <a:prstGeom prst="rect">
+            <a:avLst/>
+          </a:prstGeom>
+        </p:spPr>
+        <p:txBody>
+          <a:bodyPr vert="horz" lIns="91440" tIns="45720" rIns="91440" bIns="45720" rtlCol="0" anchor="b"/>
+          <a:lstStyle>
+            <a:lvl1pPr algn="l">
+              <a:defRPr sz="1200"/>
+            </a:lvl1pPr>
+          </a:lstStyle>
+          <a:p>
+            <a:endParaRPr lang="en-CN"/>
+          </a:p>
+        </p:txBody>
+      </p:sp>
+      <p:sp>
+        <p:nvSpPr>
+          <p:cNvPr id="7" name="Slide Number Placeholder 6"/>
+          <p:cNvSpPr>
+            <a:spLocks noGrp="1"/>
+          </p:cNvSpPr>
+          <p:nvPr>
+            <p:ph type="sldNum" sz="quarter" idx="5"/>
+          </p:nvPr>
+        </p:nvSpPr>
+        <p:spPr>
+          <a:xfrm>
+            <a:off x="3884613" y="8685213"/>
+            <a:ext cx="2971800" cy="458787"/>
+          </a:xfrm>
+          <a:prstGeom prst="rect">
+            <a:avLst/>
+          </a:prstGeom>
+        </p:spPr>
+        <p:txBody>
+          <a:bodyPr vert="horz" lIns="91440" tIns="45720" rIns="91440" bIns="45720" rtlCol="0" anchor="b"/>
+          <a:lstStyle>
+            <a:lvl1pPr algn="r">
+              <a:defRPr sz="1200"/>
+            </a:lvl1pPr>
+          </a:lstStyle>
+          <a:p>
+            <a:fld id="{86C81B2F-A610-2949-B9DC-A3E483DF43DC}" type="slidenum">
+              <a:rPr lang="en-CN" smtClean="0"/>
+              <a:t>‹#›</a:t>
+            </a:fld>
+            <a:endParaRPr lang="en-CN"/>
+          </a:p>
+        </p:txBody>
+      </p:sp>
+    </p:spTree>
+    <p:extLst>
+      <p:ext uri="{BB962C8B-B14F-4D97-AF65-F5344CB8AC3E}">
+        <p14:creationId xmlns:p14="http://schemas.microsoft.com/office/powerpoint/2010/main" val="3592746419"/>
+      </p:ext>
+    </p:extLst>
+  </p:cSld>
+  <p:clrMap bg1="lt1" tx1="dk1" bg2="lt2" tx2="dk2" accent1="accent1" accent2="accent2" accent3="accent3" accent4="accent4" accent5="accent5" accent6="accent6" hlink="hlink" folHlink="folHlink"/>
+  <p:notesStyle>
+    <a:lvl1pPr marL="0" algn="l" defTabSz="914400" rtl="0" eaLnBrk="1" latinLnBrk="0" hangingPunct="1">
+      <a:defRPr sz="1200" kern="1200">
+        <a:solidFill>
+          <a:schemeClr val="tx1"/>
+        </a:solidFill>
+        <a:latin typeface="+mn-lt"/>
+        <a:ea typeface="+mn-ea"/>
+        <a:cs typeface="+mn-cs"/>
+      </a:defRPr>
+    </a:lvl1pPr>
+    <a:lvl2pPr marL="457200" algn="l" defTabSz="914400" rtl="0" eaLnBrk="1" latinLnBrk="0" hangingPunct="1">
+      <a:defRPr sz="1200" kern="1200">
+        <a:solidFill>
+          <a:schemeClr val="tx1"/>
+        </a:solidFill>
+        <a:latin typeface="+mn-lt"/>
+        <a:ea typeface="+mn-ea"/>
+        <a:cs typeface="+mn-cs"/>
+      </a:defRPr>
+    </a:lvl2pPr>
+    <a:lvl3pPr marL="914400" algn="l" defTabSz="914400" rtl="0" eaLnBrk="1" latinLnBrk="0" hangingPunct="1">
+      <a:defRPr sz="1200" kern="1200">
+        <a:solidFill>
+          <a:schemeClr val="tx1"/>
+        </a:solidFill>
+        <a:latin typeface="+mn-lt"/>
+        <a:ea typeface="+mn-ea"/>
+        <a:cs typeface="+mn-cs"/>
+      </a:defRPr>
+    </a:lvl3pPr>
+    <a:lvl4pPr marL="1371600" algn="l" defTabSz="914400" rtl="0" eaLnBrk="1" latinLnBrk="0" hangingPunct="1">
+      <a:defRPr sz="1200" kern="1200">
+        <a:solidFill>
+          <a:schemeClr val="tx1"/>
+        </a:solidFill>
+        <a:latin typeface="+mn-lt"/>
+        <a:ea typeface="+mn-ea"/>
+        <a:cs typeface="+mn-cs"/>
+      </a:defRPr>
+    </a:lvl4pPr>
+    <a:lvl5pPr marL="1828800" algn="l" defTabSz="914400" rtl="0" eaLnBrk="1" latinLnBrk="0" hangingPunct="1">
+      <a:defRPr sz="1200" kern="1200">
+        <a:solidFill>
+          <a:schemeClr val="tx1"/>
+        </a:solidFill>
+        <a:latin typeface="+mn-lt"/>
+        <a:ea typeface="+mn-ea"/>
+        <a:cs typeface="+mn-cs"/>
+      </a:defRPr>
+    </a:lvl5pPr>
+    <a:lvl6pPr marL="2286000" algn="l" defTabSz="914400" rtl="0" eaLnBrk="1" latinLnBrk="0" hangingPunct="1">
+      <a:defRPr sz="1200" kern="1200">
+        <a:solidFill>
+          <a:schemeClr val="tx1"/>
+        </a:solidFill>
+        <a:latin typeface="+mn-lt"/>
+        <a:ea typeface="+mn-ea"/>
+        <a:cs typeface="+mn-cs"/>
+      </a:defRPr>
+    </a:lvl6pPr>
+    <a:lvl7pPr marL="2743200" algn="l" defTabSz="914400" rtl="0" eaLnBrk="1" latinLnBrk="0" hangingPunct="1">
+      <a:defRPr sz="1200" kern="1200">
+        <a:solidFill>
+          <a:schemeClr val="tx1"/>
+        </a:solidFill>
+        <a:latin typeface="+mn-lt"/>
+        <a:ea typeface="+mn-ea"/>
+        <a:cs typeface="+mn-cs"/>
+      </a:defRPr>
+    </a:lvl7pPr>
+    <a:lvl8pPr marL="3200400" algn="l" defTabSz="914400" rtl="0" eaLnBrk="1" latinLnBrk="0" hangingPunct="1">
+      <a:defRPr sz="1200" kern="1200">
+        <a:solidFill>
+          <a:schemeClr val="tx1"/>
+        </a:solidFill>
+        <a:latin typeface="+mn-lt"/>
+        <a:ea typeface="+mn-ea"/>
+        <a:cs typeface="+mn-cs"/>
+      </a:defRPr>
+    </a:lvl8pPr>
+    <a:lvl9pPr marL="3657600" algn="l" defTabSz="914400" rtl="0" eaLnBrk="1" latinLnBrk="0" hangingPunct="1">
+      <a:defRPr sz="1200" kern="1200">
+        <a:solidFill>
+          <a:schemeClr val="tx1"/>
+        </a:solidFill>
+        <a:latin typeface="+mn-lt"/>
+        <a:ea typeface="+mn-ea"/>
+        <a:cs typeface="+mn-cs"/>
+      </a:defRPr>
+    </a:lvl9pPr>
+  </p:notesStyle>
+</p:notesMaster>
+</file>
+
+<file path=ppt/notesSlides/notesSlide1.xml><?xml version="1.0" encoding="utf-8"?>
+<p:notes xmlns:a="http://schemas.openxmlformats.org/drawingml/2006/main" xmlns:r="http://schemas.openxmlformats.org/officeDocument/2006/relationships" xmlns:p="http://schemas.openxmlformats.org/presentationml/2006/main">
+  <p:cSld>
+    <p:spTree>
+      <p:nvGrpSpPr>
+        <p:cNvPr id="1" name=""/>
+        <p:cNvGrpSpPr/>
+        <p:nvPr/>
+      </p:nvGrpSpPr>
+      <p:grpSpPr>
+        <a:xfrm>
+          <a:off x="0" y="0"/>
+          <a:ext cx="0" cy="0"/>
+          <a:chOff x="0" y="0"/>
+          <a:chExt cx="0" cy="0"/>
+        </a:xfrm>
+      </p:grpSpPr>
+      <p:sp>
+        <p:nvSpPr>
+          <p:cNvPr id="2" name="Slide Image Placeholder 1"/>
+          <p:cNvSpPr>
+            <a:spLocks noGrp="1" noRot="1" noChangeAspect="1"/>
+          </p:cNvSpPr>
+          <p:nvPr>
+            <p:ph type="sldImg"/>
+          </p:nvPr>
+        </p:nvSpPr>
+        <p:spPr/>
+      </p:sp>
+      <p:sp>
+        <p:nvSpPr>
+          <p:cNvPr id="3" name="Notes Placeholder 2"/>
+          <p:cNvSpPr>
+            <a:spLocks noGrp="1"/>
+          </p:cNvSpPr>
+          <p:nvPr>
+            <p:ph type="body" idx="1"/>
+          </p:nvPr>
+        </p:nvSpPr>
+        <p:spPr/>
+        <p:txBody>
+          <a:bodyPr/>
+          <a:lstStyle/>
+          <a:p>
+            <a:r>
+              <a:rPr lang="en-CN" dirty="0"/>
+              <a:t>B-Tree node</a:t>
+            </a:r>
+          </a:p>
+        </p:txBody>
+      </p:sp>
+      <p:sp>
+        <p:nvSpPr>
+          <p:cNvPr id="4" name="Slide Number Placeholder 3"/>
+          <p:cNvSpPr>
+            <a:spLocks noGrp="1"/>
+          </p:cNvSpPr>
+          <p:nvPr>
+            <p:ph type="sldNum" sz="quarter" idx="5"/>
+          </p:nvPr>
+        </p:nvSpPr>
+        <p:spPr/>
+        <p:txBody>
+          <a:bodyPr/>
+          <a:lstStyle/>
+          <a:p>
+            <a:fld id="{86C81B2F-A610-2949-B9DC-A3E483DF43DC}" type="slidenum">
+              <a:rPr lang="en-CN" smtClean="0"/>
+              <a:t>1</a:t>
+            </a:fld>
+            <a:endParaRPr lang="en-CN"/>
+          </a:p>
+        </p:txBody>
+      </p:sp>
+    </p:spTree>
+    <p:extLst>
+      <p:ext uri="{BB962C8B-B14F-4D97-AF65-F5344CB8AC3E}">
+        <p14:creationId xmlns:p14="http://schemas.microsoft.com/office/powerpoint/2010/main" val="2902639346"/>
+      </p:ext>
+    </p:extLst>
+  </p:cSld>
+  <p:clrMapOvr>
+    <a:masterClrMapping/>
+  </p:clrMapOvr>
+</p:notes>
+</file>
+
+<file path=ppt/notesSlides/notesSlide2.xml><?xml version="1.0" encoding="utf-8"?>
+<p:notes xmlns:a="http://schemas.openxmlformats.org/drawingml/2006/main" xmlns:r="http://schemas.openxmlformats.org/officeDocument/2006/relationships" xmlns:p="http://schemas.openxmlformats.org/presentationml/2006/main">
+  <p:cSld>
+    <p:spTree>
+      <p:nvGrpSpPr>
+        <p:cNvPr id="1" name=""/>
+        <p:cNvGrpSpPr/>
+        <p:nvPr/>
+      </p:nvGrpSpPr>
+      <p:grpSpPr>
+        <a:xfrm>
+          <a:off x="0" y="0"/>
+          <a:ext cx="0" cy="0"/>
+          <a:chOff x="0" y="0"/>
+          <a:chExt cx="0" cy="0"/>
+        </a:xfrm>
+      </p:grpSpPr>
+      <p:sp>
+        <p:nvSpPr>
+          <p:cNvPr id="2" name="Slide Image Placeholder 1"/>
+          <p:cNvSpPr>
+            <a:spLocks noGrp="1" noRot="1" noChangeAspect="1"/>
+          </p:cNvSpPr>
+          <p:nvPr>
+            <p:ph type="sldImg"/>
+          </p:nvPr>
+        </p:nvSpPr>
+        <p:spPr/>
+      </p:sp>
+      <p:sp>
+        <p:nvSpPr>
+          <p:cNvPr id="3" name="Notes Placeholder 2"/>
+          <p:cNvSpPr>
+            <a:spLocks noGrp="1"/>
+          </p:cNvSpPr>
+          <p:nvPr>
+            <p:ph type="body" idx="1"/>
+          </p:nvPr>
+        </p:nvSpPr>
+        <p:spPr/>
+        <p:txBody>
+          <a:bodyPr/>
+          <a:lstStyle/>
+          <a:p>
+            <a:r>
+              <a:rPr lang="en-CN" dirty="0"/>
+              <a:t>Split</a:t>
+            </a:r>
+          </a:p>
+        </p:txBody>
+      </p:sp>
+      <p:sp>
+        <p:nvSpPr>
+          <p:cNvPr id="4" name="Slide Number Placeholder 3"/>
+          <p:cNvSpPr>
+            <a:spLocks noGrp="1"/>
+          </p:cNvSpPr>
+          <p:nvPr>
+            <p:ph type="sldNum" sz="quarter" idx="5"/>
+          </p:nvPr>
+        </p:nvSpPr>
+        <p:spPr/>
+        <p:txBody>
+          <a:bodyPr/>
+          <a:lstStyle/>
+          <a:p>
+            <a:fld id="{86C81B2F-A610-2949-B9DC-A3E483DF43DC}" type="slidenum">
+              <a:rPr lang="en-CN" smtClean="0"/>
+              <a:t>2</a:t>
+            </a:fld>
+            <a:endParaRPr lang="en-CN"/>
+          </a:p>
+        </p:txBody>
+      </p:sp>
+    </p:spTree>
+    <p:extLst>
+      <p:ext uri="{BB962C8B-B14F-4D97-AF65-F5344CB8AC3E}">
+        <p14:creationId xmlns:p14="http://schemas.microsoft.com/office/powerpoint/2010/main" val="3752909154"/>
+      </p:ext>
+    </p:extLst>
+  </p:cSld>
+  <p:clrMapOvr>
+    <a:masterClrMapping/>
+  </p:clrMapOvr>
+</p:notes>
+</file>
+
+<file path=ppt/notesSlides/notesSlide3.xml><?xml version="1.0" encoding="utf-8"?>
+<p:notes xmlns:a="http://schemas.openxmlformats.org/drawingml/2006/main" xmlns:r="http://schemas.openxmlformats.org/officeDocument/2006/relationships" xmlns:p="http://schemas.openxmlformats.org/presentationml/2006/main">
+  <p:cSld>
+    <p:spTree>
+      <p:nvGrpSpPr>
+        <p:cNvPr id="1" name=""/>
+        <p:cNvGrpSpPr/>
+        <p:nvPr/>
+      </p:nvGrpSpPr>
+      <p:grpSpPr>
+        <a:xfrm>
+          <a:off x="0" y="0"/>
+          <a:ext cx="0" cy="0"/>
+          <a:chOff x="0" y="0"/>
+          <a:chExt cx="0" cy="0"/>
+        </a:xfrm>
+      </p:grpSpPr>
+      <p:sp>
+        <p:nvSpPr>
+          <p:cNvPr id="2" name="Slide Image Placeholder 1"/>
+          <p:cNvSpPr>
+            <a:spLocks noGrp="1" noRot="1" noChangeAspect="1"/>
+          </p:cNvSpPr>
+          <p:nvPr>
+            <p:ph type="sldImg"/>
+          </p:nvPr>
+        </p:nvSpPr>
+        <p:spPr/>
+      </p:sp>
+      <p:sp>
+        <p:nvSpPr>
+          <p:cNvPr id="3" name="Notes Placeholder 2"/>
+          <p:cNvSpPr>
+            <a:spLocks noGrp="1"/>
+          </p:cNvSpPr>
+          <p:nvPr>
+            <p:ph type="body" idx="1"/>
+          </p:nvPr>
+        </p:nvSpPr>
+        <p:spPr/>
+        <p:txBody>
+          <a:bodyPr/>
+          <a:lstStyle/>
+          <a:p>
+            <a:r>
+              <a:rPr lang="en-CN" dirty="0"/>
+              <a:t>Partition</a:t>
+            </a:r>
+          </a:p>
+        </p:txBody>
+      </p:sp>
+      <p:sp>
+        <p:nvSpPr>
+          <p:cNvPr id="4" name="Slide Number Placeholder 3"/>
+          <p:cNvSpPr>
+            <a:spLocks noGrp="1"/>
+          </p:cNvSpPr>
+          <p:nvPr>
+            <p:ph type="sldNum" sz="quarter" idx="5"/>
+          </p:nvPr>
+        </p:nvSpPr>
+        <p:spPr/>
+        <p:txBody>
+          <a:bodyPr/>
+          <a:lstStyle/>
+          <a:p>
+            <a:fld id="{86C81B2F-A610-2949-B9DC-A3E483DF43DC}" type="slidenum">
+              <a:rPr lang="en-CN" smtClean="0"/>
+              <a:t>3</a:t>
+            </a:fld>
+            <a:endParaRPr lang="en-CN"/>
+          </a:p>
+        </p:txBody>
+      </p:sp>
+    </p:spTree>
+    <p:extLst>
+      <p:ext uri="{BB962C8B-B14F-4D97-AF65-F5344CB8AC3E}">
+        <p14:creationId xmlns:p14="http://schemas.microsoft.com/office/powerpoint/2010/main" val="3064736011"/>
+      </p:ext>
+    </p:extLst>
+  </p:cSld>
+  <p:clrMapOvr>
+    <a:masterClrMapping/>
+  </p:clrMapOvr>
+</p:notes>
+</file>
+
+<file path=ppt/notesSlides/notesSlide4.xml><?xml version="1.0" encoding="utf-8"?>
+<p:notes xmlns:a="http://schemas.openxmlformats.org/drawingml/2006/main" xmlns:r="http://schemas.openxmlformats.org/officeDocument/2006/relationships" xmlns:p="http://schemas.openxmlformats.org/presentationml/2006/main">
+  <p:cSld>
+    <p:spTree>
+      <p:nvGrpSpPr>
+        <p:cNvPr id="1" name=""/>
+        <p:cNvGrpSpPr/>
+        <p:nvPr/>
+      </p:nvGrpSpPr>
+      <p:grpSpPr>
+        <a:xfrm>
+          <a:off x="0" y="0"/>
+          <a:ext cx="0" cy="0"/>
+          <a:chOff x="0" y="0"/>
+          <a:chExt cx="0" cy="0"/>
+        </a:xfrm>
+      </p:grpSpPr>
+      <p:sp>
+        <p:nvSpPr>
+          <p:cNvPr id="2" name="Slide Image Placeholder 1"/>
+          <p:cNvSpPr>
+            <a:spLocks noGrp="1" noRot="1" noChangeAspect="1"/>
+          </p:cNvSpPr>
+          <p:nvPr>
+            <p:ph type="sldImg"/>
+          </p:nvPr>
+        </p:nvSpPr>
+        <p:spPr/>
+      </p:sp>
+      <p:sp>
+        <p:nvSpPr>
+          <p:cNvPr id="3" name="Notes Placeholder 2"/>
+          <p:cNvSpPr>
+            <a:spLocks noGrp="1"/>
+          </p:cNvSpPr>
+          <p:nvPr>
+            <p:ph type="body" idx="1"/>
+          </p:nvPr>
+        </p:nvSpPr>
+        <p:spPr/>
+        <p:txBody>
+          <a:bodyPr/>
+          <a:lstStyle/>
+          <a:p>
+            <a:r>
+              <a:rPr lang="en-CN" dirty="0"/>
+              <a:t>2-3-4 tree build from </a:t>
+            </a:r>
+            <a:r>
+              <a:rPr lang="en-US" dirty="0"/>
+              <a:t>"GMPXACDEJKNORSTUVYZ”</a:t>
+            </a:r>
+          </a:p>
+          <a:p>
+            <a:pPr marL="0" marR="0" lvl="0" indent="0" algn="l" defTabSz="914400" rtl="0" eaLnBrk="1" fontAlgn="auto" latinLnBrk="0" hangingPunct="1">
+              <a:lnSpc>
+                <a:spcPct val="100000"/>
+              </a:lnSpc>
+              <a:spcBef>
+                <a:spcPts val="0"/>
+              </a:spcBef>
+              <a:spcAft>
+                <a:spcPts val="0"/>
+              </a:spcAft>
+              <a:buClrTx/>
+              <a:buSzTx/>
+              <a:buFontTx/>
+              <a:buNone/>
+              <a:tabLst/>
+              <a:defRPr/>
+            </a:pPr>
+            <a:r>
+              <a:rPr lang="en-US" dirty="0"/>
+              <a:t>B-tree of degree degree 3 </a:t>
+            </a:r>
+            <a:r>
+              <a:rPr lang="en-US"/>
+              <a:t>from "GMPXACDEJKNORSTUVYZ”</a:t>
+            </a:r>
+          </a:p>
+        </p:txBody>
+      </p:sp>
+      <p:sp>
+        <p:nvSpPr>
+          <p:cNvPr id="4" name="Slide Number Placeholder 3"/>
+          <p:cNvSpPr>
+            <a:spLocks noGrp="1"/>
+          </p:cNvSpPr>
+          <p:nvPr>
+            <p:ph type="sldNum" sz="quarter" idx="5"/>
+          </p:nvPr>
+        </p:nvSpPr>
+        <p:spPr/>
+        <p:txBody>
+          <a:bodyPr/>
+          <a:lstStyle/>
+          <a:p>
+            <a:fld id="{86C81B2F-A610-2949-B9DC-A3E483DF43DC}" type="slidenum">
+              <a:rPr lang="en-CN" smtClean="0"/>
+              <a:t>4</a:t>
+            </a:fld>
+            <a:endParaRPr lang="en-CN"/>
+          </a:p>
+        </p:txBody>
+      </p:sp>
+    </p:spTree>
+    <p:extLst>
+      <p:ext uri="{BB962C8B-B14F-4D97-AF65-F5344CB8AC3E}">
+        <p14:creationId xmlns:p14="http://schemas.microsoft.com/office/powerpoint/2010/main" val="1755267421"/>
+      </p:ext>
+    </p:extLst>
+  </p:cSld>
+  <p:clrMapOvr>
+    <a:masterClrMapping/>
+  </p:clrMapOvr>
+</p:notes>
+</file>
+
 <file path=ppt/slideLayouts/slideLayout1.xml><?xml version="1.0" encoding="utf-8"?>
 <p:sldLayout xmlns:a="http://schemas.openxmlformats.org/drawingml/2006/main" xmlns:r="http://schemas.openxmlformats.org/officeDocument/2006/relationships" xmlns:p="http://schemas.openxmlformats.org/presentationml/2006/main" type="title" preserve="1">
   <p:cSld name="Title Slide">
@@ -263,7 +996,7 @@
           <a:p>
             <a:fld id="{B6EEB924-5985-A949-B5CF-883A526C1012}" type="datetimeFigureOut">
               <a:rPr lang="en-CN" smtClean="0"/>
-              <a:t>2021/9/12</a:t>
+              <a:t>2021/9/25</a:t>
             </a:fld>
             <a:endParaRPr lang="en-CN"/>
           </a:p>
@@ -463,7 +1196,7 @@
           <a:p>
             <a:fld id="{B6EEB924-5985-A949-B5CF-883A526C1012}" type="datetimeFigureOut">
               <a:rPr lang="en-CN" smtClean="0"/>
-              <a:t>2021/9/12</a:t>
+              <a:t>2021/9/25</a:t>
             </a:fld>
             <a:endParaRPr lang="en-CN"/>
           </a:p>
@@ -673,7 +1406,7 @@
           <a:p>
             <a:fld id="{B6EEB924-5985-A949-B5CF-883A526C1012}" type="datetimeFigureOut">
               <a:rPr lang="en-CN" smtClean="0"/>
-              <a:t>2021/9/12</a:t>
+              <a:t>2021/9/25</a:t>
             </a:fld>
             <a:endParaRPr lang="en-CN"/>
           </a:p>
@@ -873,7 +1606,7 @@
           <a:p>
             <a:fld id="{B6EEB924-5985-A949-B5CF-883A526C1012}" type="datetimeFigureOut">
               <a:rPr lang="en-CN" smtClean="0"/>
-              <a:t>2021/9/12</a:t>
+              <a:t>2021/9/25</a:t>
             </a:fld>
             <a:endParaRPr lang="en-CN"/>
           </a:p>
@@ -1149,7 +1882,7 @@
           <a:p>
             <a:fld id="{B6EEB924-5985-A949-B5CF-883A526C1012}" type="datetimeFigureOut">
               <a:rPr lang="en-CN" smtClean="0"/>
-              <a:t>2021/9/12</a:t>
+              <a:t>2021/9/25</a:t>
             </a:fld>
             <a:endParaRPr lang="en-CN"/>
           </a:p>
@@ -1417,7 +2150,7 @@
           <a:p>
             <a:fld id="{B6EEB924-5985-A949-B5CF-883A526C1012}" type="datetimeFigureOut">
               <a:rPr lang="en-CN" smtClean="0"/>
-              <a:t>2021/9/12</a:t>
+              <a:t>2021/9/25</a:t>
             </a:fld>
             <a:endParaRPr lang="en-CN"/>
           </a:p>
@@ -1832,7 +2565,7 @@
           <a:p>
             <a:fld id="{B6EEB924-5985-A949-B5CF-883A526C1012}" type="datetimeFigureOut">
               <a:rPr lang="en-CN" smtClean="0"/>
-              <a:t>2021/9/12</a:t>
+              <a:t>2021/9/25</a:t>
             </a:fld>
             <a:endParaRPr lang="en-CN"/>
           </a:p>
@@ -1974,7 +2707,7 @@
           <a:p>
             <a:fld id="{B6EEB924-5985-A949-B5CF-883A526C1012}" type="datetimeFigureOut">
               <a:rPr lang="en-CN" smtClean="0"/>
-              <a:t>2021/9/12</a:t>
+              <a:t>2021/9/25</a:t>
             </a:fld>
             <a:endParaRPr lang="en-CN"/>
           </a:p>
@@ -2087,7 +2820,7 @@
           <a:p>
             <a:fld id="{B6EEB924-5985-A949-B5CF-883A526C1012}" type="datetimeFigureOut">
               <a:rPr lang="en-CN" smtClean="0"/>
-              <a:t>2021/9/12</a:t>
+              <a:t>2021/9/25</a:t>
             </a:fld>
             <a:endParaRPr lang="en-CN"/>
           </a:p>
@@ -2400,7 +3133,7 @@
           <a:p>
             <a:fld id="{B6EEB924-5985-A949-B5CF-883A526C1012}" type="datetimeFigureOut">
               <a:rPr lang="en-CN" smtClean="0"/>
-              <a:t>2021/9/12</a:t>
+              <a:t>2021/9/25</a:t>
             </a:fld>
             <a:endParaRPr lang="en-CN"/>
           </a:p>
@@ -2689,7 +3422,7 @@
           <a:p>
             <a:fld id="{B6EEB924-5985-A949-B5CF-883A526C1012}" type="datetimeFigureOut">
               <a:rPr lang="en-CN" smtClean="0"/>
-              <a:t>2021/9/12</a:t>
+              <a:t>2021/9/25</a:t>
             </a:fld>
             <a:endParaRPr lang="en-CN"/>
           </a:p>
@@ -2932,7 +3665,7 @@
           <a:p>
             <a:fld id="{B6EEB924-5985-A949-B5CF-883A526C1012}" type="datetimeFigureOut">
               <a:rPr lang="en-CN" smtClean="0"/>
-              <a:t>2021/9/12</a:t>
+              <a:t>2021/9/25</a:t>
             </a:fld>
             <a:endParaRPr lang="en-CN"/>
           </a:p>
@@ -7754,6 +8487,2490 @@
 </p:sld>
 </file>
 
+<file path=ppt/slides/slide4.xml><?xml version="1.0" encoding="utf-8"?>
+<p:sld xmlns:a="http://schemas.openxmlformats.org/drawingml/2006/main" xmlns:r="http://schemas.openxmlformats.org/officeDocument/2006/relationships" xmlns:p="http://schemas.openxmlformats.org/presentationml/2006/main">
+  <p:cSld>
+    <p:spTree>
+      <p:nvGrpSpPr>
+        <p:cNvPr id="1" name=""/>
+        <p:cNvGrpSpPr/>
+        <p:nvPr/>
+      </p:nvGrpSpPr>
+      <p:grpSpPr>
+        <a:xfrm>
+          <a:off x="0" y="0"/>
+          <a:ext cx="0" cy="0"/>
+          <a:chOff x="0" y="0"/>
+          <a:chExt cx="0" cy="0"/>
+        </a:xfrm>
+      </p:grpSpPr>
+      <p:sp>
+        <p:nvSpPr>
+          <p:cNvPr id="2" name="Rectangle 1">
+            <a:extLst>
+              <a:ext uri="{FF2B5EF4-FFF2-40B4-BE49-F238E27FC236}">
+                <a16:creationId xmlns:a16="http://schemas.microsoft.com/office/drawing/2014/main" id="{13CAC1EE-5729-C44F-912A-EC15C046442E}"/>
+              </a:ext>
+            </a:extLst>
+          </p:cNvPr>
+          <p:cNvSpPr/>
+          <p:nvPr/>
+        </p:nvSpPr>
+        <p:spPr>
+          <a:xfrm>
+            <a:off x="5312983" y="436181"/>
+            <a:ext cx="609600" cy="567559"/>
+          </a:xfrm>
+          <a:prstGeom prst="rect">
+            <a:avLst/>
+          </a:prstGeom>
+        </p:spPr>
+        <p:style>
+          <a:lnRef idx="2">
+            <a:schemeClr val="dk1"/>
+          </a:lnRef>
+          <a:fillRef idx="1">
+            <a:schemeClr val="lt1"/>
+          </a:fillRef>
+          <a:effectRef idx="0">
+            <a:schemeClr val="dk1"/>
+          </a:effectRef>
+          <a:fontRef idx="minor">
+            <a:schemeClr val="dk1"/>
+          </a:fontRef>
+        </p:style>
+        <p:txBody>
+          <a:bodyPr rtlCol="0" anchor="ctr"/>
+          <a:lstStyle/>
+          <a:p>
+            <a:pPr algn="ctr"/>
+            <a:r>
+              <a:rPr lang="en-CN" i="1" dirty="0">
+                <a:latin typeface="Times New Roman" panose="02020603050405020304" pitchFamily="18" charset="0"/>
+                <a:cs typeface="Times New Roman" panose="02020603050405020304" pitchFamily="18" charset="0"/>
+              </a:rPr>
+              <a:t>N</a:t>
+            </a:r>
+            <a:endParaRPr lang="en-CN" baseline="-25000" dirty="0"/>
+          </a:p>
+        </p:txBody>
+      </p:sp>
+      <p:sp>
+        <p:nvSpPr>
+          <p:cNvPr id="3" name="Rectangle 2">
+            <a:extLst>
+              <a:ext uri="{FF2B5EF4-FFF2-40B4-BE49-F238E27FC236}">
+                <a16:creationId xmlns:a16="http://schemas.microsoft.com/office/drawing/2014/main" id="{93322298-F288-2846-8EDF-0DEE7D2CECF0}"/>
+              </a:ext>
+            </a:extLst>
+          </p:cNvPr>
+          <p:cNvSpPr/>
+          <p:nvPr/>
+        </p:nvSpPr>
+        <p:spPr>
+          <a:xfrm>
+            <a:off x="2464679" y="1460940"/>
+            <a:ext cx="609600" cy="567559"/>
+          </a:xfrm>
+          <a:prstGeom prst="rect">
+            <a:avLst/>
+          </a:prstGeom>
+        </p:spPr>
+        <p:style>
+          <a:lnRef idx="2">
+            <a:schemeClr val="dk1"/>
+          </a:lnRef>
+          <a:fillRef idx="1">
+            <a:schemeClr val="lt1"/>
+          </a:fillRef>
+          <a:effectRef idx="0">
+            <a:schemeClr val="dk1"/>
+          </a:effectRef>
+          <a:fontRef idx="minor">
+            <a:schemeClr val="dk1"/>
+          </a:fontRef>
+        </p:style>
+        <p:txBody>
+          <a:bodyPr rtlCol="0" anchor="ctr"/>
+          <a:lstStyle/>
+          <a:p>
+            <a:pPr algn="ctr"/>
+            <a:r>
+              <a:rPr lang="en-CN" i="1" dirty="0">
+                <a:latin typeface="Times New Roman" panose="02020603050405020304" pitchFamily="18" charset="0"/>
+                <a:cs typeface="Times New Roman" panose="02020603050405020304" pitchFamily="18" charset="0"/>
+              </a:rPr>
+              <a:t>E</a:t>
+            </a:r>
+            <a:endParaRPr lang="en-CN" baseline="-25000" dirty="0"/>
+          </a:p>
+        </p:txBody>
+      </p:sp>
+      <p:sp>
+        <p:nvSpPr>
+          <p:cNvPr id="4" name="Rectangle 3">
+            <a:extLst>
+              <a:ext uri="{FF2B5EF4-FFF2-40B4-BE49-F238E27FC236}">
+                <a16:creationId xmlns:a16="http://schemas.microsoft.com/office/drawing/2014/main" id="{14907875-E6F9-B84B-868A-F1F51141E3B5}"/>
+              </a:ext>
+            </a:extLst>
+          </p:cNvPr>
+          <p:cNvSpPr/>
+          <p:nvPr/>
+        </p:nvSpPr>
+        <p:spPr>
+          <a:xfrm>
+            <a:off x="3074279" y="1460940"/>
+            <a:ext cx="609600" cy="567559"/>
+          </a:xfrm>
+          <a:prstGeom prst="rect">
+            <a:avLst/>
+          </a:prstGeom>
+        </p:spPr>
+        <p:style>
+          <a:lnRef idx="2">
+            <a:schemeClr val="dk1"/>
+          </a:lnRef>
+          <a:fillRef idx="1">
+            <a:schemeClr val="lt1"/>
+          </a:fillRef>
+          <a:effectRef idx="0">
+            <a:schemeClr val="dk1"/>
+          </a:effectRef>
+          <a:fontRef idx="minor">
+            <a:schemeClr val="dk1"/>
+          </a:fontRef>
+        </p:style>
+        <p:txBody>
+          <a:bodyPr rtlCol="0" anchor="ctr"/>
+          <a:lstStyle/>
+          <a:p>
+            <a:pPr algn="ctr"/>
+            <a:r>
+              <a:rPr lang="en-CN" i="1" dirty="0">
+                <a:latin typeface="Times New Roman" panose="02020603050405020304" pitchFamily="18" charset="0"/>
+                <a:cs typeface="Times New Roman" panose="02020603050405020304" pitchFamily="18" charset="0"/>
+              </a:rPr>
+              <a:t>J</a:t>
+            </a:r>
+            <a:endParaRPr lang="en-CN" dirty="0"/>
+          </a:p>
+        </p:txBody>
+      </p:sp>
+      <p:sp>
+        <p:nvSpPr>
+          <p:cNvPr id="5" name="Rectangle 4">
+            <a:extLst>
+              <a:ext uri="{FF2B5EF4-FFF2-40B4-BE49-F238E27FC236}">
+                <a16:creationId xmlns:a16="http://schemas.microsoft.com/office/drawing/2014/main" id="{84236272-699B-0449-B6AF-C63A24E4362F}"/>
+              </a:ext>
+            </a:extLst>
+          </p:cNvPr>
+          <p:cNvSpPr/>
+          <p:nvPr/>
+        </p:nvSpPr>
+        <p:spPr>
+          <a:xfrm>
+            <a:off x="714707" y="2504091"/>
+            <a:ext cx="609600" cy="567559"/>
+          </a:xfrm>
+          <a:prstGeom prst="rect">
+            <a:avLst/>
+          </a:prstGeom>
+        </p:spPr>
+        <p:style>
+          <a:lnRef idx="2">
+            <a:schemeClr val="dk1"/>
+          </a:lnRef>
+          <a:fillRef idx="1">
+            <a:schemeClr val="lt1"/>
+          </a:fillRef>
+          <a:effectRef idx="0">
+            <a:schemeClr val="dk1"/>
+          </a:effectRef>
+          <a:fontRef idx="minor">
+            <a:schemeClr val="dk1"/>
+          </a:fontRef>
+        </p:style>
+        <p:txBody>
+          <a:bodyPr rtlCol="0" anchor="ctr"/>
+          <a:lstStyle/>
+          <a:p>
+            <a:pPr algn="ctr"/>
+            <a:r>
+              <a:rPr lang="en-CN" i="1" dirty="0">
+                <a:latin typeface="Times New Roman" panose="02020603050405020304" pitchFamily="18" charset="0"/>
+                <a:cs typeface="Times New Roman" panose="02020603050405020304" pitchFamily="18" charset="0"/>
+              </a:rPr>
+              <a:t>A</a:t>
+            </a:r>
+            <a:endParaRPr lang="en-CN" baseline="-25000" dirty="0"/>
+          </a:p>
+        </p:txBody>
+      </p:sp>
+      <p:sp>
+        <p:nvSpPr>
+          <p:cNvPr id="6" name="Rectangle 5">
+            <a:extLst>
+              <a:ext uri="{FF2B5EF4-FFF2-40B4-BE49-F238E27FC236}">
+                <a16:creationId xmlns:a16="http://schemas.microsoft.com/office/drawing/2014/main" id="{96288EA2-60F3-B44A-95DA-78A1451614F4}"/>
+              </a:ext>
+            </a:extLst>
+          </p:cNvPr>
+          <p:cNvSpPr/>
+          <p:nvPr/>
+        </p:nvSpPr>
+        <p:spPr>
+          <a:xfrm>
+            <a:off x="1324307" y="2504091"/>
+            <a:ext cx="609600" cy="567559"/>
+          </a:xfrm>
+          <a:prstGeom prst="rect">
+            <a:avLst/>
+          </a:prstGeom>
+        </p:spPr>
+        <p:style>
+          <a:lnRef idx="2">
+            <a:schemeClr val="dk1"/>
+          </a:lnRef>
+          <a:fillRef idx="1">
+            <a:schemeClr val="lt1"/>
+          </a:fillRef>
+          <a:effectRef idx="0">
+            <a:schemeClr val="dk1"/>
+          </a:effectRef>
+          <a:fontRef idx="minor">
+            <a:schemeClr val="dk1"/>
+          </a:fontRef>
+        </p:style>
+        <p:txBody>
+          <a:bodyPr rtlCol="0" anchor="ctr"/>
+          <a:lstStyle/>
+          <a:p>
+            <a:pPr algn="ctr"/>
+            <a:r>
+              <a:rPr lang="en-CN" i="1" dirty="0">
+                <a:latin typeface="Times New Roman" panose="02020603050405020304" pitchFamily="18" charset="0"/>
+                <a:cs typeface="Times New Roman" panose="02020603050405020304" pitchFamily="18" charset="0"/>
+              </a:rPr>
+              <a:t>C</a:t>
+            </a:r>
+            <a:endParaRPr lang="en-CN" dirty="0"/>
+          </a:p>
+        </p:txBody>
+      </p:sp>
+      <p:sp>
+        <p:nvSpPr>
+          <p:cNvPr id="7" name="Rectangle 6">
+            <a:extLst>
+              <a:ext uri="{FF2B5EF4-FFF2-40B4-BE49-F238E27FC236}">
+                <a16:creationId xmlns:a16="http://schemas.microsoft.com/office/drawing/2014/main" id="{58A5815E-BEEB-A349-8F50-60D54FC9B1E9}"/>
+              </a:ext>
+            </a:extLst>
+          </p:cNvPr>
+          <p:cNvSpPr/>
+          <p:nvPr/>
+        </p:nvSpPr>
+        <p:spPr>
+          <a:xfrm>
+            <a:off x="1939162" y="2504091"/>
+            <a:ext cx="609600" cy="567559"/>
+          </a:xfrm>
+          <a:prstGeom prst="rect">
+            <a:avLst/>
+          </a:prstGeom>
+        </p:spPr>
+        <p:style>
+          <a:lnRef idx="2">
+            <a:schemeClr val="dk1"/>
+          </a:lnRef>
+          <a:fillRef idx="1">
+            <a:schemeClr val="lt1"/>
+          </a:fillRef>
+          <a:effectRef idx="0">
+            <a:schemeClr val="dk1"/>
+          </a:effectRef>
+          <a:fontRef idx="minor">
+            <a:schemeClr val="dk1"/>
+          </a:fontRef>
+        </p:style>
+        <p:txBody>
+          <a:bodyPr rtlCol="0" anchor="ctr"/>
+          <a:lstStyle/>
+          <a:p>
+            <a:pPr algn="ctr"/>
+            <a:r>
+              <a:rPr lang="en-CN" i="1" dirty="0">
+                <a:latin typeface="Times New Roman" panose="02020603050405020304" pitchFamily="18" charset="0"/>
+                <a:cs typeface="Times New Roman" panose="02020603050405020304" pitchFamily="18" charset="0"/>
+              </a:rPr>
+              <a:t>D</a:t>
+            </a:r>
+            <a:endParaRPr lang="en-CN" dirty="0"/>
+          </a:p>
+        </p:txBody>
+      </p:sp>
+      <p:cxnSp>
+        <p:nvCxnSpPr>
+          <p:cNvPr id="8" name="Straight Arrow Connector 7">
+            <a:extLst>
+              <a:ext uri="{FF2B5EF4-FFF2-40B4-BE49-F238E27FC236}">
+                <a16:creationId xmlns:a16="http://schemas.microsoft.com/office/drawing/2014/main" id="{06214D2D-83E1-B744-B51A-286F8E1A2E7E}"/>
+              </a:ext>
+            </a:extLst>
+          </p:cNvPr>
+          <p:cNvCxnSpPr>
+            <a:cxnSpLocks/>
+            <a:stCxn id="2" idx="1"/>
+            <a:endCxn id="4" idx="0"/>
+          </p:cNvCxnSpPr>
+          <p:nvPr/>
+        </p:nvCxnSpPr>
+        <p:spPr>
+          <a:xfrm flipH="1">
+            <a:off x="3379079" y="719961"/>
+            <a:ext cx="1933904" cy="740979"/>
+          </a:xfrm>
+          <a:prstGeom prst="straightConnector1">
+            <a:avLst/>
+          </a:prstGeom>
+          <a:ln>
+            <a:tailEnd type="triangle"/>
+          </a:ln>
+        </p:spPr>
+        <p:style>
+          <a:lnRef idx="2">
+            <a:schemeClr val="dk1"/>
+          </a:lnRef>
+          <a:fillRef idx="0">
+            <a:schemeClr val="dk1"/>
+          </a:fillRef>
+          <a:effectRef idx="1">
+            <a:schemeClr val="dk1"/>
+          </a:effectRef>
+          <a:fontRef idx="minor">
+            <a:schemeClr val="tx1"/>
+          </a:fontRef>
+        </p:style>
+      </p:cxnSp>
+      <p:cxnSp>
+        <p:nvCxnSpPr>
+          <p:cNvPr id="12" name="Straight Arrow Connector 11">
+            <a:extLst>
+              <a:ext uri="{FF2B5EF4-FFF2-40B4-BE49-F238E27FC236}">
+                <a16:creationId xmlns:a16="http://schemas.microsoft.com/office/drawing/2014/main" id="{2B89BAD3-211C-C44C-BAF8-C0E13E9EEC34}"/>
+              </a:ext>
+            </a:extLst>
+          </p:cNvPr>
+          <p:cNvCxnSpPr>
+            <a:cxnSpLocks/>
+            <a:stCxn id="3" idx="1"/>
+            <a:endCxn id="6" idx="0"/>
+          </p:cNvCxnSpPr>
+          <p:nvPr/>
+        </p:nvCxnSpPr>
+        <p:spPr>
+          <a:xfrm flipH="1">
+            <a:off x="1629107" y="1744720"/>
+            <a:ext cx="835572" cy="759371"/>
+          </a:xfrm>
+          <a:prstGeom prst="straightConnector1">
+            <a:avLst/>
+          </a:prstGeom>
+          <a:ln>
+            <a:tailEnd type="triangle"/>
+          </a:ln>
+        </p:spPr>
+        <p:style>
+          <a:lnRef idx="2">
+            <a:schemeClr val="dk1"/>
+          </a:lnRef>
+          <a:fillRef idx="0">
+            <a:schemeClr val="dk1"/>
+          </a:fillRef>
+          <a:effectRef idx="1">
+            <a:schemeClr val="dk1"/>
+          </a:effectRef>
+          <a:fontRef idx="minor">
+            <a:schemeClr val="tx1"/>
+          </a:fontRef>
+        </p:style>
+      </p:cxnSp>
+      <p:sp>
+        <p:nvSpPr>
+          <p:cNvPr id="15" name="Rectangle 14">
+            <a:extLst>
+              <a:ext uri="{FF2B5EF4-FFF2-40B4-BE49-F238E27FC236}">
+                <a16:creationId xmlns:a16="http://schemas.microsoft.com/office/drawing/2014/main" id="{3466DB2E-9B74-5C43-93AA-EF22E893FE90}"/>
+              </a:ext>
+            </a:extLst>
+          </p:cNvPr>
+          <p:cNvSpPr/>
+          <p:nvPr/>
+        </p:nvSpPr>
+        <p:spPr>
+          <a:xfrm>
+            <a:off x="2929765" y="2504090"/>
+            <a:ext cx="609600" cy="567559"/>
+          </a:xfrm>
+          <a:prstGeom prst="rect">
+            <a:avLst/>
+          </a:prstGeom>
+        </p:spPr>
+        <p:style>
+          <a:lnRef idx="2">
+            <a:schemeClr val="dk1"/>
+          </a:lnRef>
+          <a:fillRef idx="1">
+            <a:schemeClr val="lt1"/>
+          </a:fillRef>
+          <a:effectRef idx="0">
+            <a:schemeClr val="dk1"/>
+          </a:effectRef>
+          <a:fontRef idx="minor">
+            <a:schemeClr val="dk1"/>
+          </a:fontRef>
+        </p:style>
+        <p:txBody>
+          <a:bodyPr rtlCol="0" anchor="ctr"/>
+          <a:lstStyle/>
+          <a:p>
+            <a:pPr algn="ctr"/>
+            <a:r>
+              <a:rPr lang="en-CN" i="1" dirty="0">
+                <a:latin typeface="Times New Roman" panose="02020603050405020304" pitchFamily="18" charset="0"/>
+                <a:cs typeface="Times New Roman" panose="02020603050405020304" pitchFamily="18" charset="0"/>
+              </a:rPr>
+              <a:t>G</a:t>
+            </a:r>
+            <a:endParaRPr lang="en-CN" dirty="0"/>
+          </a:p>
+        </p:txBody>
+      </p:sp>
+      <p:cxnSp>
+        <p:nvCxnSpPr>
+          <p:cNvPr id="17" name="Straight Arrow Connector 16">
+            <a:extLst>
+              <a:ext uri="{FF2B5EF4-FFF2-40B4-BE49-F238E27FC236}">
+                <a16:creationId xmlns:a16="http://schemas.microsoft.com/office/drawing/2014/main" id="{3A34275D-D90C-A747-9CF5-C9F1C9DAD153}"/>
+              </a:ext>
+            </a:extLst>
+          </p:cNvPr>
+          <p:cNvCxnSpPr>
+            <a:cxnSpLocks/>
+            <a:stCxn id="4" idx="1"/>
+            <a:endCxn id="15" idx="0"/>
+          </p:cNvCxnSpPr>
+          <p:nvPr/>
+        </p:nvCxnSpPr>
+        <p:spPr>
+          <a:xfrm>
+            <a:off x="3074279" y="1744720"/>
+            <a:ext cx="160286" cy="759370"/>
+          </a:xfrm>
+          <a:prstGeom prst="straightConnector1">
+            <a:avLst/>
+          </a:prstGeom>
+          <a:ln>
+            <a:tailEnd type="triangle"/>
+          </a:ln>
+        </p:spPr>
+        <p:style>
+          <a:lnRef idx="2">
+            <a:schemeClr val="dk1"/>
+          </a:lnRef>
+          <a:fillRef idx="0">
+            <a:schemeClr val="dk1"/>
+          </a:fillRef>
+          <a:effectRef idx="1">
+            <a:schemeClr val="dk1"/>
+          </a:effectRef>
+          <a:fontRef idx="minor">
+            <a:schemeClr val="tx1"/>
+          </a:fontRef>
+        </p:style>
+      </p:cxnSp>
+      <p:sp>
+        <p:nvSpPr>
+          <p:cNvPr id="20" name="Rectangle 19">
+            <a:extLst>
+              <a:ext uri="{FF2B5EF4-FFF2-40B4-BE49-F238E27FC236}">
+                <a16:creationId xmlns:a16="http://schemas.microsoft.com/office/drawing/2014/main" id="{F5F75E8E-CF87-714B-8770-349091FA91A8}"/>
+              </a:ext>
+            </a:extLst>
+          </p:cNvPr>
+          <p:cNvSpPr/>
+          <p:nvPr/>
+        </p:nvSpPr>
+        <p:spPr>
+          <a:xfrm>
+            <a:off x="3972916" y="2504090"/>
+            <a:ext cx="609600" cy="567559"/>
+          </a:xfrm>
+          <a:prstGeom prst="rect">
+            <a:avLst/>
+          </a:prstGeom>
+        </p:spPr>
+        <p:style>
+          <a:lnRef idx="2">
+            <a:schemeClr val="dk1"/>
+          </a:lnRef>
+          <a:fillRef idx="1">
+            <a:schemeClr val="lt1"/>
+          </a:fillRef>
+          <a:effectRef idx="0">
+            <a:schemeClr val="dk1"/>
+          </a:effectRef>
+          <a:fontRef idx="minor">
+            <a:schemeClr val="dk1"/>
+          </a:fontRef>
+        </p:style>
+        <p:txBody>
+          <a:bodyPr rtlCol="0" anchor="ctr"/>
+          <a:lstStyle/>
+          <a:p>
+            <a:pPr algn="ctr"/>
+            <a:r>
+              <a:rPr lang="en-CN" i="1" dirty="0">
+                <a:latin typeface="Times New Roman" panose="02020603050405020304" pitchFamily="18" charset="0"/>
+                <a:cs typeface="Times New Roman" panose="02020603050405020304" pitchFamily="18" charset="0"/>
+              </a:rPr>
+              <a:t>K</a:t>
+            </a:r>
+            <a:endParaRPr lang="en-CN" baseline="-25000" dirty="0"/>
+          </a:p>
+        </p:txBody>
+      </p:sp>
+      <p:sp>
+        <p:nvSpPr>
+          <p:cNvPr id="21" name="Rectangle 20">
+            <a:extLst>
+              <a:ext uri="{FF2B5EF4-FFF2-40B4-BE49-F238E27FC236}">
+                <a16:creationId xmlns:a16="http://schemas.microsoft.com/office/drawing/2014/main" id="{7D889E32-260B-AE43-8025-8EB227516D58}"/>
+              </a:ext>
+            </a:extLst>
+          </p:cNvPr>
+          <p:cNvSpPr/>
+          <p:nvPr/>
+        </p:nvSpPr>
+        <p:spPr>
+          <a:xfrm>
+            <a:off x="4582516" y="2504090"/>
+            <a:ext cx="609600" cy="567559"/>
+          </a:xfrm>
+          <a:prstGeom prst="rect">
+            <a:avLst/>
+          </a:prstGeom>
+        </p:spPr>
+        <p:style>
+          <a:lnRef idx="2">
+            <a:schemeClr val="dk1"/>
+          </a:lnRef>
+          <a:fillRef idx="1">
+            <a:schemeClr val="lt1"/>
+          </a:fillRef>
+          <a:effectRef idx="0">
+            <a:schemeClr val="dk1"/>
+          </a:effectRef>
+          <a:fontRef idx="minor">
+            <a:schemeClr val="dk1"/>
+          </a:fontRef>
+        </p:style>
+        <p:txBody>
+          <a:bodyPr rtlCol="0" anchor="ctr"/>
+          <a:lstStyle/>
+          <a:p>
+            <a:pPr algn="ctr"/>
+            <a:r>
+              <a:rPr lang="en-CN" i="1" dirty="0">
+                <a:latin typeface="Times New Roman" panose="02020603050405020304" pitchFamily="18" charset="0"/>
+                <a:cs typeface="Times New Roman" panose="02020603050405020304" pitchFamily="18" charset="0"/>
+              </a:rPr>
+              <a:t>M</a:t>
+            </a:r>
+            <a:endParaRPr lang="en-CN" dirty="0"/>
+          </a:p>
+        </p:txBody>
+      </p:sp>
+      <p:cxnSp>
+        <p:nvCxnSpPr>
+          <p:cNvPr id="23" name="Straight Arrow Connector 22">
+            <a:extLst>
+              <a:ext uri="{FF2B5EF4-FFF2-40B4-BE49-F238E27FC236}">
+                <a16:creationId xmlns:a16="http://schemas.microsoft.com/office/drawing/2014/main" id="{DDD3A640-1C24-A143-A74D-8D0CB788E39A}"/>
+              </a:ext>
+            </a:extLst>
+          </p:cNvPr>
+          <p:cNvCxnSpPr>
+            <a:cxnSpLocks/>
+            <a:stCxn id="4" idx="3"/>
+            <a:endCxn id="20" idx="0"/>
+          </p:cNvCxnSpPr>
+          <p:nvPr/>
+        </p:nvCxnSpPr>
+        <p:spPr>
+          <a:xfrm>
+            <a:off x="3683879" y="1744720"/>
+            <a:ext cx="593837" cy="759370"/>
+          </a:xfrm>
+          <a:prstGeom prst="straightConnector1">
+            <a:avLst/>
+          </a:prstGeom>
+          <a:ln>
+            <a:tailEnd type="triangle"/>
+          </a:ln>
+        </p:spPr>
+        <p:style>
+          <a:lnRef idx="2">
+            <a:schemeClr val="dk1"/>
+          </a:lnRef>
+          <a:fillRef idx="0">
+            <a:schemeClr val="dk1"/>
+          </a:fillRef>
+          <a:effectRef idx="1">
+            <a:schemeClr val="dk1"/>
+          </a:effectRef>
+          <a:fontRef idx="minor">
+            <a:schemeClr val="tx1"/>
+          </a:fontRef>
+        </p:style>
+      </p:cxnSp>
+      <p:sp>
+        <p:nvSpPr>
+          <p:cNvPr id="26" name="Rectangle 25">
+            <a:extLst>
+              <a:ext uri="{FF2B5EF4-FFF2-40B4-BE49-F238E27FC236}">
+                <a16:creationId xmlns:a16="http://schemas.microsoft.com/office/drawing/2014/main" id="{DB2659A1-E794-5B42-842D-54E79C520DF6}"/>
+              </a:ext>
+            </a:extLst>
+          </p:cNvPr>
+          <p:cNvSpPr/>
+          <p:nvPr/>
+        </p:nvSpPr>
+        <p:spPr>
+          <a:xfrm>
+            <a:off x="7609494" y="1460942"/>
+            <a:ext cx="609600" cy="567559"/>
+          </a:xfrm>
+          <a:prstGeom prst="rect">
+            <a:avLst/>
+          </a:prstGeom>
+        </p:spPr>
+        <p:style>
+          <a:lnRef idx="2">
+            <a:schemeClr val="dk1"/>
+          </a:lnRef>
+          <a:fillRef idx="1">
+            <a:schemeClr val="lt1"/>
+          </a:fillRef>
+          <a:effectRef idx="0">
+            <a:schemeClr val="dk1"/>
+          </a:effectRef>
+          <a:fontRef idx="minor">
+            <a:schemeClr val="dk1"/>
+          </a:fontRef>
+        </p:style>
+        <p:txBody>
+          <a:bodyPr rtlCol="0" anchor="ctr"/>
+          <a:lstStyle/>
+          <a:p>
+            <a:pPr algn="ctr"/>
+            <a:r>
+              <a:rPr lang="en-CN" i="1" dirty="0">
+                <a:latin typeface="Times New Roman" panose="02020603050405020304" pitchFamily="18" charset="0"/>
+                <a:cs typeface="Times New Roman" panose="02020603050405020304" pitchFamily="18" charset="0"/>
+              </a:rPr>
+              <a:t>S</a:t>
+            </a:r>
+            <a:endParaRPr lang="en-CN" baseline="-25000" dirty="0"/>
+          </a:p>
+        </p:txBody>
+      </p:sp>
+      <p:sp>
+        <p:nvSpPr>
+          <p:cNvPr id="27" name="Rectangle 26">
+            <a:extLst>
+              <a:ext uri="{FF2B5EF4-FFF2-40B4-BE49-F238E27FC236}">
+                <a16:creationId xmlns:a16="http://schemas.microsoft.com/office/drawing/2014/main" id="{CD49E79A-CB94-FE4E-B73B-1A67EA1AA5CB}"/>
+              </a:ext>
+            </a:extLst>
+          </p:cNvPr>
+          <p:cNvSpPr/>
+          <p:nvPr/>
+        </p:nvSpPr>
+        <p:spPr>
+          <a:xfrm>
+            <a:off x="8219094" y="1460942"/>
+            <a:ext cx="609600" cy="567559"/>
+          </a:xfrm>
+          <a:prstGeom prst="rect">
+            <a:avLst/>
+          </a:prstGeom>
+        </p:spPr>
+        <p:style>
+          <a:lnRef idx="2">
+            <a:schemeClr val="dk1"/>
+          </a:lnRef>
+          <a:fillRef idx="1">
+            <a:schemeClr val="lt1"/>
+          </a:fillRef>
+          <a:effectRef idx="0">
+            <a:schemeClr val="dk1"/>
+          </a:effectRef>
+          <a:fontRef idx="minor">
+            <a:schemeClr val="dk1"/>
+          </a:fontRef>
+        </p:style>
+        <p:txBody>
+          <a:bodyPr rtlCol="0" anchor="ctr"/>
+          <a:lstStyle/>
+          <a:p>
+            <a:pPr algn="ctr"/>
+            <a:r>
+              <a:rPr lang="en-CN" i="1" dirty="0">
+                <a:latin typeface="Times New Roman" panose="02020603050405020304" pitchFamily="18" charset="0"/>
+                <a:cs typeface="Times New Roman" panose="02020603050405020304" pitchFamily="18" charset="0"/>
+              </a:rPr>
+              <a:t>V</a:t>
+            </a:r>
+            <a:endParaRPr lang="en-CN" dirty="0"/>
+          </a:p>
+        </p:txBody>
+      </p:sp>
+      <p:cxnSp>
+        <p:nvCxnSpPr>
+          <p:cNvPr id="28" name="Straight Arrow Connector 27">
+            <a:extLst>
+              <a:ext uri="{FF2B5EF4-FFF2-40B4-BE49-F238E27FC236}">
+                <a16:creationId xmlns:a16="http://schemas.microsoft.com/office/drawing/2014/main" id="{A41D80C4-DEBA-E64F-A3E5-D6CD0B6E0603}"/>
+              </a:ext>
+            </a:extLst>
+          </p:cNvPr>
+          <p:cNvCxnSpPr>
+            <a:cxnSpLocks/>
+            <a:stCxn id="2" idx="3"/>
+            <a:endCxn id="26" idx="0"/>
+          </p:cNvCxnSpPr>
+          <p:nvPr/>
+        </p:nvCxnSpPr>
+        <p:spPr>
+          <a:xfrm>
+            <a:off x="5922583" y="719961"/>
+            <a:ext cx="1991711" cy="740981"/>
+          </a:xfrm>
+          <a:prstGeom prst="straightConnector1">
+            <a:avLst/>
+          </a:prstGeom>
+          <a:ln>
+            <a:tailEnd type="triangle"/>
+          </a:ln>
+        </p:spPr>
+        <p:style>
+          <a:lnRef idx="2">
+            <a:schemeClr val="dk1"/>
+          </a:lnRef>
+          <a:fillRef idx="0">
+            <a:schemeClr val="dk1"/>
+          </a:fillRef>
+          <a:effectRef idx="1">
+            <a:schemeClr val="dk1"/>
+          </a:effectRef>
+          <a:fontRef idx="minor">
+            <a:schemeClr val="tx1"/>
+          </a:fontRef>
+        </p:style>
+      </p:cxnSp>
+      <p:sp>
+        <p:nvSpPr>
+          <p:cNvPr id="31" name="Rectangle 30">
+            <a:extLst>
+              <a:ext uri="{FF2B5EF4-FFF2-40B4-BE49-F238E27FC236}">
+                <a16:creationId xmlns:a16="http://schemas.microsoft.com/office/drawing/2014/main" id="{27B3FDE4-27A7-914E-959E-BFB8B9A3468E}"/>
+              </a:ext>
+            </a:extLst>
+          </p:cNvPr>
+          <p:cNvSpPr/>
+          <p:nvPr/>
+        </p:nvSpPr>
+        <p:spPr>
+          <a:xfrm>
+            <a:off x="5628290" y="2504090"/>
+            <a:ext cx="609600" cy="567559"/>
+          </a:xfrm>
+          <a:prstGeom prst="rect">
+            <a:avLst/>
+          </a:prstGeom>
+        </p:spPr>
+        <p:style>
+          <a:lnRef idx="2">
+            <a:schemeClr val="dk1"/>
+          </a:lnRef>
+          <a:fillRef idx="1">
+            <a:schemeClr val="lt1"/>
+          </a:fillRef>
+          <a:effectRef idx="0">
+            <a:schemeClr val="dk1"/>
+          </a:effectRef>
+          <a:fontRef idx="minor">
+            <a:schemeClr val="dk1"/>
+          </a:fontRef>
+        </p:style>
+        <p:txBody>
+          <a:bodyPr rtlCol="0" anchor="ctr"/>
+          <a:lstStyle/>
+          <a:p>
+            <a:pPr algn="ctr"/>
+            <a:r>
+              <a:rPr lang="en-CN" i="1" dirty="0">
+                <a:latin typeface="Times New Roman" panose="02020603050405020304" pitchFamily="18" charset="0"/>
+                <a:cs typeface="Times New Roman" panose="02020603050405020304" pitchFamily="18" charset="0"/>
+              </a:rPr>
+              <a:t>O</a:t>
+            </a:r>
+            <a:endParaRPr lang="en-CN" baseline="-25000" dirty="0"/>
+          </a:p>
+        </p:txBody>
+      </p:sp>
+      <p:sp>
+        <p:nvSpPr>
+          <p:cNvPr id="32" name="Rectangle 31">
+            <a:extLst>
+              <a:ext uri="{FF2B5EF4-FFF2-40B4-BE49-F238E27FC236}">
+                <a16:creationId xmlns:a16="http://schemas.microsoft.com/office/drawing/2014/main" id="{979A0966-3051-1A47-9422-D80C21388702}"/>
+              </a:ext>
+            </a:extLst>
+          </p:cNvPr>
+          <p:cNvSpPr/>
+          <p:nvPr/>
+        </p:nvSpPr>
+        <p:spPr>
+          <a:xfrm>
+            <a:off x="6237890" y="2504090"/>
+            <a:ext cx="609600" cy="567559"/>
+          </a:xfrm>
+          <a:prstGeom prst="rect">
+            <a:avLst/>
+          </a:prstGeom>
+        </p:spPr>
+        <p:style>
+          <a:lnRef idx="2">
+            <a:schemeClr val="dk1"/>
+          </a:lnRef>
+          <a:fillRef idx="1">
+            <a:schemeClr val="lt1"/>
+          </a:fillRef>
+          <a:effectRef idx="0">
+            <a:schemeClr val="dk1"/>
+          </a:effectRef>
+          <a:fontRef idx="minor">
+            <a:schemeClr val="dk1"/>
+          </a:fontRef>
+        </p:style>
+        <p:txBody>
+          <a:bodyPr rtlCol="0" anchor="ctr"/>
+          <a:lstStyle/>
+          <a:p>
+            <a:pPr algn="ctr"/>
+            <a:r>
+              <a:rPr lang="en-CN" i="1" dirty="0">
+                <a:latin typeface="Times New Roman" panose="02020603050405020304" pitchFamily="18" charset="0"/>
+                <a:cs typeface="Times New Roman" panose="02020603050405020304" pitchFamily="18" charset="0"/>
+              </a:rPr>
+              <a:t>P</a:t>
+            </a:r>
+            <a:endParaRPr lang="en-CN" dirty="0"/>
+          </a:p>
+        </p:txBody>
+      </p:sp>
+      <p:sp>
+        <p:nvSpPr>
+          <p:cNvPr id="33" name="Rectangle 32">
+            <a:extLst>
+              <a:ext uri="{FF2B5EF4-FFF2-40B4-BE49-F238E27FC236}">
+                <a16:creationId xmlns:a16="http://schemas.microsoft.com/office/drawing/2014/main" id="{DE47EA56-C121-3746-8061-E0507145C660}"/>
+              </a:ext>
+            </a:extLst>
+          </p:cNvPr>
+          <p:cNvSpPr/>
+          <p:nvPr/>
+        </p:nvSpPr>
+        <p:spPr>
+          <a:xfrm>
+            <a:off x="6852745" y="2504090"/>
+            <a:ext cx="609600" cy="567559"/>
+          </a:xfrm>
+          <a:prstGeom prst="rect">
+            <a:avLst/>
+          </a:prstGeom>
+        </p:spPr>
+        <p:style>
+          <a:lnRef idx="2">
+            <a:schemeClr val="dk1"/>
+          </a:lnRef>
+          <a:fillRef idx="1">
+            <a:schemeClr val="lt1"/>
+          </a:fillRef>
+          <a:effectRef idx="0">
+            <a:schemeClr val="dk1"/>
+          </a:effectRef>
+          <a:fontRef idx="minor">
+            <a:schemeClr val="dk1"/>
+          </a:fontRef>
+        </p:style>
+        <p:txBody>
+          <a:bodyPr rtlCol="0" anchor="ctr"/>
+          <a:lstStyle/>
+          <a:p>
+            <a:pPr algn="ctr"/>
+            <a:r>
+              <a:rPr lang="en-CN" i="1" dirty="0">
+                <a:latin typeface="Times New Roman" panose="02020603050405020304" pitchFamily="18" charset="0"/>
+                <a:cs typeface="Times New Roman" panose="02020603050405020304" pitchFamily="18" charset="0"/>
+              </a:rPr>
+              <a:t>R</a:t>
+            </a:r>
+            <a:endParaRPr lang="en-CN" dirty="0"/>
+          </a:p>
+        </p:txBody>
+      </p:sp>
+      <p:cxnSp>
+        <p:nvCxnSpPr>
+          <p:cNvPr id="34" name="Straight Arrow Connector 33">
+            <a:extLst>
+              <a:ext uri="{FF2B5EF4-FFF2-40B4-BE49-F238E27FC236}">
+                <a16:creationId xmlns:a16="http://schemas.microsoft.com/office/drawing/2014/main" id="{C0D468F0-FD56-3B4D-9E1F-DA512F7494E1}"/>
+              </a:ext>
+            </a:extLst>
+          </p:cNvPr>
+          <p:cNvCxnSpPr>
+            <a:cxnSpLocks/>
+            <a:stCxn id="26" idx="1"/>
+            <a:endCxn id="32" idx="0"/>
+          </p:cNvCxnSpPr>
+          <p:nvPr/>
+        </p:nvCxnSpPr>
+        <p:spPr>
+          <a:xfrm flipH="1">
+            <a:off x="6542690" y="1744722"/>
+            <a:ext cx="1066804" cy="759368"/>
+          </a:xfrm>
+          <a:prstGeom prst="straightConnector1">
+            <a:avLst/>
+          </a:prstGeom>
+          <a:ln>
+            <a:tailEnd type="triangle"/>
+          </a:ln>
+        </p:spPr>
+        <p:style>
+          <a:lnRef idx="2">
+            <a:schemeClr val="dk1"/>
+          </a:lnRef>
+          <a:fillRef idx="0">
+            <a:schemeClr val="dk1"/>
+          </a:fillRef>
+          <a:effectRef idx="1">
+            <a:schemeClr val="dk1"/>
+          </a:effectRef>
+          <a:fontRef idx="minor">
+            <a:schemeClr val="tx1"/>
+          </a:fontRef>
+        </p:style>
+      </p:cxnSp>
+      <p:sp>
+        <p:nvSpPr>
+          <p:cNvPr id="37" name="Rectangle 36">
+            <a:extLst>
+              <a:ext uri="{FF2B5EF4-FFF2-40B4-BE49-F238E27FC236}">
+                <a16:creationId xmlns:a16="http://schemas.microsoft.com/office/drawing/2014/main" id="{24999C09-DC25-EE48-843C-4A56666A3121}"/>
+              </a:ext>
+            </a:extLst>
+          </p:cNvPr>
+          <p:cNvSpPr/>
+          <p:nvPr/>
+        </p:nvSpPr>
+        <p:spPr>
+          <a:xfrm>
+            <a:off x="7767145" y="2506718"/>
+            <a:ext cx="609600" cy="567559"/>
+          </a:xfrm>
+          <a:prstGeom prst="rect">
+            <a:avLst/>
+          </a:prstGeom>
+        </p:spPr>
+        <p:style>
+          <a:lnRef idx="2">
+            <a:schemeClr val="dk1"/>
+          </a:lnRef>
+          <a:fillRef idx="1">
+            <a:schemeClr val="lt1"/>
+          </a:fillRef>
+          <a:effectRef idx="0">
+            <a:schemeClr val="dk1"/>
+          </a:effectRef>
+          <a:fontRef idx="minor">
+            <a:schemeClr val="dk1"/>
+          </a:fontRef>
+        </p:style>
+        <p:txBody>
+          <a:bodyPr rtlCol="0" anchor="ctr"/>
+          <a:lstStyle/>
+          <a:p>
+            <a:pPr algn="ctr"/>
+            <a:r>
+              <a:rPr lang="en-CN" i="1" dirty="0">
+                <a:latin typeface="Times New Roman" panose="02020603050405020304" pitchFamily="18" charset="0"/>
+                <a:cs typeface="Times New Roman" panose="02020603050405020304" pitchFamily="18" charset="0"/>
+              </a:rPr>
+              <a:t>T</a:t>
+            </a:r>
+            <a:endParaRPr lang="en-CN" dirty="0"/>
+          </a:p>
+        </p:txBody>
+      </p:sp>
+      <p:sp>
+        <p:nvSpPr>
+          <p:cNvPr id="38" name="Rectangle 37">
+            <a:extLst>
+              <a:ext uri="{FF2B5EF4-FFF2-40B4-BE49-F238E27FC236}">
+                <a16:creationId xmlns:a16="http://schemas.microsoft.com/office/drawing/2014/main" id="{A2B382DF-8F36-4340-9CC9-C9AE493B115B}"/>
+              </a:ext>
+            </a:extLst>
+          </p:cNvPr>
+          <p:cNvSpPr/>
+          <p:nvPr/>
+        </p:nvSpPr>
+        <p:spPr>
+          <a:xfrm>
+            <a:off x="8376745" y="2506718"/>
+            <a:ext cx="609600" cy="567559"/>
+          </a:xfrm>
+          <a:prstGeom prst="rect">
+            <a:avLst/>
+          </a:prstGeom>
+        </p:spPr>
+        <p:style>
+          <a:lnRef idx="2">
+            <a:schemeClr val="dk1"/>
+          </a:lnRef>
+          <a:fillRef idx="1">
+            <a:schemeClr val="lt1"/>
+          </a:fillRef>
+          <a:effectRef idx="0">
+            <a:schemeClr val="dk1"/>
+          </a:effectRef>
+          <a:fontRef idx="minor">
+            <a:schemeClr val="dk1"/>
+          </a:fontRef>
+        </p:style>
+        <p:txBody>
+          <a:bodyPr rtlCol="0" anchor="ctr"/>
+          <a:lstStyle/>
+          <a:p>
+            <a:pPr algn="ctr"/>
+            <a:r>
+              <a:rPr lang="en-CN" i="1" dirty="0">
+                <a:latin typeface="Times New Roman" panose="02020603050405020304" pitchFamily="18" charset="0"/>
+                <a:cs typeface="Times New Roman" panose="02020603050405020304" pitchFamily="18" charset="0"/>
+              </a:rPr>
+              <a:t>U</a:t>
+            </a:r>
+            <a:endParaRPr lang="en-CN" dirty="0"/>
+          </a:p>
+        </p:txBody>
+      </p:sp>
+      <p:cxnSp>
+        <p:nvCxnSpPr>
+          <p:cNvPr id="39" name="Straight Arrow Connector 38">
+            <a:extLst>
+              <a:ext uri="{FF2B5EF4-FFF2-40B4-BE49-F238E27FC236}">
+                <a16:creationId xmlns:a16="http://schemas.microsoft.com/office/drawing/2014/main" id="{5F1DDCC3-B70B-2842-9DCD-BE925B51B6D1}"/>
+              </a:ext>
+            </a:extLst>
+          </p:cNvPr>
+          <p:cNvCxnSpPr>
+            <a:cxnSpLocks/>
+            <a:stCxn id="27" idx="1"/>
+            <a:endCxn id="37" idx="0"/>
+          </p:cNvCxnSpPr>
+          <p:nvPr/>
+        </p:nvCxnSpPr>
+        <p:spPr>
+          <a:xfrm flipH="1">
+            <a:off x="8071945" y="1744722"/>
+            <a:ext cx="147149" cy="761996"/>
+          </a:xfrm>
+          <a:prstGeom prst="straightConnector1">
+            <a:avLst/>
+          </a:prstGeom>
+          <a:ln>
+            <a:tailEnd type="triangle"/>
+          </a:ln>
+        </p:spPr>
+        <p:style>
+          <a:lnRef idx="2">
+            <a:schemeClr val="dk1"/>
+          </a:lnRef>
+          <a:fillRef idx="0">
+            <a:schemeClr val="dk1"/>
+          </a:fillRef>
+          <a:effectRef idx="1">
+            <a:schemeClr val="dk1"/>
+          </a:effectRef>
+          <a:fontRef idx="minor">
+            <a:schemeClr val="tx1"/>
+          </a:fontRef>
+        </p:style>
+      </p:cxnSp>
+      <p:sp>
+        <p:nvSpPr>
+          <p:cNvPr id="42" name="Rectangle 41">
+            <a:extLst>
+              <a:ext uri="{FF2B5EF4-FFF2-40B4-BE49-F238E27FC236}">
+                <a16:creationId xmlns:a16="http://schemas.microsoft.com/office/drawing/2014/main" id="{DEE40155-6951-9A45-99E1-AED2D939FC9A}"/>
+              </a:ext>
+            </a:extLst>
+          </p:cNvPr>
+          <p:cNvSpPr/>
+          <p:nvPr/>
+        </p:nvSpPr>
+        <p:spPr>
+          <a:xfrm>
+            <a:off x="9375222" y="2504090"/>
+            <a:ext cx="609600" cy="567559"/>
+          </a:xfrm>
+          <a:prstGeom prst="rect">
+            <a:avLst/>
+          </a:prstGeom>
+        </p:spPr>
+        <p:style>
+          <a:lnRef idx="2">
+            <a:schemeClr val="dk1"/>
+          </a:lnRef>
+          <a:fillRef idx="1">
+            <a:schemeClr val="lt1"/>
+          </a:fillRef>
+          <a:effectRef idx="0">
+            <a:schemeClr val="dk1"/>
+          </a:effectRef>
+          <a:fontRef idx="minor">
+            <a:schemeClr val="dk1"/>
+          </a:fontRef>
+        </p:style>
+        <p:txBody>
+          <a:bodyPr rtlCol="0" anchor="ctr"/>
+          <a:lstStyle/>
+          <a:p>
+            <a:pPr algn="ctr"/>
+            <a:r>
+              <a:rPr lang="en-CN" i="1" dirty="0">
+                <a:latin typeface="Times New Roman" panose="02020603050405020304" pitchFamily="18" charset="0"/>
+                <a:cs typeface="Times New Roman" panose="02020603050405020304" pitchFamily="18" charset="0"/>
+              </a:rPr>
+              <a:t>X</a:t>
+            </a:r>
+            <a:endParaRPr lang="en-CN" baseline="-25000" dirty="0"/>
+          </a:p>
+        </p:txBody>
+      </p:sp>
+      <p:sp>
+        <p:nvSpPr>
+          <p:cNvPr id="43" name="Rectangle 42">
+            <a:extLst>
+              <a:ext uri="{FF2B5EF4-FFF2-40B4-BE49-F238E27FC236}">
+                <a16:creationId xmlns:a16="http://schemas.microsoft.com/office/drawing/2014/main" id="{DD4C910E-6541-094D-BDB5-A79B8D331566}"/>
+              </a:ext>
+            </a:extLst>
+          </p:cNvPr>
+          <p:cNvSpPr/>
+          <p:nvPr/>
+        </p:nvSpPr>
+        <p:spPr>
+          <a:xfrm>
+            <a:off x="9984822" y="2504090"/>
+            <a:ext cx="609600" cy="567559"/>
+          </a:xfrm>
+          <a:prstGeom prst="rect">
+            <a:avLst/>
+          </a:prstGeom>
+        </p:spPr>
+        <p:style>
+          <a:lnRef idx="2">
+            <a:schemeClr val="dk1"/>
+          </a:lnRef>
+          <a:fillRef idx="1">
+            <a:schemeClr val="lt1"/>
+          </a:fillRef>
+          <a:effectRef idx="0">
+            <a:schemeClr val="dk1"/>
+          </a:effectRef>
+          <a:fontRef idx="minor">
+            <a:schemeClr val="dk1"/>
+          </a:fontRef>
+        </p:style>
+        <p:txBody>
+          <a:bodyPr rtlCol="0" anchor="ctr"/>
+          <a:lstStyle/>
+          <a:p>
+            <a:pPr algn="ctr"/>
+            <a:r>
+              <a:rPr lang="en-CN" i="1" dirty="0">
+                <a:latin typeface="Times New Roman" panose="02020603050405020304" pitchFamily="18" charset="0"/>
+                <a:cs typeface="Times New Roman" panose="02020603050405020304" pitchFamily="18" charset="0"/>
+              </a:rPr>
+              <a:t>Y</a:t>
+            </a:r>
+            <a:endParaRPr lang="en-CN" dirty="0"/>
+          </a:p>
+        </p:txBody>
+      </p:sp>
+      <p:sp>
+        <p:nvSpPr>
+          <p:cNvPr id="44" name="Rectangle 43">
+            <a:extLst>
+              <a:ext uri="{FF2B5EF4-FFF2-40B4-BE49-F238E27FC236}">
+                <a16:creationId xmlns:a16="http://schemas.microsoft.com/office/drawing/2014/main" id="{D1A37C86-852B-9B47-B36B-5C785AA12744}"/>
+              </a:ext>
+            </a:extLst>
+          </p:cNvPr>
+          <p:cNvSpPr/>
+          <p:nvPr/>
+        </p:nvSpPr>
+        <p:spPr>
+          <a:xfrm>
+            <a:off x="10599677" y="2504090"/>
+            <a:ext cx="609600" cy="567559"/>
+          </a:xfrm>
+          <a:prstGeom prst="rect">
+            <a:avLst/>
+          </a:prstGeom>
+        </p:spPr>
+        <p:style>
+          <a:lnRef idx="2">
+            <a:schemeClr val="dk1"/>
+          </a:lnRef>
+          <a:fillRef idx="1">
+            <a:schemeClr val="lt1"/>
+          </a:fillRef>
+          <a:effectRef idx="0">
+            <a:schemeClr val="dk1"/>
+          </a:effectRef>
+          <a:fontRef idx="minor">
+            <a:schemeClr val="dk1"/>
+          </a:fontRef>
+        </p:style>
+        <p:txBody>
+          <a:bodyPr rtlCol="0" anchor="ctr"/>
+          <a:lstStyle/>
+          <a:p>
+            <a:pPr algn="ctr"/>
+            <a:r>
+              <a:rPr lang="en-CN" i="1" dirty="0">
+                <a:latin typeface="Times New Roman" panose="02020603050405020304" pitchFamily="18" charset="0"/>
+                <a:cs typeface="Times New Roman" panose="02020603050405020304" pitchFamily="18" charset="0"/>
+              </a:rPr>
+              <a:t>Z</a:t>
+            </a:r>
+            <a:endParaRPr lang="en-CN" dirty="0"/>
+          </a:p>
+        </p:txBody>
+      </p:sp>
+      <p:cxnSp>
+        <p:nvCxnSpPr>
+          <p:cNvPr id="45" name="Straight Arrow Connector 44">
+            <a:extLst>
+              <a:ext uri="{FF2B5EF4-FFF2-40B4-BE49-F238E27FC236}">
+                <a16:creationId xmlns:a16="http://schemas.microsoft.com/office/drawing/2014/main" id="{FF0C289C-6471-DC47-A4D8-7715A096B38C}"/>
+              </a:ext>
+            </a:extLst>
+          </p:cNvPr>
+          <p:cNvCxnSpPr>
+            <a:cxnSpLocks/>
+            <a:stCxn id="27" idx="3"/>
+            <a:endCxn id="43" idx="0"/>
+          </p:cNvCxnSpPr>
+          <p:nvPr/>
+        </p:nvCxnSpPr>
+        <p:spPr>
+          <a:xfrm>
+            <a:off x="8828694" y="1744722"/>
+            <a:ext cx="1460928" cy="759368"/>
+          </a:xfrm>
+          <a:prstGeom prst="straightConnector1">
+            <a:avLst/>
+          </a:prstGeom>
+          <a:ln>
+            <a:tailEnd type="triangle"/>
+          </a:ln>
+        </p:spPr>
+        <p:style>
+          <a:lnRef idx="2">
+            <a:schemeClr val="dk1"/>
+          </a:lnRef>
+          <a:fillRef idx="0">
+            <a:schemeClr val="dk1"/>
+          </a:fillRef>
+          <a:effectRef idx="1">
+            <a:schemeClr val="dk1"/>
+          </a:effectRef>
+          <a:fontRef idx="minor">
+            <a:schemeClr val="tx1"/>
+          </a:fontRef>
+        </p:style>
+      </p:cxnSp>
+      <p:sp>
+        <p:nvSpPr>
+          <p:cNvPr id="56" name="Rectangle 55">
+            <a:extLst>
+              <a:ext uri="{FF2B5EF4-FFF2-40B4-BE49-F238E27FC236}">
+                <a16:creationId xmlns:a16="http://schemas.microsoft.com/office/drawing/2014/main" id="{9423D20F-CF8A-5346-8780-C994C077A3BA}"/>
+              </a:ext>
+            </a:extLst>
+          </p:cNvPr>
+          <p:cNvSpPr/>
+          <p:nvPr/>
+        </p:nvSpPr>
+        <p:spPr>
+          <a:xfrm>
+            <a:off x="4703383" y="4261941"/>
+            <a:ext cx="609600" cy="567559"/>
+          </a:xfrm>
+          <a:prstGeom prst="rect">
+            <a:avLst/>
+          </a:prstGeom>
+        </p:spPr>
+        <p:style>
+          <a:lnRef idx="2">
+            <a:schemeClr val="dk1"/>
+          </a:lnRef>
+          <a:fillRef idx="1">
+            <a:schemeClr val="lt1"/>
+          </a:fillRef>
+          <a:effectRef idx="0">
+            <a:schemeClr val="dk1"/>
+          </a:effectRef>
+          <a:fontRef idx="minor">
+            <a:schemeClr val="dk1"/>
+          </a:fontRef>
+        </p:style>
+        <p:txBody>
+          <a:bodyPr rtlCol="0" anchor="ctr"/>
+          <a:lstStyle/>
+          <a:p>
+            <a:pPr algn="ctr"/>
+            <a:r>
+              <a:rPr lang="en-CN" i="1" dirty="0">
+                <a:latin typeface="Times New Roman" panose="02020603050405020304" pitchFamily="18" charset="0"/>
+                <a:cs typeface="Times New Roman" panose="02020603050405020304" pitchFamily="18" charset="0"/>
+              </a:rPr>
+              <a:t>E</a:t>
+            </a:r>
+            <a:endParaRPr lang="en-CN" dirty="0"/>
+          </a:p>
+        </p:txBody>
+      </p:sp>
+      <p:sp>
+        <p:nvSpPr>
+          <p:cNvPr id="57" name="Rectangle 56">
+            <a:extLst>
+              <a:ext uri="{FF2B5EF4-FFF2-40B4-BE49-F238E27FC236}">
+                <a16:creationId xmlns:a16="http://schemas.microsoft.com/office/drawing/2014/main" id="{FA4DEA9A-1A30-5C43-BB54-23EA620808AA}"/>
+              </a:ext>
+            </a:extLst>
+          </p:cNvPr>
+          <p:cNvSpPr/>
+          <p:nvPr/>
+        </p:nvSpPr>
+        <p:spPr>
+          <a:xfrm>
+            <a:off x="5312983" y="4261941"/>
+            <a:ext cx="609600" cy="567559"/>
+          </a:xfrm>
+          <a:prstGeom prst="rect">
+            <a:avLst/>
+          </a:prstGeom>
+        </p:spPr>
+        <p:style>
+          <a:lnRef idx="2">
+            <a:schemeClr val="dk1"/>
+          </a:lnRef>
+          <a:fillRef idx="1">
+            <a:schemeClr val="lt1"/>
+          </a:fillRef>
+          <a:effectRef idx="0">
+            <a:schemeClr val="dk1"/>
+          </a:effectRef>
+          <a:fontRef idx="minor">
+            <a:schemeClr val="dk1"/>
+          </a:fontRef>
+        </p:style>
+        <p:txBody>
+          <a:bodyPr rtlCol="0" anchor="ctr"/>
+          <a:lstStyle/>
+          <a:p>
+            <a:pPr algn="ctr"/>
+            <a:r>
+              <a:rPr lang="en-CN" i="1" dirty="0">
+                <a:latin typeface="Times New Roman" panose="02020603050405020304" pitchFamily="18" charset="0"/>
+                <a:cs typeface="Times New Roman" panose="02020603050405020304" pitchFamily="18" charset="0"/>
+              </a:rPr>
+              <a:t>O</a:t>
+            </a:r>
+            <a:endParaRPr lang="en-CN" dirty="0"/>
+          </a:p>
+        </p:txBody>
+      </p:sp>
+      <p:sp>
+        <p:nvSpPr>
+          <p:cNvPr id="58" name="Rectangle 57">
+            <a:extLst>
+              <a:ext uri="{FF2B5EF4-FFF2-40B4-BE49-F238E27FC236}">
+                <a16:creationId xmlns:a16="http://schemas.microsoft.com/office/drawing/2014/main" id="{9CD00CC0-1B82-E849-A8AA-8535F56E63D4}"/>
+              </a:ext>
+            </a:extLst>
+          </p:cNvPr>
+          <p:cNvSpPr/>
+          <p:nvPr/>
+        </p:nvSpPr>
+        <p:spPr>
+          <a:xfrm>
+            <a:off x="5927838" y="4261941"/>
+            <a:ext cx="609600" cy="567559"/>
+          </a:xfrm>
+          <a:prstGeom prst="rect">
+            <a:avLst/>
+          </a:prstGeom>
+        </p:spPr>
+        <p:style>
+          <a:lnRef idx="2">
+            <a:schemeClr val="dk1"/>
+          </a:lnRef>
+          <a:fillRef idx="1">
+            <a:schemeClr val="lt1"/>
+          </a:fillRef>
+          <a:effectRef idx="0">
+            <a:schemeClr val="dk1"/>
+          </a:effectRef>
+          <a:fontRef idx="minor">
+            <a:schemeClr val="dk1"/>
+          </a:fontRef>
+        </p:style>
+        <p:txBody>
+          <a:bodyPr rtlCol="0" anchor="ctr"/>
+          <a:lstStyle/>
+          <a:p>
+            <a:pPr algn="ctr"/>
+            <a:r>
+              <a:rPr lang="en-CN" i="1" dirty="0">
+                <a:latin typeface="Times New Roman" panose="02020603050405020304" pitchFamily="18" charset="0"/>
+                <a:cs typeface="Times New Roman" panose="02020603050405020304" pitchFamily="18" charset="0"/>
+              </a:rPr>
+              <a:t>U</a:t>
+            </a:r>
+            <a:endParaRPr lang="en-CN" dirty="0"/>
+          </a:p>
+        </p:txBody>
+      </p:sp>
+      <p:sp>
+        <p:nvSpPr>
+          <p:cNvPr id="62" name="Rectangle 61">
+            <a:extLst>
+              <a:ext uri="{FF2B5EF4-FFF2-40B4-BE49-F238E27FC236}">
+                <a16:creationId xmlns:a16="http://schemas.microsoft.com/office/drawing/2014/main" id="{090FE6E7-5BFB-E440-88C2-70425C14A4AD}"/>
+              </a:ext>
+            </a:extLst>
+          </p:cNvPr>
+          <p:cNvSpPr/>
+          <p:nvPr/>
+        </p:nvSpPr>
+        <p:spPr>
+          <a:xfrm>
+            <a:off x="625374" y="5446991"/>
+            <a:ext cx="609600" cy="567559"/>
+          </a:xfrm>
+          <a:prstGeom prst="rect">
+            <a:avLst/>
+          </a:prstGeom>
+        </p:spPr>
+        <p:style>
+          <a:lnRef idx="2">
+            <a:schemeClr val="dk1"/>
+          </a:lnRef>
+          <a:fillRef idx="1">
+            <a:schemeClr val="lt1"/>
+          </a:fillRef>
+          <a:effectRef idx="0">
+            <a:schemeClr val="dk1"/>
+          </a:effectRef>
+          <a:fontRef idx="minor">
+            <a:schemeClr val="dk1"/>
+          </a:fontRef>
+        </p:style>
+        <p:txBody>
+          <a:bodyPr rtlCol="0" anchor="ctr"/>
+          <a:lstStyle/>
+          <a:p>
+            <a:pPr algn="ctr"/>
+            <a:r>
+              <a:rPr lang="en-CN" i="1" dirty="0">
+                <a:latin typeface="Times New Roman" panose="02020603050405020304" pitchFamily="18" charset="0"/>
+                <a:cs typeface="Times New Roman" panose="02020603050405020304" pitchFamily="18" charset="0"/>
+              </a:rPr>
+              <a:t>A</a:t>
+            </a:r>
+            <a:endParaRPr lang="en-CN" baseline="-25000" dirty="0"/>
+          </a:p>
+        </p:txBody>
+      </p:sp>
+      <p:sp>
+        <p:nvSpPr>
+          <p:cNvPr id="63" name="Rectangle 62">
+            <a:extLst>
+              <a:ext uri="{FF2B5EF4-FFF2-40B4-BE49-F238E27FC236}">
+                <a16:creationId xmlns:a16="http://schemas.microsoft.com/office/drawing/2014/main" id="{E1F91B0B-896E-814F-ACE3-0FC33BF2B5A9}"/>
+              </a:ext>
+            </a:extLst>
+          </p:cNvPr>
+          <p:cNvSpPr/>
+          <p:nvPr/>
+        </p:nvSpPr>
+        <p:spPr>
+          <a:xfrm>
+            <a:off x="1234974" y="5446991"/>
+            <a:ext cx="609600" cy="567559"/>
+          </a:xfrm>
+          <a:prstGeom prst="rect">
+            <a:avLst/>
+          </a:prstGeom>
+        </p:spPr>
+        <p:style>
+          <a:lnRef idx="2">
+            <a:schemeClr val="dk1"/>
+          </a:lnRef>
+          <a:fillRef idx="1">
+            <a:schemeClr val="lt1"/>
+          </a:fillRef>
+          <a:effectRef idx="0">
+            <a:schemeClr val="dk1"/>
+          </a:effectRef>
+          <a:fontRef idx="minor">
+            <a:schemeClr val="dk1"/>
+          </a:fontRef>
+        </p:style>
+        <p:txBody>
+          <a:bodyPr rtlCol="0" anchor="ctr"/>
+          <a:lstStyle/>
+          <a:p>
+            <a:pPr algn="ctr"/>
+            <a:r>
+              <a:rPr lang="en-CN" i="1" dirty="0">
+                <a:latin typeface="Times New Roman" panose="02020603050405020304" pitchFamily="18" charset="0"/>
+                <a:cs typeface="Times New Roman" panose="02020603050405020304" pitchFamily="18" charset="0"/>
+              </a:rPr>
+              <a:t>C</a:t>
+            </a:r>
+            <a:endParaRPr lang="en-CN" dirty="0"/>
+          </a:p>
+        </p:txBody>
+      </p:sp>
+      <p:sp>
+        <p:nvSpPr>
+          <p:cNvPr id="64" name="Rectangle 63">
+            <a:extLst>
+              <a:ext uri="{FF2B5EF4-FFF2-40B4-BE49-F238E27FC236}">
+                <a16:creationId xmlns:a16="http://schemas.microsoft.com/office/drawing/2014/main" id="{65338D33-7187-1A43-953A-04E4758D144B}"/>
+              </a:ext>
+            </a:extLst>
+          </p:cNvPr>
+          <p:cNvSpPr/>
+          <p:nvPr/>
+        </p:nvSpPr>
+        <p:spPr>
+          <a:xfrm>
+            <a:off x="1849829" y="5446991"/>
+            <a:ext cx="609600" cy="567559"/>
+          </a:xfrm>
+          <a:prstGeom prst="rect">
+            <a:avLst/>
+          </a:prstGeom>
+        </p:spPr>
+        <p:style>
+          <a:lnRef idx="2">
+            <a:schemeClr val="dk1"/>
+          </a:lnRef>
+          <a:fillRef idx="1">
+            <a:schemeClr val="lt1"/>
+          </a:fillRef>
+          <a:effectRef idx="0">
+            <a:schemeClr val="dk1"/>
+          </a:effectRef>
+          <a:fontRef idx="minor">
+            <a:schemeClr val="dk1"/>
+          </a:fontRef>
+        </p:style>
+        <p:txBody>
+          <a:bodyPr rtlCol="0" anchor="ctr"/>
+          <a:lstStyle/>
+          <a:p>
+            <a:pPr algn="ctr"/>
+            <a:r>
+              <a:rPr lang="en-CN" i="1" dirty="0">
+                <a:latin typeface="Times New Roman" panose="02020603050405020304" pitchFamily="18" charset="0"/>
+                <a:cs typeface="Times New Roman" panose="02020603050405020304" pitchFamily="18" charset="0"/>
+              </a:rPr>
+              <a:t>D</a:t>
+            </a:r>
+            <a:endParaRPr lang="en-CN" dirty="0"/>
+          </a:p>
+        </p:txBody>
+      </p:sp>
+      <p:cxnSp>
+        <p:nvCxnSpPr>
+          <p:cNvPr id="65" name="Straight Arrow Connector 64">
+            <a:extLst>
+              <a:ext uri="{FF2B5EF4-FFF2-40B4-BE49-F238E27FC236}">
+                <a16:creationId xmlns:a16="http://schemas.microsoft.com/office/drawing/2014/main" id="{36D26703-E758-7142-BD81-3A965EC872DE}"/>
+              </a:ext>
+            </a:extLst>
+          </p:cNvPr>
+          <p:cNvCxnSpPr>
+            <a:cxnSpLocks/>
+            <a:stCxn id="56" idx="1"/>
+            <a:endCxn id="63" idx="0"/>
+          </p:cNvCxnSpPr>
+          <p:nvPr/>
+        </p:nvCxnSpPr>
+        <p:spPr>
+          <a:xfrm flipH="1">
+            <a:off x="1539774" y="4545721"/>
+            <a:ext cx="3163609" cy="901270"/>
+          </a:xfrm>
+          <a:prstGeom prst="straightConnector1">
+            <a:avLst/>
+          </a:prstGeom>
+          <a:ln>
+            <a:tailEnd type="triangle"/>
+          </a:ln>
+        </p:spPr>
+        <p:style>
+          <a:lnRef idx="2">
+            <a:schemeClr val="dk1"/>
+          </a:lnRef>
+          <a:fillRef idx="0">
+            <a:schemeClr val="dk1"/>
+          </a:fillRef>
+          <a:effectRef idx="1">
+            <a:schemeClr val="dk1"/>
+          </a:effectRef>
+          <a:fontRef idx="minor">
+            <a:schemeClr val="tx1"/>
+          </a:fontRef>
+        </p:style>
+      </p:cxnSp>
+      <p:sp>
+        <p:nvSpPr>
+          <p:cNvPr id="68" name="Rectangle 67">
+            <a:extLst>
+              <a:ext uri="{FF2B5EF4-FFF2-40B4-BE49-F238E27FC236}">
+                <a16:creationId xmlns:a16="http://schemas.microsoft.com/office/drawing/2014/main" id="{8EBCBA69-D63A-EA48-B1F1-AF7D33CC426D}"/>
+              </a:ext>
+            </a:extLst>
+          </p:cNvPr>
+          <p:cNvSpPr/>
+          <p:nvPr/>
+        </p:nvSpPr>
+        <p:spPr>
+          <a:xfrm>
+            <a:off x="2795777" y="5439096"/>
+            <a:ext cx="609600" cy="567559"/>
+          </a:xfrm>
+          <a:prstGeom prst="rect">
+            <a:avLst/>
+          </a:prstGeom>
+        </p:spPr>
+        <p:style>
+          <a:lnRef idx="2">
+            <a:schemeClr val="dk1"/>
+          </a:lnRef>
+          <a:fillRef idx="1">
+            <a:schemeClr val="lt1"/>
+          </a:fillRef>
+          <a:effectRef idx="0">
+            <a:schemeClr val="dk1"/>
+          </a:effectRef>
+          <a:fontRef idx="minor">
+            <a:schemeClr val="dk1"/>
+          </a:fontRef>
+        </p:style>
+        <p:txBody>
+          <a:bodyPr rtlCol="0" anchor="ctr"/>
+          <a:lstStyle/>
+          <a:p>
+            <a:pPr algn="ctr"/>
+            <a:r>
+              <a:rPr lang="en-CN" i="1" dirty="0">
+                <a:latin typeface="Times New Roman" panose="02020603050405020304" pitchFamily="18" charset="0"/>
+                <a:cs typeface="Times New Roman" panose="02020603050405020304" pitchFamily="18" charset="0"/>
+              </a:rPr>
+              <a:t>G</a:t>
+            </a:r>
+            <a:endParaRPr lang="en-CN" baseline="-25000" dirty="0"/>
+          </a:p>
+        </p:txBody>
+      </p:sp>
+      <p:sp>
+        <p:nvSpPr>
+          <p:cNvPr id="69" name="Rectangle 68">
+            <a:extLst>
+              <a:ext uri="{FF2B5EF4-FFF2-40B4-BE49-F238E27FC236}">
+                <a16:creationId xmlns:a16="http://schemas.microsoft.com/office/drawing/2014/main" id="{C08BD5ED-4D5A-974B-A302-013890A87C89}"/>
+              </a:ext>
+            </a:extLst>
+          </p:cNvPr>
+          <p:cNvSpPr/>
+          <p:nvPr/>
+        </p:nvSpPr>
+        <p:spPr>
+          <a:xfrm>
+            <a:off x="3405377" y="5439096"/>
+            <a:ext cx="609600" cy="567559"/>
+          </a:xfrm>
+          <a:prstGeom prst="rect">
+            <a:avLst/>
+          </a:prstGeom>
+        </p:spPr>
+        <p:style>
+          <a:lnRef idx="2">
+            <a:schemeClr val="dk1"/>
+          </a:lnRef>
+          <a:fillRef idx="1">
+            <a:schemeClr val="lt1"/>
+          </a:fillRef>
+          <a:effectRef idx="0">
+            <a:schemeClr val="dk1"/>
+          </a:effectRef>
+          <a:fontRef idx="minor">
+            <a:schemeClr val="dk1"/>
+          </a:fontRef>
+        </p:style>
+        <p:txBody>
+          <a:bodyPr rtlCol="0" anchor="ctr"/>
+          <a:lstStyle/>
+          <a:p>
+            <a:pPr algn="ctr"/>
+            <a:r>
+              <a:rPr lang="en-CN" i="1" dirty="0">
+                <a:latin typeface="Times New Roman" panose="02020603050405020304" pitchFamily="18" charset="0"/>
+                <a:cs typeface="Times New Roman" panose="02020603050405020304" pitchFamily="18" charset="0"/>
+              </a:rPr>
+              <a:t>J</a:t>
+            </a:r>
+            <a:endParaRPr lang="en-CN" dirty="0"/>
+          </a:p>
+        </p:txBody>
+      </p:sp>
+      <p:sp>
+        <p:nvSpPr>
+          <p:cNvPr id="70" name="Rectangle 69">
+            <a:extLst>
+              <a:ext uri="{FF2B5EF4-FFF2-40B4-BE49-F238E27FC236}">
+                <a16:creationId xmlns:a16="http://schemas.microsoft.com/office/drawing/2014/main" id="{3A6F608B-8A40-5B48-8B91-836F0CE5012A}"/>
+              </a:ext>
+            </a:extLst>
+          </p:cNvPr>
+          <p:cNvSpPr/>
+          <p:nvPr/>
+        </p:nvSpPr>
+        <p:spPr>
+          <a:xfrm>
+            <a:off x="4624593" y="5439091"/>
+            <a:ext cx="609600" cy="567559"/>
+          </a:xfrm>
+          <a:prstGeom prst="rect">
+            <a:avLst/>
+          </a:prstGeom>
+        </p:spPr>
+        <p:style>
+          <a:lnRef idx="2">
+            <a:schemeClr val="dk1"/>
+          </a:lnRef>
+          <a:fillRef idx="1">
+            <a:schemeClr val="lt1"/>
+          </a:fillRef>
+          <a:effectRef idx="0">
+            <a:schemeClr val="dk1"/>
+          </a:effectRef>
+          <a:fontRef idx="minor">
+            <a:schemeClr val="dk1"/>
+          </a:fontRef>
+        </p:style>
+        <p:txBody>
+          <a:bodyPr rtlCol="0" anchor="ctr"/>
+          <a:lstStyle/>
+          <a:p>
+            <a:pPr algn="ctr"/>
+            <a:r>
+              <a:rPr lang="en-CN" i="1" dirty="0">
+                <a:latin typeface="Times New Roman" panose="02020603050405020304" pitchFamily="18" charset="0"/>
+                <a:cs typeface="Times New Roman" panose="02020603050405020304" pitchFamily="18" charset="0"/>
+              </a:rPr>
+              <a:t>M</a:t>
+            </a:r>
+            <a:endParaRPr lang="en-CN" dirty="0"/>
+          </a:p>
+        </p:txBody>
+      </p:sp>
+      <p:sp>
+        <p:nvSpPr>
+          <p:cNvPr id="71" name="Rectangle 70">
+            <a:extLst>
+              <a:ext uri="{FF2B5EF4-FFF2-40B4-BE49-F238E27FC236}">
+                <a16:creationId xmlns:a16="http://schemas.microsoft.com/office/drawing/2014/main" id="{7CD90A3C-8261-A941-B880-52BC4F8451B4}"/>
+              </a:ext>
+            </a:extLst>
+          </p:cNvPr>
+          <p:cNvSpPr/>
+          <p:nvPr/>
+        </p:nvSpPr>
+        <p:spPr>
+          <a:xfrm>
+            <a:off x="5239448" y="5439090"/>
+            <a:ext cx="609600" cy="567559"/>
+          </a:xfrm>
+          <a:prstGeom prst="rect">
+            <a:avLst/>
+          </a:prstGeom>
+        </p:spPr>
+        <p:style>
+          <a:lnRef idx="2">
+            <a:schemeClr val="dk1"/>
+          </a:lnRef>
+          <a:fillRef idx="1">
+            <a:schemeClr val="lt1"/>
+          </a:fillRef>
+          <a:effectRef idx="0">
+            <a:schemeClr val="dk1"/>
+          </a:effectRef>
+          <a:fontRef idx="minor">
+            <a:schemeClr val="dk1"/>
+          </a:fontRef>
+        </p:style>
+        <p:txBody>
+          <a:bodyPr rtlCol="0" anchor="ctr"/>
+          <a:lstStyle/>
+          <a:p>
+            <a:pPr algn="ctr"/>
+            <a:r>
+              <a:rPr lang="en-CN" i="1" dirty="0">
+                <a:latin typeface="Times New Roman" panose="02020603050405020304" pitchFamily="18" charset="0"/>
+                <a:cs typeface="Times New Roman" panose="02020603050405020304" pitchFamily="18" charset="0"/>
+              </a:rPr>
+              <a:t>N</a:t>
+            </a:r>
+            <a:endParaRPr lang="en-CN" dirty="0"/>
+          </a:p>
+        </p:txBody>
+      </p:sp>
+      <p:sp>
+        <p:nvSpPr>
+          <p:cNvPr id="72" name="Rectangle 71">
+            <a:extLst>
+              <a:ext uri="{FF2B5EF4-FFF2-40B4-BE49-F238E27FC236}">
+                <a16:creationId xmlns:a16="http://schemas.microsoft.com/office/drawing/2014/main" id="{1634E758-81D7-0847-A479-300B81D75709}"/>
+              </a:ext>
+            </a:extLst>
+          </p:cNvPr>
+          <p:cNvSpPr/>
+          <p:nvPr/>
+        </p:nvSpPr>
+        <p:spPr>
+          <a:xfrm>
+            <a:off x="4014977" y="5439089"/>
+            <a:ext cx="609600" cy="567559"/>
+          </a:xfrm>
+          <a:prstGeom prst="rect">
+            <a:avLst/>
+          </a:prstGeom>
+        </p:spPr>
+        <p:style>
+          <a:lnRef idx="2">
+            <a:schemeClr val="dk1"/>
+          </a:lnRef>
+          <a:fillRef idx="1">
+            <a:schemeClr val="lt1"/>
+          </a:fillRef>
+          <a:effectRef idx="0">
+            <a:schemeClr val="dk1"/>
+          </a:effectRef>
+          <a:fontRef idx="minor">
+            <a:schemeClr val="dk1"/>
+          </a:fontRef>
+        </p:style>
+        <p:txBody>
+          <a:bodyPr rtlCol="0" anchor="ctr"/>
+          <a:lstStyle/>
+          <a:p>
+            <a:pPr algn="ctr"/>
+            <a:r>
+              <a:rPr lang="en-CN" i="1" dirty="0">
+                <a:latin typeface="Times New Roman" panose="02020603050405020304" pitchFamily="18" charset="0"/>
+                <a:cs typeface="Times New Roman" panose="02020603050405020304" pitchFamily="18" charset="0"/>
+              </a:rPr>
+              <a:t>K</a:t>
+            </a:r>
+            <a:endParaRPr lang="en-CN" dirty="0"/>
+          </a:p>
+        </p:txBody>
+      </p:sp>
+      <p:cxnSp>
+        <p:nvCxnSpPr>
+          <p:cNvPr id="73" name="Straight Arrow Connector 72">
+            <a:extLst>
+              <a:ext uri="{FF2B5EF4-FFF2-40B4-BE49-F238E27FC236}">
+                <a16:creationId xmlns:a16="http://schemas.microsoft.com/office/drawing/2014/main" id="{9777C0A5-7090-9E48-B447-EA10071667C6}"/>
+              </a:ext>
+            </a:extLst>
+          </p:cNvPr>
+          <p:cNvCxnSpPr>
+            <a:cxnSpLocks/>
+            <a:stCxn id="57" idx="1"/>
+            <a:endCxn id="72" idx="0"/>
+          </p:cNvCxnSpPr>
+          <p:nvPr/>
+        </p:nvCxnSpPr>
+        <p:spPr>
+          <a:xfrm flipH="1">
+            <a:off x="4319777" y="4545721"/>
+            <a:ext cx="993206" cy="893368"/>
+          </a:xfrm>
+          <a:prstGeom prst="straightConnector1">
+            <a:avLst/>
+          </a:prstGeom>
+          <a:ln>
+            <a:tailEnd type="triangle"/>
+          </a:ln>
+        </p:spPr>
+        <p:style>
+          <a:lnRef idx="2">
+            <a:schemeClr val="dk1"/>
+          </a:lnRef>
+          <a:fillRef idx="0">
+            <a:schemeClr val="dk1"/>
+          </a:fillRef>
+          <a:effectRef idx="1">
+            <a:schemeClr val="dk1"/>
+          </a:effectRef>
+          <a:fontRef idx="minor">
+            <a:schemeClr val="tx1"/>
+          </a:fontRef>
+        </p:style>
+      </p:cxnSp>
+      <p:sp>
+        <p:nvSpPr>
+          <p:cNvPr id="76" name="Rectangle 75">
+            <a:extLst>
+              <a:ext uri="{FF2B5EF4-FFF2-40B4-BE49-F238E27FC236}">
+                <a16:creationId xmlns:a16="http://schemas.microsoft.com/office/drawing/2014/main" id="{FE4078DE-13A3-B848-8266-9FF2D1CDC444}"/>
+              </a:ext>
+            </a:extLst>
+          </p:cNvPr>
+          <p:cNvSpPr/>
+          <p:nvPr/>
+        </p:nvSpPr>
+        <p:spPr>
+          <a:xfrm>
+            <a:off x="6288024" y="5439100"/>
+            <a:ext cx="609600" cy="567559"/>
+          </a:xfrm>
+          <a:prstGeom prst="rect">
+            <a:avLst/>
+          </a:prstGeom>
+        </p:spPr>
+        <p:style>
+          <a:lnRef idx="2">
+            <a:schemeClr val="dk1"/>
+          </a:lnRef>
+          <a:fillRef idx="1">
+            <a:schemeClr val="lt1"/>
+          </a:fillRef>
+          <a:effectRef idx="0">
+            <a:schemeClr val="dk1"/>
+          </a:effectRef>
+          <a:fontRef idx="minor">
+            <a:schemeClr val="dk1"/>
+          </a:fontRef>
+        </p:style>
+        <p:txBody>
+          <a:bodyPr rtlCol="0" anchor="ctr"/>
+          <a:lstStyle/>
+          <a:p>
+            <a:pPr algn="ctr"/>
+            <a:r>
+              <a:rPr lang="en-CN" i="1" dirty="0">
+                <a:latin typeface="Times New Roman" panose="02020603050405020304" pitchFamily="18" charset="0"/>
+                <a:cs typeface="Times New Roman" panose="02020603050405020304" pitchFamily="18" charset="0"/>
+              </a:rPr>
+              <a:t>P</a:t>
+            </a:r>
+            <a:endParaRPr lang="en-CN" dirty="0"/>
+          </a:p>
+        </p:txBody>
+      </p:sp>
+      <p:sp>
+        <p:nvSpPr>
+          <p:cNvPr id="77" name="Rectangle 76">
+            <a:extLst>
+              <a:ext uri="{FF2B5EF4-FFF2-40B4-BE49-F238E27FC236}">
+                <a16:creationId xmlns:a16="http://schemas.microsoft.com/office/drawing/2014/main" id="{CE6C8E6A-62DB-8A41-8B4F-424F0058CCB6}"/>
+              </a:ext>
+            </a:extLst>
+          </p:cNvPr>
+          <p:cNvSpPr/>
+          <p:nvPr/>
+        </p:nvSpPr>
+        <p:spPr>
+          <a:xfrm>
+            <a:off x="7507240" y="5439095"/>
+            <a:ext cx="609600" cy="567559"/>
+          </a:xfrm>
+          <a:prstGeom prst="rect">
+            <a:avLst/>
+          </a:prstGeom>
+        </p:spPr>
+        <p:style>
+          <a:lnRef idx="2">
+            <a:schemeClr val="dk1"/>
+          </a:lnRef>
+          <a:fillRef idx="1">
+            <a:schemeClr val="lt1"/>
+          </a:fillRef>
+          <a:effectRef idx="0">
+            <a:schemeClr val="dk1"/>
+          </a:effectRef>
+          <a:fontRef idx="minor">
+            <a:schemeClr val="dk1"/>
+          </a:fontRef>
+        </p:style>
+        <p:txBody>
+          <a:bodyPr rtlCol="0" anchor="ctr"/>
+          <a:lstStyle/>
+          <a:p>
+            <a:pPr algn="ctr"/>
+            <a:r>
+              <a:rPr lang="en-CN" i="1" dirty="0">
+                <a:latin typeface="Times New Roman" panose="02020603050405020304" pitchFamily="18" charset="0"/>
+                <a:cs typeface="Times New Roman" panose="02020603050405020304" pitchFamily="18" charset="0"/>
+              </a:rPr>
+              <a:t>S</a:t>
+            </a:r>
+            <a:endParaRPr lang="en-CN" dirty="0"/>
+          </a:p>
+        </p:txBody>
+      </p:sp>
+      <p:sp>
+        <p:nvSpPr>
+          <p:cNvPr id="78" name="Rectangle 77">
+            <a:extLst>
+              <a:ext uri="{FF2B5EF4-FFF2-40B4-BE49-F238E27FC236}">
+                <a16:creationId xmlns:a16="http://schemas.microsoft.com/office/drawing/2014/main" id="{DEE14EAC-365C-4948-88EA-0FD31E66B279}"/>
+              </a:ext>
+            </a:extLst>
+          </p:cNvPr>
+          <p:cNvSpPr/>
+          <p:nvPr/>
+        </p:nvSpPr>
+        <p:spPr>
+          <a:xfrm>
+            <a:off x="8122095" y="5439094"/>
+            <a:ext cx="609600" cy="567559"/>
+          </a:xfrm>
+          <a:prstGeom prst="rect">
+            <a:avLst/>
+          </a:prstGeom>
+        </p:spPr>
+        <p:style>
+          <a:lnRef idx="2">
+            <a:schemeClr val="dk1"/>
+          </a:lnRef>
+          <a:fillRef idx="1">
+            <a:schemeClr val="lt1"/>
+          </a:fillRef>
+          <a:effectRef idx="0">
+            <a:schemeClr val="dk1"/>
+          </a:effectRef>
+          <a:fontRef idx="minor">
+            <a:schemeClr val="dk1"/>
+          </a:fontRef>
+        </p:style>
+        <p:txBody>
+          <a:bodyPr rtlCol="0" anchor="ctr"/>
+          <a:lstStyle/>
+          <a:p>
+            <a:pPr algn="ctr"/>
+            <a:r>
+              <a:rPr lang="en-CN" i="1" dirty="0">
+                <a:latin typeface="Times New Roman" panose="02020603050405020304" pitchFamily="18" charset="0"/>
+                <a:cs typeface="Times New Roman" panose="02020603050405020304" pitchFamily="18" charset="0"/>
+              </a:rPr>
+              <a:t>T</a:t>
+            </a:r>
+            <a:endParaRPr lang="en-CN" dirty="0"/>
+          </a:p>
+        </p:txBody>
+      </p:sp>
+      <p:sp>
+        <p:nvSpPr>
+          <p:cNvPr id="79" name="Rectangle 78">
+            <a:extLst>
+              <a:ext uri="{FF2B5EF4-FFF2-40B4-BE49-F238E27FC236}">
+                <a16:creationId xmlns:a16="http://schemas.microsoft.com/office/drawing/2014/main" id="{CBD0DC26-7CDD-C846-A018-87F470BDCF18}"/>
+              </a:ext>
+            </a:extLst>
+          </p:cNvPr>
+          <p:cNvSpPr/>
+          <p:nvPr/>
+        </p:nvSpPr>
+        <p:spPr>
+          <a:xfrm>
+            <a:off x="6897624" y="5439093"/>
+            <a:ext cx="609600" cy="567559"/>
+          </a:xfrm>
+          <a:prstGeom prst="rect">
+            <a:avLst/>
+          </a:prstGeom>
+        </p:spPr>
+        <p:style>
+          <a:lnRef idx="2">
+            <a:schemeClr val="dk1"/>
+          </a:lnRef>
+          <a:fillRef idx="1">
+            <a:schemeClr val="lt1"/>
+          </a:fillRef>
+          <a:effectRef idx="0">
+            <a:schemeClr val="dk1"/>
+          </a:effectRef>
+          <a:fontRef idx="minor">
+            <a:schemeClr val="dk1"/>
+          </a:fontRef>
+        </p:style>
+        <p:txBody>
+          <a:bodyPr rtlCol="0" anchor="ctr"/>
+          <a:lstStyle/>
+          <a:p>
+            <a:pPr algn="ctr"/>
+            <a:r>
+              <a:rPr lang="en-CN" i="1" dirty="0">
+                <a:latin typeface="Times New Roman" panose="02020603050405020304" pitchFamily="18" charset="0"/>
+                <a:cs typeface="Times New Roman" panose="02020603050405020304" pitchFamily="18" charset="0"/>
+              </a:rPr>
+              <a:t>R</a:t>
+            </a:r>
+            <a:endParaRPr lang="en-CN" dirty="0"/>
+          </a:p>
+        </p:txBody>
+      </p:sp>
+      <p:cxnSp>
+        <p:nvCxnSpPr>
+          <p:cNvPr id="80" name="Straight Arrow Connector 79">
+            <a:extLst>
+              <a:ext uri="{FF2B5EF4-FFF2-40B4-BE49-F238E27FC236}">
+                <a16:creationId xmlns:a16="http://schemas.microsoft.com/office/drawing/2014/main" id="{617FCE5D-F105-C449-A106-10D970BF8E1E}"/>
+              </a:ext>
+            </a:extLst>
+          </p:cNvPr>
+          <p:cNvCxnSpPr>
+            <a:cxnSpLocks/>
+            <a:stCxn id="58" idx="1"/>
+            <a:endCxn id="79" idx="0"/>
+          </p:cNvCxnSpPr>
+          <p:nvPr/>
+        </p:nvCxnSpPr>
+        <p:spPr>
+          <a:xfrm>
+            <a:off x="5927838" y="4545721"/>
+            <a:ext cx="1274586" cy="893372"/>
+          </a:xfrm>
+          <a:prstGeom prst="straightConnector1">
+            <a:avLst/>
+          </a:prstGeom>
+          <a:ln>
+            <a:tailEnd type="triangle"/>
+          </a:ln>
+        </p:spPr>
+        <p:style>
+          <a:lnRef idx="2">
+            <a:schemeClr val="dk1"/>
+          </a:lnRef>
+          <a:fillRef idx="0">
+            <a:schemeClr val="dk1"/>
+          </a:fillRef>
+          <a:effectRef idx="1">
+            <a:schemeClr val="dk1"/>
+          </a:effectRef>
+          <a:fontRef idx="minor">
+            <a:schemeClr val="tx1"/>
+          </a:fontRef>
+        </p:style>
+      </p:cxnSp>
+      <p:sp>
+        <p:nvSpPr>
+          <p:cNvPr id="84" name="Rectangle 83">
+            <a:extLst>
+              <a:ext uri="{FF2B5EF4-FFF2-40B4-BE49-F238E27FC236}">
+                <a16:creationId xmlns:a16="http://schemas.microsoft.com/office/drawing/2014/main" id="{EC9B4849-825A-1F48-865B-D78ADB90EEF2}"/>
+              </a:ext>
+            </a:extLst>
+          </p:cNvPr>
+          <p:cNvSpPr/>
+          <p:nvPr/>
+        </p:nvSpPr>
+        <p:spPr>
+          <a:xfrm>
+            <a:off x="9133465" y="5439095"/>
+            <a:ext cx="609600" cy="567559"/>
+          </a:xfrm>
+          <a:prstGeom prst="rect">
+            <a:avLst/>
+          </a:prstGeom>
+        </p:spPr>
+        <p:style>
+          <a:lnRef idx="2">
+            <a:schemeClr val="dk1"/>
+          </a:lnRef>
+          <a:fillRef idx="1">
+            <a:schemeClr val="lt1"/>
+          </a:fillRef>
+          <a:effectRef idx="0">
+            <a:schemeClr val="dk1"/>
+          </a:effectRef>
+          <a:fontRef idx="minor">
+            <a:schemeClr val="dk1"/>
+          </a:fontRef>
+        </p:style>
+        <p:txBody>
+          <a:bodyPr rtlCol="0" anchor="ctr"/>
+          <a:lstStyle/>
+          <a:p>
+            <a:pPr algn="ctr"/>
+            <a:r>
+              <a:rPr lang="en-CN" i="1" dirty="0">
+                <a:latin typeface="Times New Roman" panose="02020603050405020304" pitchFamily="18" charset="0"/>
+                <a:cs typeface="Times New Roman" panose="02020603050405020304" pitchFamily="18" charset="0"/>
+              </a:rPr>
+              <a:t>V</a:t>
+            </a:r>
+            <a:endParaRPr lang="en-CN" dirty="0"/>
+          </a:p>
+        </p:txBody>
+      </p:sp>
+      <p:sp>
+        <p:nvSpPr>
+          <p:cNvPr id="85" name="Rectangle 84">
+            <a:extLst>
+              <a:ext uri="{FF2B5EF4-FFF2-40B4-BE49-F238E27FC236}">
+                <a16:creationId xmlns:a16="http://schemas.microsoft.com/office/drawing/2014/main" id="{61C604FC-4197-DE45-8AD2-D94A6C6E468A}"/>
+              </a:ext>
+            </a:extLst>
+          </p:cNvPr>
+          <p:cNvSpPr/>
+          <p:nvPr/>
+        </p:nvSpPr>
+        <p:spPr>
+          <a:xfrm>
+            <a:off x="10352681" y="5439090"/>
+            <a:ext cx="609600" cy="567559"/>
+          </a:xfrm>
+          <a:prstGeom prst="rect">
+            <a:avLst/>
+          </a:prstGeom>
+        </p:spPr>
+        <p:style>
+          <a:lnRef idx="2">
+            <a:schemeClr val="dk1"/>
+          </a:lnRef>
+          <a:fillRef idx="1">
+            <a:schemeClr val="lt1"/>
+          </a:fillRef>
+          <a:effectRef idx="0">
+            <a:schemeClr val="dk1"/>
+          </a:effectRef>
+          <a:fontRef idx="minor">
+            <a:schemeClr val="dk1"/>
+          </a:fontRef>
+        </p:style>
+        <p:txBody>
+          <a:bodyPr rtlCol="0" anchor="ctr"/>
+          <a:lstStyle/>
+          <a:p>
+            <a:pPr algn="ctr"/>
+            <a:r>
+              <a:rPr lang="en-CN" i="1" dirty="0">
+                <a:latin typeface="Times New Roman" panose="02020603050405020304" pitchFamily="18" charset="0"/>
+                <a:cs typeface="Times New Roman" panose="02020603050405020304" pitchFamily="18" charset="0"/>
+              </a:rPr>
+              <a:t>Y</a:t>
+            </a:r>
+            <a:endParaRPr lang="en-CN" dirty="0"/>
+          </a:p>
+        </p:txBody>
+      </p:sp>
+      <p:sp>
+        <p:nvSpPr>
+          <p:cNvPr id="86" name="Rectangle 85">
+            <a:extLst>
+              <a:ext uri="{FF2B5EF4-FFF2-40B4-BE49-F238E27FC236}">
+                <a16:creationId xmlns:a16="http://schemas.microsoft.com/office/drawing/2014/main" id="{FDD3EFE1-B4BB-A548-A237-03E2DDEFDA19}"/>
+              </a:ext>
+            </a:extLst>
+          </p:cNvPr>
+          <p:cNvSpPr/>
+          <p:nvPr/>
+        </p:nvSpPr>
+        <p:spPr>
+          <a:xfrm>
+            <a:off x="10967536" y="5439089"/>
+            <a:ext cx="609600" cy="567559"/>
+          </a:xfrm>
+          <a:prstGeom prst="rect">
+            <a:avLst/>
+          </a:prstGeom>
+        </p:spPr>
+        <p:style>
+          <a:lnRef idx="2">
+            <a:schemeClr val="dk1"/>
+          </a:lnRef>
+          <a:fillRef idx="1">
+            <a:schemeClr val="lt1"/>
+          </a:fillRef>
+          <a:effectRef idx="0">
+            <a:schemeClr val="dk1"/>
+          </a:effectRef>
+          <a:fontRef idx="minor">
+            <a:schemeClr val="dk1"/>
+          </a:fontRef>
+        </p:style>
+        <p:txBody>
+          <a:bodyPr rtlCol="0" anchor="ctr"/>
+          <a:lstStyle/>
+          <a:p>
+            <a:pPr algn="ctr"/>
+            <a:r>
+              <a:rPr lang="en-CN" i="1" dirty="0">
+                <a:latin typeface="Times New Roman" panose="02020603050405020304" pitchFamily="18" charset="0"/>
+                <a:cs typeface="Times New Roman" panose="02020603050405020304" pitchFamily="18" charset="0"/>
+              </a:rPr>
+              <a:t>Z</a:t>
+            </a:r>
+            <a:endParaRPr lang="en-CN" dirty="0"/>
+          </a:p>
+        </p:txBody>
+      </p:sp>
+      <p:sp>
+        <p:nvSpPr>
+          <p:cNvPr id="87" name="Rectangle 86">
+            <a:extLst>
+              <a:ext uri="{FF2B5EF4-FFF2-40B4-BE49-F238E27FC236}">
+                <a16:creationId xmlns:a16="http://schemas.microsoft.com/office/drawing/2014/main" id="{6535384A-EACF-3047-91A4-00BDC72FCB16}"/>
+              </a:ext>
+            </a:extLst>
+          </p:cNvPr>
+          <p:cNvSpPr/>
+          <p:nvPr/>
+        </p:nvSpPr>
+        <p:spPr>
+          <a:xfrm>
+            <a:off x="9743065" y="5439088"/>
+            <a:ext cx="609600" cy="567559"/>
+          </a:xfrm>
+          <a:prstGeom prst="rect">
+            <a:avLst/>
+          </a:prstGeom>
+        </p:spPr>
+        <p:style>
+          <a:lnRef idx="2">
+            <a:schemeClr val="dk1"/>
+          </a:lnRef>
+          <a:fillRef idx="1">
+            <a:schemeClr val="lt1"/>
+          </a:fillRef>
+          <a:effectRef idx="0">
+            <a:schemeClr val="dk1"/>
+          </a:effectRef>
+          <a:fontRef idx="minor">
+            <a:schemeClr val="dk1"/>
+          </a:fontRef>
+        </p:style>
+        <p:txBody>
+          <a:bodyPr rtlCol="0" anchor="ctr"/>
+          <a:lstStyle/>
+          <a:p>
+            <a:pPr algn="ctr"/>
+            <a:r>
+              <a:rPr lang="en-CN" i="1" dirty="0">
+                <a:latin typeface="Times New Roman" panose="02020603050405020304" pitchFamily="18" charset="0"/>
+                <a:cs typeface="Times New Roman" panose="02020603050405020304" pitchFamily="18" charset="0"/>
+              </a:rPr>
+              <a:t>X</a:t>
+            </a:r>
+            <a:endParaRPr lang="en-CN" dirty="0"/>
+          </a:p>
+        </p:txBody>
+      </p:sp>
+      <p:cxnSp>
+        <p:nvCxnSpPr>
+          <p:cNvPr id="88" name="Straight Arrow Connector 87">
+            <a:extLst>
+              <a:ext uri="{FF2B5EF4-FFF2-40B4-BE49-F238E27FC236}">
+                <a16:creationId xmlns:a16="http://schemas.microsoft.com/office/drawing/2014/main" id="{61454A3E-AAE3-774D-BB76-D69743BFBF87}"/>
+              </a:ext>
+            </a:extLst>
+          </p:cNvPr>
+          <p:cNvCxnSpPr>
+            <a:cxnSpLocks/>
+            <a:stCxn id="58" idx="3"/>
+            <a:endCxn id="87" idx="0"/>
+          </p:cNvCxnSpPr>
+          <p:nvPr/>
+        </p:nvCxnSpPr>
+        <p:spPr>
+          <a:xfrm>
+            <a:off x="6537438" y="4545721"/>
+            <a:ext cx="3510427" cy="893367"/>
+          </a:xfrm>
+          <a:prstGeom prst="straightConnector1">
+            <a:avLst/>
+          </a:prstGeom>
+          <a:ln>
+            <a:tailEnd type="triangle"/>
+          </a:ln>
+        </p:spPr>
+        <p:style>
+          <a:lnRef idx="2">
+            <a:schemeClr val="dk1"/>
+          </a:lnRef>
+          <a:fillRef idx="0">
+            <a:schemeClr val="dk1"/>
+          </a:fillRef>
+          <a:effectRef idx="1">
+            <a:schemeClr val="dk1"/>
+          </a:effectRef>
+          <a:fontRef idx="minor">
+            <a:schemeClr val="tx1"/>
+          </a:fontRef>
+        </p:style>
+      </p:cxnSp>
+    </p:spTree>
+    <p:extLst>
+      <p:ext uri="{BB962C8B-B14F-4D97-AF65-F5344CB8AC3E}">
+        <p14:creationId xmlns:p14="http://schemas.microsoft.com/office/powerpoint/2010/main" val="3713032337"/>
+      </p:ext>
+    </p:extLst>
+  </p:cSld>
+  <p:clrMapOvr>
+    <a:masterClrMapping/>
+  </p:clrMapOvr>
+</p:sld>
+</file>
+
 <file path=ppt/theme/theme1.xml><?xml version="1.0" encoding="utf-8"?>
 <a:theme xmlns:a="http://schemas.openxmlformats.org/drawingml/2006/main" name="Office Theme">
   <a:themeElements>
@@ -8047,4 +11264,299 @@
     </a:ext>
   </a:extLst>
 </a:theme>
+</file>
+
+<file path=ppt/theme/theme2.xml><?xml version="1.0" encoding="utf-8"?>
+<a:theme xmlns:a="http://schemas.openxmlformats.org/drawingml/2006/main" name="Office Theme">
+  <a:themeElements>
+    <a:clrScheme name="Office">
+      <a:dk1>
+        <a:sysClr val="windowText" lastClr="000000"/>
+      </a:dk1>
+      <a:lt1>
+        <a:sysClr val="window" lastClr="FFFFFF"/>
+      </a:lt1>
+      <a:dk2>
+        <a:srgbClr val="44546A"/>
+      </a:dk2>
+      <a:lt2>
+        <a:srgbClr val="E7E6E6"/>
+      </a:lt2>
+      <a:accent1>
+        <a:srgbClr val="4472C4"/>
+      </a:accent1>
+      <a:accent2>
+        <a:srgbClr val="ED7D31"/>
+      </a:accent2>
+      <a:accent3>
+        <a:srgbClr val="A5A5A5"/>
+      </a:accent3>
+      <a:accent4>
+        <a:srgbClr val="FFC000"/>
+      </a:accent4>
+      <a:accent5>
+        <a:srgbClr val="5B9BD5"/>
+      </a:accent5>
+      <a:accent6>
+        <a:srgbClr val="70AD47"/>
+      </a:accent6>
+      <a:hlink>
+        <a:srgbClr val="0563C1"/>
+      </a:hlink>
+      <a:folHlink>
+        <a:srgbClr val="954F72"/>
+      </a:folHlink>
+    </a:clrScheme>
+    <a:fontScheme name="Office">
+      <a:majorFont>
+        <a:latin typeface="Calibri Light" panose="020F0302020204030204"/>
+        <a:ea typeface=""/>
+        <a:cs typeface=""/>
+        <a:font script="Jpan" typeface="游ゴシック Light"/>
+        <a:font script="Hang" typeface="맑은 고딕"/>
+        <a:font script="Hans" typeface="等线 Light"/>
+        <a:font script="Hant" typeface="新細明體"/>
+        <a:font script="Arab" typeface="Times New Roman"/>
+        <a:font script="Hebr" typeface="Times New Roman"/>
+        <a:font script="Thai" typeface="Angsana New"/>
+        <a:font script="Ethi" typeface="Nyala"/>
+        <a:font script="Beng" typeface="Vrinda"/>
+        <a:font script="Gujr" typeface="Shruti"/>
+        <a:font script="Khmr" typeface="MoolBoran"/>
+        <a:font script="Knda" typeface="Tunga"/>
+        <a:font script="Guru" typeface="Raavi"/>
+        <a:font script="Cans" typeface="Euphemia"/>
+        <a:font script="Cher" typeface="Plantagenet Cherokee"/>
+        <a:font script="Yiii" typeface="Microsoft Yi Baiti"/>
+        <a:font script="Tibt" typeface="Microsoft Himalaya"/>
+        <a:font script="Thaa" typeface="MV Boli"/>
+        <a:font script="Deva" typeface="Mangal"/>
+        <a:font script="Telu" typeface="Gautami"/>
+        <a:font script="Taml" typeface="Latha"/>
+        <a:font script="Syrc" typeface="Estrangelo Edessa"/>
+        <a:font script="Orya" typeface="Kalinga"/>
+        <a:font script="Mlym" typeface="Kartika"/>
+        <a:font script="Laoo" typeface="DokChampa"/>
+        <a:font script="Sinh" typeface="Iskoola Pota"/>
+        <a:font script="Mong" typeface="Mongolian Baiti"/>
+        <a:font script="Viet" typeface="Times New Roman"/>
+        <a:font script="Uigh" typeface="Microsoft Uighur"/>
+        <a:font script="Geor" typeface="Sylfaen"/>
+        <a:font script="Armn" typeface="Arial"/>
+        <a:font script="Bugi" typeface="Leelawadee UI"/>
+        <a:font script="Bopo" typeface="Microsoft JhengHei"/>
+        <a:font script="Java" typeface="Javanese Text"/>
+        <a:font script="Lisu" typeface="Segoe UI"/>
+        <a:font script="Mymr" typeface="Myanmar Text"/>
+        <a:font script="Nkoo" typeface="Ebrima"/>
+        <a:font script="Olck" typeface="Nirmala UI"/>
+        <a:font script="Osma" typeface="Ebrima"/>
+        <a:font script="Phag" typeface="Phagspa"/>
+        <a:font script="Syrn" typeface="Estrangelo Edessa"/>
+        <a:font script="Syrj" typeface="Estrangelo Edessa"/>
+        <a:font script="Syre" typeface="Estrangelo Edessa"/>
+        <a:font script="Sora" typeface="Nirmala UI"/>
+        <a:font script="Tale" typeface="Microsoft Tai Le"/>
+        <a:font script="Talu" typeface="Microsoft New Tai Lue"/>
+        <a:font script="Tfng" typeface="Ebrima"/>
+      </a:majorFont>
+      <a:minorFont>
+        <a:latin typeface="Calibri" panose="020F0502020204030204"/>
+        <a:ea typeface=""/>
+        <a:cs typeface=""/>
+        <a:font script="Jpan" typeface="游ゴシック"/>
+        <a:font script="Hang" typeface="맑은 고딕"/>
+        <a:font script="Hans" typeface="等线"/>
+        <a:font script="Hant" typeface="新細明體"/>
+        <a:font script="Arab" typeface="Arial"/>
+        <a:font script="Hebr" typeface="Arial"/>
+        <a:font script="Thai" typeface="Cordia New"/>
+        <a:font script="Ethi" typeface="Nyala"/>
+        <a:font script="Beng" typeface="Vrinda"/>
+        <a:font script="Gujr" typeface="Shruti"/>
+        <a:font script="Khmr" typeface="DaunPenh"/>
+        <a:font script="Knda" typeface="Tunga"/>
+        <a:font script="Guru" typeface="Raavi"/>
+        <a:font script="Cans" typeface="Euphemia"/>
+        <a:font script="Cher" typeface="Plantagenet Cherokee"/>
+        <a:font script="Yiii" typeface="Microsoft Yi Baiti"/>
+        <a:font script="Tibt" typeface="Microsoft Himalaya"/>
+        <a:font script="Thaa" typeface="MV Boli"/>
+        <a:font script="Deva" typeface="Mangal"/>
+        <a:font script="Telu" typeface="Gautami"/>
+        <a:font script="Taml" typeface="Latha"/>
+        <a:font script="Syrc" typeface="Estrangelo Edessa"/>
+        <a:font script="Orya" typeface="Kalinga"/>
+        <a:font script="Mlym" typeface="Kartika"/>
+        <a:font script="Laoo" typeface="DokChampa"/>
+        <a:font script="Sinh" typeface="Iskoola Pota"/>
+        <a:font script="Mong" typeface="Mongolian Baiti"/>
+        <a:font script="Viet" typeface="Arial"/>
+        <a:font script="Uigh" typeface="Microsoft Uighur"/>
+        <a:font script="Geor" typeface="Sylfaen"/>
+        <a:font script="Armn" typeface="Arial"/>
+        <a:font script="Bugi" typeface="Leelawadee UI"/>
+        <a:font script="Bopo" typeface="Microsoft JhengHei"/>
+        <a:font script="Java" typeface="Javanese Text"/>
+        <a:font script="Lisu" typeface="Segoe UI"/>
+        <a:font script="Mymr" typeface="Myanmar Text"/>
+        <a:font script="Nkoo" typeface="Ebrima"/>
+        <a:font script="Olck" typeface="Nirmala UI"/>
+        <a:font script="Osma" typeface="Ebrima"/>
+        <a:font script="Phag" typeface="Phagspa"/>
+        <a:font script="Syrn" typeface="Estrangelo Edessa"/>
+        <a:font script="Syrj" typeface="Estrangelo Edessa"/>
+        <a:font script="Syre" typeface="Estrangelo Edessa"/>
+        <a:font script="Sora" typeface="Nirmala UI"/>
+        <a:font script="Tale" typeface="Microsoft Tai Le"/>
+        <a:font script="Talu" typeface="Microsoft New Tai Lue"/>
+        <a:font script="Tfng" typeface="Ebrima"/>
+      </a:minorFont>
+    </a:fontScheme>
+    <a:fmtScheme name="Office">
+      <a:fillStyleLst>
+        <a:solidFill>
+          <a:schemeClr val="phClr"/>
+        </a:solidFill>
+        <a:gradFill rotWithShape="1">
+          <a:gsLst>
+            <a:gs pos="0">
+              <a:schemeClr val="phClr">
+                <a:lumMod val="110000"/>
+                <a:satMod val="105000"/>
+                <a:tint val="67000"/>
+              </a:schemeClr>
+            </a:gs>
+            <a:gs pos="50000">
+              <a:schemeClr val="phClr">
+                <a:lumMod val="105000"/>
+                <a:satMod val="103000"/>
+                <a:tint val="73000"/>
+              </a:schemeClr>
+            </a:gs>
+            <a:gs pos="100000">
+              <a:schemeClr val="phClr">
+                <a:lumMod val="105000"/>
+                <a:satMod val="109000"/>
+                <a:tint val="81000"/>
+              </a:schemeClr>
+            </a:gs>
+          </a:gsLst>
+          <a:lin ang="5400000" scaled="0"/>
+        </a:gradFill>
+        <a:gradFill rotWithShape="1">
+          <a:gsLst>
+            <a:gs pos="0">
+              <a:schemeClr val="phClr">
+                <a:satMod val="103000"/>
+                <a:lumMod val="102000"/>
+                <a:tint val="94000"/>
+              </a:schemeClr>
+            </a:gs>
+            <a:gs pos="50000">
+              <a:schemeClr val="phClr">
+                <a:satMod val="110000"/>
+                <a:lumMod val="100000"/>
+                <a:shade val="100000"/>
+              </a:schemeClr>
+            </a:gs>
+            <a:gs pos="100000">
+              <a:schemeClr val="phClr">
+                <a:lumMod val="99000"/>
+                <a:satMod val="120000"/>
+                <a:shade val="78000"/>
+              </a:schemeClr>
+            </a:gs>
+          </a:gsLst>
+          <a:lin ang="5400000" scaled="0"/>
+        </a:gradFill>
+      </a:fillStyleLst>
+      <a:lnStyleLst>
+        <a:ln w="6350" cap="flat" cmpd="sng" algn="ctr">
+          <a:solidFill>
+            <a:schemeClr val="phClr"/>
+          </a:solidFill>
+          <a:prstDash val="solid"/>
+          <a:miter lim="800000"/>
+        </a:ln>
+        <a:ln w="12700" cap="flat" cmpd="sng" algn="ctr">
+          <a:solidFill>
+            <a:schemeClr val="phClr"/>
+          </a:solidFill>
+          <a:prstDash val="solid"/>
+          <a:miter lim="800000"/>
+        </a:ln>
+        <a:ln w="19050" cap="flat" cmpd="sng" algn="ctr">
+          <a:solidFill>
+            <a:schemeClr val="phClr"/>
+          </a:solidFill>
+          <a:prstDash val="solid"/>
+          <a:miter lim="800000"/>
+        </a:ln>
+      </a:lnStyleLst>
+      <a:effectStyleLst>
+        <a:effectStyle>
+          <a:effectLst/>
+        </a:effectStyle>
+        <a:effectStyle>
+          <a:effectLst/>
+        </a:effectStyle>
+        <a:effectStyle>
+          <a:effectLst>
+            <a:outerShdw blurRad="57150" dist="19050" dir="5400000" algn="ctr" rotWithShape="0">
+              <a:srgbClr val="000000">
+                <a:alpha val="63000"/>
+              </a:srgbClr>
+            </a:outerShdw>
+          </a:effectLst>
+        </a:effectStyle>
+      </a:effectStyleLst>
+      <a:bgFillStyleLst>
+        <a:solidFill>
+          <a:schemeClr val="phClr"/>
+        </a:solidFill>
+        <a:solidFill>
+          <a:schemeClr val="phClr">
+            <a:tint val="95000"/>
+            <a:satMod val="170000"/>
+          </a:schemeClr>
+        </a:solidFill>
+        <a:gradFill rotWithShape="1">
+          <a:gsLst>
+            <a:gs pos="0">
+              <a:schemeClr val="phClr">
+                <a:tint val="93000"/>
+                <a:satMod val="150000"/>
+                <a:shade val="98000"/>
+                <a:lumMod val="102000"/>
+              </a:schemeClr>
+            </a:gs>
+            <a:gs pos="50000">
+              <a:schemeClr val="phClr">
+                <a:tint val="98000"/>
+                <a:satMod val="130000"/>
+                <a:shade val="90000"/>
+                <a:lumMod val="103000"/>
+              </a:schemeClr>
+            </a:gs>
+            <a:gs pos="100000">
+              <a:schemeClr val="phClr">
+                <a:shade val="63000"/>
+                <a:satMod val="120000"/>
+              </a:schemeClr>
+            </a:gs>
+          </a:gsLst>
+          <a:lin ang="5400000" scaled="0"/>
+        </a:gradFill>
+      </a:bgFillStyleLst>
+    </a:fmtScheme>
+  </a:themeElements>
+  <a:objectDefaults/>
+  <a:extraClrSchemeLst/>
+  <a:extLst>
+    <a:ext uri="{05A4C25C-085E-4340-85A3-A5531E510DB2}">
+      <thm15:themeFamily xmlns:thm15="http://schemas.microsoft.com/office/thememl/2012/main" name="Office Theme" id="{62F939B6-93AF-4DB8-9C6B-D6C7DFDC589F}" vid="{4A3C46E8-61CC-4603-A589-7422A47A8E4A}"/>
+    </a:ext>
+  </a:extLst>
+</a:theme>
 </file>
</xml_diff>

<commit_message>
Rewrite B-tree, added paired lists (EN)
</commit_message>
<xml_diff>
--- a/datastruct/tree/B-tree/img/btrees.pptx
+++ b/datastruct/tree/B-tree/img/btrees.pptx
@@ -5,13 +5,14 @@
     <p:sldMasterId id="2147483648" r:id="rId1"/>
   </p:sldMasterIdLst>
   <p:notesMasterIdLst>
-    <p:notesMasterId r:id="rId6"/>
+    <p:notesMasterId r:id="rId7"/>
   </p:notesMasterIdLst>
   <p:sldIdLst>
     <p:sldId id="256" r:id="rId2"/>
     <p:sldId id="257" r:id="rId3"/>
     <p:sldId id="258" r:id="rId4"/>
     <p:sldId id="259" r:id="rId5"/>
+    <p:sldId id="260" r:id="rId6"/>
   </p:sldIdLst>
   <p:sldSz cx="12192000" cy="6858000"/>
   <p:notesSz cx="6858000" cy="9144000"/>
@@ -802,11 +803,7 @@
             </a:pPr>
             <a:r>
               <a:rPr lang="en-US" dirty="0"/>
-              <a:t>B-tree of degree degree 3 </a:t>
-            </a:r>
-            <a:r>
-              <a:rPr lang="en-US"/>
-              <a:t>from "GMPXACDEJKNORSTUVYZ”</a:t>
+              <a:t>B-tree of degree degree 3 from "GMPXACDEJKNORSTUVYZ”</a:t>
             </a:r>
           </a:p>
         </p:txBody>
@@ -838,6 +835,93 @@
     <p:extLst>
       <p:ext uri="{BB962C8B-B14F-4D97-AF65-F5344CB8AC3E}">
         <p14:creationId xmlns:p14="http://schemas.microsoft.com/office/powerpoint/2010/main" val="1755267421"/>
+      </p:ext>
+    </p:extLst>
+  </p:cSld>
+  <p:clrMapOvr>
+    <a:masterClrMapping/>
+  </p:clrMapOvr>
+</p:notes>
+</file>
+
+<file path=ppt/notesSlides/notesSlide5.xml><?xml version="1.0" encoding="utf-8"?>
+<p:notes xmlns:a="http://schemas.openxmlformats.org/drawingml/2006/main" xmlns:r="http://schemas.openxmlformats.org/officeDocument/2006/relationships" xmlns:p="http://schemas.openxmlformats.org/presentationml/2006/main">
+  <p:cSld>
+    <p:spTree>
+      <p:nvGrpSpPr>
+        <p:cNvPr id="1" name=""/>
+        <p:cNvGrpSpPr/>
+        <p:nvPr/>
+      </p:nvGrpSpPr>
+      <p:grpSpPr>
+        <a:xfrm>
+          <a:off x="0" y="0"/>
+          <a:ext cx="0" cy="0"/>
+          <a:chOff x="0" y="0"/>
+          <a:chExt cx="0" cy="0"/>
+        </a:xfrm>
+      </p:grpSpPr>
+      <p:sp>
+        <p:nvSpPr>
+          <p:cNvPr id="2" name="Slide Image Placeholder 1"/>
+          <p:cNvSpPr>
+            <a:spLocks noGrp="1" noRot="1" noChangeAspect="1"/>
+          </p:cNvSpPr>
+          <p:nvPr>
+            <p:ph type="sldImg"/>
+          </p:nvPr>
+        </p:nvSpPr>
+        <p:spPr/>
+      </p:sp>
+      <p:sp>
+        <p:nvSpPr>
+          <p:cNvPr id="3" name="Notes Placeholder 2"/>
+          <p:cNvSpPr>
+            <a:spLocks noGrp="1"/>
+          </p:cNvSpPr>
+          <p:nvPr>
+            <p:ph type="body" idx="1"/>
+          </p:nvPr>
+        </p:nvSpPr>
+        <p:spPr/>
+        <p:txBody>
+          <a:bodyPr/>
+          <a:lstStyle/>
+          <a:p>
+            <a:r>
+              <a:rPr lang="en-CN" dirty="0"/>
+              <a:t>Partition</a:t>
+            </a:r>
+          </a:p>
+        </p:txBody>
+      </p:sp>
+      <p:sp>
+        <p:nvSpPr>
+          <p:cNvPr id="4" name="Slide Number Placeholder 3"/>
+          <p:cNvSpPr>
+            <a:spLocks noGrp="1"/>
+          </p:cNvSpPr>
+          <p:nvPr>
+            <p:ph type="sldNum" sz="quarter" idx="5"/>
+          </p:nvPr>
+        </p:nvSpPr>
+        <p:spPr/>
+        <p:txBody>
+          <a:bodyPr/>
+          <a:lstStyle/>
+          <a:p>
+            <a:fld id="{86C81B2F-A610-2949-B9DC-A3E483DF43DC}" type="slidenum">
+              <a:rPr lang="en-CN" smtClean="0"/>
+              <a:t>5</a:t>
+            </a:fld>
+            <a:endParaRPr lang="en-CN"/>
+          </a:p>
+        </p:txBody>
+      </p:sp>
+    </p:spTree>
+    <p:extLst>
+      <p:ext uri="{BB962C8B-B14F-4D97-AF65-F5344CB8AC3E}">
+        <p14:creationId xmlns:p14="http://schemas.microsoft.com/office/powerpoint/2010/main" val="4260781987"/>
       </p:ext>
     </p:extLst>
   </p:cSld>
@@ -5507,6 +5591,13 @@
               </a:rPr>
               <a:t>m</a:t>
             </a:r>
+            <a:r>
+              <a:rPr lang="en-CN" baseline="-25000" dirty="0">
+                <a:latin typeface="Times New Roman" panose="02020603050405020304" pitchFamily="18" charset="0"/>
+                <a:cs typeface="Times New Roman" panose="02020603050405020304" pitchFamily="18" charset="0"/>
+              </a:rPr>
+              <a:t>+1</a:t>
+            </a:r>
             <a:endParaRPr lang="en-CN" baseline="-25000" dirty="0"/>
           </a:p>
         </p:txBody>
@@ -6773,15 +6864,12 @@
                 <a:latin typeface="Times New Roman" panose="02020603050405020304" pitchFamily="18" charset="0"/>
                 <a:cs typeface="Times New Roman" panose="02020603050405020304" pitchFamily="18" charset="0"/>
               </a:rPr>
-              <a:t>i+</a:t>
-            </a:r>
-            <a:r>
-              <a:rPr lang="en-CN" baseline="-25000" dirty="0">
-                <a:latin typeface="Times New Roman" panose="02020603050405020304" pitchFamily="18" charset="0"/>
-                <a:cs typeface="Times New Roman" panose="02020603050405020304" pitchFamily="18" charset="0"/>
-              </a:rPr>
-              <a:t>1</a:t>
-            </a:r>
+              <a:t>i</a:t>
+            </a:r>
+            <a:endParaRPr lang="en-CN" baseline="-25000" dirty="0">
+              <a:latin typeface="Times New Roman" panose="02020603050405020304" pitchFamily="18" charset="0"/>
+              <a:cs typeface="Times New Roman" panose="02020603050405020304" pitchFamily="18" charset="0"/>
+            </a:endParaRPr>
           </a:p>
         </p:txBody>
       </p:sp>
@@ -10962,6 +11050,1842 @@
     <p:extLst>
       <p:ext uri="{BB962C8B-B14F-4D97-AF65-F5344CB8AC3E}">
         <p14:creationId xmlns:p14="http://schemas.microsoft.com/office/powerpoint/2010/main" val="3713032337"/>
+      </p:ext>
+    </p:extLst>
+  </p:cSld>
+  <p:clrMapOvr>
+    <a:masterClrMapping/>
+  </p:clrMapOvr>
+</p:sld>
+</file>
+
+<file path=ppt/slides/slide5.xml><?xml version="1.0" encoding="utf-8"?>
+<p:sld xmlns:a="http://schemas.openxmlformats.org/drawingml/2006/main" xmlns:r="http://schemas.openxmlformats.org/officeDocument/2006/relationships" xmlns:p="http://schemas.openxmlformats.org/presentationml/2006/main">
+  <p:cSld>
+    <p:spTree>
+      <p:nvGrpSpPr>
+        <p:cNvPr id="1" name=""/>
+        <p:cNvGrpSpPr/>
+        <p:nvPr/>
+      </p:nvGrpSpPr>
+      <p:grpSpPr>
+        <a:xfrm>
+          <a:off x="0" y="0"/>
+          <a:ext cx="0" cy="0"/>
+          <a:chOff x="0" y="0"/>
+          <a:chExt cx="0" cy="0"/>
+        </a:xfrm>
+      </p:grpSpPr>
+      <p:sp>
+        <p:nvSpPr>
+          <p:cNvPr id="3" name="Rectangle 2">
+            <a:extLst>
+              <a:ext uri="{FF2B5EF4-FFF2-40B4-BE49-F238E27FC236}">
+                <a16:creationId xmlns:a16="http://schemas.microsoft.com/office/drawing/2014/main" id="{B5459B50-ACE7-C344-AD18-962652055465}"/>
+              </a:ext>
+            </a:extLst>
+          </p:cNvPr>
+          <p:cNvSpPr/>
+          <p:nvPr/>
+        </p:nvSpPr>
+        <p:spPr>
+          <a:xfrm>
+            <a:off x="2438413" y="530771"/>
+            <a:ext cx="609600" cy="567559"/>
+          </a:xfrm>
+          <a:prstGeom prst="rect">
+            <a:avLst/>
+          </a:prstGeom>
+        </p:spPr>
+        <p:style>
+          <a:lnRef idx="2">
+            <a:schemeClr val="dk1"/>
+          </a:lnRef>
+          <a:fillRef idx="1">
+            <a:schemeClr val="lt1"/>
+          </a:fillRef>
+          <a:effectRef idx="0">
+            <a:schemeClr val="dk1"/>
+          </a:effectRef>
+          <a:fontRef idx="minor">
+            <a:schemeClr val="dk1"/>
+          </a:fontRef>
+        </p:style>
+        <p:txBody>
+          <a:bodyPr rtlCol="0" anchor="ctr"/>
+          <a:lstStyle/>
+          <a:p>
+            <a:pPr algn="ctr"/>
+            <a:r>
+              <a:rPr lang="en-CN" i="1" dirty="0">
+                <a:latin typeface="Times New Roman" panose="02020603050405020304" pitchFamily="18" charset="0"/>
+                <a:cs typeface="Times New Roman" panose="02020603050405020304" pitchFamily="18" charset="0"/>
+              </a:rPr>
+              <a:t>k</a:t>
+            </a:r>
+            <a:r>
+              <a:rPr lang="en-CN" baseline="-25000" dirty="0"/>
+              <a:t>1</a:t>
+            </a:r>
+          </a:p>
+        </p:txBody>
+      </p:sp>
+      <p:sp>
+        <p:nvSpPr>
+          <p:cNvPr id="4" name="Rectangle 3">
+            <a:extLst>
+              <a:ext uri="{FF2B5EF4-FFF2-40B4-BE49-F238E27FC236}">
+                <a16:creationId xmlns:a16="http://schemas.microsoft.com/office/drawing/2014/main" id="{20826EA8-8C02-5F42-9159-14BB2DCA1ABC}"/>
+              </a:ext>
+            </a:extLst>
+          </p:cNvPr>
+          <p:cNvSpPr/>
+          <p:nvPr/>
+        </p:nvSpPr>
+        <p:spPr>
+          <a:xfrm>
+            <a:off x="3048013" y="530771"/>
+            <a:ext cx="609600" cy="567559"/>
+          </a:xfrm>
+          <a:prstGeom prst="rect">
+            <a:avLst/>
+          </a:prstGeom>
+        </p:spPr>
+        <p:style>
+          <a:lnRef idx="2">
+            <a:schemeClr val="dk1"/>
+          </a:lnRef>
+          <a:fillRef idx="1">
+            <a:schemeClr val="lt1"/>
+          </a:fillRef>
+          <a:effectRef idx="0">
+            <a:schemeClr val="dk1"/>
+          </a:effectRef>
+          <a:fontRef idx="minor">
+            <a:schemeClr val="dk1"/>
+          </a:fontRef>
+        </p:style>
+        <p:txBody>
+          <a:bodyPr rtlCol="0" anchor="ctr"/>
+          <a:lstStyle/>
+          <a:p>
+            <a:pPr algn="ctr"/>
+            <a:r>
+              <a:rPr lang="en-CN" dirty="0">
+                <a:latin typeface="Times New Roman" panose="02020603050405020304" pitchFamily="18" charset="0"/>
+                <a:cs typeface="Times New Roman" panose="02020603050405020304" pitchFamily="18" charset="0"/>
+              </a:rPr>
+              <a:t>…</a:t>
+            </a:r>
+          </a:p>
+        </p:txBody>
+      </p:sp>
+      <p:sp>
+        <p:nvSpPr>
+          <p:cNvPr id="5" name="Rectangle 4">
+            <a:extLst>
+              <a:ext uri="{FF2B5EF4-FFF2-40B4-BE49-F238E27FC236}">
+                <a16:creationId xmlns:a16="http://schemas.microsoft.com/office/drawing/2014/main" id="{7A86A469-3E50-D349-BD13-3D7C56301A40}"/>
+              </a:ext>
+            </a:extLst>
+          </p:cNvPr>
+          <p:cNvSpPr/>
+          <p:nvPr/>
+        </p:nvSpPr>
+        <p:spPr>
+          <a:xfrm>
+            <a:off x="3657613" y="530771"/>
+            <a:ext cx="609600" cy="567559"/>
+          </a:xfrm>
+          <a:prstGeom prst="rect">
+            <a:avLst/>
+          </a:prstGeom>
+        </p:spPr>
+        <p:style>
+          <a:lnRef idx="2">
+            <a:schemeClr val="dk1"/>
+          </a:lnRef>
+          <a:fillRef idx="1">
+            <a:schemeClr val="lt1"/>
+          </a:fillRef>
+          <a:effectRef idx="0">
+            <a:schemeClr val="dk1"/>
+          </a:effectRef>
+          <a:fontRef idx="minor">
+            <a:schemeClr val="dk1"/>
+          </a:fontRef>
+        </p:style>
+        <p:txBody>
+          <a:bodyPr rtlCol="0" anchor="ctr"/>
+          <a:lstStyle/>
+          <a:p>
+            <a:pPr algn="ctr"/>
+            <a:r>
+              <a:rPr lang="en-US" i="1" dirty="0">
+                <a:latin typeface="Times New Roman" panose="02020603050405020304" pitchFamily="18" charset="0"/>
+                <a:cs typeface="Times New Roman" panose="02020603050405020304" pitchFamily="18" charset="0"/>
+              </a:rPr>
+              <a:t>k</a:t>
+            </a:r>
+            <a:r>
+              <a:rPr lang="en-CN" i="1" baseline="-25000" dirty="0">
+                <a:latin typeface="Times New Roman" panose="02020603050405020304" pitchFamily="18" charset="0"/>
+                <a:cs typeface="Times New Roman" panose="02020603050405020304" pitchFamily="18" charset="0"/>
+              </a:rPr>
+              <a:t>i</a:t>
+            </a:r>
+            <a:r>
+              <a:rPr lang="en-CN" baseline="-25000" dirty="0"/>
+              <a:t>-1</a:t>
+            </a:r>
+          </a:p>
+        </p:txBody>
+      </p:sp>
+      <p:sp>
+        <p:nvSpPr>
+          <p:cNvPr id="6" name="Rectangle 5">
+            <a:extLst>
+              <a:ext uri="{FF2B5EF4-FFF2-40B4-BE49-F238E27FC236}">
+                <a16:creationId xmlns:a16="http://schemas.microsoft.com/office/drawing/2014/main" id="{B27DD51C-43F2-FC4A-B0DE-1799D03FE106}"/>
+              </a:ext>
+            </a:extLst>
+          </p:cNvPr>
+          <p:cNvSpPr/>
+          <p:nvPr/>
+        </p:nvSpPr>
+        <p:spPr>
+          <a:xfrm>
+            <a:off x="7189094" y="530770"/>
+            <a:ext cx="609600" cy="567559"/>
+          </a:xfrm>
+          <a:prstGeom prst="rect">
+            <a:avLst/>
+          </a:prstGeom>
+        </p:spPr>
+        <p:style>
+          <a:lnRef idx="2">
+            <a:schemeClr val="dk1"/>
+          </a:lnRef>
+          <a:fillRef idx="1">
+            <a:schemeClr val="lt1"/>
+          </a:fillRef>
+          <a:effectRef idx="0">
+            <a:schemeClr val="dk1"/>
+          </a:effectRef>
+          <a:fontRef idx="minor">
+            <a:schemeClr val="dk1"/>
+          </a:fontRef>
+        </p:style>
+        <p:txBody>
+          <a:bodyPr rtlCol="0" anchor="ctr"/>
+          <a:lstStyle/>
+          <a:p>
+            <a:pPr algn="ctr"/>
+            <a:r>
+              <a:rPr lang="en-US" i="1" dirty="0">
+                <a:latin typeface="Times New Roman" panose="02020603050405020304" pitchFamily="18" charset="0"/>
+                <a:cs typeface="Times New Roman" panose="02020603050405020304" pitchFamily="18" charset="0"/>
+              </a:rPr>
+              <a:t>k</a:t>
+            </a:r>
+            <a:r>
+              <a:rPr lang="en-CN" i="1" baseline="-25000" dirty="0">
+                <a:latin typeface="Times New Roman" panose="02020603050405020304" pitchFamily="18" charset="0"/>
+                <a:cs typeface="Times New Roman" panose="02020603050405020304" pitchFamily="18" charset="0"/>
+              </a:rPr>
+              <a:t>i</a:t>
+            </a:r>
+            <a:endParaRPr lang="en-CN" baseline="-25000" dirty="0">
+              <a:latin typeface="Times New Roman" panose="02020603050405020304" pitchFamily="18" charset="0"/>
+              <a:cs typeface="Times New Roman" panose="02020603050405020304" pitchFamily="18" charset="0"/>
+            </a:endParaRPr>
+          </a:p>
+        </p:txBody>
+      </p:sp>
+      <p:sp>
+        <p:nvSpPr>
+          <p:cNvPr id="7" name="Rectangle 6">
+            <a:extLst>
+              <a:ext uri="{FF2B5EF4-FFF2-40B4-BE49-F238E27FC236}">
+                <a16:creationId xmlns:a16="http://schemas.microsoft.com/office/drawing/2014/main" id="{B54C2FE3-F4F3-9049-87F8-0651FC9BAF4E}"/>
+              </a:ext>
+            </a:extLst>
+          </p:cNvPr>
+          <p:cNvSpPr/>
+          <p:nvPr/>
+        </p:nvSpPr>
+        <p:spPr>
+          <a:xfrm>
+            <a:off x="8408294" y="530771"/>
+            <a:ext cx="609600" cy="567559"/>
+          </a:xfrm>
+          <a:prstGeom prst="rect">
+            <a:avLst/>
+          </a:prstGeom>
+        </p:spPr>
+        <p:style>
+          <a:lnRef idx="2">
+            <a:schemeClr val="dk1"/>
+          </a:lnRef>
+          <a:fillRef idx="1">
+            <a:schemeClr val="lt1"/>
+          </a:fillRef>
+          <a:effectRef idx="0">
+            <a:schemeClr val="dk1"/>
+          </a:effectRef>
+          <a:fontRef idx="minor">
+            <a:schemeClr val="dk1"/>
+          </a:fontRef>
+        </p:style>
+        <p:txBody>
+          <a:bodyPr rtlCol="0" anchor="ctr"/>
+          <a:lstStyle/>
+          <a:p>
+            <a:pPr algn="ctr"/>
+            <a:r>
+              <a:rPr lang="en-CN" i="1" dirty="0">
+                <a:latin typeface="Times New Roman" panose="02020603050405020304" pitchFamily="18" charset="0"/>
+                <a:cs typeface="Times New Roman" panose="02020603050405020304" pitchFamily="18" charset="0"/>
+              </a:rPr>
+              <a:t>k</a:t>
+            </a:r>
+            <a:r>
+              <a:rPr lang="en-CN" i="1" baseline="-25000" dirty="0">
+                <a:latin typeface="Times New Roman" panose="02020603050405020304" pitchFamily="18" charset="0"/>
+                <a:cs typeface="Times New Roman" panose="02020603050405020304" pitchFamily="18" charset="0"/>
+              </a:rPr>
+              <a:t>n</a:t>
+            </a:r>
+          </a:p>
+        </p:txBody>
+      </p:sp>
+      <p:sp>
+        <p:nvSpPr>
+          <p:cNvPr id="9" name="Rectangle 8">
+            <a:extLst>
+              <a:ext uri="{FF2B5EF4-FFF2-40B4-BE49-F238E27FC236}">
+                <a16:creationId xmlns:a16="http://schemas.microsoft.com/office/drawing/2014/main" id="{B209D1D0-EF62-9549-8B64-CC7DDFB763F1}"/>
+              </a:ext>
+            </a:extLst>
+          </p:cNvPr>
+          <p:cNvSpPr/>
+          <p:nvPr/>
+        </p:nvSpPr>
+        <p:spPr>
+          <a:xfrm>
+            <a:off x="7798694" y="530770"/>
+            <a:ext cx="609600" cy="567559"/>
+          </a:xfrm>
+          <a:prstGeom prst="rect">
+            <a:avLst/>
+          </a:prstGeom>
+        </p:spPr>
+        <p:style>
+          <a:lnRef idx="2">
+            <a:schemeClr val="dk1"/>
+          </a:lnRef>
+          <a:fillRef idx="1">
+            <a:schemeClr val="lt1"/>
+          </a:fillRef>
+          <a:effectRef idx="0">
+            <a:schemeClr val="dk1"/>
+          </a:effectRef>
+          <a:fontRef idx="minor">
+            <a:schemeClr val="dk1"/>
+          </a:fontRef>
+        </p:style>
+        <p:txBody>
+          <a:bodyPr rtlCol="0" anchor="ctr"/>
+          <a:lstStyle/>
+          <a:p>
+            <a:pPr algn="ctr"/>
+            <a:r>
+              <a:rPr lang="en-CN" i="1" dirty="0">
+                <a:latin typeface="Times New Roman" panose="02020603050405020304" pitchFamily="18" charset="0"/>
+                <a:cs typeface="Times New Roman" panose="02020603050405020304" pitchFamily="18" charset="0"/>
+              </a:rPr>
+              <a:t>…</a:t>
+            </a:r>
+            <a:endParaRPr lang="en-CN" baseline="-25000" dirty="0"/>
+          </a:p>
+        </p:txBody>
+      </p:sp>
+      <p:sp>
+        <p:nvSpPr>
+          <p:cNvPr id="10" name="Rectangle 9">
+            <a:extLst>
+              <a:ext uri="{FF2B5EF4-FFF2-40B4-BE49-F238E27FC236}">
+                <a16:creationId xmlns:a16="http://schemas.microsoft.com/office/drawing/2014/main" id="{2D144554-AD2A-D848-B46D-9BE11503496B}"/>
+              </a:ext>
+            </a:extLst>
+          </p:cNvPr>
+          <p:cNvSpPr/>
+          <p:nvPr/>
+        </p:nvSpPr>
+        <p:spPr>
+          <a:xfrm>
+            <a:off x="1198192" y="1723695"/>
+            <a:ext cx="609600" cy="567559"/>
+          </a:xfrm>
+          <a:prstGeom prst="rect">
+            <a:avLst/>
+          </a:prstGeom>
+        </p:spPr>
+        <p:style>
+          <a:lnRef idx="2">
+            <a:schemeClr val="dk1"/>
+          </a:lnRef>
+          <a:fillRef idx="1">
+            <a:schemeClr val="lt1"/>
+          </a:fillRef>
+          <a:effectRef idx="0">
+            <a:schemeClr val="dk1"/>
+          </a:effectRef>
+          <a:fontRef idx="minor">
+            <a:schemeClr val="dk1"/>
+          </a:fontRef>
+        </p:style>
+        <p:txBody>
+          <a:bodyPr rtlCol="0" anchor="ctr"/>
+          <a:lstStyle/>
+          <a:p>
+            <a:pPr algn="ctr"/>
+            <a:r>
+              <a:rPr lang="en-CN" i="1" dirty="0">
+                <a:latin typeface="Times New Roman" panose="02020603050405020304" pitchFamily="18" charset="0"/>
+                <a:cs typeface="Times New Roman" panose="02020603050405020304" pitchFamily="18" charset="0"/>
+              </a:rPr>
+              <a:t>t</a:t>
+            </a:r>
+            <a:r>
+              <a:rPr lang="en-CN" baseline="-25000" dirty="0"/>
+              <a:t>1</a:t>
+            </a:r>
+          </a:p>
+        </p:txBody>
+      </p:sp>
+      <p:cxnSp>
+        <p:nvCxnSpPr>
+          <p:cNvPr id="11" name="Straight Arrow Connector 10">
+            <a:extLst>
+              <a:ext uri="{FF2B5EF4-FFF2-40B4-BE49-F238E27FC236}">
+                <a16:creationId xmlns:a16="http://schemas.microsoft.com/office/drawing/2014/main" id="{323BDD05-2C1F-4E4E-AB10-7CFDA2BE2938}"/>
+              </a:ext>
+            </a:extLst>
+          </p:cNvPr>
+          <p:cNvCxnSpPr>
+            <a:cxnSpLocks/>
+            <a:stCxn id="3" idx="1"/>
+            <a:endCxn id="10" idx="0"/>
+          </p:cNvCxnSpPr>
+          <p:nvPr/>
+        </p:nvCxnSpPr>
+        <p:spPr>
+          <a:xfrm flipH="1">
+            <a:off x="1502992" y="814551"/>
+            <a:ext cx="935421" cy="909144"/>
+          </a:xfrm>
+          <a:prstGeom prst="straightConnector1">
+            <a:avLst/>
+          </a:prstGeom>
+          <a:ln>
+            <a:tailEnd type="triangle"/>
+          </a:ln>
+        </p:spPr>
+        <p:style>
+          <a:lnRef idx="2">
+            <a:schemeClr val="dk1"/>
+          </a:lnRef>
+          <a:fillRef idx="0">
+            <a:schemeClr val="dk1"/>
+          </a:fillRef>
+          <a:effectRef idx="1">
+            <a:schemeClr val="dk1"/>
+          </a:effectRef>
+          <a:fontRef idx="minor">
+            <a:schemeClr val="tx1"/>
+          </a:fontRef>
+        </p:style>
+      </p:cxnSp>
+      <p:sp>
+        <p:nvSpPr>
+          <p:cNvPr id="12" name="Rectangle 11">
+            <a:extLst>
+              <a:ext uri="{FF2B5EF4-FFF2-40B4-BE49-F238E27FC236}">
+                <a16:creationId xmlns:a16="http://schemas.microsoft.com/office/drawing/2014/main" id="{681CF5D7-E2CE-BD43-81B3-A42C773CB563}"/>
+              </a:ext>
+            </a:extLst>
+          </p:cNvPr>
+          <p:cNvSpPr/>
+          <p:nvPr/>
+        </p:nvSpPr>
+        <p:spPr>
+          <a:xfrm>
+            <a:off x="2932402" y="1723695"/>
+            <a:ext cx="609600" cy="567559"/>
+          </a:xfrm>
+          <a:prstGeom prst="rect">
+            <a:avLst/>
+          </a:prstGeom>
+        </p:spPr>
+        <p:style>
+          <a:lnRef idx="2">
+            <a:schemeClr val="dk1"/>
+          </a:lnRef>
+          <a:fillRef idx="1">
+            <a:schemeClr val="lt1"/>
+          </a:fillRef>
+          <a:effectRef idx="0">
+            <a:schemeClr val="dk1"/>
+          </a:effectRef>
+          <a:fontRef idx="minor">
+            <a:schemeClr val="dk1"/>
+          </a:fontRef>
+        </p:style>
+        <p:txBody>
+          <a:bodyPr rtlCol="0" anchor="ctr"/>
+          <a:lstStyle/>
+          <a:p>
+            <a:pPr algn="ctr"/>
+            <a:r>
+              <a:rPr lang="en-US" i="1" dirty="0">
+                <a:latin typeface="Times New Roman" panose="02020603050405020304" pitchFamily="18" charset="0"/>
+                <a:cs typeface="Times New Roman" panose="02020603050405020304" pitchFamily="18" charset="0"/>
+              </a:rPr>
+              <a:t>t</a:t>
+            </a:r>
+            <a:r>
+              <a:rPr lang="en-CN" i="1" baseline="-25000" dirty="0">
+                <a:latin typeface="Times New Roman" panose="02020603050405020304" pitchFamily="18" charset="0"/>
+                <a:cs typeface="Times New Roman" panose="02020603050405020304" pitchFamily="18" charset="0"/>
+              </a:rPr>
+              <a:t>i</a:t>
+            </a:r>
+            <a:r>
+              <a:rPr lang="en-CN" baseline="-25000" dirty="0">
+                <a:latin typeface="Times New Roman" panose="02020603050405020304" pitchFamily="18" charset="0"/>
+                <a:cs typeface="Times New Roman" panose="02020603050405020304" pitchFamily="18" charset="0"/>
+              </a:rPr>
+              <a:t>-1</a:t>
+            </a:r>
+          </a:p>
+        </p:txBody>
+      </p:sp>
+      <p:cxnSp>
+        <p:nvCxnSpPr>
+          <p:cNvPr id="13" name="Straight Arrow Connector 12">
+            <a:extLst>
+              <a:ext uri="{FF2B5EF4-FFF2-40B4-BE49-F238E27FC236}">
+                <a16:creationId xmlns:a16="http://schemas.microsoft.com/office/drawing/2014/main" id="{1F982FF6-7C90-9345-8CBE-59EB4CCC39F2}"/>
+              </a:ext>
+            </a:extLst>
+          </p:cNvPr>
+          <p:cNvCxnSpPr>
+            <a:cxnSpLocks/>
+            <a:stCxn id="5" idx="1"/>
+            <a:endCxn id="12" idx="0"/>
+          </p:cNvCxnSpPr>
+          <p:nvPr/>
+        </p:nvCxnSpPr>
+        <p:spPr>
+          <a:xfrm flipH="1">
+            <a:off x="3237202" y="814551"/>
+            <a:ext cx="420411" cy="909144"/>
+          </a:xfrm>
+          <a:prstGeom prst="straightConnector1">
+            <a:avLst/>
+          </a:prstGeom>
+          <a:ln>
+            <a:tailEnd type="triangle"/>
+          </a:ln>
+        </p:spPr>
+        <p:style>
+          <a:lnRef idx="2">
+            <a:schemeClr val="dk1"/>
+          </a:lnRef>
+          <a:fillRef idx="0">
+            <a:schemeClr val="dk1"/>
+          </a:fillRef>
+          <a:effectRef idx="1">
+            <a:schemeClr val="dk1"/>
+          </a:effectRef>
+          <a:fontRef idx="minor">
+            <a:schemeClr val="tx1"/>
+          </a:fontRef>
+        </p:style>
+      </p:cxnSp>
+      <p:sp>
+        <p:nvSpPr>
+          <p:cNvPr id="14" name="Rectangle 13">
+            <a:extLst>
+              <a:ext uri="{FF2B5EF4-FFF2-40B4-BE49-F238E27FC236}">
+                <a16:creationId xmlns:a16="http://schemas.microsoft.com/office/drawing/2014/main" id="{DD59F287-BA48-3A42-B7E9-222A8472D4A1}"/>
+              </a:ext>
+            </a:extLst>
+          </p:cNvPr>
+          <p:cNvSpPr/>
+          <p:nvPr/>
+        </p:nvSpPr>
+        <p:spPr>
+          <a:xfrm>
+            <a:off x="7746175" y="1723693"/>
+            <a:ext cx="609600" cy="567559"/>
+          </a:xfrm>
+          <a:prstGeom prst="rect">
+            <a:avLst/>
+          </a:prstGeom>
+        </p:spPr>
+        <p:style>
+          <a:lnRef idx="2">
+            <a:schemeClr val="dk1"/>
+          </a:lnRef>
+          <a:fillRef idx="1">
+            <a:schemeClr val="lt1"/>
+          </a:fillRef>
+          <a:effectRef idx="0">
+            <a:schemeClr val="dk1"/>
+          </a:effectRef>
+          <a:fontRef idx="minor">
+            <a:schemeClr val="dk1"/>
+          </a:fontRef>
+        </p:style>
+        <p:txBody>
+          <a:bodyPr rtlCol="0" anchor="ctr"/>
+          <a:lstStyle/>
+          <a:p>
+            <a:pPr algn="ctr"/>
+            <a:r>
+              <a:rPr lang="en-US" i="1" dirty="0">
+                <a:latin typeface="Times New Roman" panose="02020603050405020304" pitchFamily="18" charset="0"/>
+                <a:cs typeface="Times New Roman" panose="02020603050405020304" pitchFamily="18" charset="0"/>
+              </a:rPr>
+              <a:t>t</a:t>
+            </a:r>
+            <a:r>
+              <a:rPr lang="en-CN" i="1" baseline="-25000" dirty="0">
+                <a:latin typeface="Times New Roman" panose="02020603050405020304" pitchFamily="18" charset="0"/>
+                <a:cs typeface="Times New Roman" panose="02020603050405020304" pitchFamily="18" charset="0"/>
+              </a:rPr>
+              <a:t>i</a:t>
+            </a:r>
+            <a:r>
+              <a:rPr lang="en-CN" baseline="-25000" dirty="0">
+                <a:latin typeface="Times New Roman" panose="02020603050405020304" pitchFamily="18" charset="0"/>
+                <a:cs typeface="Times New Roman" panose="02020603050405020304" pitchFamily="18" charset="0"/>
+              </a:rPr>
+              <a:t>+1</a:t>
+            </a:r>
+            <a:endParaRPr lang="en-CN" baseline="-25000" dirty="0"/>
+          </a:p>
+        </p:txBody>
+      </p:sp>
+      <p:cxnSp>
+        <p:nvCxnSpPr>
+          <p:cNvPr id="15" name="Straight Arrow Connector 14">
+            <a:extLst>
+              <a:ext uri="{FF2B5EF4-FFF2-40B4-BE49-F238E27FC236}">
+                <a16:creationId xmlns:a16="http://schemas.microsoft.com/office/drawing/2014/main" id="{00DBA832-31F2-EB4B-874E-3FC706E07DCC}"/>
+              </a:ext>
+            </a:extLst>
+          </p:cNvPr>
+          <p:cNvCxnSpPr>
+            <a:cxnSpLocks/>
+            <a:stCxn id="6" idx="3"/>
+            <a:endCxn id="14" idx="0"/>
+          </p:cNvCxnSpPr>
+          <p:nvPr/>
+        </p:nvCxnSpPr>
+        <p:spPr>
+          <a:xfrm>
+            <a:off x="7798694" y="814550"/>
+            <a:ext cx="252281" cy="909143"/>
+          </a:xfrm>
+          <a:prstGeom prst="straightConnector1">
+            <a:avLst/>
+          </a:prstGeom>
+          <a:ln>
+            <a:tailEnd type="triangle"/>
+          </a:ln>
+        </p:spPr>
+        <p:style>
+          <a:lnRef idx="2">
+            <a:schemeClr val="dk1"/>
+          </a:lnRef>
+          <a:fillRef idx="0">
+            <a:schemeClr val="dk1"/>
+          </a:fillRef>
+          <a:effectRef idx="1">
+            <a:schemeClr val="dk1"/>
+          </a:effectRef>
+          <a:fontRef idx="minor">
+            <a:schemeClr val="tx1"/>
+          </a:fontRef>
+        </p:style>
+      </p:cxnSp>
+      <p:sp>
+        <p:nvSpPr>
+          <p:cNvPr id="16" name="Rectangle 15">
+            <a:extLst>
+              <a:ext uri="{FF2B5EF4-FFF2-40B4-BE49-F238E27FC236}">
+                <a16:creationId xmlns:a16="http://schemas.microsoft.com/office/drawing/2014/main" id="{9787CF20-C0B7-2C49-B2F3-58DA6B9DBBDC}"/>
+              </a:ext>
+            </a:extLst>
+          </p:cNvPr>
+          <p:cNvSpPr/>
+          <p:nvPr/>
+        </p:nvSpPr>
+        <p:spPr>
+          <a:xfrm>
+            <a:off x="9532895" y="1723694"/>
+            <a:ext cx="609600" cy="567559"/>
+          </a:xfrm>
+          <a:prstGeom prst="rect">
+            <a:avLst/>
+          </a:prstGeom>
+        </p:spPr>
+        <p:style>
+          <a:lnRef idx="2">
+            <a:schemeClr val="dk1"/>
+          </a:lnRef>
+          <a:fillRef idx="1">
+            <a:schemeClr val="lt1"/>
+          </a:fillRef>
+          <a:effectRef idx="0">
+            <a:schemeClr val="dk1"/>
+          </a:effectRef>
+          <a:fontRef idx="minor">
+            <a:schemeClr val="dk1"/>
+          </a:fontRef>
+        </p:style>
+        <p:txBody>
+          <a:bodyPr rtlCol="0" anchor="ctr"/>
+          <a:lstStyle/>
+          <a:p>
+            <a:pPr algn="ctr"/>
+            <a:r>
+              <a:rPr lang="en-US" i="1" dirty="0">
+                <a:latin typeface="Times New Roman" panose="02020603050405020304" pitchFamily="18" charset="0"/>
+                <a:cs typeface="Times New Roman" panose="02020603050405020304" pitchFamily="18" charset="0"/>
+              </a:rPr>
+              <a:t>t</a:t>
+            </a:r>
+            <a:r>
+              <a:rPr lang="en-CN" i="1" baseline="-25000" dirty="0">
+                <a:latin typeface="Times New Roman" panose="02020603050405020304" pitchFamily="18" charset="0"/>
+                <a:cs typeface="Times New Roman" panose="02020603050405020304" pitchFamily="18" charset="0"/>
+              </a:rPr>
+              <a:t>n</a:t>
+            </a:r>
+            <a:r>
+              <a:rPr lang="en-CN" baseline="-25000" dirty="0">
+                <a:latin typeface="Times New Roman" panose="02020603050405020304" pitchFamily="18" charset="0"/>
+                <a:cs typeface="Times New Roman" panose="02020603050405020304" pitchFamily="18" charset="0"/>
+              </a:rPr>
+              <a:t>+1</a:t>
+            </a:r>
+          </a:p>
+        </p:txBody>
+      </p:sp>
+      <p:cxnSp>
+        <p:nvCxnSpPr>
+          <p:cNvPr id="17" name="Straight Arrow Connector 16">
+            <a:extLst>
+              <a:ext uri="{FF2B5EF4-FFF2-40B4-BE49-F238E27FC236}">
+                <a16:creationId xmlns:a16="http://schemas.microsoft.com/office/drawing/2014/main" id="{424B4A48-FFCA-8640-8CDE-067743771014}"/>
+              </a:ext>
+            </a:extLst>
+          </p:cNvPr>
+          <p:cNvCxnSpPr>
+            <a:cxnSpLocks/>
+            <a:stCxn id="7" idx="3"/>
+            <a:endCxn id="16" idx="0"/>
+          </p:cNvCxnSpPr>
+          <p:nvPr/>
+        </p:nvCxnSpPr>
+        <p:spPr>
+          <a:xfrm>
+            <a:off x="9017894" y="814551"/>
+            <a:ext cx="819801" cy="909143"/>
+          </a:xfrm>
+          <a:prstGeom prst="straightConnector1">
+            <a:avLst/>
+          </a:prstGeom>
+          <a:ln>
+            <a:tailEnd type="triangle"/>
+          </a:ln>
+        </p:spPr>
+        <p:style>
+          <a:lnRef idx="2">
+            <a:schemeClr val="dk1"/>
+          </a:lnRef>
+          <a:fillRef idx="0">
+            <a:schemeClr val="dk1"/>
+          </a:fillRef>
+          <a:effectRef idx="1">
+            <a:schemeClr val="dk1"/>
+          </a:effectRef>
+          <a:fontRef idx="minor">
+            <a:schemeClr val="tx1"/>
+          </a:fontRef>
+        </p:style>
+      </p:cxnSp>
+      <p:sp>
+        <p:nvSpPr>
+          <p:cNvPr id="28" name="Rectangle 27">
+            <a:extLst>
+              <a:ext uri="{FF2B5EF4-FFF2-40B4-BE49-F238E27FC236}">
+                <a16:creationId xmlns:a16="http://schemas.microsoft.com/office/drawing/2014/main" id="{A3954980-4EC6-EE43-9D68-BF9362CE2861}"/>
+              </a:ext>
+            </a:extLst>
+          </p:cNvPr>
+          <p:cNvSpPr/>
+          <p:nvPr/>
+        </p:nvSpPr>
+        <p:spPr>
+          <a:xfrm>
+            <a:off x="5381333" y="1723692"/>
+            <a:ext cx="609600" cy="567559"/>
+          </a:xfrm>
+          <a:prstGeom prst="rect">
+            <a:avLst/>
+          </a:prstGeom>
+        </p:spPr>
+        <p:style>
+          <a:lnRef idx="2">
+            <a:schemeClr val="dk1"/>
+          </a:lnRef>
+          <a:fillRef idx="1">
+            <a:schemeClr val="lt1"/>
+          </a:fillRef>
+          <a:effectRef idx="0">
+            <a:schemeClr val="dk1"/>
+          </a:effectRef>
+          <a:fontRef idx="minor">
+            <a:schemeClr val="dk1"/>
+          </a:fontRef>
+        </p:style>
+        <p:txBody>
+          <a:bodyPr rtlCol="0" anchor="ctr"/>
+          <a:lstStyle/>
+          <a:p>
+            <a:pPr algn="ctr"/>
+            <a:r>
+              <a:rPr lang="en-US" i="1" dirty="0">
+                <a:latin typeface="Times New Roman" panose="02020603050405020304" pitchFamily="18" charset="0"/>
+                <a:cs typeface="Times New Roman" panose="02020603050405020304" pitchFamily="18" charset="0"/>
+              </a:rPr>
+              <a:t>t</a:t>
+            </a:r>
+            <a:r>
+              <a:rPr lang="en-CN" i="1" baseline="-25000" dirty="0">
+                <a:latin typeface="Times New Roman" panose="02020603050405020304" pitchFamily="18" charset="0"/>
+                <a:cs typeface="Times New Roman" panose="02020603050405020304" pitchFamily="18" charset="0"/>
+              </a:rPr>
+              <a:t>i</a:t>
+            </a:r>
+            <a:endParaRPr lang="en-CN" baseline="-25000" dirty="0"/>
+          </a:p>
+        </p:txBody>
+      </p:sp>
+      <p:sp>
+        <p:nvSpPr>
+          <p:cNvPr id="56" name="TextBox 55">
+            <a:extLst>
+              <a:ext uri="{FF2B5EF4-FFF2-40B4-BE49-F238E27FC236}">
+                <a16:creationId xmlns:a16="http://schemas.microsoft.com/office/drawing/2014/main" id="{3B4C5473-DCBB-3A4F-A100-A83DEC49486E}"/>
+              </a:ext>
+            </a:extLst>
+          </p:cNvPr>
+          <p:cNvSpPr txBox="1"/>
+          <p:nvPr/>
+        </p:nvSpPr>
+        <p:spPr>
+          <a:xfrm>
+            <a:off x="3104027" y="2547287"/>
+            <a:ext cx="248786" cy="369332"/>
+          </a:xfrm>
+          <a:prstGeom prst="rect">
+            <a:avLst/>
+          </a:prstGeom>
+          <a:noFill/>
+        </p:spPr>
+        <p:txBody>
+          <a:bodyPr wrap="none" rtlCol="0">
+            <a:spAutoFit/>
+          </a:bodyPr>
+          <a:lstStyle/>
+          <a:p>
+            <a:r>
+              <a:rPr lang="en-US" i="1" dirty="0">
+                <a:latin typeface="Times New Roman" panose="02020603050405020304" pitchFamily="18" charset="0"/>
+                <a:cs typeface="Times New Roman" panose="02020603050405020304" pitchFamily="18" charset="0"/>
+              </a:rPr>
+              <a:t>l</a:t>
+            </a:r>
+            <a:endParaRPr lang="en-CN" i="1" baseline="-25000" dirty="0">
+              <a:latin typeface="Times New Roman" panose="02020603050405020304" pitchFamily="18" charset="0"/>
+              <a:cs typeface="Times New Roman" panose="02020603050405020304" pitchFamily="18" charset="0"/>
+            </a:endParaRPr>
+          </a:p>
+        </p:txBody>
+      </p:sp>
+      <p:sp>
+        <p:nvSpPr>
+          <p:cNvPr id="57" name="TextBox 56">
+            <a:extLst>
+              <a:ext uri="{FF2B5EF4-FFF2-40B4-BE49-F238E27FC236}">
+                <a16:creationId xmlns:a16="http://schemas.microsoft.com/office/drawing/2014/main" id="{DA6E2504-DEA4-3541-ABFB-075FF0C45DCB}"/>
+              </a:ext>
+            </a:extLst>
+          </p:cNvPr>
+          <p:cNvSpPr txBox="1"/>
+          <p:nvPr/>
+        </p:nvSpPr>
+        <p:spPr>
+          <a:xfrm>
+            <a:off x="5538299" y="2509998"/>
+            <a:ext cx="325730" cy="369332"/>
+          </a:xfrm>
+          <a:prstGeom prst="rect">
+            <a:avLst/>
+          </a:prstGeom>
+          <a:noFill/>
+        </p:spPr>
+        <p:txBody>
+          <a:bodyPr wrap="none" rtlCol="0">
+            <a:spAutoFit/>
+          </a:bodyPr>
+          <a:lstStyle/>
+          <a:p>
+            <a:r>
+              <a:rPr lang="en-US" i="1" dirty="0">
+                <a:latin typeface="Times New Roman" panose="02020603050405020304" pitchFamily="18" charset="0"/>
+                <a:cs typeface="Times New Roman" panose="02020603050405020304" pitchFamily="18" charset="0"/>
+              </a:rPr>
+              <a:t>t’</a:t>
+            </a:r>
+            <a:endParaRPr lang="en-CN" i="1" baseline="-25000" dirty="0">
+              <a:latin typeface="Times New Roman" panose="02020603050405020304" pitchFamily="18" charset="0"/>
+              <a:cs typeface="Times New Roman" panose="02020603050405020304" pitchFamily="18" charset="0"/>
+            </a:endParaRPr>
+          </a:p>
+        </p:txBody>
+      </p:sp>
+      <p:sp>
+        <p:nvSpPr>
+          <p:cNvPr id="58" name="TextBox 57">
+            <a:extLst>
+              <a:ext uri="{FF2B5EF4-FFF2-40B4-BE49-F238E27FC236}">
+                <a16:creationId xmlns:a16="http://schemas.microsoft.com/office/drawing/2014/main" id="{F0C7143F-328E-CC4C-A9C3-2FA9734797F0}"/>
+              </a:ext>
+            </a:extLst>
+          </p:cNvPr>
+          <p:cNvSpPr txBox="1"/>
+          <p:nvPr/>
+        </p:nvSpPr>
+        <p:spPr>
+          <a:xfrm>
+            <a:off x="8103535" y="2547287"/>
+            <a:ext cx="274434" cy="369332"/>
+          </a:xfrm>
+          <a:prstGeom prst="rect">
+            <a:avLst/>
+          </a:prstGeom>
+          <a:noFill/>
+        </p:spPr>
+        <p:txBody>
+          <a:bodyPr wrap="none" rtlCol="0">
+            <a:spAutoFit/>
+          </a:bodyPr>
+          <a:lstStyle/>
+          <a:p>
+            <a:r>
+              <a:rPr lang="en-US" i="1" dirty="0">
+                <a:latin typeface="Times New Roman" panose="02020603050405020304" pitchFamily="18" charset="0"/>
+                <a:cs typeface="Times New Roman" panose="02020603050405020304" pitchFamily="18" charset="0"/>
+              </a:rPr>
+              <a:t>r</a:t>
+            </a:r>
+            <a:endParaRPr lang="en-CN" i="1" baseline="-25000" dirty="0">
+              <a:latin typeface="Times New Roman" panose="02020603050405020304" pitchFamily="18" charset="0"/>
+              <a:cs typeface="Times New Roman" panose="02020603050405020304" pitchFamily="18" charset="0"/>
+            </a:endParaRPr>
+          </a:p>
+        </p:txBody>
+      </p:sp>
+      <p:sp>
+        <p:nvSpPr>
+          <p:cNvPr id="39" name="Rectangle 38">
+            <a:extLst>
+              <a:ext uri="{FF2B5EF4-FFF2-40B4-BE49-F238E27FC236}">
+                <a16:creationId xmlns:a16="http://schemas.microsoft.com/office/drawing/2014/main" id="{13627B3C-0347-8E4C-8B4F-C760289A69EF}"/>
+              </a:ext>
+            </a:extLst>
+          </p:cNvPr>
+          <p:cNvSpPr/>
+          <p:nvPr/>
+        </p:nvSpPr>
+        <p:spPr>
+          <a:xfrm>
+            <a:off x="2932402" y="4566747"/>
+            <a:ext cx="609600" cy="567559"/>
+          </a:xfrm>
+          <a:prstGeom prst="rect">
+            <a:avLst/>
+          </a:prstGeom>
+        </p:spPr>
+        <p:style>
+          <a:lnRef idx="2">
+            <a:schemeClr val="dk1"/>
+          </a:lnRef>
+          <a:fillRef idx="1">
+            <a:schemeClr val="lt1"/>
+          </a:fillRef>
+          <a:effectRef idx="0">
+            <a:schemeClr val="dk1"/>
+          </a:effectRef>
+          <a:fontRef idx="minor">
+            <a:schemeClr val="dk1"/>
+          </a:fontRef>
+        </p:style>
+        <p:txBody>
+          <a:bodyPr rtlCol="0" anchor="ctr"/>
+          <a:lstStyle/>
+          <a:p>
+            <a:pPr algn="ctr"/>
+            <a:r>
+              <a:rPr lang="en-US" i="1" dirty="0">
+                <a:latin typeface="Times New Roman" panose="02020603050405020304" pitchFamily="18" charset="0"/>
+                <a:cs typeface="Times New Roman" panose="02020603050405020304" pitchFamily="18" charset="0"/>
+              </a:rPr>
+              <a:t>t</a:t>
+            </a:r>
+            <a:r>
+              <a:rPr lang="en-CN" i="1" baseline="-25000" dirty="0">
+                <a:latin typeface="Times New Roman" panose="02020603050405020304" pitchFamily="18" charset="0"/>
+                <a:cs typeface="Times New Roman" panose="02020603050405020304" pitchFamily="18" charset="0"/>
+              </a:rPr>
+              <a:t>i</a:t>
+            </a:r>
+            <a:endParaRPr lang="en-CN" baseline="-25000" dirty="0"/>
+          </a:p>
+        </p:txBody>
+      </p:sp>
+      <p:sp>
+        <p:nvSpPr>
+          <p:cNvPr id="40" name="TextBox 39">
+            <a:extLst>
+              <a:ext uri="{FF2B5EF4-FFF2-40B4-BE49-F238E27FC236}">
+                <a16:creationId xmlns:a16="http://schemas.microsoft.com/office/drawing/2014/main" id="{E9530FE0-6567-7444-BE42-0E9F654F0C04}"/>
+              </a:ext>
+            </a:extLst>
+          </p:cNvPr>
+          <p:cNvSpPr txBox="1"/>
+          <p:nvPr/>
+        </p:nvSpPr>
+        <p:spPr>
+          <a:xfrm>
+            <a:off x="2606672" y="4241817"/>
+            <a:ext cx="325730" cy="369332"/>
+          </a:xfrm>
+          <a:prstGeom prst="rect">
+            <a:avLst/>
+          </a:prstGeom>
+          <a:noFill/>
+        </p:spPr>
+        <p:txBody>
+          <a:bodyPr wrap="none" rtlCol="0">
+            <a:spAutoFit/>
+          </a:bodyPr>
+          <a:lstStyle/>
+          <a:p>
+            <a:r>
+              <a:rPr lang="en-US" i="1" dirty="0">
+                <a:latin typeface="Times New Roman" panose="02020603050405020304" pitchFamily="18" charset="0"/>
+                <a:cs typeface="Times New Roman" panose="02020603050405020304" pitchFamily="18" charset="0"/>
+              </a:rPr>
+              <a:t>t’</a:t>
+            </a:r>
+            <a:endParaRPr lang="en-CN" i="1" baseline="-25000" dirty="0">
+              <a:latin typeface="Times New Roman" panose="02020603050405020304" pitchFamily="18" charset="0"/>
+              <a:cs typeface="Times New Roman" panose="02020603050405020304" pitchFamily="18" charset="0"/>
+            </a:endParaRPr>
+          </a:p>
+        </p:txBody>
+      </p:sp>
+      <p:sp>
+        <p:nvSpPr>
+          <p:cNvPr id="45" name="Rectangle 44">
+            <a:extLst>
+              <a:ext uri="{FF2B5EF4-FFF2-40B4-BE49-F238E27FC236}">
+                <a16:creationId xmlns:a16="http://schemas.microsoft.com/office/drawing/2014/main" id="{1C5EFABB-4C13-BA4D-9078-DA4AC734FEF4}"/>
+              </a:ext>
+            </a:extLst>
+          </p:cNvPr>
+          <p:cNvSpPr/>
+          <p:nvPr/>
+        </p:nvSpPr>
+        <p:spPr>
+          <a:xfrm>
+            <a:off x="4771733" y="5438605"/>
+            <a:ext cx="1092296" cy="567559"/>
+          </a:xfrm>
+          <a:prstGeom prst="rect">
+            <a:avLst/>
+          </a:prstGeom>
+        </p:spPr>
+        <p:style>
+          <a:lnRef idx="2">
+            <a:schemeClr val="dk1"/>
+          </a:lnRef>
+          <a:fillRef idx="1">
+            <a:schemeClr val="lt1"/>
+          </a:fillRef>
+          <a:effectRef idx="0">
+            <a:schemeClr val="dk1"/>
+          </a:effectRef>
+          <a:fontRef idx="minor">
+            <a:schemeClr val="dk1"/>
+          </a:fontRef>
+        </p:style>
+        <p:txBody>
+          <a:bodyPr rtlCol="0" anchor="ctr"/>
+          <a:lstStyle/>
+          <a:p>
+            <a:pPr algn="ctr"/>
+            <a:r>
+              <a:rPr lang="en-US" dirty="0">
+                <a:latin typeface="Times New Roman" panose="02020603050405020304" pitchFamily="18" charset="0"/>
+                <a:cs typeface="Times New Roman" panose="02020603050405020304" pitchFamily="18" charset="0"/>
+              </a:rPr>
+              <a:t>(</a:t>
+            </a:r>
+            <a:r>
+              <a:rPr lang="en-US" i="1" dirty="0">
+                <a:latin typeface="Times New Roman" panose="02020603050405020304" pitchFamily="18" charset="0"/>
+                <a:cs typeface="Times New Roman" panose="02020603050405020304" pitchFamily="18" charset="0"/>
+              </a:rPr>
+              <a:t>k</a:t>
+            </a:r>
+            <a:r>
+              <a:rPr lang="en-CN" i="1" baseline="-25000" dirty="0">
+                <a:latin typeface="Times New Roman" panose="02020603050405020304" pitchFamily="18" charset="0"/>
+                <a:cs typeface="Times New Roman" panose="02020603050405020304" pitchFamily="18" charset="0"/>
+              </a:rPr>
+              <a:t>i+</a:t>
+            </a:r>
+            <a:r>
+              <a:rPr lang="en-CN" baseline="-25000" dirty="0">
+                <a:latin typeface="Times New Roman" panose="02020603050405020304" pitchFamily="18" charset="0"/>
+                <a:cs typeface="Times New Roman" panose="02020603050405020304" pitchFamily="18" charset="0"/>
+              </a:rPr>
+              <a:t>1</a:t>
+            </a:r>
+            <a:r>
+              <a:rPr lang="en-CN" dirty="0">
+                <a:latin typeface="Times New Roman" panose="02020603050405020304" pitchFamily="18" charset="0"/>
+                <a:cs typeface="Times New Roman" panose="02020603050405020304" pitchFamily="18" charset="0"/>
+              </a:rPr>
+              <a:t>, </a:t>
+            </a:r>
+            <a:r>
+              <a:rPr lang="en-CN" i="1" dirty="0">
+                <a:latin typeface="Times New Roman" panose="02020603050405020304" pitchFamily="18" charset="0"/>
+                <a:cs typeface="Times New Roman" panose="02020603050405020304" pitchFamily="18" charset="0"/>
+              </a:rPr>
+              <a:t>t</a:t>
+            </a:r>
+            <a:r>
+              <a:rPr lang="en-CN" i="1" baseline="-25000" dirty="0">
+                <a:latin typeface="Times New Roman" panose="02020603050405020304" pitchFamily="18" charset="0"/>
+                <a:cs typeface="Times New Roman" panose="02020603050405020304" pitchFamily="18" charset="0"/>
+              </a:rPr>
+              <a:t>i</a:t>
+            </a:r>
+            <a:r>
+              <a:rPr lang="en-CN" baseline="-25000" dirty="0">
+                <a:latin typeface="Times New Roman" panose="02020603050405020304" pitchFamily="18" charset="0"/>
+                <a:cs typeface="Times New Roman" panose="02020603050405020304" pitchFamily="18" charset="0"/>
+              </a:rPr>
+              <a:t>+1</a:t>
+            </a:r>
+            <a:r>
+              <a:rPr lang="en-CN" dirty="0">
+                <a:latin typeface="Times New Roman" panose="02020603050405020304" pitchFamily="18" charset="0"/>
+                <a:cs typeface="Times New Roman" panose="02020603050405020304" pitchFamily="18" charset="0"/>
+              </a:rPr>
+              <a:t>)</a:t>
+            </a:r>
+            <a:endParaRPr lang="en-CN" baseline="-25000" dirty="0">
+              <a:latin typeface="Times New Roman" panose="02020603050405020304" pitchFamily="18" charset="0"/>
+              <a:cs typeface="Times New Roman" panose="02020603050405020304" pitchFamily="18" charset="0"/>
+            </a:endParaRPr>
+          </a:p>
+        </p:txBody>
+      </p:sp>
+      <p:sp>
+        <p:nvSpPr>
+          <p:cNvPr id="49" name="Rectangle 48">
+            <a:extLst>
+              <a:ext uri="{FF2B5EF4-FFF2-40B4-BE49-F238E27FC236}">
+                <a16:creationId xmlns:a16="http://schemas.microsoft.com/office/drawing/2014/main" id="{5B7B86D6-8329-FE4E-A65E-E626C834586B}"/>
+              </a:ext>
+            </a:extLst>
+          </p:cNvPr>
+          <p:cNvSpPr/>
+          <p:nvPr/>
+        </p:nvSpPr>
+        <p:spPr>
+          <a:xfrm>
+            <a:off x="6967667" y="5438603"/>
+            <a:ext cx="1092296" cy="567559"/>
+          </a:xfrm>
+          <a:prstGeom prst="rect">
+            <a:avLst/>
+          </a:prstGeom>
+        </p:spPr>
+        <p:style>
+          <a:lnRef idx="2">
+            <a:schemeClr val="dk1"/>
+          </a:lnRef>
+          <a:fillRef idx="1">
+            <a:schemeClr val="lt1"/>
+          </a:fillRef>
+          <a:effectRef idx="0">
+            <a:schemeClr val="dk1"/>
+          </a:effectRef>
+          <a:fontRef idx="minor">
+            <a:schemeClr val="dk1"/>
+          </a:fontRef>
+        </p:style>
+        <p:txBody>
+          <a:bodyPr rtlCol="0" anchor="ctr"/>
+          <a:lstStyle/>
+          <a:p>
+            <a:pPr algn="ctr"/>
+            <a:r>
+              <a:rPr lang="en-CN" dirty="0">
+                <a:latin typeface="Times New Roman" panose="02020603050405020304" pitchFamily="18" charset="0"/>
+                <a:cs typeface="Times New Roman" panose="02020603050405020304" pitchFamily="18" charset="0"/>
+              </a:rPr>
+              <a:t>(</a:t>
+            </a:r>
+            <a:r>
+              <a:rPr lang="en-CN" i="1" dirty="0">
+                <a:latin typeface="Times New Roman" panose="02020603050405020304" pitchFamily="18" charset="0"/>
+                <a:cs typeface="Times New Roman" panose="02020603050405020304" pitchFamily="18" charset="0"/>
+              </a:rPr>
+              <a:t>k</a:t>
+            </a:r>
+            <a:r>
+              <a:rPr lang="en-CN" i="1" baseline="-25000" dirty="0">
+                <a:latin typeface="Times New Roman" panose="02020603050405020304" pitchFamily="18" charset="0"/>
+                <a:cs typeface="Times New Roman" panose="02020603050405020304" pitchFamily="18" charset="0"/>
+              </a:rPr>
+              <a:t>n </a:t>
+            </a:r>
+            <a:r>
+              <a:rPr lang="en-CN" dirty="0">
+                <a:latin typeface="Times New Roman" panose="02020603050405020304" pitchFamily="18" charset="0"/>
+                <a:cs typeface="Times New Roman" panose="02020603050405020304" pitchFamily="18" charset="0"/>
+              </a:rPr>
+              <a:t>,</a:t>
+            </a:r>
+            <a:r>
+              <a:rPr lang="en-CN" i="1" dirty="0">
+                <a:latin typeface="Times New Roman" panose="02020603050405020304" pitchFamily="18" charset="0"/>
+                <a:cs typeface="Times New Roman" panose="02020603050405020304" pitchFamily="18" charset="0"/>
+              </a:rPr>
+              <a:t> t</a:t>
+            </a:r>
+            <a:r>
+              <a:rPr lang="en-CN" i="1" baseline="-25000" dirty="0">
+                <a:latin typeface="Times New Roman" panose="02020603050405020304" pitchFamily="18" charset="0"/>
+                <a:cs typeface="Times New Roman" panose="02020603050405020304" pitchFamily="18" charset="0"/>
+              </a:rPr>
+              <a:t>n</a:t>
+            </a:r>
+            <a:r>
+              <a:rPr lang="en-CN" baseline="-25000" dirty="0">
+                <a:latin typeface="Times New Roman" panose="02020603050405020304" pitchFamily="18" charset="0"/>
+                <a:cs typeface="Times New Roman" panose="02020603050405020304" pitchFamily="18" charset="0"/>
+              </a:rPr>
+              <a:t>+1</a:t>
+            </a:r>
+            <a:r>
+              <a:rPr lang="en-CN" dirty="0">
+                <a:latin typeface="Times New Roman" panose="02020603050405020304" pitchFamily="18" charset="0"/>
+                <a:cs typeface="Times New Roman" panose="02020603050405020304" pitchFamily="18" charset="0"/>
+              </a:rPr>
+              <a:t>)</a:t>
+            </a:r>
+            <a:endParaRPr lang="en-CN" baseline="-25000" dirty="0">
+              <a:latin typeface="Times New Roman" panose="02020603050405020304" pitchFamily="18" charset="0"/>
+              <a:cs typeface="Times New Roman" panose="02020603050405020304" pitchFamily="18" charset="0"/>
+            </a:endParaRPr>
+          </a:p>
+        </p:txBody>
+      </p:sp>
+      <p:sp>
+        <p:nvSpPr>
+          <p:cNvPr id="50" name="Rectangle 49">
+            <a:extLst>
+              <a:ext uri="{FF2B5EF4-FFF2-40B4-BE49-F238E27FC236}">
+                <a16:creationId xmlns:a16="http://schemas.microsoft.com/office/drawing/2014/main" id="{58122DC4-70AE-1346-AB01-5892299441B9}"/>
+              </a:ext>
+            </a:extLst>
+          </p:cNvPr>
+          <p:cNvSpPr/>
+          <p:nvPr/>
+        </p:nvSpPr>
+        <p:spPr>
+          <a:xfrm>
+            <a:off x="5864029" y="5438604"/>
+            <a:ext cx="1092296" cy="567559"/>
+          </a:xfrm>
+          <a:prstGeom prst="rect">
+            <a:avLst/>
+          </a:prstGeom>
+        </p:spPr>
+        <p:style>
+          <a:lnRef idx="2">
+            <a:schemeClr val="dk1"/>
+          </a:lnRef>
+          <a:fillRef idx="1">
+            <a:schemeClr val="lt1"/>
+          </a:fillRef>
+          <a:effectRef idx="0">
+            <a:schemeClr val="dk1"/>
+          </a:effectRef>
+          <a:fontRef idx="minor">
+            <a:schemeClr val="dk1"/>
+          </a:fontRef>
+        </p:style>
+        <p:txBody>
+          <a:bodyPr rtlCol="0" anchor="ctr"/>
+          <a:lstStyle/>
+          <a:p>
+            <a:pPr algn="ctr"/>
+            <a:r>
+              <a:rPr lang="en-CN" i="1" dirty="0">
+                <a:latin typeface="Times New Roman" panose="02020603050405020304" pitchFamily="18" charset="0"/>
+                <a:cs typeface="Times New Roman" panose="02020603050405020304" pitchFamily="18" charset="0"/>
+              </a:rPr>
+              <a:t>…</a:t>
+            </a:r>
+            <a:endParaRPr lang="en-CN" baseline="-25000" dirty="0"/>
+          </a:p>
+        </p:txBody>
+      </p:sp>
+      <p:sp>
+        <p:nvSpPr>
+          <p:cNvPr id="55" name="TextBox 54">
+            <a:extLst>
+              <a:ext uri="{FF2B5EF4-FFF2-40B4-BE49-F238E27FC236}">
+                <a16:creationId xmlns:a16="http://schemas.microsoft.com/office/drawing/2014/main" id="{ED2AC980-BB97-D94E-ACB7-777C029BF016}"/>
+              </a:ext>
+            </a:extLst>
+          </p:cNvPr>
+          <p:cNvSpPr txBox="1"/>
+          <p:nvPr/>
+        </p:nvSpPr>
+        <p:spPr>
+          <a:xfrm>
+            <a:off x="6272960" y="6074479"/>
+            <a:ext cx="274434" cy="369332"/>
+          </a:xfrm>
+          <a:prstGeom prst="rect">
+            <a:avLst/>
+          </a:prstGeom>
+          <a:noFill/>
+        </p:spPr>
+        <p:txBody>
+          <a:bodyPr wrap="none" rtlCol="0">
+            <a:spAutoFit/>
+          </a:bodyPr>
+          <a:lstStyle/>
+          <a:p>
+            <a:r>
+              <a:rPr lang="en-US" i="1" dirty="0">
+                <a:latin typeface="Times New Roman" panose="02020603050405020304" pitchFamily="18" charset="0"/>
+                <a:cs typeface="Times New Roman" panose="02020603050405020304" pitchFamily="18" charset="0"/>
+              </a:rPr>
+              <a:t>r</a:t>
+            </a:r>
+            <a:endParaRPr lang="en-CN" i="1" baseline="-25000" dirty="0">
+              <a:latin typeface="Times New Roman" panose="02020603050405020304" pitchFamily="18" charset="0"/>
+              <a:cs typeface="Times New Roman" panose="02020603050405020304" pitchFamily="18" charset="0"/>
+            </a:endParaRPr>
+          </a:p>
+        </p:txBody>
+      </p:sp>
+      <p:sp>
+        <p:nvSpPr>
+          <p:cNvPr id="59" name="Rectangle 58">
+            <a:extLst>
+              <a:ext uri="{FF2B5EF4-FFF2-40B4-BE49-F238E27FC236}">
+                <a16:creationId xmlns:a16="http://schemas.microsoft.com/office/drawing/2014/main" id="{20CCF611-2F28-6E46-9840-33B248880D83}"/>
+              </a:ext>
+            </a:extLst>
+          </p:cNvPr>
+          <p:cNvSpPr/>
+          <p:nvPr/>
+        </p:nvSpPr>
+        <p:spPr>
+          <a:xfrm>
+            <a:off x="4771733" y="3623597"/>
+            <a:ext cx="1092296" cy="567559"/>
+          </a:xfrm>
+          <a:prstGeom prst="rect">
+            <a:avLst/>
+          </a:prstGeom>
+        </p:spPr>
+        <p:style>
+          <a:lnRef idx="2">
+            <a:schemeClr val="dk1"/>
+          </a:lnRef>
+          <a:fillRef idx="1">
+            <a:schemeClr val="lt1"/>
+          </a:fillRef>
+          <a:effectRef idx="0">
+            <a:schemeClr val="dk1"/>
+          </a:effectRef>
+          <a:fontRef idx="minor">
+            <a:schemeClr val="dk1"/>
+          </a:fontRef>
+        </p:style>
+        <p:txBody>
+          <a:bodyPr rtlCol="0" anchor="ctr"/>
+          <a:lstStyle/>
+          <a:p>
+            <a:pPr algn="ctr"/>
+            <a:r>
+              <a:rPr lang="en-US" dirty="0">
+                <a:latin typeface="Times New Roman" panose="02020603050405020304" pitchFamily="18" charset="0"/>
+                <a:cs typeface="Times New Roman" panose="02020603050405020304" pitchFamily="18" charset="0"/>
+              </a:rPr>
+              <a:t>(</a:t>
+            </a:r>
+            <a:r>
+              <a:rPr lang="en-US" i="1" dirty="0">
+                <a:latin typeface="Times New Roman" panose="02020603050405020304" pitchFamily="18" charset="0"/>
+                <a:cs typeface="Times New Roman" panose="02020603050405020304" pitchFamily="18" charset="0"/>
+              </a:rPr>
+              <a:t>k</a:t>
+            </a:r>
+            <a:r>
+              <a:rPr lang="en-CN" i="1" baseline="-25000" dirty="0">
+                <a:latin typeface="Times New Roman" panose="02020603050405020304" pitchFamily="18" charset="0"/>
+                <a:cs typeface="Times New Roman" panose="02020603050405020304" pitchFamily="18" charset="0"/>
+              </a:rPr>
+              <a:t>i-</a:t>
+            </a:r>
+            <a:r>
+              <a:rPr lang="en-CN" baseline="-25000" dirty="0">
+                <a:latin typeface="Times New Roman" panose="02020603050405020304" pitchFamily="18" charset="0"/>
+                <a:cs typeface="Times New Roman" panose="02020603050405020304" pitchFamily="18" charset="0"/>
+              </a:rPr>
+              <a:t>1</a:t>
+            </a:r>
+            <a:r>
+              <a:rPr lang="en-CN" dirty="0">
+                <a:latin typeface="Times New Roman" panose="02020603050405020304" pitchFamily="18" charset="0"/>
+                <a:cs typeface="Times New Roman" panose="02020603050405020304" pitchFamily="18" charset="0"/>
+              </a:rPr>
+              <a:t>, </a:t>
+            </a:r>
+            <a:r>
+              <a:rPr lang="en-CN" i="1" dirty="0">
+                <a:latin typeface="Times New Roman" panose="02020603050405020304" pitchFamily="18" charset="0"/>
+                <a:cs typeface="Times New Roman" panose="02020603050405020304" pitchFamily="18" charset="0"/>
+              </a:rPr>
+              <a:t>t</a:t>
+            </a:r>
+            <a:r>
+              <a:rPr lang="en-CN" i="1" baseline="-25000" dirty="0">
+                <a:latin typeface="Times New Roman" panose="02020603050405020304" pitchFamily="18" charset="0"/>
+                <a:cs typeface="Times New Roman" panose="02020603050405020304" pitchFamily="18" charset="0"/>
+              </a:rPr>
+              <a:t>i</a:t>
+            </a:r>
+            <a:r>
+              <a:rPr lang="en-CN" baseline="-25000" dirty="0">
+                <a:latin typeface="Times New Roman" panose="02020603050405020304" pitchFamily="18" charset="0"/>
+                <a:cs typeface="Times New Roman" panose="02020603050405020304" pitchFamily="18" charset="0"/>
+              </a:rPr>
+              <a:t>-1</a:t>
+            </a:r>
+            <a:r>
+              <a:rPr lang="en-CN" dirty="0">
+                <a:latin typeface="Times New Roman" panose="02020603050405020304" pitchFamily="18" charset="0"/>
+                <a:cs typeface="Times New Roman" panose="02020603050405020304" pitchFamily="18" charset="0"/>
+              </a:rPr>
+              <a:t>)</a:t>
+            </a:r>
+            <a:endParaRPr lang="en-CN" baseline="-25000" dirty="0">
+              <a:latin typeface="Times New Roman" panose="02020603050405020304" pitchFamily="18" charset="0"/>
+              <a:cs typeface="Times New Roman" panose="02020603050405020304" pitchFamily="18" charset="0"/>
+            </a:endParaRPr>
+          </a:p>
+        </p:txBody>
+      </p:sp>
+      <p:sp>
+        <p:nvSpPr>
+          <p:cNvPr id="60" name="Rectangle 59">
+            <a:extLst>
+              <a:ext uri="{FF2B5EF4-FFF2-40B4-BE49-F238E27FC236}">
+                <a16:creationId xmlns:a16="http://schemas.microsoft.com/office/drawing/2014/main" id="{B55E3091-F558-F549-AE68-A2D7AB348F4A}"/>
+              </a:ext>
+            </a:extLst>
+          </p:cNvPr>
+          <p:cNvSpPr/>
+          <p:nvPr/>
+        </p:nvSpPr>
+        <p:spPr>
+          <a:xfrm>
+            <a:off x="6967667" y="3623595"/>
+            <a:ext cx="1092296" cy="567559"/>
+          </a:xfrm>
+          <a:prstGeom prst="rect">
+            <a:avLst/>
+          </a:prstGeom>
+        </p:spPr>
+        <p:style>
+          <a:lnRef idx="2">
+            <a:schemeClr val="dk1"/>
+          </a:lnRef>
+          <a:fillRef idx="1">
+            <a:schemeClr val="lt1"/>
+          </a:fillRef>
+          <a:effectRef idx="0">
+            <a:schemeClr val="dk1"/>
+          </a:effectRef>
+          <a:fontRef idx="minor">
+            <a:schemeClr val="dk1"/>
+          </a:fontRef>
+        </p:style>
+        <p:txBody>
+          <a:bodyPr rtlCol="0" anchor="ctr"/>
+          <a:lstStyle/>
+          <a:p>
+            <a:pPr algn="ctr"/>
+            <a:r>
+              <a:rPr lang="en-CN" dirty="0">
+                <a:latin typeface="Times New Roman" panose="02020603050405020304" pitchFamily="18" charset="0"/>
+                <a:cs typeface="Times New Roman" panose="02020603050405020304" pitchFamily="18" charset="0"/>
+              </a:rPr>
+              <a:t>(</a:t>
+            </a:r>
+            <a:r>
+              <a:rPr lang="en-CN" i="1" dirty="0">
+                <a:latin typeface="Times New Roman" panose="02020603050405020304" pitchFamily="18" charset="0"/>
+                <a:cs typeface="Times New Roman" panose="02020603050405020304" pitchFamily="18" charset="0"/>
+              </a:rPr>
+              <a:t>k</a:t>
+            </a:r>
+            <a:r>
+              <a:rPr lang="en-CN" baseline="-25000" dirty="0">
+                <a:latin typeface="Times New Roman" panose="02020603050405020304" pitchFamily="18" charset="0"/>
+                <a:cs typeface="Times New Roman" panose="02020603050405020304" pitchFamily="18" charset="0"/>
+              </a:rPr>
+              <a:t>1</a:t>
+            </a:r>
+            <a:r>
+              <a:rPr lang="en-CN" i="1" baseline="-25000" dirty="0">
+                <a:latin typeface="Times New Roman" panose="02020603050405020304" pitchFamily="18" charset="0"/>
+                <a:cs typeface="Times New Roman" panose="02020603050405020304" pitchFamily="18" charset="0"/>
+              </a:rPr>
+              <a:t> </a:t>
+            </a:r>
+            <a:r>
+              <a:rPr lang="en-CN" dirty="0">
+                <a:latin typeface="Times New Roman" panose="02020603050405020304" pitchFamily="18" charset="0"/>
+                <a:cs typeface="Times New Roman" panose="02020603050405020304" pitchFamily="18" charset="0"/>
+              </a:rPr>
+              <a:t>,</a:t>
+            </a:r>
+            <a:r>
+              <a:rPr lang="en-CN" i="1" dirty="0">
+                <a:latin typeface="Times New Roman" panose="02020603050405020304" pitchFamily="18" charset="0"/>
+                <a:cs typeface="Times New Roman" panose="02020603050405020304" pitchFamily="18" charset="0"/>
+              </a:rPr>
+              <a:t> t</a:t>
+            </a:r>
+            <a:r>
+              <a:rPr lang="en-CN" baseline="-25000" dirty="0">
+                <a:latin typeface="Times New Roman" panose="02020603050405020304" pitchFamily="18" charset="0"/>
+                <a:cs typeface="Times New Roman" panose="02020603050405020304" pitchFamily="18" charset="0"/>
+              </a:rPr>
+              <a:t>1</a:t>
+            </a:r>
+            <a:r>
+              <a:rPr lang="en-CN" dirty="0">
+                <a:latin typeface="Times New Roman" panose="02020603050405020304" pitchFamily="18" charset="0"/>
+                <a:cs typeface="Times New Roman" panose="02020603050405020304" pitchFamily="18" charset="0"/>
+              </a:rPr>
+              <a:t>)</a:t>
+            </a:r>
+            <a:endParaRPr lang="en-CN" baseline="-25000" dirty="0">
+              <a:latin typeface="Times New Roman" panose="02020603050405020304" pitchFamily="18" charset="0"/>
+              <a:cs typeface="Times New Roman" panose="02020603050405020304" pitchFamily="18" charset="0"/>
+            </a:endParaRPr>
+          </a:p>
+        </p:txBody>
+      </p:sp>
+      <p:sp>
+        <p:nvSpPr>
+          <p:cNvPr id="61" name="Rectangle 60">
+            <a:extLst>
+              <a:ext uri="{FF2B5EF4-FFF2-40B4-BE49-F238E27FC236}">
+                <a16:creationId xmlns:a16="http://schemas.microsoft.com/office/drawing/2014/main" id="{D9B56D6B-7D52-CC49-B670-AAF393A11EC6}"/>
+              </a:ext>
+            </a:extLst>
+          </p:cNvPr>
+          <p:cNvSpPr/>
+          <p:nvPr/>
+        </p:nvSpPr>
+        <p:spPr>
+          <a:xfrm>
+            <a:off x="5864029" y="3623596"/>
+            <a:ext cx="1092296" cy="567559"/>
+          </a:xfrm>
+          <a:prstGeom prst="rect">
+            <a:avLst/>
+          </a:prstGeom>
+        </p:spPr>
+        <p:style>
+          <a:lnRef idx="2">
+            <a:schemeClr val="dk1"/>
+          </a:lnRef>
+          <a:fillRef idx="1">
+            <a:schemeClr val="lt1"/>
+          </a:fillRef>
+          <a:effectRef idx="0">
+            <a:schemeClr val="dk1"/>
+          </a:effectRef>
+          <a:fontRef idx="minor">
+            <a:schemeClr val="dk1"/>
+          </a:fontRef>
+        </p:style>
+        <p:txBody>
+          <a:bodyPr rtlCol="0" anchor="ctr"/>
+          <a:lstStyle/>
+          <a:p>
+            <a:pPr algn="ctr"/>
+            <a:r>
+              <a:rPr lang="en-CN" i="1" dirty="0">
+                <a:latin typeface="Times New Roman" panose="02020603050405020304" pitchFamily="18" charset="0"/>
+                <a:cs typeface="Times New Roman" panose="02020603050405020304" pitchFamily="18" charset="0"/>
+              </a:rPr>
+              <a:t>…</a:t>
+            </a:r>
+            <a:endParaRPr lang="en-CN" baseline="-25000" dirty="0"/>
+          </a:p>
+        </p:txBody>
+      </p:sp>
+      <p:sp>
+        <p:nvSpPr>
+          <p:cNvPr id="62" name="TextBox 61">
+            <a:extLst>
+              <a:ext uri="{FF2B5EF4-FFF2-40B4-BE49-F238E27FC236}">
+                <a16:creationId xmlns:a16="http://schemas.microsoft.com/office/drawing/2014/main" id="{A86C3519-CBB0-DF47-A2DC-7C40D904C332}"/>
+              </a:ext>
+            </a:extLst>
+          </p:cNvPr>
+          <p:cNvSpPr txBox="1"/>
+          <p:nvPr/>
+        </p:nvSpPr>
+        <p:spPr>
+          <a:xfrm>
+            <a:off x="6272960" y="4259471"/>
+            <a:ext cx="248786" cy="369332"/>
+          </a:xfrm>
+          <a:prstGeom prst="rect">
+            <a:avLst/>
+          </a:prstGeom>
+          <a:noFill/>
+        </p:spPr>
+        <p:txBody>
+          <a:bodyPr wrap="none" rtlCol="0">
+            <a:spAutoFit/>
+          </a:bodyPr>
+          <a:lstStyle/>
+          <a:p>
+            <a:r>
+              <a:rPr lang="en-US" i="1" dirty="0">
+                <a:latin typeface="Times New Roman" panose="02020603050405020304" pitchFamily="18" charset="0"/>
+                <a:cs typeface="Times New Roman" panose="02020603050405020304" pitchFamily="18" charset="0"/>
+              </a:rPr>
+              <a:t>l</a:t>
+            </a:r>
+            <a:endParaRPr lang="en-CN" i="1" baseline="-25000" dirty="0">
+              <a:latin typeface="Times New Roman" panose="02020603050405020304" pitchFamily="18" charset="0"/>
+              <a:cs typeface="Times New Roman" panose="02020603050405020304" pitchFamily="18" charset="0"/>
+            </a:endParaRPr>
+          </a:p>
+        </p:txBody>
+      </p:sp>
+      <p:cxnSp>
+        <p:nvCxnSpPr>
+          <p:cNvPr id="18" name="Curved Connector 17">
+            <a:extLst>
+              <a:ext uri="{FF2B5EF4-FFF2-40B4-BE49-F238E27FC236}">
+                <a16:creationId xmlns:a16="http://schemas.microsoft.com/office/drawing/2014/main" id="{39561342-1DE1-AE4C-A6DE-1466FC05537A}"/>
+              </a:ext>
+            </a:extLst>
+          </p:cNvPr>
+          <p:cNvCxnSpPr>
+            <a:stCxn id="39" idx="0"/>
+            <a:endCxn id="59" idx="1"/>
+          </p:cNvCxnSpPr>
+          <p:nvPr/>
+        </p:nvCxnSpPr>
+        <p:spPr>
+          <a:xfrm rot="5400000" flipH="1" flipV="1">
+            <a:off x="3674782" y="3469797"/>
+            <a:ext cx="659370" cy="1534531"/>
+          </a:xfrm>
+          <a:prstGeom prst="curvedConnector2">
+            <a:avLst/>
+          </a:prstGeom>
+          <a:ln>
+            <a:prstDash val="dash"/>
+            <a:tailEnd type="triangle"/>
+          </a:ln>
+        </p:spPr>
+        <p:style>
+          <a:lnRef idx="2">
+            <a:schemeClr val="dk1"/>
+          </a:lnRef>
+          <a:fillRef idx="0">
+            <a:schemeClr val="dk1"/>
+          </a:fillRef>
+          <a:effectRef idx="1">
+            <a:schemeClr val="dk1"/>
+          </a:effectRef>
+          <a:fontRef idx="minor">
+            <a:schemeClr val="tx1"/>
+          </a:fontRef>
+        </p:style>
+      </p:cxnSp>
+      <p:cxnSp>
+        <p:nvCxnSpPr>
+          <p:cNvPr id="63" name="Curved Connector 62">
+            <a:extLst>
+              <a:ext uri="{FF2B5EF4-FFF2-40B4-BE49-F238E27FC236}">
+                <a16:creationId xmlns:a16="http://schemas.microsoft.com/office/drawing/2014/main" id="{8B962806-13AF-9948-8AC3-710B7FC58582}"/>
+              </a:ext>
+            </a:extLst>
+          </p:cNvPr>
+          <p:cNvCxnSpPr>
+            <a:cxnSpLocks/>
+            <a:stCxn id="39" idx="2"/>
+            <a:endCxn id="45" idx="1"/>
+          </p:cNvCxnSpPr>
+          <p:nvPr/>
+        </p:nvCxnSpPr>
+        <p:spPr>
+          <a:xfrm rot="16200000" flipH="1">
+            <a:off x="3710428" y="4661079"/>
+            <a:ext cx="588079" cy="1534531"/>
+          </a:xfrm>
+          <a:prstGeom prst="curvedConnector2">
+            <a:avLst/>
+          </a:prstGeom>
+          <a:ln>
+            <a:prstDash val="dash"/>
+            <a:tailEnd type="triangle"/>
+          </a:ln>
+        </p:spPr>
+        <p:style>
+          <a:lnRef idx="2">
+            <a:schemeClr val="dk1"/>
+          </a:lnRef>
+          <a:fillRef idx="0">
+            <a:schemeClr val="dk1"/>
+          </a:fillRef>
+          <a:effectRef idx="1">
+            <a:schemeClr val="dk1"/>
+          </a:effectRef>
+          <a:fontRef idx="minor">
+            <a:schemeClr val="tx1"/>
+          </a:fontRef>
+        </p:style>
+      </p:cxnSp>
+      <p:sp>
+        <p:nvSpPr>
+          <p:cNvPr id="21" name="TextBox 20">
+            <a:extLst>
+              <a:ext uri="{FF2B5EF4-FFF2-40B4-BE49-F238E27FC236}">
+                <a16:creationId xmlns:a16="http://schemas.microsoft.com/office/drawing/2014/main" id="{3CFAFEA3-C1A8-2F46-A73E-5956D45242D4}"/>
+              </a:ext>
+            </a:extLst>
+          </p:cNvPr>
+          <p:cNvSpPr txBox="1"/>
+          <p:nvPr/>
+        </p:nvSpPr>
+        <p:spPr>
+          <a:xfrm>
+            <a:off x="4635062" y="4628803"/>
+            <a:ext cx="654346" cy="369332"/>
+          </a:xfrm>
+          <a:prstGeom prst="rect">
+            <a:avLst/>
+          </a:prstGeom>
+          <a:noFill/>
+        </p:spPr>
+        <p:txBody>
+          <a:bodyPr wrap="none" rtlCol="0">
+            <a:spAutoFit/>
+          </a:bodyPr>
+          <a:lstStyle/>
+          <a:p>
+            <a:r>
+              <a:rPr lang="en-CN" dirty="0"/>
+              <a:t>head</a:t>
+            </a:r>
+          </a:p>
+        </p:txBody>
+      </p:sp>
+      <p:sp>
+        <p:nvSpPr>
+          <p:cNvPr id="64" name="TextBox 63">
+            <a:extLst>
+              <a:ext uri="{FF2B5EF4-FFF2-40B4-BE49-F238E27FC236}">
+                <a16:creationId xmlns:a16="http://schemas.microsoft.com/office/drawing/2014/main" id="{42202E78-FF2D-A94E-A72D-FF4B1DAEC54B}"/>
+              </a:ext>
+            </a:extLst>
+          </p:cNvPr>
+          <p:cNvSpPr txBox="1"/>
+          <p:nvPr/>
+        </p:nvSpPr>
+        <p:spPr>
+          <a:xfrm>
+            <a:off x="8020366" y="4605894"/>
+            <a:ext cx="475195" cy="369332"/>
+          </a:xfrm>
+          <a:prstGeom prst="rect">
+            <a:avLst/>
+          </a:prstGeom>
+          <a:noFill/>
+        </p:spPr>
+        <p:txBody>
+          <a:bodyPr wrap="none" rtlCol="0">
+            <a:spAutoFit/>
+          </a:bodyPr>
+          <a:lstStyle/>
+          <a:p>
+            <a:r>
+              <a:rPr lang="en-CN" dirty="0"/>
+              <a:t>tail</a:t>
+            </a:r>
+          </a:p>
+        </p:txBody>
+      </p:sp>
+    </p:spTree>
+    <p:extLst>
+      <p:ext uri="{BB962C8B-B14F-4D97-AF65-F5344CB8AC3E}">
+        <p14:creationId xmlns:p14="http://schemas.microsoft.com/office/powerpoint/2010/main" val="2366997393"/>
       </p:ext>
     </p:extLst>
   </p:cSld>

</xml_diff>

<commit_message>
Paired list B-tree, step left/right (EN)
</commit_message>
<xml_diff>
--- a/datastruct/tree/B-tree/img/btrees.pptx
+++ b/datastruct/tree/B-tree/img/btrees.pptx
@@ -12172,14 +12172,7 @@
                 <a:latin typeface="Times New Roman" panose="02020603050405020304" pitchFamily="18" charset="0"/>
                 <a:cs typeface="Times New Roman" panose="02020603050405020304" pitchFamily="18" charset="0"/>
               </a:rPr>
-              <a:t>i+</a:t>
-            </a:r>
-            <a:r>
-              <a:rPr lang="en-CN" baseline="-25000" dirty="0">
-                <a:latin typeface="Times New Roman" panose="02020603050405020304" pitchFamily="18" charset="0"/>
-                <a:cs typeface="Times New Roman" panose="02020603050405020304" pitchFamily="18" charset="0"/>
-              </a:rPr>
-              <a:t>1</a:t>
+              <a:t>i </a:t>
             </a:r>
             <a:r>
               <a:rPr lang="en-CN" dirty="0">

</xml_diff>

<commit_message>
Added a figure to illustrate del (EN)
</commit_message>
<xml_diff>
--- a/datastruct/tree/B-tree/img/btrees.pptx
+++ b/datastruct/tree/B-tree/img/btrees.pptx
@@ -5,7 +5,7 @@
     <p:sldMasterId id="2147483648" r:id="rId1"/>
   </p:sldMasterIdLst>
   <p:notesMasterIdLst>
-    <p:notesMasterId r:id="rId7"/>
+    <p:notesMasterId r:id="rId8"/>
   </p:notesMasterIdLst>
   <p:sldIdLst>
     <p:sldId id="256" r:id="rId2"/>
@@ -13,6 +13,7 @@
     <p:sldId id="258" r:id="rId4"/>
     <p:sldId id="259" r:id="rId5"/>
     <p:sldId id="260" r:id="rId6"/>
+    <p:sldId id="261" r:id="rId7"/>
   </p:sldIdLst>
   <p:sldSz cx="12192000" cy="6858000"/>
   <p:notesSz cx="6858000" cy="9144000"/>
@@ -201,7 +202,7 @@
           <a:p>
             <a:fld id="{22594BF6-097C-9847-BA6A-E18D0743F6CE}" type="datetimeFigureOut">
               <a:rPr lang="en-CN" smtClean="0"/>
-              <a:t>2021/9/25</a:t>
+              <a:t>2021/10/6</a:t>
             </a:fld>
             <a:endParaRPr lang="en-CN"/>
           </a:p>
@@ -931,6 +932,93 @@
 </p:notes>
 </file>
 
+<file path=ppt/notesSlides/notesSlide6.xml><?xml version="1.0" encoding="utf-8"?>
+<p:notes xmlns:a="http://schemas.openxmlformats.org/drawingml/2006/main" xmlns:r="http://schemas.openxmlformats.org/officeDocument/2006/relationships" xmlns:p="http://schemas.openxmlformats.org/presentationml/2006/main">
+  <p:cSld>
+    <p:spTree>
+      <p:nvGrpSpPr>
+        <p:cNvPr id="1" name=""/>
+        <p:cNvGrpSpPr/>
+        <p:nvPr/>
+      </p:nvGrpSpPr>
+      <p:grpSpPr>
+        <a:xfrm>
+          <a:off x="0" y="0"/>
+          <a:ext cx="0" cy="0"/>
+          <a:chOff x="0" y="0"/>
+          <a:chExt cx="0" cy="0"/>
+        </a:xfrm>
+      </p:grpSpPr>
+      <p:sp>
+        <p:nvSpPr>
+          <p:cNvPr id="2" name="Slide Image Placeholder 1"/>
+          <p:cNvSpPr>
+            <a:spLocks noGrp="1" noRot="1" noChangeAspect="1"/>
+          </p:cNvSpPr>
+          <p:nvPr>
+            <p:ph type="sldImg"/>
+          </p:nvPr>
+        </p:nvSpPr>
+        <p:spPr/>
+      </p:sp>
+      <p:sp>
+        <p:nvSpPr>
+          <p:cNvPr id="3" name="Notes Placeholder 2"/>
+          <p:cNvSpPr>
+            <a:spLocks noGrp="1"/>
+          </p:cNvSpPr>
+          <p:nvPr>
+            <p:ph type="body" idx="1"/>
+          </p:nvPr>
+        </p:nvSpPr>
+        <p:spPr/>
+        <p:txBody>
+          <a:bodyPr/>
+          <a:lstStyle/>
+          <a:p>
+            <a:r>
+              <a:rPr lang="en-CN" dirty="0"/>
+              <a:t>delete</a:t>
+            </a:r>
+          </a:p>
+        </p:txBody>
+      </p:sp>
+      <p:sp>
+        <p:nvSpPr>
+          <p:cNvPr id="4" name="Slide Number Placeholder 3"/>
+          <p:cNvSpPr>
+            <a:spLocks noGrp="1"/>
+          </p:cNvSpPr>
+          <p:nvPr>
+            <p:ph type="sldNum" sz="quarter" idx="5"/>
+          </p:nvPr>
+        </p:nvSpPr>
+        <p:spPr/>
+        <p:txBody>
+          <a:bodyPr/>
+          <a:lstStyle/>
+          <a:p>
+            <a:fld id="{86C81B2F-A610-2949-B9DC-A3E483DF43DC}" type="slidenum">
+              <a:rPr lang="en-CN" smtClean="0"/>
+              <a:t>6</a:t>
+            </a:fld>
+            <a:endParaRPr lang="en-CN"/>
+          </a:p>
+        </p:txBody>
+      </p:sp>
+    </p:spTree>
+    <p:extLst>
+      <p:ext uri="{BB962C8B-B14F-4D97-AF65-F5344CB8AC3E}">
+        <p14:creationId xmlns:p14="http://schemas.microsoft.com/office/powerpoint/2010/main" val="1910210032"/>
+      </p:ext>
+    </p:extLst>
+  </p:cSld>
+  <p:clrMapOvr>
+    <a:masterClrMapping/>
+  </p:clrMapOvr>
+</p:notes>
+</file>
+
 <file path=ppt/slideLayouts/slideLayout1.xml><?xml version="1.0" encoding="utf-8"?>
 <p:sldLayout xmlns:a="http://schemas.openxmlformats.org/drawingml/2006/main" xmlns:r="http://schemas.openxmlformats.org/officeDocument/2006/relationships" xmlns:p="http://schemas.openxmlformats.org/presentationml/2006/main" type="title" preserve="1">
   <p:cSld name="Title Slide">
@@ -1080,7 +1168,7 @@
           <a:p>
             <a:fld id="{B6EEB924-5985-A949-B5CF-883A526C1012}" type="datetimeFigureOut">
               <a:rPr lang="en-CN" smtClean="0"/>
-              <a:t>2021/9/25</a:t>
+              <a:t>2021/10/6</a:t>
             </a:fld>
             <a:endParaRPr lang="en-CN"/>
           </a:p>
@@ -1280,7 +1368,7 @@
           <a:p>
             <a:fld id="{B6EEB924-5985-A949-B5CF-883A526C1012}" type="datetimeFigureOut">
               <a:rPr lang="en-CN" smtClean="0"/>
-              <a:t>2021/9/25</a:t>
+              <a:t>2021/10/6</a:t>
             </a:fld>
             <a:endParaRPr lang="en-CN"/>
           </a:p>
@@ -1490,7 +1578,7 @@
           <a:p>
             <a:fld id="{B6EEB924-5985-A949-B5CF-883A526C1012}" type="datetimeFigureOut">
               <a:rPr lang="en-CN" smtClean="0"/>
-              <a:t>2021/9/25</a:t>
+              <a:t>2021/10/6</a:t>
             </a:fld>
             <a:endParaRPr lang="en-CN"/>
           </a:p>
@@ -1690,7 +1778,7 @@
           <a:p>
             <a:fld id="{B6EEB924-5985-A949-B5CF-883A526C1012}" type="datetimeFigureOut">
               <a:rPr lang="en-CN" smtClean="0"/>
-              <a:t>2021/9/25</a:t>
+              <a:t>2021/10/6</a:t>
             </a:fld>
             <a:endParaRPr lang="en-CN"/>
           </a:p>
@@ -1966,7 +2054,7 @@
           <a:p>
             <a:fld id="{B6EEB924-5985-A949-B5CF-883A526C1012}" type="datetimeFigureOut">
               <a:rPr lang="en-CN" smtClean="0"/>
-              <a:t>2021/9/25</a:t>
+              <a:t>2021/10/6</a:t>
             </a:fld>
             <a:endParaRPr lang="en-CN"/>
           </a:p>
@@ -2234,7 +2322,7 @@
           <a:p>
             <a:fld id="{B6EEB924-5985-A949-B5CF-883A526C1012}" type="datetimeFigureOut">
               <a:rPr lang="en-CN" smtClean="0"/>
-              <a:t>2021/9/25</a:t>
+              <a:t>2021/10/6</a:t>
             </a:fld>
             <a:endParaRPr lang="en-CN"/>
           </a:p>
@@ -2649,7 +2737,7 @@
           <a:p>
             <a:fld id="{B6EEB924-5985-A949-B5CF-883A526C1012}" type="datetimeFigureOut">
               <a:rPr lang="en-CN" smtClean="0"/>
-              <a:t>2021/9/25</a:t>
+              <a:t>2021/10/6</a:t>
             </a:fld>
             <a:endParaRPr lang="en-CN"/>
           </a:p>
@@ -2791,7 +2879,7 @@
           <a:p>
             <a:fld id="{B6EEB924-5985-A949-B5CF-883A526C1012}" type="datetimeFigureOut">
               <a:rPr lang="en-CN" smtClean="0"/>
-              <a:t>2021/9/25</a:t>
+              <a:t>2021/10/6</a:t>
             </a:fld>
             <a:endParaRPr lang="en-CN"/>
           </a:p>
@@ -2904,7 +2992,7 @@
           <a:p>
             <a:fld id="{B6EEB924-5985-A949-B5CF-883A526C1012}" type="datetimeFigureOut">
               <a:rPr lang="en-CN" smtClean="0"/>
-              <a:t>2021/9/25</a:t>
+              <a:t>2021/10/6</a:t>
             </a:fld>
             <a:endParaRPr lang="en-CN"/>
           </a:p>
@@ -3217,7 +3305,7 @@
           <a:p>
             <a:fld id="{B6EEB924-5985-A949-B5CF-883A526C1012}" type="datetimeFigureOut">
               <a:rPr lang="en-CN" smtClean="0"/>
-              <a:t>2021/9/25</a:t>
+              <a:t>2021/10/6</a:t>
             </a:fld>
             <a:endParaRPr lang="en-CN"/>
           </a:p>
@@ -3506,7 +3594,7 @@
           <a:p>
             <a:fld id="{B6EEB924-5985-A949-B5CF-883A526C1012}" type="datetimeFigureOut">
               <a:rPr lang="en-CN" smtClean="0"/>
-              <a:t>2021/9/25</a:t>
+              <a:t>2021/10/6</a:t>
             </a:fld>
             <a:endParaRPr lang="en-CN"/>
           </a:p>
@@ -3749,7 +3837,7 @@
           <a:p>
             <a:fld id="{B6EEB924-5985-A949-B5CF-883A526C1012}" type="datetimeFigureOut">
               <a:rPr lang="en-CN" smtClean="0"/>
-              <a:t>2021/9/25</a:t>
+              <a:t>2021/10/6</a:t>
             </a:fld>
             <a:endParaRPr lang="en-CN"/>
           </a:p>
@@ -12879,6 +12967,989 @@
     <p:extLst>
       <p:ext uri="{BB962C8B-B14F-4D97-AF65-F5344CB8AC3E}">
         <p14:creationId xmlns:p14="http://schemas.microsoft.com/office/powerpoint/2010/main" val="2366997393"/>
+      </p:ext>
+    </p:extLst>
+  </p:cSld>
+  <p:clrMapOvr>
+    <a:masterClrMapping/>
+  </p:clrMapOvr>
+</p:sld>
+</file>
+
+<file path=ppt/slides/slide6.xml><?xml version="1.0" encoding="utf-8"?>
+<p:sld xmlns:a="http://schemas.openxmlformats.org/drawingml/2006/main" xmlns:r="http://schemas.openxmlformats.org/officeDocument/2006/relationships" xmlns:p="http://schemas.openxmlformats.org/presentationml/2006/main">
+  <p:cSld>
+    <p:spTree>
+      <p:nvGrpSpPr>
+        <p:cNvPr id="1" name=""/>
+        <p:cNvGrpSpPr/>
+        <p:nvPr/>
+      </p:nvGrpSpPr>
+      <p:grpSpPr>
+        <a:xfrm>
+          <a:off x="0" y="0"/>
+          <a:ext cx="0" cy="0"/>
+          <a:chOff x="0" y="0"/>
+          <a:chExt cx="0" cy="0"/>
+        </a:xfrm>
+      </p:grpSpPr>
+      <p:sp>
+        <p:nvSpPr>
+          <p:cNvPr id="2" name="Rectangle 1">
+            <a:extLst>
+              <a:ext uri="{FF2B5EF4-FFF2-40B4-BE49-F238E27FC236}">
+                <a16:creationId xmlns:a16="http://schemas.microsoft.com/office/drawing/2014/main" id="{189FEDA9-4676-C348-BF68-BCE31F2D74DC}"/>
+              </a:ext>
+            </a:extLst>
+          </p:cNvPr>
+          <p:cNvSpPr/>
+          <p:nvPr/>
+        </p:nvSpPr>
+        <p:spPr>
+          <a:xfrm>
+            <a:off x="3920377" y="2703789"/>
+            <a:ext cx="609600" cy="567559"/>
+          </a:xfrm>
+          <a:prstGeom prst="rect">
+            <a:avLst/>
+          </a:prstGeom>
+        </p:spPr>
+        <p:style>
+          <a:lnRef idx="2">
+            <a:schemeClr val="dk1"/>
+          </a:lnRef>
+          <a:fillRef idx="1">
+            <a:schemeClr val="lt1"/>
+          </a:fillRef>
+          <a:effectRef idx="0">
+            <a:schemeClr val="dk1"/>
+          </a:effectRef>
+          <a:fontRef idx="minor">
+            <a:schemeClr val="dk1"/>
+          </a:fontRef>
+        </p:style>
+        <p:txBody>
+          <a:bodyPr rtlCol="0" anchor="ctr"/>
+          <a:lstStyle/>
+          <a:p>
+            <a:pPr algn="ctr"/>
+            <a:r>
+              <a:rPr lang="en-CN" i="1" dirty="0">
+                <a:latin typeface="Times New Roman" panose="02020603050405020304" pitchFamily="18" charset="0"/>
+                <a:cs typeface="Times New Roman" panose="02020603050405020304" pitchFamily="18" charset="0"/>
+              </a:rPr>
+              <a:t>k</a:t>
+            </a:r>
+            <a:r>
+              <a:rPr lang="en-CN" baseline="-25000" dirty="0"/>
+              <a:t>1</a:t>
+            </a:r>
+          </a:p>
+        </p:txBody>
+      </p:sp>
+      <p:sp>
+        <p:nvSpPr>
+          <p:cNvPr id="3" name="Rectangle 2">
+            <a:extLst>
+              <a:ext uri="{FF2B5EF4-FFF2-40B4-BE49-F238E27FC236}">
+                <a16:creationId xmlns:a16="http://schemas.microsoft.com/office/drawing/2014/main" id="{4680E9FB-24F9-F749-8020-CEAF45809070}"/>
+              </a:ext>
+            </a:extLst>
+          </p:cNvPr>
+          <p:cNvSpPr/>
+          <p:nvPr/>
+        </p:nvSpPr>
+        <p:spPr>
+          <a:xfrm>
+            <a:off x="4529977" y="2703789"/>
+            <a:ext cx="609600" cy="567559"/>
+          </a:xfrm>
+          <a:prstGeom prst="rect">
+            <a:avLst/>
+          </a:prstGeom>
+        </p:spPr>
+        <p:style>
+          <a:lnRef idx="2">
+            <a:schemeClr val="dk1"/>
+          </a:lnRef>
+          <a:fillRef idx="1">
+            <a:schemeClr val="lt1"/>
+          </a:fillRef>
+          <a:effectRef idx="0">
+            <a:schemeClr val="dk1"/>
+          </a:effectRef>
+          <a:fontRef idx="minor">
+            <a:schemeClr val="dk1"/>
+          </a:fontRef>
+        </p:style>
+        <p:txBody>
+          <a:bodyPr rtlCol="0" anchor="ctr"/>
+          <a:lstStyle/>
+          <a:p>
+            <a:pPr algn="ctr"/>
+            <a:r>
+              <a:rPr lang="en-CN" dirty="0">
+                <a:latin typeface="Times New Roman" panose="02020603050405020304" pitchFamily="18" charset="0"/>
+                <a:cs typeface="Times New Roman" panose="02020603050405020304" pitchFamily="18" charset="0"/>
+              </a:rPr>
+              <a:t>…</a:t>
+            </a:r>
+          </a:p>
+        </p:txBody>
+      </p:sp>
+      <p:sp>
+        <p:nvSpPr>
+          <p:cNvPr id="4" name="Rectangle 3">
+            <a:extLst>
+              <a:ext uri="{FF2B5EF4-FFF2-40B4-BE49-F238E27FC236}">
+                <a16:creationId xmlns:a16="http://schemas.microsoft.com/office/drawing/2014/main" id="{C7EDBC9B-6650-0142-B6FB-BFA039DDF865}"/>
+              </a:ext>
+            </a:extLst>
+          </p:cNvPr>
+          <p:cNvSpPr/>
+          <p:nvPr/>
+        </p:nvSpPr>
+        <p:spPr>
+          <a:xfrm>
+            <a:off x="5139577" y="2703789"/>
+            <a:ext cx="609600" cy="567559"/>
+          </a:xfrm>
+          <a:prstGeom prst="rect">
+            <a:avLst/>
+          </a:prstGeom>
+        </p:spPr>
+        <p:style>
+          <a:lnRef idx="2">
+            <a:schemeClr val="dk1"/>
+          </a:lnRef>
+          <a:fillRef idx="1">
+            <a:schemeClr val="lt1"/>
+          </a:fillRef>
+          <a:effectRef idx="0">
+            <a:schemeClr val="dk1"/>
+          </a:effectRef>
+          <a:fontRef idx="minor">
+            <a:schemeClr val="dk1"/>
+          </a:fontRef>
+        </p:style>
+        <p:txBody>
+          <a:bodyPr rtlCol="0" anchor="ctr"/>
+          <a:lstStyle/>
+          <a:p>
+            <a:pPr algn="ctr"/>
+            <a:r>
+              <a:rPr lang="en-US" i="1" dirty="0">
+                <a:latin typeface="Times New Roman" panose="02020603050405020304" pitchFamily="18" charset="0"/>
+                <a:cs typeface="Times New Roman" panose="02020603050405020304" pitchFamily="18" charset="0"/>
+              </a:rPr>
+              <a:t>k</a:t>
+            </a:r>
+            <a:r>
+              <a:rPr lang="en-CN" i="1" baseline="-25000" dirty="0">
+                <a:latin typeface="Times New Roman" panose="02020603050405020304" pitchFamily="18" charset="0"/>
+                <a:cs typeface="Times New Roman" panose="02020603050405020304" pitchFamily="18" charset="0"/>
+              </a:rPr>
+              <a:t>i</a:t>
+            </a:r>
+            <a:r>
+              <a:rPr lang="en-CN" baseline="-25000" dirty="0"/>
+              <a:t>-1</a:t>
+            </a:r>
+          </a:p>
+        </p:txBody>
+      </p:sp>
+      <p:sp>
+        <p:nvSpPr>
+          <p:cNvPr id="5" name="Rectangle 4">
+            <a:extLst>
+              <a:ext uri="{FF2B5EF4-FFF2-40B4-BE49-F238E27FC236}">
+                <a16:creationId xmlns:a16="http://schemas.microsoft.com/office/drawing/2014/main" id="{DE63870E-7602-C843-81FE-0E47B95D2BA3}"/>
+              </a:ext>
+            </a:extLst>
+          </p:cNvPr>
+          <p:cNvSpPr/>
+          <p:nvPr/>
+        </p:nvSpPr>
+        <p:spPr>
+          <a:xfrm>
+            <a:off x="6978902" y="2703789"/>
+            <a:ext cx="609600" cy="567559"/>
+          </a:xfrm>
+          <a:prstGeom prst="rect">
+            <a:avLst/>
+          </a:prstGeom>
+        </p:spPr>
+        <p:style>
+          <a:lnRef idx="2">
+            <a:schemeClr val="dk1"/>
+          </a:lnRef>
+          <a:fillRef idx="1">
+            <a:schemeClr val="lt1"/>
+          </a:fillRef>
+          <a:effectRef idx="0">
+            <a:schemeClr val="dk1"/>
+          </a:effectRef>
+          <a:fontRef idx="minor">
+            <a:schemeClr val="dk1"/>
+          </a:fontRef>
+        </p:style>
+        <p:txBody>
+          <a:bodyPr rtlCol="0" anchor="ctr"/>
+          <a:lstStyle/>
+          <a:p>
+            <a:pPr algn="ctr"/>
+            <a:r>
+              <a:rPr lang="en-CN" i="1" dirty="0">
+                <a:latin typeface="Times New Roman" panose="02020603050405020304" pitchFamily="18" charset="0"/>
+                <a:cs typeface="Times New Roman" panose="02020603050405020304" pitchFamily="18" charset="0"/>
+              </a:rPr>
+              <a:t>k</a:t>
+            </a:r>
+            <a:r>
+              <a:rPr lang="en-CN" i="1" baseline="-25000" dirty="0">
+                <a:latin typeface="Times New Roman" panose="02020603050405020304" pitchFamily="18" charset="0"/>
+                <a:cs typeface="Times New Roman" panose="02020603050405020304" pitchFamily="18" charset="0"/>
+              </a:rPr>
+              <a:t>n</a:t>
+            </a:r>
+          </a:p>
+        </p:txBody>
+      </p:sp>
+      <p:sp>
+        <p:nvSpPr>
+          <p:cNvPr id="6" name="Rectangle 5">
+            <a:extLst>
+              <a:ext uri="{FF2B5EF4-FFF2-40B4-BE49-F238E27FC236}">
+                <a16:creationId xmlns:a16="http://schemas.microsoft.com/office/drawing/2014/main" id="{FCD19DE3-CC58-EA44-A120-348FB37BE6D3}"/>
+              </a:ext>
+            </a:extLst>
+          </p:cNvPr>
+          <p:cNvSpPr/>
+          <p:nvPr/>
+        </p:nvSpPr>
+        <p:spPr>
+          <a:xfrm>
+            <a:off x="6369302" y="2703788"/>
+            <a:ext cx="609600" cy="567559"/>
+          </a:xfrm>
+          <a:prstGeom prst="rect">
+            <a:avLst/>
+          </a:prstGeom>
+        </p:spPr>
+        <p:style>
+          <a:lnRef idx="2">
+            <a:schemeClr val="dk1"/>
+          </a:lnRef>
+          <a:fillRef idx="1">
+            <a:schemeClr val="lt1"/>
+          </a:fillRef>
+          <a:effectRef idx="0">
+            <a:schemeClr val="dk1"/>
+          </a:effectRef>
+          <a:fontRef idx="minor">
+            <a:schemeClr val="dk1"/>
+          </a:fontRef>
+        </p:style>
+        <p:txBody>
+          <a:bodyPr rtlCol="0" anchor="ctr"/>
+          <a:lstStyle/>
+          <a:p>
+            <a:pPr algn="ctr"/>
+            <a:r>
+              <a:rPr lang="en-CN" i="1" dirty="0">
+                <a:latin typeface="Times New Roman" panose="02020603050405020304" pitchFamily="18" charset="0"/>
+                <a:cs typeface="Times New Roman" panose="02020603050405020304" pitchFamily="18" charset="0"/>
+              </a:rPr>
+              <a:t>…</a:t>
+            </a:r>
+            <a:endParaRPr lang="en-CN" baseline="-25000" dirty="0"/>
+          </a:p>
+        </p:txBody>
+      </p:sp>
+      <p:sp>
+        <p:nvSpPr>
+          <p:cNvPr id="7" name="Rectangle 6">
+            <a:extLst>
+              <a:ext uri="{FF2B5EF4-FFF2-40B4-BE49-F238E27FC236}">
+                <a16:creationId xmlns:a16="http://schemas.microsoft.com/office/drawing/2014/main" id="{4999A386-ACBB-3042-91AF-04F677630880}"/>
+              </a:ext>
+            </a:extLst>
+          </p:cNvPr>
+          <p:cNvSpPr/>
+          <p:nvPr/>
+        </p:nvSpPr>
+        <p:spPr>
+          <a:xfrm>
+            <a:off x="2680156" y="3896713"/>
+            <a:ext cx="609600" cy="567559"/>
+          </a:xfrm>
+          <a:prstGeom prst="rect">
+            <a:avLst/>
+          </a:prstGeom>
+        </p:spPr>
+        <p:style>
+          <a:lnRef idx="2">
+            <a:schemeClr val="dk1"/>
+          </a:lnRef>
+          <a:fillRef idx="1">
+            <a:schemeClr val="lt1"/>
+          </a:fillRef>
+          <a:effectRef idx="0">
+            <a:schemeClr val="dk1"/>
+          </a:effectRef>
+          <a:fontRef idx="minor">
+            <a:schemeClr val="dk1"/>
+          </a:fontRef>
+        </p:style>
+        <p:txBody>
+          <a:bodyPr rtlCol="0" anchor="ctr"/>
+          <a:lstStyle/>
+          <a:p>
+            <a:pPr algn="ctr"/>
+            <a:r>
+              <a:rPr lang="en-CN" i="1" dirty="0">
+                <a:latin typeface="Times New Roman" panose="02020603050405020304" pitchFamily="18" charset="0"/>
+                <a:cs typeface="Times New Roman" panose="02020603050405020304" pitchFamily="18" charset="0"/>
+              </a:rPr>
+              <a:t>t</a:t>
+            </a:r>
+            <a:r>
+              <a:rPr lang="en-CN" baseline="-25000" dirty="0"/>
+              <a:t>1</a:t>
+            </a:r>
+          </a:p>
+        </p:txBody>
+      </p:sp>
+      <p:cxnSp>
+        <p:nvCxnSpPr>
+          <p:cNvPr id="8" name="Straight Arrow Connector 7">
+            <a:extLst>
+              <a:ext uri="{FF2B5EF4-FFF2-40B4-BE49-F238E27FC236}">
+                <a16:creationId xmlns:a16="http://schemas.microsoft.com/office/drawing/2014/main" id="{ED32BCA5-1FE9-7D47-A1C6-F49FE714224B}"/>
+              </a:ext>
+            </a:extLst>
+          </p:cNvPr>
+          <p:cNvCxnSpPr>
+            <a:cxnSpLocks/>
+            <a:stCxn id="2" idx="1"/>
+            <a:endCxn id="7" idx="0"/>
+          </p:cNvCxnSpPr>
+          <p:nvPr/>
+        </p:nvCxnSpPr>
+        <p:spPr>
+          <a:xfrm flipH="1">
+            <a:off x="2984956" y="2987569"/>
+            <a:ext cx="935421" cy="909144"/>
+          </a:xfrm>
+          <a:prstGeom prst="straightConnector1">
+            <a:avLst/>
+          </a:prstGeom>
+          <a:ln>
+            <a:tailEnd type="triangle"/>
+          </a:ln>
+        </p:spPr>
+        <p:style>
+          <a:lnRef idx="2">
+            <a:schemeClr val="dk1"/>
+          </a:lnRef>
+          <a:fillRef idx="0">
+            <a:schemeClr val="dk1"/>
+          </a:fillRef>
+          <a:effectRef idx="1">
+            <a:schemeClr val="dk1"/>
+          </a:effectRef>
+          <a:fontRef idx="minor">
+            <a:schemeClr val="tx1"/>
+          </a:fontRef>
+        </p:style>
+      </p:cxnSp>
+      <p:sp>
+        <p:nvSpPr>
+          <p:cNvPr id="10" name="Rectangle 9">
+            <a:extLst>
+              <a:ext uri="{FF2B5EF4-FFF2-40B4-BE49-F238E27FC236}">
+                <a16:creationId xmlns:a16="http://schemas.microsoft.com/office/drawing/2014/main" id="{8DE390DE-496E-EA47-98A8-379F61771ED6}"/>
+              </a:ext>
+            </a:extLst>
+          </p:cNvPr>
+          <p:cNvSpPr/>
+          <p:nvPr/>
+        </p:nvSpPr>
+        <p:spPr>
+          <a:xfrm>
+            <a:off x="8114027" y="3896712"/>
+            <a:ext cx="609600" cy="567559"/>
+          </a:xfrm>
+          <a:prstGeom prst="rect">
+            <a:avLst/>
+          </a:prstGeom>
+        </p:spPr>
+        <p:style>
+          <a:lnRef idx="2">
+            <a:schemeClr val="dk1"/>
+          </a:lnRef>
+          <a:fillRef idx="1">
+            <a:schemeClr val="lt1"/>
+          </a:fillRef>
+          <a:effectRef idx="0">
+            <a:schemeClr val="dk1"/>
+          </a:effectRef>
+          <a:fontRef idx="minor">
+            <a:schemeClr val="dk1"/>
+          </a:fontRef>
+        </p:style>
+        <p:txBody>
+          <a:bodyPr rtlCol="0" anchor="ctr"/>
+          <a:lstStyle/>
+          <a:p>
+            <a:pPr algn="ctr"/>
+            <a:r>
+              <a:rPr lang="en-US" i="1" dirty="0">
+                <a:latin typeface="Times New Roman" panose="02020603050405020304" pitchFamily="18" charset="0"/>
+                <a:cs typeface="Times New Roman" panose="02020603050405020304" pitchFamily="18" charset="0"/>
+              </a:rPr>
+              <a:t>t</a:t>
+            </a:r>
+            <a:r>
+              <a:rPr lang="en-CN" i="1" baseline="-25000" dirty="0">
+                <a:latin typeface="Times New Roman" panose="02020603050405020304" pitchFamily="18" charset="0"/>
+                <a:cs typeface="Times New Roman" panose="02020603050405020304" pitchFamily="18" charset="0"/>
+              </a:rPr>
+              <a:t>n</a:t>
+            </a:r>
+            <a:r>
+              <a:rPr lang="en-CN" baseline="-25000" dirty="0">
+                <a:latin typeface="Times New Roman" panose="02020603050405020304" pitchFamily="18" charset="0"/>
+                <a:cs typeface="Times New Roman" panose="02020603050405020304" pitchFamily="18" charset="0"/>
+              </a:rPr>
+              <a:t>+1</a:t>
+            </a:r>
+          </a:p>
+        </p:txBody>
+      </p:sp>
+      <p:cxnSp>
+        <p:nvCxnSpPr>
+          <p:cNvPr id="11" name="Straight Arrow Connector 10">
+            <a:extLst>
+              <a:ext uri="{FF2B5EF4-FFF2-40B4-BE49-F238E27FC236}">
+                <a16:creationId xmlns:a16="http://schemas.microsoft.com/office/drawing/2014/main" id="{FBF945F6-8D14-4A48-8A7E-5EAF86DA369D}"/>
+              </a:ext>
+            </a:extLst>
+          </p:cNvPr>
+          <p:cNvCxnSpPr>
+            <a:cxnSpLocks/>
+            <a:stCxn id="5" idx="3"/>
+            <a:endCxn id="10" idx="0"/>
+          </p:cNvCxnSpPr>
+          <p:nvPr/>
+        </p:nvCxnSpPr>
+        <p:spPr>
+          <a:xfrm>
+            <a:off x="7588502" y="2987569"/>
+            <a:ext cx="830325" cy="909143"/>
+          </a:xfrm>
+          <a:prstGeom prst="straightConnector1">
+            <a:avLst/>
+          </a:prstGeom>
+          <a:ln>
+            <a:tailEnd type="triangle"/>
+          </a:ln>
+        </p:spPr>
+        <p:style>
+          <a:lnRef idx="2">
+            <a:schemeClr val="dk1"/>
+          </a:lnRef>
+          <a:fillRef idx="0">
+            <a:schemeClr val="dk1"/>
+          </a:fillRef>
+          <a:effectRef idx="1">
+            <a:schemeClr val="dk1"/>
+          </a:effectRef>
+          <a:fontRef idx="minor">
+            <a:schemeClr val="tx1"/>
+          </a:fontRef>
+        </p:style>
+      </p:cxnSp>
+      <p:sp>
+        <p:nvSpPr>
+          <p:cNvPr id="12" name="Rectangle 11">
+            <a:extLst>
+              <a:ext uri="{FF2B5EF4-FFF2-40B4-BE49-F238E27FC236}">
+                <a16:creationId xmlns:a16="http://schemas.microsoft.com/office/drawing/2014/main" id="{A71C68CF-670C-DD44-B47B-9B7C6FCEB40E}"/>
+              </a:ext>
+            </a:extLst>
+          </p:cNvPr>
+          <p:cNvSpPr/>
+          <p:nvPr/>
+        </p:nvSpPr>
+        <p:spPr>
+          <a:xfrm>
+            <a:off x="5749177" y="2703788"/>
+            <a:ext cx="609600" cy="567559"/>
+          </a:xfrm>
+          <a:prstGeom prst="rect">
+            <a:avLst/>
+          </a:prstGeom>
+        </p:spPr>
+        <p:style>
+          <a:lnRef idx="2">
+            <a:schemeClr val="dk1"/>
+          </a:lnRef>
+          <a:fillRef idx="1">
+            <a:schemeClr val="lt1"/>
+          </a:fillRef>
+          <a:effectRef idx="0">
+            <a:schemeClr val="dk1"/>
+          </a:effectRef>
+          <a:fontRef idx="minor">
+            <a:schemeClr val="dk1"/>
+          </a:fontRef>
+        </p:style>
+        <p:txBody>
+          <a:bodyPr rtlCol="0" anchor="ctr"/>
+          <a:lstStyle/>
+          <a:p>
+            <a:pPr algn="ctr"/>
+            <a:r>
+              <a:rPr lang="en-US" i="1" dirty="0">
+                <a:latin typeface="Times New Roman" panose="02020603050405020304" pitchFamily="18" charset="0"/>
+                <a:cs typeface="Times New Roman" panose="02020603050405020304" pitchFamily="18" charset="0"/>
+              </a:rPr>
+              <a:t>k</a:t>
+            </a:r>
+            <a:r>
+              <a:rPr lang="en-CN" i="1" baseline="-25000" dirty="0">
+                <a:latin typeface="Times New Roman" panose="02020603050405020304" pitchFamily="18" charset="0"/>
+                <a:cs typeface="Times New Roman" panose="02020603050405020304" pitchFamily="18" charset="0"/>
+              </a:rPr>
+              <a:t>i</a:t>
+            </a:r>
+            <a:r>
+              <a:rPr lang="en-US" altLang="zh-CN" i="1" dirty="0">
+                <a:latin typeface="Times New Roman" panose="02020603050405020304" pitchFamily="18" charset="0"/>
+                <a:cs typeface="Times New Roman" panose="02020603050405020304" pitchFamily="18" charset="0"/>
+              </a:rPr>
+              <a:t>=x</a:t>
+            </a:r>
+            <a:endParaRPr lang="en-CN" baseline="-25000" dirty="0"/>
+          </a:p>
+        </p:txBody>
+      </p:sp>
+      <p:cxnSp>
+        <p:nvCxnSpPr>
+          <p:cNvPr id="13" name="Straight Arrow Connector 12">
+            <a:extLst>
+              <a:ext uri="{FF2B5EF4-FFF2-40B4-BE49-F238E27FC236}">
+                <a16:creationId xmlns:a16="http://schemas.microsoft.com/office/drawing/2014/main" id="{931BF7EC-887F-4A40-9A99-0B8280C99C03}"/>
+              </a:ext>
+            </a:extLst>
+          </p:cNvPr>
+          <p:cNvCxnSpPr>
+            <a:cxnSpLocks/>
+            <a:stCxn id="4" idx="3"/>
+            <a:endCxn id="17" idx="0"/>
+          </p:cNvCxnSpPr>
+          <p:nvPr/>
+        </p:nvCxnSpPr>
+        <p:spPr>
+          <a:xfrm>
+            <a:off x="5749177" y="2987569"/>
+            <a:ext cx="459818" cy="1128852"/>
+          </a:xfrm>
+          <a:prstGeom prst="straightConnector1">
+            <a:avLst/>
+          </a:prstGeom>
+          <a:ln>
+            <a:tailEnd type="triangle"/>
+          </a:ln>
+        </p:spPr>
+        <p:style>
+          <a:lnRef idx="2">
+            <a:schemeClr val="dk1"/>
+          </a:lnRef>
+          <a:fillRef idx="0">
+            <a:schemeClr val="dk1"/>
+          </a:fillRef>
+          <a:effectRef idx="1">
+            <a:schemeClr val="dk1"/>
+          </a:effectRef>
+          <a:fontRef idx="minor">
+            <a:schemeClr val="tx1"/>
+          </a:fontRef>
+        </p:style>
+      </p:cxnSp>
+      <p:sp>
+        <p:nvSpPr>
+          <p:cNvPr id="14" name="TextBox 13">
+            <a:extLst>
+              <a:ext uri="{FF2B5EF4-FFF2-40B4-BE49-F238E27FC236}">
+                <a16:creationId xmlns:a16="http://schemas.microsoft.com/office/drawing/2014/main" id="{AF58AD33-2240-CA45-B3B8-52B3B89C8560}"/>
+              </a:ext>
+            </a:extLst>
+          </p:cNvPr>
+          <p:cNvSpPr txBox="1"/>
+          <p:nvPr/>
+        </p:nvSpPr>
+        <p:spPr>
+          <a:xfrm>
+            <a:off x="5180249" y="1817327"/>
+            <a:ext cx="896399" cy="369332"/>
+          </a:xfrm>
+          <a:prstGeom prst="rect">
+            <a:avLst/>
+          </a:prstGeom>
+          <a:noFill/>
+        </p:spPr>
+        <p:txBody>
+          <a:bodyPr wrap="none" rtlCol="0">
+            <a:spAutoFit/>
+          </a:bodyPr>
+          <a:lstStyle/>
+          <a:p>
+            <a:r>
+              <a:rPr lang="en-US" i="1" dirty="0">
+                <a:latin typeface="Times New Roman" panose="02020603050405020304" pitchFamily="18" charset="0"/>
+                <a:cs typeface="Times New Roman" panose="02020603050405020304" pitchFamily="18" charset="0"/>
+              </a:rPr>
+              <a:t>delete x</a:t>
+            </a:r>
+            <a:endParaRPr lang="en-CN" i="1" baseline="-25000" dirty="0">
+              <a:latin typeface="Times New Roman" panose="02020603050405020304" pitchFamily="18" charset="0"/>
+              <a:cs typeface="Times New Roman" panose="02020603050405020304" pitchFamily="18" charset="0"/>
+            </a:endParaRPr>
+          </a:p>
+        </p:txBody>
+      </p:sp>
+      <p:cxnSp>
+        <p:nvCxnSpPr>
+          <p:cNvPr id="15" name="Straight Arrow Connector 14">
+            <a:extLst>
+              <a:ext uri="{FF2B5EF4-FFF2-40B4-BE49-F238E27FC236}">
+                <a16:creationId xmlns:a16="http://schemas.microsoft.com/office/drawing/2014/main" id="{58D753B3-6853-114E-8E6F-46FDCEB25F9B}"/>
+              </a:ext>
+            </a:extLst>
+          </p:cNvPr>
+          <p:cNvCxnSpPr>
+            <a:cxnSpLocks/>
+            <a:stCxn id="14" idx="2"/>
+          </p:cNvCxnSpPr>
+          <p:nvPr/>
+        </p:nvCxnSpPr>
+        <p:spPr>
+          <a:xfrm>
+            <a:off x="5628449" y="2186659"/>
+            <a:ext cx="120728" cy="510159"/>
+          </a:xfrm>
+          <a:prstGeom prst="straightConnector1">
+            <a:avLst/>
+          </a:prstGeom>
+          <a:ln>
+            <a:tailEnd type="triangle"/>
+          </a:ln>
+        </p:spPr>
+        <p:style>
+          <a:lnRef idx="2">
+            <a:schemeClr val="dk1"/>
+          </a:lnRef>
+          <a:fillRef idx="0">
+            <a:schemeClr val="dk1"/>
+          </a:fillRef>
+          <a:effectRef idx="1">
+            <a:schemeClr val="dk1"/>
+          </a:effectRef>
+          <a:fontRef idx="minor">
+            <a:schemeClr val="tx1"/>
+          </a:fontRef>
+        </p:style>
+      </p:cxnSp>
+      <p:sp>
+        <p:nvSpPr>
+          <p:cNvPr id="17" name="Triangle 16">
+            <a:extLst>
+              <a:ext uri="{FF2B5EF4-FFF2-40B4-BE49-F238E27FC236}">
+                <a16:creationId xmlns:a16="http://schemas.microsoft.com/office/drawing/2014/main" id="{3FF43BCB-01AF-5E4F-82D7-327D7E052729}"/>
+              </a:ext>
+            </a:extLst>
+          </p:cNvPr>
+          <p:cNvSpPr/>
+          <p:nvPr/>
+        </p:nvSpPr>
+        <p:spPr>
+          <a:xfrm>
+            <a:off x="5544224" y="4116421"/>
+            <a:ext cx="1329541" cy="1086200"/>
+          </a:xfrm>
+          <a:prstGeom prst="triangle">
+            <a:avLst/>
+          </a:prstGeom>
+        </p:spPr>
+        <p:style>
+          <a:lnRef idx="2">
+            <a:schemeClr val="dk1"/>
+          </a:lnRef>
+          <a:fillRef idx="1">
+            <a:schemeClr val="lt1"/>
+          </a:fillRef>
+          <a:effectRef idx="0">
+            <a:schemeClr val="dk1"/>
+          </a:effectRef>
+          <a:fontRef idx="minor">
+            <a:schemeClr val="dk1"/>
+          </a:fontRef>
+        </p:style>
+        <p:txBody>
+          <a:bodyPr rtlCol="0" anchor="ctr"/>
+          <a:lstStyle/>
+          <a:p>
+            <a:pPr algn="ctr"/>
+            <a:r>
+              <a:rPr lang="en-CN" i="1" dirty="0">
+                <a:latin typeface="Times New Roman" panose="02020603050405020304" pitchFamily="18" charset="0"/>
+                <a:cs typeface="Times New Roman" panose="02020603050405020304" pitchFamily="18" charset="0"/>
+              </a:rPr>
+              <a:t>t</a:t>
+            </a:r>
+            <a:r>
+              <a:rPr lang="en-CN" i="1" baseline="-25000" dirty="0">
+                <a:latin typeface="Times New Roman" panose="02020603050405020304" pitchFamily="18" charset="0"/>
+                <a:cs typeface="Times New Roman" panose="02020603050405020304" pitchFamily="18" charset="0"/>
+              </a:rPr>
+              <a:t>i</a:t>
+            </a:r>
+          </a:p>
+          <a:p>
+            <a:pPr algn="ctr"/>
+            <a:endParaRPr lang="en-CN" dirty="0"/>
+          </a:p>
+        </p:txBody>
+      </p:sp>
+      <p:cxnSp>
+        <p:nvCxnSpPr>
+          <p:cNvPr id="21" name="Curved Connector 20">
+            <a:extLst>
+              <a:ext uri="{FF2B5EF4-FFF2-40B4-BE49-F238E27FC236}">
+                <a16:creationId xmlns:a16="http://schemas.microsoft.com/office/drawing/2014/main" id="{DF8CEBEA-B31B-6C40-9CF5-9DCB360F614B}"/>
+              </a:ext>
+            </a:extLst>
+          </p:cNvPr>
+          <p:cNvCxnSpPr>
+            <a:cxnSpLocks/>
+            <a:stCxn id="17" idx="4"/>
+            <a:endCxn id="12" idx="3"/>
+          </p:cNvCxnSpPr>
+          <p:nvPr/>
+        </p:nvCxnSpPr>
+        <p:spPr>
+          <a:xfrm rot="5400000" flipH="1">
+            <a:off x="5508744" y="3837601"/>
+            <a:ext cx="2215053" cy="514988"/>
+          </a:xfrm>
+          <a:prstGeom prst="curvedConnector4">
+            <a:avLst>
+              <a:gd name="adj1" fmla="val 9134"/>
+              <a:gd name="adj2" fmla="val -1531"/>
+            </a:avLst>
+          </a:prstGeom>
+          <a:ln>
+            <a:prstDash val="dash"/>
+            <a:headEnd type="oval" w="med" len="med"/>
+            <a:tailEnd type="triangle" w="med" len="med"/>
+          </a:ln>
+        </p:spPr>
+        <p:style>
+          <a:lnRef idx="2">
+            <a:schemeClr val="dk1"/>
+          </a:lnRef>
+          <a:fillRef idx="0">
+            <a:schemeClr val="dk1"/>
+          </a:fillRef>
+          <a:effectRef idx="1">
+            <a:schemeClr val="dk1"/>
+          </a:effectRef>
+          <a:fontRef idx="minor">
+            <a:schemeClr val="tx1"/>
+          </a:fontRef>
+        </p:style>
+      </p:cxnSp>
+      <p:sp>
+        <p:nvSpPr>
+          <p:cNvPr id="33" name="TextBox 32">
+            <a:extLst>
+              <a:ext uri="{FF2B5EF4-FFF2-40B4-BE49-F238E27FC236}">
+                <a16:creationId xmlns:a16="http://schemas.microsoft.com/office/drawing/2014/main" id="{F277A218-127B-BC4E-BB5F-D933EB4AB3C6}"/>
+              </a:ext>
+            </a:extLst>
+          </p:cNvPr>
+          <p:cNvSpPr txBox="1"/>
+          <p:nvPr/>
+        </p:nvSpPr>
+        <p:spPr>
+          <a:xfrm>
+            <a:off x="6208994" y="3600655"/>
+            <a:ext cx="1796774" cy="369332"/>
+          </a:xfrm>
+          <a:prstGeom prst="rect">
+            <a:avLst/>
+          </a:prstGeom>
+          <a:noFill/>
+        </p:spPr>
+        <p:txBody>
+          <a:bodyPr wrap="none" rtlCol="0">
+            <a:spAutoFit/>
+          </a:bodyPr>
+          <a:lstStyle/>
+          <a:p>
+            <a:r>
+              <a:rPr lang="en-US" i="1" dirty="0">
+                <a:latin typeface="Times New Roman" panose="02020603050405020304" pitchFamily="18" charset="0"/>
+                <a:cs typeface="Times New Roman" panose="02020603050405020304" pitchFamily="18" charset="0"/>
+              </a:rPr>
+              <a:t>replace </a:t>
+            </a:r>
+            <a:r>
+              <a:rPr lang="en-US" i="1" dirty="0" err="1">
+                <a:latin typeface="Times New Roman" panose="02020603050405020304" pitchFamily="18" charset="0"/>
+                <a:cs typeface="Times New Roman" panose="02020603050405020304" pitchFamily="18" charset="0"/>
+              </a:rPr>
+              <a:t>k</a:t>
+            </a:r>
+            <a:r>
+              <a:rPr lang="en-US" i="1" baseline="-25000" dirty="0" err="1">
+                <a:latin typeface="Times New Roman" panose="02020603050405020304" pitchFamily="18" charset="0"/>
+                <a:cs typeface="Times New Roman" panose="02020603050405020304" pitchFamily="18" charset="0"/>
+              </a:rPr>
+              <a:t>i</a:t>
+            </a:r>
+            <a:r>
+              <a:rPr lang="en-US" i="1" dirty="0">
+                <a:latin typeface="Times New Roman" panose="02020603050405020304" pitchFamily="18" charset="0"/>
+                <a:cs typeface="Times New Roman" panose="02020603050405020304" pitchFamily="18" charset="0"/>
+              </a:rPr>
+              <a:t> with k’ </a:t>
+            </a:r>
+            <a:endParaRPr lang="en-CN" i="1" baseline="-25000" dirty="0">
+              <a:latin typeface="Times New Roman" panose="02020603050405020304" pitchFamily="18" charset="0"/>
+              <a:cs typeface="Times New Roman" panose="02020603050405020304" pitchFamily="18" charset="0"/>
+            </a:endParaRPr>
+          </a:p>
+        </p:txBody>
+      </p:sp>
+      <p:sp>
+        <p:nvSpPr>
+          <p:cNvPr id="34" name="TextBox 33">
+            <a:extLst>
+              <a:ext uri="{FF2B5EF4-FFF2-40B4-BE49-F238E27FC236}">
+                <a16:creationId xmlns:a16="http://schemas.microsoft.com/office/drawing/2014/main" id="{501EB89A-9FEC-604C-A12E-3055CD5959BA}"/>
+              </a:ext>
+            </a:extLst>
+          </p:cNvPr>
+          <p:cNvSpPr txBox="1"/>
+          <p:nvPr/>
+        </p:nvSpPr>
+        <p:spPr>
+          <a:xfrm>
+            <a:off x="6916199" y="5119202"/>
+            <a:ext cx="1197828" cy="369332"/>
+          </a:xfrm>
+          <a:prstGeom prst="rect">
+            <a:avLst/>
+          </a:prstGeom>
+          <a:noFill/>
+        </p:spPr>
+        <p:txBody>
+          <a:bodyPr wrap="none" rtlCol="0">
+            <a:spAutoFit/>
+          </a:bodyPr>
+          <a:lstStyle/>
+          <a:p>
+            <a:r>
+              <a:rPr lang="en-US" i="1" dirty="0">
+                <a:latin typeface="Times New Roman" panose="02020603050405020304" pitchFamily="18" charset="0"/>
+                <a:cs typeface="Times New Roman" panose="02020603050405020304" pitchFamily="18" charset="0"/>
+              </a:rPr>
+              <a:t>k’=max</a:t>
+            </a:r>
+            <a:r>
+              <a:rPr lang="en-US" dirty="0">
+                <a:latin typeface="Times New Roman" panose="02020603050405020304" pitchFamily="18" charset="0"/>
+                <a:cs typeface="Times New Roman" panose="02020603050405020304" pitchFamily="18" charset="0"/>
+              </a:rPr>
+              <a:t>(</a:t>
+            </a:r>
+            <a:r>
+              <a:rPr lang="en-US" i="1" dirty="0" err="1">
+                <a:latin typeface="Times New Roman" panose="02020603050405020304" pitchFamily="18" charset="0"/>
+                <a:cs typeface="Times New Roman" panose="02020603050405020304" pitchFamily="18" charset="0"/>
+              </a:rPr>
+              <a:t>t</a:t>
+            </a:r>
+            <a:r>
+              <a:rPr lang="en-US" i="1" baseline="-25000" dirty="0" err="1">
+                <a:latin typeface="Times New Roman" panose="02020603050405020304" pitchFamily="18" charset="0"/>
+                <a:cs typeface="Times New Roman" panose="02020603050405020304" pitchFamily="18" charset="0"/>
+              </a:rPr>
+              <a:t>i</a:t>
+            </a:r>
+            <a:r>
+              <a:rPr lang="en-US" dirty="0">
+                <a:latin typeface="Times New Roman" panose="02020603050405020304" pitchFamily="18" charset="0"/>
+                <a:cs typeface="Times New Roman" panose="02020603050405020304" pitchFamily="18" charset="0"/>
+              </a:rPr>
+              <a:t>)</a:t>
+            </a:r>
+            <a:endParaRPr lang="en-CN" baseline="-25000" dirty="0">
+              <a:latin typeface="Times New Roman" panose="02020603050405020304" pitchFamily="18" charset="0"/>
+              <a:cs typeface="Times New Roman" panose="02020603050405020304" pitchFamily="18" charset="0"/>
+            </a:endParaRPr>
+          </a:p>
+        </p:txBody>
+      </p:sp>
+      <p:sp>
+        <p:nvSpPr>
+          <p:cNvPr id="40" name="TextBox 39">
+            <a:extLst>
+              <a:ext uri="{FF2B5EF4-FFF2-40B4-BE49-F238E27FC236}">
+                <a16:creationId xmlns:a16="http://schemas.microsoft.com/office/drawing/2014/main" id="{6BE5956D-D336-114F-A8BA-971075757AAF}"/>
+              </a:ext>
+            </a:extLst>
+          </p:cNvPr>
+          <p:cNvSpPr txBox="1"/>
+          <p:nvPr/>
+        </p:nvSpPr>
+        <p:spPr>
+          <a:xfrm>
+            <a:off x="5062353" y="3805005"/>
+            <a:ext cx="973343" cy="369332"/>
+          </a:xfrm>
+          <a:prstGeom prst="rect">
+            <a:avLst/>
+          </a:prstGeom>
+          <a:noFill/>
+        </p:spPr>
+        <p:txBody>
+          <a:bodyPr wrap="none" rtlCol="0">
+            <a:spAutoFit/>
+          </a:bodyPr>
+          <a:lstStyle/>
+          <a:p>
+            <a:r>
+              <a:rPr lang="en-US" i="1" dirty="0">
+                <a:latin typeface="Times New Roman" panose="02020603050405020304" pitchFamily="18" charset="0"/>
+                <a:cs typeface="Times New Roman" panose="02020603050405020304" pitchFamily="18" charset="0"/>
+              </a:rPr>
+              <a:t>delete k’</a:t>
+            </a:r>
+            <a:endParaRPr lang="en-CN" i="1" baseline="-25000" dirty="0">
+              <a:latin typeface="Times New Roman" panose="02020603050405020304" pitchFamily="18" charset="0"/>
+              <a:cs typeface="Times New Roman" panose="02020603050405020304" pitchFamily="18" charset="0"/>
+            </a:endParaRPr>
+          </a:p>
+        </p:txBody>
+      </p:sp>
+    </p:spTree>
+    <p:extLst>
+      <p:ext uri="{BB962C8B-B14F-4D97-AF65-F5344CB8AC3E}">
+        <p14:creationId xmlns:p14="http://schemas.microsoft.com/office/powerpoint/2010/main" val="3327750197"/>
       </p:ext>
     </p:extLst>
   </p:cSld>

</xml_diff>

<commit_message>
Rewrite merge before del part (EN)
</commit_message>
<xml_diff>
--- a/datastruct/tree/B-tree/img/btrees.pptx
+++ b/datastruct/tree/B-tree/img/btrees.pptx
@@ -5,7 +5,7 @@
     <p:sldMasterId id="2147483648" r:id="rId1"/>
   </p:sldMasterIdLst>
   <p:notesMasterIdLst>
-    <p:notesMasterId r:id="rId8"/>
+    <p:notesMasterId r:id="rId9"/>
   </p:notesMasterIdLst>
   <p:sldIdLst>
     <p:sldId id="256" r:id="rId2"/>
@@ -14,6 +14,7 @@
     <p:sldId id="259" r:id="rId5"/>
     <p:sldId id="260" r:id="rId6"/>
     <p:sldId id="261" r:id="rId7"/>
+    <p:sldId id="262" r:id="rId8"/>
   </p:sldIdLst>
   <p:sldSz cx="12192000" cy="6858000"/>
   <p:notesSz cx="6858000" cy="9144000"/>
@@ -202,7 +203,7 @@
           <a:p>
             <a:fld id="{22594BF6-097C-9847-BA6A-E18D0743F6CE}" type="datetimeFigureOut">
               <a:rPr lang="en-CN" smtClean="0"/>
-              <a:t>2021/10/6</a:t>
+              <a:t>2021/11/20</a:t>
             </a:fld>
             <a:endParaRPr lang="en-CN"/>
           </a:p>
@@ -1019,6 +1020,93 @@
 </p:notes>
 </file>
 
+<file path=ppt/notesSlides/notesSlide7.xml><?xml version="1.0" encoding="utf-8"?>
+<p:notes xmlns:a="http://schemas.openxmlformats.org/drawingml/2006/main" xmlns:r="http://schemas.openxmlformats.org/officeDocument/2006/relationships" xmlns:p="http://schemas.openxmlformats.org/presentationml/2006/main">
+  <p:cSld>
+    <p:spTree>
+      <p:nvGrpSpPr>
+        <p:cNvPr id="1" name=""/>
+        <p:cNvGrpSpPr/>
+        <p:nvPr/>
+      </p:nvGrpSpPr>
+      <p:grpSpPr>
+        <a:xfrm>
+          <a:off x="0" y="0"/>
+          <a:ext cx="0" cy="0"/>
+          <a:chOff x="0" y="0"/>
+          <a:chExt cx="0" cy="0"/>
+        </a:xfrm>
+      </p:grpSpPr>
+      <p:sp>
+        <p:nvSpPr>
+          <p:cNvPr id="2" name="Slide Image Placeholder 1"/>
+          <p:cNvSpPr>
+            <a:spLocks noGrp="1" noRot="1" noChangeAspect="1"/>
+          </p:cNvSpPr>
+          <p:nvPr>
+            <p:ph type="sldImg"/>
+          </p:nvPr>
+        </p:nvSpPr>
+        <p:spPr/>
+      </p:sp>
+      <p:sp>
+        <p:nvSpPr>
+          <p:cNvPr id="3" name="Notes Placeholder 2"/>
+          <p:cNvSpPr>
+            <a:spLocks noGrp="1"/>
+          </p:cNvSpPr>
+          <p:nvPr>
+            <p:ph type="body" idx="1"/>
+          </p:nvPr>
+        </p:nvSpPr>
+        <p:spPr/>
+        <p:txBody>
+          <a:bodyPr/>
+          <a:lstStyle/>
+          <a:p>
+            <a:r>
+              <a:rPr lang="en-CN" dirty="0"/>
+              <a:t>delete</a:t>
+            </a:r>
+          </a:p>
+        </p:txBody>
+      </p:sp>
+      <p:sp>
+        <p:nvSpPr>
+          <p:cNvPr id="4" name="Slide Number Placeholder 3"/>
+          <p:cNvSpPr>
+            <a:spLocks noGrp="1"/>
+          </p:cNvSpPr>
+          <p:nvPr>
+            <p:ph type="sldNum" sz="quarter" idx="5"/>
+          </p:nvPr>
+        </p:nvSpPr>
+        <p:spPr/>
+        <p:txBody>
+          <a:bodyPr/>
+          <a:lstStyle/>
+          <a:p>
+            <a:fld id="{86C81B2F-A610-2949-B9DC-A3E483DF43DC}" type="slidenum">
+              <a:rPr lang="en-CN" smtClean="0"/>
+              <a:t>7</a:t>
+            </a:fld>
+            <a:endParaRPr lang="en-CN"/>
+          </a:p>
+        </p:txBody>
+      </p:sp>
+    </p:spTree>
+    <p:extLst>
+      <p:ext uri="{BB962C8B-B14F-4D97-AF65-F5344CB8AC3E}">
+        <p14:creationId xmlns:p14="http://schemas.microsoft.com/office/powerpoint/2010/main" val="788782580"/>
+      </p:ext>
+    </p:extLst>
+  </p:cSld>
+  <p:clrMapOvr>
+    <a:masterClrMapping/>
+  </p:clrMapOvr>
+</p:notes>
+</file>
+
 <file path=ppt/slideLayouts/slideLayout1.xml><?xml version="1.0" encoding="utf-8"?>
 <p:sldLayout xmlns:a="http://schemas.openxmlformats.org/drawingml/2006/main" xmlns:r="http://schemas.openxmlformats.org/officeDocument/2006/relationships" xmlns:p="http://schemas.openxmlformats.org/presentationml/2006/main" type="title" preserve="1">
   <p:cSld name="Title Slide">
@@ -1168,7 +1256,7 @@
           <a:p>
             <a:fld id="{B6EEB924-5985-A949-B5CF-883A526C1012}" type="datetimeFigureOut">
               <a:rPr lang="en-CN" smtClean="0"/>
-              <a:t>2021/10/6</a:t>
+              <a:t>2021/11/20</a:t>
             </a:fld>
             <a:endParaRPr lang="en-CN"/>
           </a:p>
@@ -1368,7 +1456,7 @@
           <a:p>
             <a:fld id="{B6EEB924-5985-A949-B5CF-883A526C1012}" type="datetimeFigureOut">
               <a:rPr lang="en-CN" smtClean="0"/>
-              <a:t>2021/10/6</a:t>
+              <a:t>2021/11/20</a:t>
             </a:fld>
             <a:endParaRPr lang="en-CN"/>
           </a:p>
@@ -1578,7 +1666,7 @@
           <a:p>
             <a:fld id="{B6EEB924-5985-A949-B5CF-883A526C1012}" type="datetimeFigureOut">
               <a:rPr lang="en-CN" smtClean="0"/>
-              <a:t>2021/10/6</a:t>
+              <a:t>2021/11/20</a:t>
             </a:fld>
             <a:endParaRPr lang="en-CN"/>
           </a:p>
@@ -1778,7 +1866,7 @@
           <a:p>
             <a:fld id="{B6EEB924-5985-A949-B5CF-883A526C1012}" type="datetimeFigureOut">
               <a:rPr lang="en-CN" smtClean="0"/>
-              <a:t>2021/10/6</a:t>
+              <a:t>2021/11/20</a:t>
             </a:fld>
             <a:endParaRPr lang="en-CN"/>
           </a:p>
@@ -2054,7 +2142,7 @@
           <a:p>
             <a:fld id="{B6EEB924-5985-A949-B5CF-883A526C1012}" type="datetimeFigureOut">
               <a:rPr lang="en-CN" smtClean="0"/>
-              <a:t>2021/10/6</a:t>
+              <a:t>2021/11/20</a:t>
             </a:fld>
             <a:endParaRPr lang="en-CN"/>
           </a:p>
@@ -2322,7 +2410,7 @@
           <a:p>
             <a:fld id="{B6EEB924-5985-A949-B5CF-883A526C1012}" type="datetimeFigureOut">
               <a:rPr lang="en-CN" smtClean="0"/>
-              <a:t>2021/10/6</a:t>
+              <a:t>2021/11/20</a:t>
             </a:fld>
             <a:endParaRPr lang="en-CN"/>
           </a:p>
@@ -2737,7 +2825,7 @@
           <a:p>
             <a:fld id="{B6EEB924-5985-A949-B5CF-883A526C1012}" type="datetimeFigureOut">
               <a:rPr lang="en-CN" smtClean="0"/>
-              <a:t>2021/10/6</a:t>
+              <a:t>2021/11/20</a:t>
             </a:fld>
             <a:endParaRPr lang="en-CN"/>
           </a:p>
@@ -2879,7 +2967,7 @@
           <a:p>
             <a:fld id="{B6EEB924-5985-A949-B5CF-883A526C1012}" type="datetimeFigureOut">
               <a:rPr lang="en-CN" smtClean="0"/>
-              <a:t>2021/10/6</a:t>
+              <a:t>2021/11/20</a:t>
             </a:fld>
             <a:endParaRPr lang="en-CN"/>
           </a:p>
@@ -2992,7 +3080,7 @@
           <a:p>
             <a:fld id="{B6EEB924-5985-A949-B5CF-883A526C1012}" type="datetimeFigureOut">
               <a:rPr lang="en-CN" smtClean="0"/>
-              <a:t>2021/10/6</a:t>
+              <a:t>2021/11/20</a:t>
             </a:fld>
             <a:endParaRPr lang="en-CN"/>
           </a:p>
@@ -3305,7 +3393,7 @@
           <a:p>
             <a:fld id="{B6EEB924-5985-A949-B5CF-883A526C1012}" type="datetimeFigureOut">
               <a:rPr lang="en-CN" smtClean="0"/>
-              <a:t>2021/10/6</a:t>
+              <a:t>2021/11/20</a:t>
             </a:fld>
             <a:endParaRPr lang="en-CN"/>
           </a:p>
@@ -3594,7 +3682,7 @@
           <a:p>
             <a:fld id="{B6EEB924-5985-A949-B5CF-883A526C1012}" type="datetimeFigureOut">
               <a:rPr lang="en-CN" smtClean="0"/>
-              <a:t>2021/10/6</a:t>
+              <a:t>2021/11/20</a:t>
             </a:fld>
             <a:endParaRPr lang="en-CN"/>
           </a:p>
@@ -3837,7 +3925,7 @@
           <a:p>
             <a:fld id="{B6EEB924-5985-A949-B5CF-883A526C1012}" type="datetimeFigureOut">
               <a:rPr lang="en-CN" smtClean="0"/>
-              <a:t>2021/10/6</a:t>
+              <a:t>2021/11/20</a:t>
             </a:fld>
             <a:endParaRPr lang="en-CN"/>
           </a:p>
@@ -13950,6 +14038,1003 @@
     <p:extLst>
       <p:ext uri="{BB962C8B-B14F-4D97-AF65-F5344CB8AC3E}">
         <p14:creationId xmlns:p14="http://schemas.microsoft.com/office/powerpoint/2010/main" val="3327750197"/>
+      </p:ext>
+    </p:extLst>
+  </p:cSld>
+  <p:clrMapOvr>
+    <a:masterClrMapping/>
+  </p:clrMapOvr>
+</p:sld>
+</file>
+
+<file path=ppt/slides/slide7.xml><?xml version="1.0" encoding="utf-8"?>
+<p:sld xmlns:a="http://schemas.openxmlformats.org/drawingml/2006/main" xmlns:r="http://schemas.openxmlformats.org/officeDocument/2006/relationships" xmlns:p="http://schemas.openxmlformats.org/presentationml/2006/main">
+  <p:cSld>
+    <p:spTree>
+      <p:nvGrpSpPr>
+        <p:cNvPr id="1" name=""/>
+        <p:cNvGrpSpPr/>
+        <p:nvPr/>
+      </p:nvGrpSpPr>
+      <p:grpSpPr>
+        <a:xfrm>
+          <a:off x="0" y="0"/>
+          <a:ext cx="0" cy="0"/>
+          <a:chOff x="0" y="0"/>
+          <a:chExt cx="0" cy="0"/>
+        </a:xfrm>
+      </p:grpSpPr>
+      <p:sp>
+        <p:nvSpPr>
+          <p:cNvPr id="2" name="Rectangle 1">
+            <a:extLst>
+              <a:ext uri="{FF2B5EF4-FFF2-40B4-BE49-F238E27FC236}">
+                <a16:creationId xmlns:a16="http://schemas.microsoft.com/office/drawing/2014/main" id="{189FEDA9-4676-C348-BF68-BCE31F2D74DC}"/>
+              </a:ext>
+            </a:extLst>
+          </p:cNvPr>
+          <p:cNvSpPr/>
+          <p:nvPr/>
+        </p:nvSpPr>
+        <p:spPr>
+          <a:xfrm>
+            <a:off x="3920377" y="2703789"/>
+            <a:ext cx="609600" cy="567559"/>
+          </a:xfrm>
+          <a:prstGeom prst="rect">
+            <a:avLst/>
+          </a:prstGeom>
+        </p:spPr>
+        <p:style>
+          <a:lnRef idx="2">
+            <a:schemeClr val="dk1"/>
+          </a:lnRef>
+          <a:fillRef idx="1">
+            <a:schemeClr val="lt1"/>
+          </a:fillRef>
+          <a:effectRef idx="0">
+            <a:schemeClr val="dk1"/>
+          </a:effectRef>
+          <a:fontRef idx="minor">
+            <a:schemeClr val="dk1"/>
+          </a:fontRef>
+        </p:style>
+        <p:txBody>
+          <a:bodyPr rtlCol="0" anchor="ctr"/>
+          <a:lstStyle/>
+          <a:p>
+            <a:pPr algn="ctr"/>
+            <a:r>
+              <a:rPr lang="en-CN" i="1" dirty="0">
+                <a:latin typeface="Times New Roman" panose="02020603050405020304" pitchFamily="18" charset="0"/>
+                <a:cs typeface="Times New Roman" panose="02020603050405020304" pitchFamily="18" charset="0"/>
+              </a:rPr>
+              <a:t>k</a:t>
+            </a:r>
+            <a:r>
+              <a:rPr lang="en-CN" baseline="-25000" dirty="0"/>
+              <a:t>1</a:t>
+            </a:r>
+          </a:p>
+        </p:txBody>
+      </p:sp>
+      <p:sp>
+        <p:nvSpPr>
+          <p:cNvPr id="3" name="Rectangle 2">
+            <a:extLst>
+              <a:ext uri="{FF2B5EF4-FFF2-40B4-BE49-F238E27FC236}">
+                <a16:creationId xmlns:a16="http://schemas.microsoft.com/office/drawing/2014/main" id="{4680E9FB-24F9-F749-8020-CEAF45809070}"/>
+              </a:ext>
+            </a:extLst>
+          </p:cNvPr>
+          <p:cNvSpPr/>
+          <p:nvPr/>
+        </p:nvSpPr>
+        <p:spPr>
+          <a:xfrm>
+            <a:off x="4529977" y="2703789"/>
+            <a:ext cx="609600" cy="567559"/>
+          </a:xfrm>
+          <a:prstGeom prst="rect">
+            <a:avLst/>
+          </a:prstGeom>
+        </p:spPr>
+        <p:style>
+          <a:lnRef idx="2">
+            <a:schemeClr val="dk1"/>
+          </a:lnRef>
+          <a:fillRef idx="1">
+            <a:schemeClr val="lt1"/>
+          </a:fillRef>
+          <a:effectRef idx="0">
+            <a:schemeClr val="dk1"/>
+          </a:effectRef>
+          <a:fontRef idx="minor">
+            <a:schemeClr val="dk1"/>
+          </a:fontRef>
+        </p:style>
+        <p:txBody>
+          <a:bodyPr rtlCol="0" anchor="ctr"/>
+          <a:lstStyle/>
+          <a:p>
+            <a:pPr algn="ctr"/>
+            <a:r>
+              <a:rPr lang="en-CN" dirty="0">
+                <a:latin typeface="Times New Roman" panose="02020603050405020304" pitchFamily="18" charset="0"/>
+                <a:cs typeface="Times New Roman" panose="02020603050405020304" pitchFamily="18" charset="0"/>
+              </a:rPr>
+              <a:t>…</a:t>
+            </a:r>
+          </a:p>
+        </p:txBody>
+      </p:sp>
+      <p:sp>
+        <p:nvSpPr>
+          <p:cNvPr id="4" name="Rectangle 3">
+            <a:extLst>
+              <a:ext uri="{FF2B5EF4-FFF2-40B4-BE49-F238E27FC236}">
+                <a16:creationId xmlns:a16="http://schemas.microsoft.com/office/drawing/2014/main" id="{C7EDBC9B-6650-0142-B6FB-BFA039DDF865}"/>
+              </a:ext>
+            </a:extLst>
+          </p:cNvPr>
+          <p:cNvSpPr/>
+          <p:nvPr/>
+        </p:nvSpPr>
+        <p:spPr>
+          <a:xfrm>
+            <a:off x="5139577" y="2703789"/>
+            <a:ext cx="609600" cy="567559"/>
+          </a:xfrm>
+          <a:prstGeom prst="rect">
+            <a:avLst/>
+          </a:prstGeom>
+        </p:spPr>
+        <p:style>
+          <a:lnRef idx="2">
+            <a:schemeClr val="dk1"/>
+          </a:lnRef>
+          <a:fillRef idx="1">
+            <a:schemeClr val="lt1"/>
+          </a:fillRef>
+          <a:effectRef idx="0">
+            <a:schemeClr val="dk1"/>
+          </a:effectRef>
+          <a:fontRef idx="minor">
+            <a:schemeClr val="dk1"/>
+          </a:fontRef>
+        </p:style>
+        <p:txBody>
+          <a:bodyPr rtlCol="0" anchor="ctr"/>
+          <a:lstStyle/>
+          <a:p>
+            <a:pPr algn="ctr"/>
+            <a:r>
+              <a:rPr lang="en-US" i="1" dirty="0">
+                <a:latin typeface="Times New Roman" panose="02020603050405020304" pitchFamily="18" charset="0"/>
+                <a:cs typeface="Times New Roman" panose="02020603050405020304" pitchFamily="18" charset="0"/>
+              </a:rPr>
+              <a:t>k</a:t>
+            </a:r>
+            <a:r>
+              <a:rPr lang="en-CN" i="1" baseline="-25000" dirty="0">
+                <a:latin typeface="Times New Roman" panose="02020603050405020304" pitchFamily="18" charset="0"/>
+                <a:cs typeface="Times New Roman" panose="02020603050405020304" pitchFamily="18" charset="0"/>
+              </a:rPr>
+              <a:t>i</a:t>
+            </a:r>
+            <a:r>
+              <a:rPr lang="en-CN" baseline="-25000" dirty="0"/>
+              <a:t>-1</a:t>
+            </a:r>
+          </a:p>
+        </p:txBody>
+      </p:sp>
+      <p:sp>
+        <p:nvSpPr>
+          <p:cNvPr id="5" name="Rectangle 4">
+            <a:extLst>
+              <a:ext uri="{FF2B5EF4-FFF2-40B4-BE49-F238E27FC236}">
+                <a16:creationId xmlns:a16="http://schemas.microsoft.com/office/drawing/2014/main" id="{DE63870E-7602-C843-81FE-0E47B95D2BA3}"/>
+              </a:ext>
+            </a:extLst>
+          </p:cNvPr>
+          <p:cNvSpPr/>
+          <p:nvPr/>
+        </p:nvSpPr>
+        <p:spPr>
+          <a:xfrm>
+            <a:off x="6978902" y="2703789"/>
+            <a:ext cx="609600" cy="567559"/>
+          </a:xfrm>
+          <a:prstGeom prst="rect">
+            <a:avLst/>
+          </a:prstGeom>
+        </p:spPr>
+        <p:style>
+          <a:lnRef idx="2">
+            <a:schemeClr val="dk1"/>
+          </a:lnRef>
+          <a:fillRef idx="1">
+            <a:schemeClr val="lt1"/>
+          </a:fillRef>
+          <a:effectRef idx="0">
+            <a:schemeClr val="dk1"/>
+          </a:effectRef>
+          <a:fontRef idx="minor">
+            <a:schemeClr val="dk1"/>
+          </a:fontRef>
+        </p:style>
+        <p:txBody>
+          <a:bodyPr rtlCol="0" anchor="ctr"/>
+          <a:lstStyle/>
+          <a:p>
+            <a:pPr algn="ctr"/>
+            <a:r>
+              <a:rPr lang="en-CN" i="1" dirty="0">
+                <a:latin typeface="Times New Roman" panose="02020603050405020304" pitchFamily="18" charset="0"/>
+                <a:cs typeface="Times New Roman" panose="02020603050405020304" pitchFamily="18" charset="0"/>
+              </a:rPr>
+              <a:t>k</a:t>
+            </a:r>
+            <a:r>
+              <a:rPr lang="en-CN" i="1" baseline="-25000" dirty="0">
+                <a:latin typeface="Times New Roman" panose="02020603050405020304" pitchFamily="18" charset="0"/>
+                <a:cs typeface="Times New Roman" panose="02020603050405020304" pitchFamily="18" charset="0"/>
+              </a:rPr>
+              <a:t>n</a:t>
+            </a:r>
+          </a:p>
+        </p:txBody>
+      </p:sp>
+      <p:sp>
+        <p:nvSpPr>
+          <p:cNvPr id="6" name="Rectangle 5">
+            <a:extLst>
+              <a:ext uri="{FF2B5EF4-FFF2-40B4-BE49-F238E27FC236}">
+                <a16:creationId xmlns:a16="http://schemas.microsoft.com/office/drawing/2014/main" id="{FCD19DE3-CC58-EA44-A120-348FB37BE6D3}"/>
+              </a:ext>
+            </a:extLst>
+          </p:cNvPr>
+          <p:cNvSpPr/>
+          <p:nvPr/>
+        </p:nvSpPr>
+        <p:spPr>
+          <a:xfrm>
+            <a:off x="6369302" y="2703788"/>
+            <a:ext cx="609600" cy="567559"/>
+          </a:xfrm>
+          <a:prstGeom prst="rect">
+            <a:avLst/>
+          </a:prstGeom>
+        </p:spPr>
+        <p:style>
+          <a:lnRef idx="2">
+            <a:schemeClr val="dk1"/>
+          </a:lnRef>
+          <a:fillRef idx="1">
+            <a:schemeClr val="lt1"/>
+          </a:fillRef>
+          <a:effectRef idx="0">
+            <a:schemeClr val="dk1"/>
+          </a:effectRef>
+          <a:fontRef idx="minor">
+            <a:schemeClr val="dk1"/>
+          </a:fontRef>
+        </p:style>
+        <p:txBody>
+          <a:bodyPr rtlCol="0" anchor="ctr"/>
+          <a:lstStyle/>
+          <a:p>
+            <a:pPr algn="ctr"/>
+            <a:r>
+              <a:rPr lang="en-CN" i="1" dirty="0">
+                <a:latin typeface="Times New Roman" panose="02020603050405020304" pitchFamily="18" charset="0"/>
+                <a:cs typeface="Times New Roman" panose="02020603050405020304" pitchFamily="18" charset="0"/>
+              </a:rPr>
+              <a:t>…</a:t>
+            </a:r>
+            <a:endParaRPr lang="en-CN" baseline="-25000" dirty="0"/>
+          </a:p>
+        </p:txBody>
+      </p:sp>
+      <p:sp>
+        <p:nvSpPr>
+          <p:cNvPr id="7" name="Rectangle 6">
+            <a:extLst>
+              <a:ext uri="{FF2B5EF4-FFF2-40B4-BE49-F238E27FC236}">
+                <a16:creationId xmlns:a16="http://schemas.microsoft.com/office/drawing/2014/main" id="{4999A386-ACBB-3042-91AF-04F677630880}"/>
+              </a:ext>
+            </a:extLst>
+          </p:cNvPr>
+          <p:cNvSpPr/>
+          <p:nvPr/>
+        </p:nvSpPr>
+        <p:spPr>
+          <a:xfrm>
+            <a:off x="2680156" y="3896713"/>
+            <a:ext cx="609600" cy="567559"/>
+          </a:xfrm>
+          <a:prstGeom prst="rect">
+            <a:avLst/>
+          </a:prstGeom>
+        </p:spPr>
+        <p:style>
+          <a:lnRef idx="2">
+            <a:schemeClr val="dk1"/>
+          </a:lnRef>
+          <a:fillRef idx="1">
+            <a:schemeClr val="lt1"/>
+          </a:fillRef>
+          <a:effectRef idx="0">
+            <a:schemeClr val="dk1"/>
+          </a:effectRef>
+          <a:fontRef idx="minor">
+            <a:schemeClr val="dk1"/>
+          </a:fontRef>
+        </p:style>
+        <p:txBody>
+          <a:bodyPr rtlCol="0" anchor="ctr"/>
+          <a:lstStyle/>
+          <a:p>
+            <a:pPr algn="ctr"/>
+            <a:r>
+              <a:rPr lang="en-CN" i="1" dirty="0">
+                <a:latin typeface="Times New Roman" panose="02020603050405020304" pitchFamily="18" charset="0"/>
+                <a:cs typeface="Times New Roman" panose="02020603050405020304" pitchFamily="18" charset="0"/>
+              </a:rPr>
+              <a:t>t</a:t>
+            </a:r>
+            <a:r>
+              <a:rPr lang="en-CN" baseline="-25000" dirty="0"/>
+              <a:t>1</a:t>
+            </a:r>
+          </a:p>
+        </p:txBody>
+      </p:sp>
+      <p:cxnSp>
+        <p:nvCxnSpPr>
+          <p:cNvPr id="8" name="Straight Arrow Connector 7">
+            <a:extLst>
+              <a:ext uri="{FF2B5EF4-FFF2-40B4-BE49-F238E27FC236}">
+                <a16:creationId xmlns:a16="http://schemas.microsoft.com/office/drawing/2014/main" id="{ED32BCA5-1FE9-7D47-A1C6-F49FE714224B}"/>
+              </a:ext>
+            </a:extLst>
+          </p:cNvPr>
+          <p:cNvCxnSpPr>
+            <a:cxnSpLocks/>
+            <a:stCxn id="2" idx="1"/>
+            <a:endCxn id="7" idx="0"/>
+          </p:cNvCxnSpPr>
+          <p:nvPr/>
+        </p:nvCxnSpPr>
+        <p:spPr>
+          <a:xfrm flipH="1">
+            <a:off x="2984956" y="2987569"/>
+            <a:ext cx="935421" cy="909144"/>
+          </a:xfrm>
+          <a:prstGeom prst="straightConnector1">
+            <a:avLst/>
+          </a:prstGeom>
+          <a:ln>
+            <a:tailEnd type="triangle"/>
+          </a:ln>
+        </p:spPr>
+        <p:style>
+          <a:lnRef idx="2">
+            <a:schemeClr val="dk1"/>
+          </a:lnRef>
+          <a:fillRef idx="0">
+            <a:schemeClr val="dk1"/>
+          </a:fillRef>
+          <a:effectRef idx="1">
+            <a:schemeClr val="dk1"/>
+          </a:effectRef>
+          <a:fontRef idx="minor">
+            <a:schemeClr val="tx1"/>
+          </a:fontRef>
+        </p:style>
+      </p:cxnSp>
+      <p:sp>
+        <p:nvSpPr>
+          <p:cNvPr id="10" name="Rectangle 9">
+            <a:extLst>
+              <a:ext uri="{FF2B5EF4-FFF2-40B4-BE49-F238E27FC236}">
+                <a16:creationId xmlns:a16="http://schemas.microsoft.com/office/drawing/2014/main" id="{8DE390DE-496E-EA47-98A8-379F61771ED6}"/>
+              </a:ext>
+            </a:extLst>
+          </p:cNvPr>
+          <p:cNvSpPr/>
+          <p:nvPr/>
+        </p:nvSpPr>
+        <p:spPr>
+          <a:xfrm>
+            <a:off x="8114027" y="3896712"/>
+            <a:ext cx="609600" cy="567559"/>
+          </a:xfrm>
+          <a:prstGeom prst="rect">
+            <a:avLst/>
+          </a:prstGeom>
+        </p:spPr>
+        <p:style>
+          <a:lnRef idx="2">
+            <a:schemeClr val="dk1"/>
+          </a:lnRef>
+          <a:fillRef idx="1">
+            <a:schemeClr val="lt1"/>
+          </a:fillRef>
+          <a:effectRef idx="0">
+            <a:schemeClr val="dk1"/>
+          </a:effectRef>
+          <a:fontRef idx="minor">
+            <a:schemeClr val="dk1"/>
+          </a:fontRef>
+        </p:style>
+        <p:txBody>
+          <a:bodyPr rtlCol="0" anchor="ctr"/>
+          <a:lstStyle/>
+          <a:p>
+            <a:pPr algn="ctr"/>
+            <a:r>
+              <a:rPr lang="en-US" i="1" dirty="0">
+                <a:latin typeface="Times New Roman" panose="02020603050405020304" pitchFamily="18" charset="0"/>
+                <a:cs typeface="Times New Roman" panose="02020603050405020304" pitchFamily="18" charset="0"/>
+              </a:rPr>
+              <a:t>t</a:t>
+            </a:r>
+            <a:r>
+              <a:rPr lang="en-CN" i="1" baseline="-25000" dirty="0">
+                <a:latin typeface="Times New Roman" panose="02020603050405020304" pitchFamily="18" charset="0"/>
+                <a:cs typeface="Times New Roman" panose="02020603050405020304" pitchFamily="18" charset="0"/>
+              </a:rPr>
+              <a:t>n</a:t>
+            </a:r>
+            <a:r>
+              <a:rPr lang="en-CN" baseline="-25000" dirty="0">
+                <a:latin typeface="Times New Roman" panose="02020603050405020304" pitchFamily="18" charset="0"/>
+                <a:cs typeface="Times New Roman" panose="02020603050405020304" pitchFamily="18" charset="0"/>
+              </a:rPr>
+              <a:t>+1</a:t>
+            </a:r>
+          </a:p>
+        </p:txBody>
+      </p:sp>
+      <p:cxnSp>
+        <p:nvCxnSpPr>
+          <p:cNvPr id="11" name="Straight Arrow Connector 10">
+            <a:extLst>
+              <a:ext uri="{FF2B5EF4-FFF2-40B4-BE49-F238E27FC236}">
+                <a16:creationId xmlns:a16="http://schemas.microsoft.com/office/drawing/2014/main" id="{FBF945F6-8D14-4A48-8A7E-5EAF86DA369D}"/>
+              </a:ext>
+            </a:extLst>
+          </p:cNvPr>
+          <p:cNvCxnSpPr>
+            <a:cxnSpLocks/>
+            <a:stCxn id="5" idx="3"/>
+            <a:endCxn id="10" idx="0"/>
+          </p:cNvCxnSpPr>
+          <p:nvPr/>
+        </p:nvCxnSpPr>
+        <p:spPr>
+          <a:xfrm>
+            <a:off x="7588502" y="2987569"/>
+            <a:ext cx="830325" cy="909143"/>
+          </a:xfrm>
+          <a:prstGeom prst="straightConnector1">
+            <a:avLst/>
+          </a:prstGeom>
+          <a:ln>
+            <a:tailEnd type="triangle"/>
+          </a:ln>
+        </p:spPr>
+        <p:style>
+          <a:lnRef idx="2">
+            <a:schemeClr val="dk1"/>
+          </a:lnRef>
+          <a:fillRef idx="0">
+            <a:schemeClr val="dk1"/>
+          </a:fillRef>
+          <a:effectRef idx="1">
+            <a:schemeClr val="dk1"/>
+          </a:effectRef>
+          <a:fontRef idx="minor">
+            <a:schemeClr val="tx1"/>
+          </a:fontRef>
+        </p:style>
+      </p:cxnSp>
+      <p:sp>
+        <p:nvSpPr>
+          <p:cNvPr id="12" name="Rectangle 11">
+            <a:extLst>
+              <a:ext uri="{FF2B5EF4-FFF2-40B4-BE49-F238E27FC236}">
+                <a16:creationId xmlns:a16="http://schemas.microsoft.com/office/drawing/2014/main" id="{A71C68CF-670C-DD44-B47B-9B7C6FCEB40E}"/>
+              </a:ext>
+            </a:extLst>
+          </p:cNvPr>
+          <p:cNvSpPr/>
+          <p:nvPr/>
+        </p:nvSpPr>
+        <p:spPr>
+          <a:xfrm>
+            <a:off x="5749177" y="2703788"/>
+            <a:ext cx="609600" cy="567559"/>
+          </a:xfrm>
+          <a:prstGeom prst="rect">
+            <a:avLst/>
+          </a:prstGeom>
+        </p:spPr>
+        <p:style>
+          <a:lnRef idx="2">
+            <a:schemeClr val="dk1"/>
+          </a:lnRef>
+          <a:fillRef idx="1">
+            <a:schemeClr val="lt1"/>
+          </a:fillRef>
+          <a:effectRef idx="0">
+            <a:schemeClr val="dk1"/>
+          </a:effectRef>
+          <a:fontRef idx="minor">
+            <a:schemeClr val="dk1"/>
+          </a:fontRef>
+        </p:style>
+        <p:txBody>
+          <a:bodyPr rtlCol="0" anchor="ctr"/>
+          <a:lstStyle/>
+          <a:p>
+            <a:pPr algn="ctr"/>
+            <a:r>
+              <a:rPr lang="en-US" i="1" dirty="0">
+                <a:latin typeface="Times New Roman" panose="02020603050405020304" pitchFamily="18" charset="0"/>
+                <a:cs typeface="Times New Roman" panose="02020603050405020304" pitchFamily="18" charset="0"/>
+              </a:rPr>
+              <a:t>k</a:t>
+            </a:r>
+            <a:r>
+              <a:rPr lang="en-CN" i="1" baseline="-25000" dirty="0">
+                <a:latin typeface="Times New Roman" panose="02020603050405020304" pitchFamily="18" charset="0"/>
+                <a:cs typeface="Times New Roman" panose="02020603050405020304" pitchFamily="18" charset="0"/>
+              </a:rPr>
+              <a:t>i</a:t>
+            </a:r>
+            <a:r>
+              <a:rPr lang="en-US" altLang="zh-CN" i="1" dirty="0">
+                <a:latin typeface="Times New Roman" panose="02020603050405020304" pitchFamily="18" charset="0"/>
+                <a:cs typeface="Times New Roman" panose="02020603050405020304" pitchFamily="18" charset="0"/>
+              </a:rPr>
+              <a:t>=x</a:t>
+            </a:r>
+            <a:endParaRPr lang="en-CN" baseline="-25000" dirty="0"/>
+          </a:p>
+        </p:txBody>
+      </p:sp>
+      <p:cxnSp>
+        <p:nvCxnSpPr>
+          <p:cNvPr id="13" name="Straight Arrow Connector 12">
+            <a:extLst>
+              <a:ext uri="{FF2B5EF4-FFF2-40B4-BE49-F238E27FC236}">
+                <a16:creationId xmlns:a16="http://schemas.microsoft.com/office/drawing/2014/main" id="{931BF7EC-887F-4A40-9A99-0B8280C99C03}"/>
+              </a:ext>
+            </a:extLst>
+          </p:cNvPr>
+          <p:cNvCxnSpPr>
+            <a:cxnSpLocks/>
+            <a:stCxn id="12" idx="3"/>
+            <a:endCxn id="17" idx="0"/>
+          </p:cNvCxnSpPr>
+          <p:nvPr/>
+        </p:nvCxnSpPr>
+        <p:spPr>
+          <a:xfrm>
+            <a:off x="6358777" y="2987568"/>
+            <a:ext cx="533457" cy="1128853"/>
+          </a:xfrm>
+          <a:prstGeom prst="straightConnector1">
+            <a:avLst/>
+          </a:prstGeom>
+          <a:ln>
+            <a:tailEnd type="triangle"/>
+          </a:ln>
+        </p:spPr>
+        <p:style>
+          <a:lnRef idx="2">
+            <a:schemeClr val="dk1"/>
+          </a:lnRef>
+          <a:fillRef idx="0">
+            <a:schemeClr val="dk1"/>
+          </a:fillRef>
+          <a:effectRef idx="1">
+            <a:schemeClr val="dk1"/>
+          </a:effectRef>
+          <a:fontRef idx="minor">
+            <a:schemeClr val="tx1"/>
+          </a:fontRef>
+        </p:style>
+      </p:cxnSp>
+      <p:sp>
+        <p:nvSpPr>
+          <p:cNvPr id="14" name="TextBox 13">
+            <a:extLst>
+              <a:ext uri="{FF2B5EF4-FFF2-40B4-BE49-F238E27FC236}">
+                <a16:creationId xmlns:a16="http://schemas.microsoft.com/office/drawing/2014/main" id="{AF58AD33-2240-CA45-B3B8-52B3B89C8560}"/>
+              </a:ext>
+            </a:extLst>
+          </p:cNvPr>
+          <p:cNvSpPr txBox="1"/>
+          <p:nvPr/>
+        </p:nvSpPr>
+        <p:spPr>
+          <a:xfrm>
+            <a:off x="5180249" y="1817327"/>
+            <a:ext cx="896399" cy="369332"/>
+          </a:xfrm>
+          <a:prstGeom prst="rect">
+            <a:avLst/>
+          </a:prstGeom>
+          <a:noFill/>
+        </p:spPr>
+        <p:txBody>
+          <a:bodyPr wrap="none" rtlCol="0">
+            <a:spAutoFit/>
+          </a:bodyPr>
+          <a:lstStyle/>
+          <a:p>
+            <a:r>
+              <a:rPr lang="en-US" i="1" dirty="0">
+                <a:latin typeface="Times New Roman" panose="02020603050405020304" pitchFamily="18" charset="0"/>
+                <a:cs typeface="Times New Roman" panose="02020603050405020304" pitchFamily="18" charset="0"/>
+              </a:rPr>
+              <a:t>delete x</a:t>
+            </a:r>
+            <a:endParaRPr lang="en-CN" i="1" baseline="-25000" dirty="0">
+              <a:latin typeface="Times New Roman" panose="02020603050405020304" pitchFamily="18" charset="0"/>
+              <a:cs typeface="Times New Roman" panose="02020603050405020304" pitchFamily="18" charset="0"/>
+            </a:endParaRPr>
+          </a:p>
+        </p:txBody>
+      </p:sp>
+      <p:cxnSp>
+        <p:nvCxnSpPr>
+          <p:cNvPr id="15" name="Straight Arrow Connector 14">
+            <a:extLst>
+              <a:ext uri="{FF2B5EF4-FFF2-40B4-BE49-F238E27FC236}">
+                <a16:creationId xmlns:a16="http://schemas.microsoft.com/office/drawing/2014/main" id="{58D753B3-6853-114E-8E6F-46FDCEB25F9B}"/>
+              </a:ext>
+            </a:extLst>
+          </p:cNvPr>
+          <p:cNvCxnSpPr>
+            <a:cxnSpLocks/>
+            <a:stCxn id="14" idx="2"/>
+          </p:cNvCxnSpPr>
+          <p:nvPr/>
+        </p:nvCxnSpPr>
+        <p:spPr>
+          <a:xfrm>
+            <a:off x="5628449" y="2186659"/>
+            <a:ext cx="120728" cy="510159"/>
+          </a:xfrm>
+          <a:prstGeom prst="straightConnector1">
+            <a:avLst/>
+          </a:prstGeom>
+          <a:ln>
+            <a:tailEnd type="triangle"/>
+          </a:ln>
+        </p:spPr>
+        <p:style>
+          <a:lnRef idx="2">
+            <a:schemeClr val="dk1"/>
+          </a:lnRef>
+          <a:fillRef idx="0">
+            <a:schemeClr val="dk1"/>
+          </a:fillRef>
+          <a:effectRef idx="1">
+            <a:schemeClr val="dk1"/>
+          </a:effectRef>
+          <a:fontRef idx="minor">
+            <a:schemeClr val="tx1"/>
+          </a:fontRef>
+        </p:style>
+      </p:cxnSp>
+      <p:sp>
+        <p:nvSpPr>
+          <p:cNvPr id="17" name="Triangle 16">
+            <a:extLst>
+              <a:ext uri="{FF2B5EF4-FFF2-40B4-BE49-F238E27FC236}">
+                <a16:creationId xmlns:a16="http://schemas.microsoft.com/office/drawing/2014/main" id="{3FF43BCB-01AF-5E4F-82D7-327D7E052729}"/>
+              </a:ext>
+            </a:extLst>
+          </p:cNvPr>
+          <p:cNvSpPr/>
+          <p:nvPr/>
+        </p:nvSpPr>
+        <p:spPr>
+          <a:xfrm>
+            <a:off x="6227463" y="4116421"/>
+            <a:ext cx="1329541" cy="1086200"/>
+          </a:xfrm>
+          <a:prstGeom prst="triangle">
+            <a:avLst/>
+          </a:prstGeom>
+        </p:spPr>
+        <p:style>
+          <a:lnRef idx="2">
+            <a:schemeClr val="dk1"/>
+          </a:lnRef>
+          <a:fillRef idx="1">
+            <a:schemeClr val="lt1"/>
+          </a:fillRef>
+          <a:effectRef idx="0">
+            <a:schemeClr val="dk1"/>
+          </a:effectRef>
+          <a:fontRef idx="minor">
+            <a:schemeClr val="dk1"/>
+          </a:fontRef>
+        </p:style>
+        <p:txBody>
+          <a:bodyPr rtlCol="0" anchor="ctr"/>
+          <a:lstStyle/>
+          <a:p>
+            <a:pPr algn="ctr"/>
+            <a:r>
+              <a:rPr lang="en-CN" i="1" dirty="0">
+                <a:latin typeface="Times New Roman" panose="02020603050405020304" pitchFamily="18" charset="0"/>
+                <a:cs typeface="Times New Roman" panose="02020603050405020304" pitchFamily="18" charset="0"/>
+              </a:rPr>
+              <a:t>t</a:t>
+            </a:r>
+            <a:r>
+              <a:rPr lang="en-CN" i="1" baseline="-25000" dirty="0">
+                <a:latin typeface="Times New Roman" panose="02020603050405020304" pitchFamily="18" charset="0"/>
+                <a:cs typeface="Times New Roman" panose="02020603050405020304" pitchFamily="18" charset="0"/>
+              </a:rPr>
+              <a:t>i+</a:t>
+            </a:r>
+            <a:r>
+              <a:rPr lang="en-CN" baseline="-25000" dirty="0">
+                <a:latin typeface="Times New Roman" panose="02020603050405020304" pitchFamily="18" charset="0"/>
+                <a:cs typeface="Times New Roman" panose="02020603050405020304" pitchFamily="18" charset="0"/>
+              </a:rPr>
+              <a:t>1</a:t>
+            </a:r>
+          </a:p>
+          <a:p>
+            <a:pPr algn="ctr"/>
+            <a:endParaRPr lang="en-CN" dirty="0"/>
+          </a:p>
+        </p:txBody>
+      </p:sp>
+      <p:cxnSp>
+        <p:nvCxnSpPr>
+          <p:cNvPr id="21" name="Curved Connector 20">
+            <a:extLst>
+              <a:ext uri="{FF2B5EF4-FFF2-40B4-BE49-F238E27FC236}">
+                <a16:creationId xmlns:a16="http://schemas.microsoft.com/office/drawing/2014/main" id="{DF8CEBEA-B31B-6C40-9CF5-9DCB360F614B}"/>
+              </a:ext>
+            </a:extLst>
+          </p:cNvPr>
+          <p:cNvCxnSpPr>
+            <a:cxnSpLocks/>
+            <a:stCxn id="17" idx="2"/>
+            <a:endCxn id="12" idx="3"/>
+          </p:cNvCxnSpPr>
+          <p:nvPr/>
+        </p:nvCxnSpPr>
+        <p:spPr>
+          <a:xfrm rot="5400000" flipH="1" flipV="1">
+            <a:off x="5185593" y="4029438"/>
+            <a:ext cx="2215053" cy="131314"/>
+          </a:xfrm>
+          <a:prstGeom prst="curvedConnector4">
+            <a:avLst>
+              <a:gd name="adj1" fmla="val -532"/>
+              <a:gd name="adj2" fmla="val -127150"/>
+            </a:avLst>
+          </a:prstGeom>
+          <a:ln>
+            <a:prstDash val="dash"/>
+            <a:headEnd type="oval" w="med" len="med"/>
+            <a:tailEnd type="triangle" w="med" len="med"/>
+          </a:ln>
+        </p:spPr>
+        <p:style>
+          <a:lnRef idx="2">
+            <a:schemeClr val="dk1"/>
+          </a:lnRef>
+          <a:fillRef idx="0">
+            <a:schemeClr val="dk1"/>
+          </a:fillRef>
+          <a:effectRef idx="1">
+            <a:schemeClr val="dk1"/>
+          </a:effectRef>
+          <a:fontRef idx="minor">
+            <a:schemeClr val="tx1"/>
+          </a:fontRef>
+        </p:style>
+      </p:cxnSp>
+      <p:sp>
+        <p:nvSpPr>
+          <p:cNvPr id="33" name="TextBox 32">
+            <a:extLst>
+              <a:ext uri="{FF2B5EF4-FFF2-40B4-BE49-F238E27FC236}">
+                <a16:creationId xmlns:a16="http://schemas.microsoft.com/office/drawing/2014/main" id="{F277A218-127B-BC4E-BB5F-D933EB4AB3C6}"/>
+              </a:ext>
+            </a:extLst>
+          </p:cNvPr>
+          <p:cNvSpPr txBox="1"/>
+          <p:nvPr/>
+        </p:nvSpPr>
+        <p:spPr>
+          <a:xfrm>
+            <a:off x="4220703" y="3995825"/>
+            <a:ext cx="1815946" cy="369332"/>
+          </a:xfrm>
+          <a:prstGeom prst="rect">
+            <a:avLst/>
+          </a:prstGeom>
+          <a:noFill/>
+        </p:spPr>
+        <p:txBody>
+          <a:bodyPr wrap="none" rtlCol="0">
+            <a:spAutoFit/>
+          </a:bodyPr>
+          <a:lstStyle/>
+          <a:p>
+            <a:r>
+              <a:rPr lang="en-US" i="1" dirty="0">
+                <a:latin typeface="Times New Roman" panose="02020603050405020304" pitchFamily="18" charset="0"/>
+                <a:cs typeface="Times New Roman" panose="02020603050405020304" pitchFamily="18" charset="0"/>
+              </a:rPr>
+              <a:t>replace </a:t>
+            </a:r>
+            <a:r>
+              <a:rPr lang="en-US" i="1" dirty="0" err="1">
+                <a:latin typeface="Times New Roman" panose="02020603050405020304" pitchFamily="18" charset="0"/>
+                <a:cs typeface="Times New Roman" panose="02020603050405020304" pitchFamily="18" charset="0"/>
+              </a:rPr>
+              <a:t>k</a:t>
+            </a:r>
+            <a:r>
+              <a:rPr lang="en-US" i="1" baseline="-25000" dirty="0" err="1">
+                <a:latin typeface="Times New Roman" panose="02020603050405020304" pitchFamily="18" charset="0"/>
+                <a:cs typeface="Times New Roman" panose="02020603050405020304" pitchFamily="18" charset="0"/>
+              </a:rPr>
+              <a:t>i</a:t>
+            </a:r>
+            <a:r>
+              <a:rPr lang="en-US" i="1" dirty="0">
+                <a:latin typeface="Times New Roman" panose="02020603050405020304" pitchFamily="18" charset="0"/>
+                <a:cs typeface="Times New Roman" panose="02020603050405020304" pitchFamily="18" charset="0"/>
+              </a:rPr>
+              <a:t> with k”</a:t>
+            </a:r>
+            <a:endParaRPr lang="en-CN" i="1" baseline="-25000" dirty="0">
+              <a:latin typeface="Times New Roman" panose="02020603050405020304" pitchFamily="18" charset="0"/>
+              <a:cs typeface="Times New Roman" panose="02020603050405020304" pitchFamily="18" charset="0"/>
+            </a:endParaRPr>
+          </a:p>
+        </p:txBody>
+      </p:sp>
+      <p:sp>
+        <p:nvSpPr>
+          <p:cNvPr id="34" name="TextBox 33">
+            <a:extLst>
+              <a:ext uri="{FF2B5EF4-FFF2-40B4-BE49-F238E27FC236}">
+                <a16:creationId xmlns:a16="http://schemas.microsoft.com/office/drawing/2014/main" id="{501EB89A-9FEC-604C-A12E-3055CD5959BA}"/>
+              </a:ext>
+            </a:extLst>
+          </p:cNvPr>
+          <p:cNvSpPr txBox="1"/>
+          <p:nvPr/>
+        </p:nvSpPr>
+        <p:spPr>
+          <a:xfrm>
+            <a:off x="5497086" y="5349055"/>
+            <a:ext cx="1314784" cy="369332"/>
+          </a:xfrm>
+          <a:prstGeom prst="rect">
+            <a:avLst/>
+          </a:prstGeom>
+          <a:noFill/>
+        </p:spPr>
+        <p:txBody>
+          <a:bodyPr wrap="none" rtlCol="0">
+            <a:spAutoFit/>
+          </a:bodyPr>
+          <a:lstStyle/>
+          <a:p>
+            <a:r>
+              <a:rPr lang="en-US" i="1" dirty="0">
+                <a:latin typeface="Times New Roman" panose="02020603050405020304" pitchFamily="18" charset="0"/>
+                <a:cs typeface="Times New Roman" panose="02020603050405020304" pitchFamily="18" charset="0"/>
+              </a:rPr>
+              <a:t>k"=min</a:t>
+            </a:r>
+            <a:r>
+              <a:rPr lang="en-US" dirty="0">
+                <a:latin typeface="Times New Roman" panose="02020603050405020304" pitchFamily="18" charset="0"/>
+                <a:cs typeface="Times New Roman" panose="02020603050405020304" pitchFamily="18" charset="0"/>
+              </a:rPr>
+              <a:t>(</a:t>
+            </a:r>
+            <a:r>
+              <a:rPr lang="en-US" i="1" dirty="0">
+                <a:latin typeface="Times New Roman" panose="02020603050405020304" pitchFamily="18" charset="0"/>
+                <a:cs typeface="Times New Roman" panose="02020603050405020304" pitchFamily="18" charset="0"/>
+              </a:rPr>
+              <a:t>t</a:t>
+            </a:r>
+            <a:r>
+              <a:rPr lang="en-US" i="1" baseline="-25000" dirty="0">
+                <a:latin typeface="Times New Roman" panose="02020603050405020304" pitchFamily="18" charset="0"/>
+                <a:cs typeface="Times New Roman" panose="02020603050405020304" pitchFamily="18" charset="0"/>
+              </a:rPr>
+              <a:t>i+</a:t>
+            </a:r>
+            <a:r>
+              <a:rPr lang="en-US" baseline="-25000" dirty="0">
+                <a:latin typeface="Times New Roman" panose="02020603050405020304" pitchFamily="18" charset="0"/>
+                <a:cs typeface="Times New Roman" panose="02020603050405020304" pitchFamily="18" charset="0"/>
+              </a:rPr>
+              <a:t>1</a:t>
+            </a:r>
+            <a:r>
+              <a:rPr lang="en-US" dirty="0">
+                <a:latin typeface="Times New Roman" panose="02020603050405020304" pitchFamily="18" charset="0"/>
+                <a:cs typeface="Times New Roman" panose="02020603050405020304" pitchFamily="18" charset="0"/>
+              </a:rPr>
+              <a:t>)</a:t>
+            </a:r>
+            <a:endParaRPr lang="en-CN" baseline="-25000" dirty="0">
+              <a:latin typeface="Times New Roman" panose="02020603050405020304" pitchFamily="18" charset="0"/>
+              <a:cs typeface="Times New Roman" panose="02020603050405020304" pitchFamily="18" charset="0"/>
+            </a:endParaRPr>
+          </a:p>
+        </p:txBody>
+      </p:sp>
+      <p:sp>
+        <p:nvSpPr>
+          <p:cNvPr id="40" name="TextBox 39">
+            <a:extLst>
+              <a:ext uri="{FF2B5EF4-FFF2-40B4-BE49-F238E27FC236}">
+                <a16:creationId xmlns:a16="http://schemas.microsoft.com/office/drawing/2014/main" id="{6BE5956D-D336-114F-A8BA-971075757AAF}"/>
+              </a:ext>
+            </a:extLst>
+          </p:cNvPr>
+          <p:cNvSpPr txBox="1"/>
+          <p:nvPr/>
+        </p:nvSpPr>
+        <p:spPr>
+          <a:xfrm>
+            <a:off x="6712300" y="3527380"/>
+            <a:ext cx="1024639" cy="369332"/>
+          </a:xfrm>
+          <a:prstGeom prst="rect">
+            <a:avLst/>
+          </a:prstGeom>
+          <a:noFill/>
+        </p:spPr>
+        <p:txBody>
+          <a:bodyPr wrap="none" rtlCol="0">
+            <a:spAutoFit/>
+          </a:bodyPr>
+          <a:lstStyle/>
+          <a:p>
+            <a:r>
+              <a:rPr lang="en-US" i="1" dirty="0">
+                <a:latin typeface="Times New Roman" panose="02020603050405020304" pitchFamily="18" charset="0"/>
+                <a:cs typeface="Times New Roman" panose="02020603050405020304" pitchFamily="18" charset="0"/>
+              </a:rPr>
+              <a:t>delete k”</a:t>
+            </a:r>
+            <a:endParaRPr lang="en-CN" i="1" baseline="-25000" dirty="0">
+              <a:latin typeface="Times New Roman" panose="02020603050405020304" pitchFamily="18" charset="0"/>
+              <a:cs typeface="Times New Roman" panose="02020603050405020304" pitchFamily="18" charset="0"/>
+            </a:endParaRPr>
+          </a:p>
+        </p:txBody>
+      </p:sp>
+    </p:spTree>
+    <p:extLst>
+      <p:ext uri="{BB962C8B-B14F-4D97-AF65-F5344CB8AC3E}">
+        <p14:creationId xmlns:p14="http://schemas.microsoft.com/office/powerpoint/2010/main" val="3701538090"/>
       </p:ext>
     </p:extLst>
   </p:cSld>

</xml_diff>